<commit_message>
Added initial content to slides 8-9
</commit_message>
<xml_diff>
--- a/docker-foundations.pptx
+++ b/docker-foundations.pptx
@@ -5,7 +5,7 @@
     <p:sldMasterId id="2147483660" r:id="rId1"/>
   </p:sldMasterIdLst>
   <p:notesMasterIdLst>
-    <p:notesMasterId r:id="rId20"/>
+    <p:notesMasterId r:id="rId21"/>
   </p:notesMasterIdLst>
   <p:sldIdLst>
     <p:sldId id="256" r:id="rId2"/>
@@ -16,16 +16,17 @@
     <p:sldId id="271" r:id="rId7"/>
     <p:sldId id="273" r:id="rId8"/>
     <p:sldId id="259" r:id="rId9"/>
-    <p:sldId id="260" r:id="rId10"/>
-    <p:sldId id="261" r:id="rId11"/>
-    <p:sldId id="262" r:id="rId12"/>
-    <p:sldId id="263" r:id="rId13"/>
-    <p:sldId id="264" r:id="rId14"/>
-    <p:sldId id="265" r:id="rId15"/>
-    <p:sldId id="266" r:id="rId16"/>
-    <p:sldId id="267" r:id="rId17"/>
-    <p:sldId id="268" r:id="rId18"/>
-    <p:sldId id="269" r:id="rId19"/>
+    <p:sldId id="274" r:id="rId10"/>
+    <p:sldId id="260" r:id="rId11"/>
+    <p:sldId id="261" r:id="rId12"/>
+    <p:sldId id="262" r:id="rId13"/>
+    <p:sldId id="263" r:id="rId14"/>
+    <p:sldId id="264" r:id="rId15"/>
+    <p:sldId id="265" r:id="rId16"/>
+    <p:sldId id="266" r:id="rId17"/>
+    <p:sldId id="267" r:id="rId18"/>
+    <p:sldId id="268" r:id="rId19"/>
+    <p:sldId id="269" r:id="rId20"/>
   </p:sldIdLst>
   <p:sldSz cx="12192000" cy="6858000"/>
   <p:notesSz cx="6858000" cy="9144000"/>
@@ -641,7 +642,7 @@
           <a:p>
             <a:fld id="{020CF8D1-BA82-5045-ACF9-1AA42AD6A519}" type="slidenum">
               <a:rPr lang="en-US" smtClean="0"/>
-              <a:t>12</a:t>
+              <a:t>13</a:t>
             </a:fld>
             <a:endParaRPr lang="en-US"/>
           </a:p>
@@ -725,7 +726,7 @@
           <a:p>
             <a:fld id="{020CF8D1-BA82-5045-ACF9-1AA42AD6A519}" type="slidenum">
               <a:rPr lang="en-US" smtClean="0"/>
-              <a:t>13</a:t>
+              <a:t>14</a:t>
             </a:fld>
             <a:endParaRPr lang="en-US"/>
           </a:p>
@@ -809,7 +810,7 @@
           <a:p>
             <a:fld id="{020CF8D1-BA82-5045-ACF9-1AA42AD6A519}" type="slidenum">
               <a:rPr lang="en-US" smtClean="0"/>
-              <a:t>14</a:t>
+              <a:t>15</a:t>
             </a:fld>
             <a:endParaRPr lang="en-US"/>
           </a:p>
@@ -893,7 +894,7 @@
           <a:p>
             <a:fld id="{020CF8D1-BA82-5045-ACF9-1AA42AD6A519}" type="slidenum">
               <a:rPr lang="en-US" smtClean="0"/>
-              <a:t>15</a:t>
+              <a:t>16</a:t>
             </a:fld>
             <a:endParaRPr lang="en-US"/>
           </a:p>
@@ -977,7 +978,7 @@
           <a:p>
             <a:fld id="{020CF8D1-BA82-5045-ACF9-1AA42AD6A519}" type="slidenum">
               <a:rPr lang="en-US" smtClean="0"/>
-              <a:t>16</a:t>
+              <a:t>17</a:t>
             </a:fld>
             <a:endParaRPr lang="en-US"/>
           </a:p>
@@ -1061,7 +1062,7 @@
           <a:p>
             <a:fld id="{020CF8D1-BA82-5045-ACF9-1AA42AD6A519}" type="slidenum">
               <a:rPr lang="en-US" smtClean="0"/>
-              <a:t>17</a:t>
+              <a:t>18</a:t>
             </a:fld>
             <a:endParaRPr lang="en-US"/>
           </a:p>
@@ -1145,7 +1146,7 @@
           <a:p>
             <a:fld id="{020CF8D1-BA82-5045-ACF9-1AA42AD6A519}" type="slidenum">
               <a:rPr lang="en-US" smtClean="0"/>
-              <a:t>18</a:t>
+              <a:t>19</a:t>
             </a:fld>
             <a:endParaRPr lang="en-US"/>
           </a:p>
@@ -1649,7 +1650,7 @@
           <a:p>
             <a:fld id="{020CF8D1-BA82-5045-ACF9-1AA42AD6A519}" type="slidenum">
               <a:rPr lang="en-US" smtClean="0"/>
-              <a:t>9</a:t>
+              <a:t>10</a:t>
             </a:fld>
             <a:endParaRPr lang="en-US"/>
           </a:p>
@@ -1733,7 +1734,7 @@
           <a:p>
             <a:fld id="{020CF8D1-BA82-5045-ACF9-1AA42AD6A519}" type="slidenum">
               <a:rPr lang="en-US" smtClean="0"/>
-              <a:t>10</a:t>
+              <a:t>11</a:t>
             </a:fld>
             <a:endParaRPr lang="en-US"/>
           </a:p>
@@ -1817,7 +1818,7 @@
           <a:p>
             <a:fld id="{020CF8D1-BA82-5045-ACF9-1AA42AD6A519}" type="slidenum">
               <a:rPr lang="en-US" smtClean="0"/>
-              <a:t>11</a:t>
+              <a:t>12</a:t>
             </a:fld>
             <a:endParaRPr lang="en-US"/>
           </a:p>
@@ -4934,10 +4935,10 @@
       </p:pic>
       <p:pic>
         <p:nvPicPr>
-          <p:cNvPr id="8" name="Picture 7" descr="A close up of a sign&#10;&#10;Description automatically generated">
+          <p:cNvPr id="11" name="Picture 10" descr="A close up of a sign&#10;&#10;Description automatically generated">
             <a:extLst>
               <a:ext uri="{FF2B5EF4-FFF2-40B4-BE49-F238E27FC236}">
-                <a16:creationId xmlns:a16="http://schemas.microsoft.com/office/drawing/2014/main" id="{BC56DE46-A0E4-5C46-AD9B-AD10EE855009}"/>
+                <a16:creationId xmlns:a16="http://schemas.microsoft.com/office/drawing/2014/main" id="{B65EBD54-CF93-1D4A-A39B-E0E2861C9378}"/>
               </a:ext>
             </a:extLst>
           </p:cNvPr>
@@ -4954,8 +4955,8 @@
         </p:blipFill>
         <p:spPr>
           <a:xfrm>
-            <a:off x="4704079" y="4239466"/>
-            <a:ext cx="2783842" cy="2410189"/>
+            <a:off x="4202610" y="3735430"/>
+            <a:ext cx="3786779" cy="3223270"/>
           </a:xfrm>
           <a:prstGeom prst="rect">
             <a:avLst/>
@@ -5009,7 +5010,7 @@
           <p:cNvPr id="2" name="Title 1">
             <a:extLst>
               <a:ext uri="{FF2B5EF4-FFF2-40B4-BE49-F238E27FC236}">
-                <a16:creationId xmlns:a16="http://schemas.microsoft.com/office/drawing/2014/main" id="{AC0D55DF-385E-9A4F-AB08-FEBC11990B8B}"/>
+                <a16:creationId xmlns:a16="http://schemas.microsoft.com/office/drawing/2014/main" id="{178FC9BC-162C-754A-A134-D392F08CDBEE}"/>
               </a:ext>
             </a:extLst>
           </p:cNvPr>
@@ -5027,11 +5028,11 @@
           <a:p>
             <a:r>
               <a:rPr lang="en-US" dirty="0"/>
-              <a:t>Docker Images</a:t>
+              <a:t>Installing</a:t>
             </a:r>
             <a:r>
               <a:rPr lang="en-US" baseline="0" dirty="0"/>
-              <a:t> &amp; Containers</a:t>
+              <a:t> Docker</a:t>
             </a:r>
             <a:endParaRPr lang="en-US" dirty="0"/>
           </a:p>
@@ -5042,7 +5043,7 @@
           <p:cNvPr id="3" name="Content Placeholder 2">
             <a:extLst>
               <a:ext uri="{FF2B5EF4-FFF2-40B4-BE49-F238E27FC236}">
-                <a16:creationId xmlns:a16="http://schemas.microsoft.com/office/drawing/2014/main" id="{4CB23FD9-ADE0-084E-A8CC-44CA0BA25AB3}"/>
+                <a16:creationId xmlns:a16="http://schemas.microsoft.com/office/drawing/2014/main" id="{0ECC7DC7-0671-F543-9991-CF8210E2567B}"/>
               </a:ext>
             </a:extLst>
           </p:cNvPr>
@@ -5058,7 +5059,22 @@
           <a:bodyPr/>
           <a:lstStyle/>
           <a:p>
-            <a:endParaRPr lang="en-US"/>
+            <a:r>
+              <a:rPr lang="en-US" dirty="0"/>
+              <a:t>Setup Docker account</a:t>
+            </a:r>
+          </a:p>
+          <a:p>
+            <a:r>
+              <a:rPr lang="en-US" dirty="0"/>
+              <a:t>Verify docker installation (docker info docker --version)</a:t>
+            </a:r>
+          </a:p>
+          <a:p>
+            <a:r>
+              <a:rPr lang="en-US" dirty="0"/>
+              <a:t>docker run hello-world</a:t>
+            </a:r>
           </a:p>
         </p:txBody>
       </p:sp>
@@ -5067,7 +5083,7 @@
           <p:cNvPr id="4" name="Date Placeholder 3">
             <a:extLst>
               <a:ext uri="{FF2B5EF4-FFF2-40B4-BE49-F238E27FC236}">
-                <a16:creationId xmlns:a16="http://schemas.microsoft.com/office/drawing/2014/main" id="{6E8781CE-B8A7-7540-B619-28D099093D8B}"/>
+                <a16:creationId xmlns:a16="http://schemas.microsoft.com/office/drawing/2014/main" id="{38C6DDB4-CE9E-4843-86A9-EFC27330D02F}"/>
               </a:ext>
             </a:extLst>
           </p:cNvPr>
@@ -5096,7 +5112,7 @@
           <p:cNvPr id="5" name="Slide Number Placeholder 4">
             <a:extLst>
               <a:ext uri="{FF2B5EF4-FFF2-40B4-BE49-F238E27FC236}">
-                <a16:creationId xmlns:a16="http://schemas.microsoft.com/office/drawing/2014/main" id="{222BEAA2-2326-1F4D-9BCE-0FC3EC23B201}"/>
+                <a16:creationId xmlns:a16="http://schemas.microsoft.com/office/drawing/2014/main" id="{09AD6D8E-DFAE-8E42-9152-B189D9284AD9}"/>
               </a:ext>
             </a:extLst>
           </p:cNvPr>
@@ -5124,7 +5140,7 @@
     </p:spTree>
     <p:extLst>
       <p:ext uri="{BB962C8B-B14F-4D97-AF65-F5344CB8AC3E}">
-        <p14:creationId xmlns:p14="http://schemas.microsoft.com/office/powerpoint/2010/main" val="3339272507"/>
+        <p14:creationId xmlns:p14="http://schemas.microsoft.com/office/powerpoint/2010/main" val="3971807622"/>
       </p:ext>
     </p:extLst>
   </p:cSld>
@@ -5168,7 +5184,7 @@
           <p:cNvPr id="2" name="Title 1">
             <a:extLst>
               <a:ext uri="{FF2B5EF4-FFF2-40B4-BE49-F238E27FC236}">
-                <a16:creationId xmlns:a16="http://schemas.microsoft.com/office/drawing/2014/main" id="{42BD247B-4264-A040-8FCB-C20FD3374FF4}"/>
+                <a16:creationId xmlns:a16="http://schemas.microsoft.com/office/drawing/2014/main" id="{AC0D55DF-385E-9A4F-AB08-FEBC11990B8B}"/>
               </a:ext>
             </a:extLst>
           </p:cNvPr>
@@ -5186,8 +5202,13 @@
           <a:p>
             <a:r>
               <a:rPr lang="en-US" dirty="0"/>
-              <a:t>Downloading &amp; Storing Images</a:t>
-            </a:r>
+              <a:t>Docker Images</a:t>
+            </a:r>
+            <a:r>
+              <a:rPr lang="en-US" baseline="0" dirty="0"/>
+              <a:t> &amp; Containers</a:t>
+            </a:r>
+            <a:endParaRPr lang="en-US" dirty="0"/>
           </a:p>
         </p:txBody>
       </p:sp>
@@ -5196,7 +5217,7 @@
           <p:cNvPr id="3" name="Content Placeholder 2">
             <a:extLst>
               <a:ext uri="{FF2B5EF4-FFF2-40B4-BE49-F238E27FC236}">
-                <a16:creationId xmlns:a16="http://schemas.microsoft.com/office/drawing/2014/main" id="{B0305AB4-6FFD-1443-85B0-D0B7EAF3A8B3}"/>
+                <a16:creationId xmlns:a16="http://schemas.microsoft.com/office/drawing/2014/main" id="{4CB23FD9-ADE0-084E-A8CC-44CA0BA25AB3}"/>
               </a:ext>
             </a:extLst>
           </p:cNvPr>
@@ -5212,7 +5233,7 @@
           <a:bodyPr/>
           <a:lstStyle/>
           <a:p>
-            <a:endParaRPr lang="en-US" dirty="0"/>
+            <a:endParaRPr lang="en-US"/>
           </a:p>
         </p:txBody>
       </p:sp>
@@ -5221,7 +5242,7 @@
           <p:cNvPr id="4" name="Date Placeholder 3">
             <a:extLst>
               <a:ext uri="{FF2B5EF4-FFF2-40B4-BE49-F238E27FC236}">
-                <a16:creationId xmlns:a16="http://schemas.microsoft.com/office/drawing/2014/main" id="{BCB84961-9207-314D-9F17-CB7953DAEC61}"/>
+                <a16:creationId xmlns:a16="http://schemas.microsoft.com/office/drawing/2014/main" id="{6E8781CE-B8A7-7540-B619-28D099093D8B}"/>
               </a:ext>
             </a:extLst>
           </p:cNvPr>
@@ -5250,7 +5271,7 @@
           <p:cNvPr id="5" name="Slide Number Placeholder 4">
             <a:extLst>
               <a:ext uri="{FF2B5EF4-FFF2-40B4-BE49-F238E27FC236}">
-                <a16:creationId xmlns:a16="http://schemas.microsoft.com/office/drawing/2014/main" id="{8DCD8B99-39C3-F945-B4FE-C794E71188E0}"/>
+                <a16:creationId xmlns:a16="http://schemas.microsoft.com/office/drawing/2014/main" id="{222BEAA2-2326-1F4D-9BCE-0FC3EC23B201}"/>
               </a:ext>
             </a:extLst>
           </p:cNvPr>
@@ -5278,7 +5299,7 @@
     </p:spTree>
     <p:extLst>
       <p:ext uri="{BB962C8B-B14F-4D97-AF65-F5344CB8AC3E}">
-        <p14:creationId xmlns:p14="http://schemas.microsoft.com/office/powerpoint/2010/main" val="3043587272"/>
+        <p14:creationId xmlns:p14="http://schemas.microsoft.com/office/powerpoint/2010/main" val="3339272507"/>
       </p:ext>
     </p:extLst>
   </p:cSld>
@@ -5322,7 +5343,7 @@
           <p:cNvPr id="2" name="Title 1">
             <a:extLst>
               <a:ext uri="{FF2B5EF4-FFF2-40B4-BE49-F238E27FC236}">
-                <a16:creationId xmlns:a16="http://schemas.microsoft.com/office/drawing/2014/main" id="{8433E226-C9CA-6940-939E-6C1F5B356A30}"/>
+                <a16:creationId xmlns:a16="http://schemas.microsoft.com/office/drawing/2014/main" id="{42BD247B-4264-A040-8FCB-C20FD3374FF4}"/>
               </a:ext>
             </a:extLst>
           </p:cNvPr>
@@ -5340,7 +5361,7 @@
           <a:p>
             <a:r>
               <a:rPr lang="en-US" dirty="0"/>
-              <a:t>Docker Images</a:t>
+              <a:t>Downloading &amp; Storing Images</a:t>
             </a:r>
           </a:p>
         </p:txBody>
@@ -5350,7 +5371,7 @@
           <p:cNvPr id="3" name="Content Placeholder 2">
             <a:extLst>
               <a:ext uri="{FF2B5EF4-FFF2-40B4-BE49-F238E27FC236}">
-                <a16:creationId xmlns:a16="http://schemas.microsoft.com/office/drawing/2014/main" id="{B3D06E7E-C378-CF4A-BAE8-73912C1352E6}"/>
+                <a16:creationId xmlns:a16="http://schemas.microsoft.com/office/drawing/2014/main" id="{B0305AB4-6FFD-1443-85B0-D0B7EAF3A8B3}"/>
               </a:ext>
             </a:extLst>
           </p:cNvPr>
@@ -5366,10 +5387,7 @@
           <a:bodyPr/>
           <a:lstStyle/>
           <a:p>
-            <a:r>
-              <a:rPr lang="en-US" dirty="0"/>
-              <a:t>Layers</a:t>
-            </a:r>
+            <a:endParaRPr lang="en-US" dirty="0"/>
           </a:p>
         </p:txBody>
       </p:sp>
@@ -5378,7 +5396,7 @@
           <p:cNvPr id="4" name="Date Placeholder 3">
             <a:extLst>
               <a:ext uri="{FF2B5EF4-FFF2-40B4-BE49-F238E27FC236}">
-                <a16:creationId xmlns:a16="http://schemas.microsoft.com/office/drawing/2014/main" id="{4F1B3995-BF30-9944-85E9-292F234D5C32}"/>
+                <a16:creationId xmlns:a16="http://schemas.microsoft.com/office/drawing/2014/main" id="{BCB84961-9207-314D-9F17-CB7953DAEC61}"/>
               </a:ext>
             </a:extLst>
           </p:cNvPr>
@@ -5407,7 +5425,7 @@
           <p:cNvPr id="5" name="Slide Number Placeholder 4">
             <a:extLst>
               <a:ext uri="{FF2B5EF4-FFF2-40B4-BE49-F238E27FC236}">
-                <a16:creationId xmlns:a16="http://schemas.microsoft.com/office/drawing/2014/main" id="{72FDF096-946D-D740-8B15-C2984C73CB55}"/>
+                <a16:creationId xmlns:a16="http://schemas.microsoft.com/office/drawing/2014/main" id="{8DCD8B99-39C3-F945-B4FE-C794E71188E0}"/>
               </a:ext>
             </a:extLst>
           </p:cNvPr>
@@ -5435,7 +5453,7 @@
     </p:spTree>
     <p:extLst>
       <p:ext uri="{BB962C8B-B14F-4D97-AF65-F5344CB8AC3E}">
-        <p14:creationId xmlns:p14="http://schemas.microsoft.com/office/powerpoint/2010/main" val="2543508427"/>
+        <p14:creationId xmlns:p14="http://schemas.microsoft.com/office/powerpoint/2010/main" val="3043587272"/>
       </p:ext>
     </p:extLst>
   </p:cSld>
@@ -5479,7 +5497,7 @@
           <p:cNvPr id="2" name="Title 1">
             <a:extLst>
               <a:ext uri="{FF2B5EF4-FFF2-40B4-BE49-F238E27FC236}">
-                <a16:creationId xmlns:a16="http://schemas.microsoft.com/office/drawing/2014/main" id="{50D24551-8433-1648-A045-8FBF82633296}"/>
+                <a16:creationId xmlns:a16="http://schemas.microsoft.com/office/drawing/2014/main" id="{8433E226-C9CA-6940-939E-6C1F5B356A30}"/>
               </a:ext>
             </a:extLst>
           </p:cNvPr>
@@ -5497,13 +5515,8 @@
           <a:p>
             <a:r>
               <a:rPr lang="en-US" dirty="0"/>
-              <a:t>The </a:t>
-            </a:r>
-            <a:r>
-              <a:rPr lang="en-US" dirty="0" err="1"/>
-              <a:t>Dockerfile</a:t>
-            </a:r>
-            <a:endParaRPr lang="en-US" dirty="0"/>
+              <a:t>Docker Images</a:t>
+            </a:r>
           </a:p>
         </p:txBody>
       </p:sp>
@@ -5512,7 +5525,7 @@
           <p:cNvPr id="3" name="Content Placeholder 2">
             <a:extLst>
               <a:ext uri="{FF2B5EF4-FFF2-40B4-BE49-F238E27FC236}">
-                <a16:creationId xmlns:a16="http://schemas.microsoft.com/office/drawing/2014/main" id="{2E80DB0F-50E2-A74A-8E43-27BCD108C388}"/>
+                <a16:creationId xmlns:a16="http://schemas.microsoft.com/office/drawing/2014/main" id="{B3D06E7E-C378-CF4A-BAE8-73912C1352E6}"/>
               </a:ext>
             </a:extLst>
           </p:cNvPr>
@@ -5530,37 +5543,7 @@
           <a:p>
             <a:r>
               <a:rPr lang="en-US" dirty="0"/>
-              <a:t>FROM</a:t>
-            </a:r>
-          </a:p>
-          <a:p>
-            <a:r>
-              <a:rPr lang="en-US" dirty="0"/>
-              <a:t>RUN</a:t>
-            </a:r>
-          </a:p>
-          <a:p>
-            <a:r>
-              <a:rPr lang="en-US" dirty="0"/>
-              <a:t>WORKDIR</a:t>
-            </a:r>
-          </a:p>
-          <a:p>
-            <a:r>
-              <a:rPr lang="en-US" dirty="0"/>
-              <a:t>COPY</a:t>
-            </a:r>
-          </a:p>
-          <a:p>
-            <a:r>
-              <a:rPr lang="en-US" dirty="0"/>
-              <a:t>LABEL</a:t>
-            </a:r>
-          </a:p>
-          <a:p>
-            <a:r>
-              <a:rPr lang="en-US" dirty="0"/>
-              <a:t>CMD</a:t>
+              <a:t>Layers</a:t>
             </a:r>
           </a:p>
         </p:txBody>
@@ -5570,7 +5553,7 @@
           <p:cNvPr id="4" name="Date Placeholder 3">
             <a:extLst>
               <a:ext uri="{FF2B5EF4-FFF2-40B4-BE49-F238E27FC236}">
-                <a16:creationId xmlns:a16="http://schemas.microsoft.com/office/drawing/2014/main" id="{39846D18-0182-8944-9632-5EC9FBE06918}"/>
+                <a16:creationId xmlns:a16="http://schemas.microsoft.com/office/drawing/2014/main" id="{4F1B3995-BF30-9944-85E9-292F234D5C32}"/>
               </a:ext>
             </a:extLst>
           </p:cNvPr>
@@ -5599,7 +5582,7 @@
           <p:cNvPr id="5" name="Slide Number Placeholder 4">
             <a:extLst>
               <a:ext uri="{FF2B5EF4-FFF2-40B4-BE49-F238E27FC236}">
-                <a16:creationId xmlns:a16="http://schemas.microsoft.com/office/drawing/2014/main" id="{9D302B0E-8A9B-A64D-BBA5-16F36A28D4D2}"/>
+                <a16:creationId xmlns:a16="http://schemas.microsoft.com/office/drawing/2014/main" id="{72FDF096-946D-D740-8B15-C2984C73CB55}"/>
               </a:ext>
             </a:extLst>
           </p:cNvPr>
@@ -5627,7 +5610,7 @@
     </p:spTree>
     <p:extLst>
       <p:ext uri="{BB962C8B-B14F-4D97-AF65-F5344CB8AC3E}">
-        <p14:creationId xmlns:p14="http://schemas.microsoft.com/office/powerpoint/2010/main" val="2181295849"/>
+        <p14:creationId xmlns:p14="http://schemas.microsoft.com/office/powerpoint/2010/main" val="2543508427"/>
       </p:ext>
     </p:extLst>
   </p:cSld>
@@ -5671,7 +5654,7 @@
           <p:cNvPr id="2" name="Title 1">
             <a:extLst>
               <a:ext uri="{FF2B5EF4-FFF2-40B4-BE49-F238E27FC236}">
-                <a16:creationId xmlns:a16="http://schemas.microsoft.com/office/drawing/2014/main" id="{94E0E83A-4B2A-E544-BF79-EC8A6F911A9E}"/>
+                <a16:creationId xmlns:a16="http://schemas.microsoft.com/office/drawing/2014/main" id="{50D24551-8433-1648-A045-8FBF82633296}"/>
               </a:ext>
             </a:extLst>
           </p:cNvPr>
@@ -5689,8 +5672,13 @@
           <a:p>
             <a:r>
               <a:rPr lang="en-US" dirty="0"/>
-              <a:t>Build Docker Images</a:t>
-            </a:r>
+              <a:t>The </a:t>
+            </a:r>
+            <a:r>
+              <a:rPr lang="en-US" dirty="0" err="1"/>
+              <a:t>Dockerfile</a:t>
+            </a:r>
+            <a:endParaRPr lang="en-US" dirty="0"/>
           </a:p>
         </p:txBody>
       </p:sp>
@@ -5699,7 +5687,7 @@
           <p:cNvPr id="3" name="Content Placeholder 2">
             <a:extLst>
               <a:ext uri="{FF2B5EF4-FFF2-40B4-BE49-F238E27FC236}">
-                <a16:creationId xmlns:a16="http://schemas.microsoft.com/office/drawing/2014/main" id="{34D58626-62C7-114E-81E1-0A0A21659024}"/>
+                <a16:creationId xmlns:a16="http://schemas.microsoft.com/office/drawing/2014/main" id="{2E80DB0F-50E2-A74A-8E43-27BCD108C388}"/>
               </a:ext>
             </a:extLst>
           </p:cNvPr>
@@ -5717,33 +5705,37 @@
           <a:p>
             <a:r>
               <a:rPr lang="en-US" dirty="0"/>
-              <a:t>docker image build -t </a:t>
-            </a:r>
-            <a:r>
-              <a:rPr lang="en-US" dirty="0" err="1"/>
-              <a:t>nnn</a:t>
-            </a:r>
+              <a:t>FROM</a:t>
+            </a:r>
+          </a:p>
+          <a:p>
             <a:r>
               <a:rPr lang="en-US" dirty="0"/>
-              <a:t> .</a:t>
+              <a:t>RUN</a:t>
             </a:r>
           </a:p>
           <a:p>
             <a:r>
               <a:rPr lang="en-US" dirty="0"/>
-              <a:t>docker image ls</a:t>
+              <a:t>WORKDIR</a:t>
             </a:r>
           </a:p>
           <a:p>
             <a:r>
               <a:rPr lang="en-US" dirty="0"/>
-              <a:t>docker image push</a:t>
+              <a:t>COPY</a:t>
             </a:r>
           </a:p>
           <a:p>
             <a:r>
               <a:rPr lang="en-US" dirty="0"/>
-              <a:t>docker image rm</a:t>
+              <a:t>LABEL</a:t>
+            </a:r>
+          </a:p>
+          <a:p>
+            <a:r>
+              <a:rPr lang="en-US" dirty="0"/>
+              <a:t>CMD</a:t>
             </a:r>
           </a:p>
         </p:txBody>
@@ -5753,7 +5745,7 @@
           <p:cNvPr id="4" name="Date Placeholder 3">
             <a:extLst>
               <a:ext uri="{FF2B5EF4-FFF2-40B4-BE49-F238E27FC236}">
-                <a16:creationId xmlns:a16="http://schemas.microsoft.com/office/drawing/2014/main" id="{CC4ADDAD-DA87-B242-A2FD-55D58FC589CB}"/>
+                <a16:creationId xmlns:a16="http://schemas.microsoft.com/office/drawing/2014/main" id="{39846D18-0182-8944-9632-5EC9FBE06918}"/>
               </a:ext>
             </a:extLst>
           </p:cNvPr>
@@ -5782,7 +5774,7 @@
           <p:cNvPr id="5" name="Slide Number Placeholder 4">
             <a:extLst>
               <a:ext uri="{FF2B5EF4-FFF2-40B4-BE49-F238E27FC236}">
-                <a16:creationId xmlns:a16="http://schemas.microsoft.com/office/drawing/2014/main" id="{A1DDA22E-7443-8A4B-9114-623E0D047796}"/>
+                <a16:creationId xmlns:a16="http://schemas.microsoft.com/office/drawing/2014/main" id="{9D302B0E-8A9B-A64D-BBA5-16F36A28D4D2}"/>
               </a:ext>
             </a:extLst>
           </p:cNvPr>
@@ -5810,7 +5802,7 @@
     </p:spTree>
     <p:extLst>
       <p:ext uri="{BB962C8B-B14F-4D97-AF65-F5344CB8AC3E}">
-        <p14:creationId xmlns:p14="http://schemas.microsoft.com/office/powerpoint/2010/main" val="3565611311"/>
+        <p14:creationId xmlns:p14="http://schemas.microsoft.com/office/powerpoint/2010/main" val="2181295849"/>
       </p:ext>
     </p:extLst>
   </p:cSld>
@@ -5854,7 +5846,7 @@
           <p:cNvPr id="2" name="Title 1">
             <a:extLst>
               <a:ext uri="{FF2B5EF4-FFF2-40B4-BE49-F238E27FC236}">
-                <a16:creationId xmlns:a16="http://schemas.microsoft.com/office/drawing/2014/main" id="{0DB06B14-C727-D448-B006-9B16C89B8923}"/>
+                <a16:creationId xmlns:a16="http://schemas.microsoft.com/office/drawing/2014/main" id="{94E0E83A-4B2A-E544-BF79-EC8A6F911A9E}"/>
               </a:ext>
             </a:extLst>
           </p:cNvPr>
@@ -5872,7 +5864,7 @@
           <a:p>
             <a:r>
               <a:rPr lang="en-US" dirty="0"/>
-              <a:t>Create Docker Containers</a:t>
+              <a:t>Build Docker Images</a:t>
             </a:r>
           </a:p>
         </p:txBody>
@@ -5882,7 +5874,7 @@
           <p:cNvPr id="3" name="Content Placeholder 2">
             <a:extLst>
               <a:ext uri="{FF2B5EF4-FFF2-40B4-BE49-F238E27FC236}">
-                <a16:creationId xmlns:a16="http://schemas.microsoft.com/office/drawing/2014/main" id="{D5FFDFF9-EB2F-BD49-B79C-EB08AF5D9C92}"/>
+                <a16:creationId xmlns:a16="http://schemas.microsoft.com/office/drawing/2014/main" id="{34D58626-62C7-114E-81E1-0A0A21659024}"/>
               </a:ext>
             </a:extLst>
           </p:cNvPr>
@@ -5895,170 +5887,38 @@
         </p:nvSpPr>
         <p:spPr/>
         <p:txBody>
-          <a:bodyPr>
-            <a:normAutofit fontScale="92500" lnSpcReduction="20000"/>
-          </a:bodyPr>
+          <a:bodyPr/>
           <a:lstStyle/>
           <a:p>
             <a:r>
               <a:rPr lang="en-US" dirty="0"/>
-              <a:t>docker container ls [-a]</a:t>
-            </a:r>
-          </a:p>
-          <a:p>
+              <a:t>docker image build -t </a:t>
+            </a:r>
+            <a:r>
+              <a:rPr lang="en-US" dirty="0" err="1"/>
+              <a:t>nnn</a:t>
+            </a:r>
             <a:r>
               <a:rPr lang="en-US" dirty="0"/>
-              <a:t>docker container run</a:t>
-            </a:r>
-          </a:p>
-          <a:p>
-            <a:pPr lvl="1"/>
+              <a:t> .</a:t>
+            </a:r>
+          </a:p>
+          <a:p>
             <a:r>
               <a:rPr lang="en-US" dirty="0"/>
-              <a:t>Flags</a:t>
-            </a:r>
-          </a:p>
-          <a:p>
-            <a:pPr lvl="2"/>
-            <a:r>
-              <a:rPr lang="en-US" dirty="0" err="1"/>
-              <a:t>i</a:t>
-            </a:r>
-            <a:endParaRPr lang="en-US" dirty="0"/>
-          </a:p>
-          <a:p>
-            <a:pPr lvl="2"/>
+              <a:t>docker image ls</a:t>
+            </a:r>
+          </a:p>
+          <a:p>
             <a:r>
               <a:rPr lang="en-US" dirty="0"/>
-              <a:t>t</a:t>
-            </a:r>
-          </a:p>
-          <a:p>
-            <a:pPr lvl="2"/>
+              <a:t>docker image push</a:t>
+            </a:r>
+          </a:p>
+          <a:p>
             <a:r>
               <a:rPr lang="en-US" dirty="0"/>
-              <a:t>d</a:t>
-            </a:r>
-          </a:p>
-          <a:p>
-            <a:pPr lvl="2"/>
-            <a:r>
-              <a:rPr lang="en-US" dirty="0"/>
-              <a:t>--name</a:t>
-            </a:r>
-          </a:p>
-          <a:p>
-            <a:pPr lvl="2"/>
-            <a:r>
-              <a:rPr lang="en-US" dirty="0"/>
-              <a:t>--rm</a:t>
-            </a:r>
-          </a:p>
-          <a:p>
-            <a:pPr lvl="2"/>
-            <a:r>
-              <a:rPr lang="en-US" dirty="0"/>
-              <a:t>Ctrl P + Q</a:t>
-            </a:r>
-          </a:p>
-          <a:p>
-            <a:pPr lvl="2"/>
-            <a:r>
-              <a:rPr lang="en-US" dirty="0"/>
-              <a:t>Ctrl D</a:t>
-            </a:r>
-          </a:p>
-          <a:p>
-            <a:pPr lvl="0"/>
-            <a:r>
-              <a:rPr lang="en-US" dirty="0"/>
-              <a:t>docker container start/stop/attach/rm</a:t>
-            </a:r>
-          </a:p>
-          <a:p>
-            <a:pPr marL="685800" marR="0" lvl="1" indent="-228600" algn="l" defTabSz="914400" rtl="0" eaLnBrk="1" fontAlgn="auto" latinLnBrk="0" hangingPunct="1">
-              <a:lnSpc>
-                <a:spcPct val="90000"/>
-              </a:lnSpc>
-              <a:spcBef>
-                <a:spcPts val="500"/>
-              </a:spcBef>
-              <a:spcAft>
-                <a:spcPts val="0"/>
-              </a:spcAft>
-              <a:buClrTx/>
-              <a:buSzTx/>
-              <a:buFont typeface="Arial" panose="020B0604020202020204" pitchFamily="34" charset="0"/>
-              <a:buChar char="•"/>
-              <a:tabLst/>
-              <a:defRPr/>
-            </a:pPr>
-            <a:r>
-              <a:rPr lang="en-US" sz="2400" kern="1200" dirty="0">
-                <a:solidFill>
-                  <a:schemeClr val="tx1"/>
-                </a:solidFill>
-                <a:effectLst/>
-                <a:latin typeface="+mn-lt"/>
-                <a:ea typeface="+mn-ea"/>
-                <a:cs typeface="+mn-cs"/>
-              </a:rPr>
-              <a:t>docker container</a:t>
-            </a:r>
-            <a:r>
-              <a:rPr lang="en-US" sz="2400" kern="1200" baseline="0" dirty="0">
-                <a:solidFill>
-                  <a:schemeClr val="tx1"/>
-                </a:solidFill>
-                <a:effectLst/>
-                <a:latin typeface="+mn-lt"/>
-                <a:ea typeface="+mn-ea"/>
-                <a:cs typeface="+mn-cs"/>
-              </a:rPr>
-              <a:t> stop container1 container2 container3</a:t>
-            </a:r>
-          </a:p>
-          <a:p>
-            <a:pPr marL="685800" marR="0" lvl="1" indent="-228600" algn="l" defTabSz="914400" rtl="0" eaLnBrk="1" fontAlgn="auto" latinLnBrk="0" hangingPunct="1">
-              <a:lnSpc>
-                <a:spcPct val="90000"/>
-              </a:lnSpc>
-              <a:spcBef>
-                <a:spcPts val="500"/>
-              </a:spcBef>
-              <a:spcAft>
-                <a:spcPts val="0"/>
-              </a:spcAft>
-              <a:buClrTx/>
-              <a:buSzTx/>
-              <a:buFont typeface="Arial" panose="020B0604020202020204" pitchFamily="34" charset="0"/>
-              <a:buChar char="•"/>
-              <a:tabLst/>
-              <a:defRPr/>
-            </a:pPr>
-            <a:r>
-              <a:rPr lang="en-US" sz="2400" kern="1200" dirty="0">
-                <a:solidFill>
-                  <a:schemeClr val="tx1"/>
-                </a:solidFill>
-                <a:effectLst/>
-                <a:latin typeface="+mn-lt"/>
-                <a:ea typeface="+mn-ea"/>
-                <a:cs typeface="+mn-cs"/>
-              </a:rPr>
-              <a:t>docker container</a:t>
-            </a:r>
-            <a:r>
-              <a:rPr lang="en-US" sz="2400" kern="1200" baseline="0" dirty="0">
-                <a:solidFill>
-                  <a:schemeClr val="tx1"/>
-                </a:solidFill>
-                <a:effectLst/>
-                <a:latin typeface="+mn-lt"/>
-                <a:ea typeface="+mn-ea"/>
-                <a:cs typeface="+mn-cs"/>
-              </a:rPr>
-              <a:t> stop $(docker container ls -a -q)</a:t>
+              <a:t>docker image rm</a:t>
             </a:r>
           </a:p>
         </p:txBody>
@@ -6068,7 +5928,7 @@
           <p:cNvPr id="4" name="Date Placeholder 3">
             <a:extLst>
               <a:ext uri="{FF2B5EF4-FFF2-40B4-BE49-F238E27FC236}">
-                <a16:creationId xmlns:a16="http://schemas.microsoft.com/office/drawing/2014/main" id="{E7AF9DB9-6A2B-8841-A7D0-6CEA791F9D17}"/>
+                <a16:creationId xmlns:a16="http://schemas.microsoft.com/office/drawing/2014/main" id="{CC4ADDAD-DA87-B242-A2FD-55D58FC589CB}"/>
               </a:ext>
             </a:extLst>
           </p:cNvPr>
@@ -6097,7 +5957,7 @@
           <p:cNvPr id="5" name="Slide Number Placeholder 4">
             <a:extLst>
               <a:ext uri="{FF2B5EF4-FFF2-40B4-BE49-F238E27FC236}">
-                <a16:creationId xmlns:a16="http://schemas.microsoft.com/office/drawing/2014/main" id="{25231814-AD22-424F-8371-36B475FB5D80}"/>
+                <a16:creationId xmlns:a16="http://schemas.microsoft.com/office/drawing/2014/main" id="{A1DDA22E-7443-8A4B-9114-623E0D047796}"/>
               </a:ext>
             </a:extLst>
           </p:cNvPr>
@@ -6125,7 +5985,7 @@
     </p:spTree>
     <p:extLst>
       <p:ext uri="{BB962C8B-B14F-4D97-AF65-F5344CB8AC3E}">
-        <p14:creationId xmlns:p14="http://schemas.microsoft.com/office/powerpoint/2010/main" val="2444915202"/>
+        <p14:creationId xmlns:p14="http://schemas.microsoft.com/office/powerpoint/2010/main" val="3565611311"/>
       </p:ext>
     </p:extLst>
   </p:cSld>
@@ -6169,7 +6029,7 @@
           <p:cNvPr id="2" name="Title 1">
             <a:extLst>
               <a:ext uri="{FF2B5EF4-FFF2-40B4-BE49-F238E27FC236}">
-                <a16:creationId xmlns:a16="http://schemas.microsoft.com/office/drawing/2014/main" id="{D84D405D-FCCC-E449-81AA-F627FC8CD5FE}"/>
+                <a16:creationId xmlns:a16="http://schemas.microsoft.com/office/drawing/2014/main" id="{0DB06B14-C727-D448-B006-9B16C89B8923}"/>
               </a:ext>
             </a:extLst>
           </p:cNvPr>
@@ -6187,13 +6047,8 @@
           <a:p>
             <a:r>
               <a:rPr lang="en-US" dirty="0"/>
-              <a:t>Mount</a:t>
-            </a:r>
-            <a:r>
-              <a:rPr lang="en-US" baseline="0" dirty="0"/>
-              <a:t> Local Volumes to Docker Containers</a:t>
-            </a:r>
-            <a:endParaRPr lang="en-US" dirty="0"/>
+              <a:t>Create Docker Containers</a:t>
+            </a:r>
           </a:p>
         </p:txBody>
       </p:sp>
@@ -6202,7 +6057,7 @@
           <p:cNvPr id="3" name="Content Placeholder 2">
             <a:extLst>
               <a:ext uri="{FF2B5EF4-FFF2-40B4-BE49-F238E27FC236}">
-                <a16:creationId xmlns:a16="http://schemas.microsoft.com/office/drawing/2014/main" id="{2797B28F-2840-2049-A94D-AACB96372593}"/>
+                <a16:creationId xmlns:a16="http://schemas.microsoft.com/office/drawing/2014/main" id="{D5FFDFF9-EB2F-BD49-B79C-EB08AF5D9C92}"/>
               </a:ext>
             </a:extLst>
           </p:cNvPr>
@@ -6215,11 +6070,171 @@
         </p:nvSpPr>
         <p:spPr/>
         <p:txBody>
-          <a:bodyPr/>
-          <a:lstStyle/>
+          <a:bodyPr>
+            <a:normAutofit fontScale="92500" lnSpcReduction="20000"/>
+          </a:bodyPr>
+          <a:lstStyle/>
+          <a:p>
+            <a:r>
+              <a:rPr lang="en-US" dirty="0"/>
+              <a:t>docker container ls [-a]</a:t>
+            </a:r>
+          </a:p>
+          <a:p>
+            <a:r>
+              <a:rPr lang="en-US" dirty="0"/>
+              <a:t>docker container run</a:t>
+            </a:r>
+          </a:p>
+          <a:p>
+            <a:pPr lvl="1"/>
+            <a:r>
+              <a:rPr lang="en-US" dirty="0"/>
+              <a:t>Flags</a:t>
+            </a:r>
+          </a:p>
           <a:p>
             <a:pPr lvl="2"/>
-            <a:endParaRPr lang="en-US"/>
+            <a:r>
+              <a:rPr lang="en-US" dirty="0" err="1"/>
+              <a:t>i</a:t>
+            </a:r>
+            <a:endParaRPr lang="en-US" dirty="0"/>
+          </a:p>
+          <a:p>
+            <a:pPr lvl="2"/>
+            <a:r>
+              <a:rPr lang="en-US" dirty="0"/>
+              <a:t>t</a:t>
+            </a:r>
+          </a:p>
+          <a:p>
+            <a:pPr lvl="2"/>
+            <a:r>
+              <a:rPr lang="en-US" dirty="0"/>
+              <a:t>d</a:t>
+            </a:r>
+          </a:p>
+          <a:p>
+            <a:pPr lvl="2"/>
+            <a:r>
+              <a:rPr lang="en-US" dirty="0"/>
+              <a:t>--name</a:t>
+            </a:r>
+          </a:p>
+          <a:p>
+            <a:pPr lvl="2"/>
+            <a:r>
+              <a:rPr lang="en-US" dirty="0"/>
+              <a:t>--rm</a:t>
+            </a:r>
+          </a:p>
+          <a:p>
+            <a:pPr lvl="2"/>
+            <a:r>
+              <a:rPr lang="en-US" dirty="0"/>
+              <a:t>Ctrl P + Q</a:t>
+            </a:r>
+          </a:p>
+          <a:p>
+            <a:pPr lvl="2"/>
+            <a:r>
+              <a:rPr lang="en-US" dirty="0"/>
+              <a:t>Ctrl D</a:t>
+            </a:r>
+          </a:p>
+          <a:p>
+            <a:pPr lvl="0"/>
+            <a:r>
+              <a:rPr lang="en-US" dirty="0"/>
+              <a:t>docker container start/stop/attach/rm</a:t>
+            </a:r>
+          </a:p>
+          <a:p>
+            <a:pPr marL="685800" marR="0" lvl="1" indent="-228600" algn="l" defTabSz="914400" rtl="0" eaLnBrk="1" fontAlgn="auto" latinLnBrk="0" hangingPunct="1">
+              <a:lnSpc>
+                <a:spcPct val="90000"/>
+              </a:lnSpc>
+              <a:spcBef>
+                <a:spcPts val="500"/>
+              </a:spcBef>
+              <a:spcAft>
+                <a:spcPts val="0"/>
+              </a:spcAft>
+              <a:buClrTx/>
+              <a:buSzTx/>
+              <a:buFont typeface="Arial" panose="020B0604020202020204" pitchFamily="34" charset="0"/>
+              <a:buChar char="•"/>
+              <a:tabLst/>
+              <a:defRPr/>
+            </a:pPr>
+            <a:r>
+              <a:rPr lang="en-US" sz="2400" kern="1200" dirty="0">
+                <a:solidFill>
+                  <a:schemeClr val="tx1"/>
+                </a:solidFill>
+                <a:effectLst/>
+                <a:latin typeface="+mn-lt"/>
+                <a:ea typeface="+mn-ea"/>
+                <a:cs typeface="+mn-cs"/>
+              </a:rPr>
+              <a:t>docker container</a:t>
+            </a:r>
+            <a:r>
+              <a:rPr lang="en-US" sz="2400" kern="1200" baseline="0" dirty="0">
+                <a:solidFill>
+                  <a:schemeClr val="tx1"/>
+                </a:solidFill>
+                <a:effectLst/>
+                <a:latin typeface="+mn-lt"/>
+                <a:ea typeface="+mn-ea"/>
+                <a:cs typeface="+mn-cs"/>
+              </a:rPr>
+              <a:t> stop container1 container2 container3</a:t>
+            </a:r>
+          </a:p>
+          <a:p>
+            <a:pPr marL="685800" marR="0" lvl="1" indent="-228600" algn="l" defTabSz="914400" rtl="0" eaLnBrk="1" fontAlgn="auto" latinLnBrk="0" hangingPunct="1">
+              <a:lnSpc>
+                <a:spcPct val="90000"/>
+              </a:lnSpc>
+              <a:spcBef>
+                <a:spcPts val="500"/>
+              </a:spcBef>
+              <a:spcAft>
+                <a:spcPts val="0"/>
+              </a:spcAft>
+              <a:buClrTx/>
+              <a:buSzTx/>
+              <a:buFont typeface="Arial" panose="020B0604020202020204" pitchFamily="34" charset="0"/>
+              <a:buChar char="•"/>
+              <a:tabLst/>
+              <a:defRPr/>
+            </a:pPr>
+            <a:r>
+              <a:rPr lang="en-US" sz="2400" kern="1200" dirty="0">
+                <a:solidFill>
+                  <a:schemeClr val="tx1"/>
+                </a:solidFill>
+                <a:effectLst/>
+                <a:latin typeface="+mn-lt"/>
+                <a:ea typeface="+mn-ea"/>
+                <a:cs typeface="+mn-cs"/>
+              </a:rPr>
+              <a:t>docker container</a:t>
+            </a:r>
+            <a:r>
+              <a:rPr lang="en-US" sz="2400" kern="1200" baseline="0" dirty="0">
+                <a:solidFill>
+                  <a:schemeClr val="tx1"/>
+                </a:solidFill>
+                <a:effectLst/>
+                <a:latin typeface="+mn-lt"/>
+                <a:ea typeface="+mn-ea"/>
+                <a:cs typeface="+mn-cs"/>
+              </a:rPr>
+              <a:t> stop $(docker container ls -a -q)</a:t>
+            </a:r>
           </a:p>
         </p:txBody>
       </p:sp>
@@ -6228,7 +6243,7 @@
           <p:cNvPr id="4" name="Date Placeholder 3">
             <a:extLst>
               <a:ext uri="{FF2B5EF4-FFF2-40B4-BE49-F238E27FC236}">
-                <a16:creationId xmlns:a16="http://schemas.microsoft.com/office/drawing/2014/main" id="{5840314C-3351-514D-A9AA-DF0F5D7C2BAD}"/>
+                <a16:creationId xmlns:a16="http://schemas.microsoft.com/office/drawing/2014/main" id="{E7AF9DB9-6A2B-8841-A7D0-6CEA791F9D17}"/>
               </a:ext>
             </a:extLst>
           </p:cNvPr>
@@ -6257,7 +6272,7 @@
           <p:cNvPr id="5" name="Slide Number Placeholder 4">
             <a:extLst>
               <a:ext uri="{FF2B5EF4-FFF2-40B4-BE49-F238E27FC236}">
-                <a16:creationId xmlns:a16="http://schemas.microsoft.com/office/drawing/2014/main" id="{9E247962-C086-7B42-9DBE-A2FF934C2CBD}"/>
+                <a16:creationId xmlns:a16="http://schemas.microsoft.com/office/drawing/2014/main" id="{25231814-AD22-424F-8371-36B475FB5D80}"/>
               </a:ext>
             </a:extLst>
           </p:cNvPr>
@@ -6285,7 +6300,7 @@
     </p:spTree>
     <p:extLst>
       <p:ext uri="{BB962C8B-B14F-4D97-AF65-F5344CB8AC3E}">
-        <p14:creationId xmlns:p14="http://schemas.microsoft.com/office/powerpoint/2010/main" val="109380659"/>
+        <p14:creationId xmlns:p14="http://schemas.microsoft.com/office/powerpoint/2010/main" val="2444915202"/>
       </p:ext>
     </p:extLst>
   </p:cSld>
@@ -6329,7 +6344,7 @@
           <p:cNvPr id="2" name="Title 1">
             <a:extLst>
               <a:ext uri="{FF2B5EF4-FFF2-40B4-BE49-F238E27FC236}">
-                <a16:creationId xmlns:a16="http://schemas.microsoft.com/office/drawing/2014/main" id="{E1CC3210-9CAD-894F-953C-7E96E99B1584}"/>
+                <a16:creationId xmlns:a16="http://schemas.microsoft.com/office/drawing/2014/main" id="{D84D405D-FCCC-E449-81AA-F627FC8CD5FE}"/>
               </a:ext>
             </a:extLst>
           </p:cNvPr>
@@ -6347,11 +6362,11 @@
           <a:p>
             <a:r>
               <a:rPr lang="en-US" dirty="0"/>
-              <a:t>Port Forward to</a:t>
+              <a:t>Mount</a:t>
             </a:r>
             <a:r>
               <a:rPr lang="en-US" baseline="0" dirty="0"/>
-              <a:t> Docker Containers</a:t>
+              <a:t> Local Volumes to Docker Containers</a:t>
             </a:r>
             <a:endParaRPr lang="en-US" dirty="0"/>
           </a:p>
@@ -6362,7 +6377,7 @@
           <p:cNvPr id="3" name="Content Placeholder 2">
             <a:extLst>
               <a:ext uri="{FF2B5EF4-FFF2-40B4-BE49-F238E27FC236}">
-                <a16:creationId xmlns:a16="http://schemas.microsoft.com/office/drawing/2014/main" id="{697E95B3-5E4A-3543-8B62-304786E5D366}"/>
+                <a16:creationId xmlns:a16="http://schemas.microsoft.com/office/drawing/2014/main" id="{2797B28F-2840-2049-A94D-AACB96372593}"/>
               </a:ext>
             </a:extLst>
           </p:cNvPr>
@@ -6378,6 +6393,7 @@
           <a:bodyPr/>
           <a:lstStyle/>
           <a:p>
+            <a:pPr lvl="2"/>
             <a:endParaRPr lang="en-US"/>
           </a:p>
         </p:txBody>
@@ -6387,7 +6403,7 @@
           <p:cNvPr id="4" name="Date Placeholder 3">
             <a:extLst>
               <a:ext uri="{FF2B5EF4-FFF2-40B4-BE49-F238E27FC236}">
-                <a16:creationId xmlns:a16="http://schemas.microsoft.com/office/drawing/2014/main" id="{BC69D427-E0F9-E24A-9F8B-C096BD28325E}"/>
+                <a16:creationId xmlns:a16="http://schemas.microsoft.com/office/drawing/2014/main" id="{5840314C-3351-514D-A9AA-DF0F5D7C2BAD}"/>
               </a:ext>
             </a:extLst>
           </p:cNvPr>
@@ -6416,7 +6432,7 @@
           <p:cNvPr id="5" name="Slide Number Placeholder 4">
             <a:extLst>
               <a:ext uri="{FF2B5EF4-FFF2-40B4-BE49-F238E27FC236}">
-                <a16:creationId xmlns:a16="http://schemas.microsoft.com/office/drawing/2014/main" id="{E4E0B44E-C38D-BE4B-8974-805C60EE8918}"/>
+                <a16:creationId xmlns:a16="http://schemas.microsoft.com/office/drawing/2014/main" id="{9E247962-C086-7B42-9DBE-A2FF934C2CBD}"/>
               </a:ext>
             </a:extLst>
           </p:cNvPr>
@@ -6444,7 +6460,7 @@
     </p:spTree>
     <p:extLst>
       <p:ext uri="{BB962C8B-B14F-4D97-AF65-F5344CB8AC3E}">
-        <p14:creationId xmlns:p14="http://schemas.microsoft.com/office/powerpoint/2010/main" val="508043100"/>
+        <p14:creationId xmlns:p14="http://schemas.microsoft.com/office/powerpoint/2010/main" val="109380659"/>
       </p:ext>
     </p:extLst>
   </p:cSld>
@@ -6488,6 +6504,165 @@
           <p:cNvPr id="2" name="Title 1">
             <a:extLst>
               <a:ext uri="{FF2B5EF4-FFF2-40B4-BE49-F238E27FC236}">
+                <a16:creationId xmlns:a16="http://schemas.microsoft.com/office/drawing/2014/main" id="{E1CC3210-9CAD-894F-953C-7E96E99B1584}"/>
+              </a:ext>
+            </a:extLst>
+          </p:cNvPr>
+          <p:cNvSpPr>
+            <a:spLocks noGrp="1"/>
+          </p:cNvSpPr>
+          <p:nvPr>
+            <p:ph type="title"/>
+          </p:nvPr>
+        </p:nvSpPr>
+        <p:spPr/>
+        <p:txBody>
+          <a:bodyPr/>
+          <a:lstStyle/>
+          <a:p>
+            <a:r>
+              <a:rPr lang="en-US" dirty="0"/>
+              <a:t>Port Forward to</a:t>
+            </a:r>
+            <a:r>
+              <a:rPr lang="en-US" baseline="0" dirty="0"/>
+              <a:t> Docker Containers</a:t>
+            </a:r>
+            <a:endParaRPr lang="en-US" dirty="0"/>
+          </a:p>
+        </p:txBody>
+      </p:sp>
+      <p:sp>
+        <p:nvSpPr>
+          <p:cNvPr id="3" name="Content Placeholder 2">
+            <a:extLst>
+              <a:ext uri="{FF2B5EF4-FFF2-40B4-BE49-F238E27FC236}">
+                <a16:creationId xmlns:a16="http://schemas.microsoft.com/office/drawing/2014/main" id="{697E95B3-5E4A-3543-8B62-304786E5D366}"/>
+              </a:ext>
+            </a:extLst>
+          </p:cNvPr>
+          <p:cNvSpPr>
+            <a:spLocks noGrp="1"/>
+          </p:cNvSpPr>
+          <p:nvPr>
+            <p:ph idx="1"/>
+          </p:nvPr>
+        </p:nvSpPr>
+        <p:spPr/>
+        <p:txBody>
+          <a:bodyPr/>
+          <a:lstStyle/>
+          <a:p>
+            <a:endParaRPr lang="en-US"/>
+          </a:p>
+        </p:txBody>
+      </p:sp>
+      <p:sp>
+        <p:nvSpPr>
+          <p:cNvPr id="4" name="Date Placeholder 3">
+            <a:extLst>
+              <a:ext uri="{FF2B5EF4-FFF2-40B4-BE49-F238E27FC236}">
+                <a16:creationId xmlns:a16="http://schemas.microsoft.com/office/drawing/2014/main" id="{BC69D427-E0F9-E24A-9F8B-C096BD28325E}"/>
+              </a:ext>
+            </a:extLst>
+          </p:cNvPr>
+          <p:cNvSpPr>
+            <a:spLocks noGrp="1"/>
+          </p:cNvSpPr>
+          <p:nvPr>
+            <p:ph type="dt" sz="half" idx="10"/>
+          </p:nvPr>
+        </p:nvSpPr>
+        <p:spPr/>
+        <p:txBody>
+          <a:bodyPr/>
+          <a:lstStyle/>
+          <a:p>
+            <a:r>
+              <a:rPr lang="en-US"/>
+              <a:t>World Wide Technology ©</a:t>
+            </a:r>
+            <a:endParaRPr lang="en-US" dirty="0"/>
+          </a:p>
+        </p:txBody>
+      </p:sp>
+      <p:sp>
+        <p:nvSpPr>
+          <p:cNvPr id="5" name="Slide Number Placeholder 4">
+            <a:extLst>
+              <a:ext uri="{FF2B5EF4-FFF2-40B4-BE49-F238E27FC236}">
+                <a16:creationId xmlns:a16="http://schemas.microsoft.com/office/drawing/2014/main" id="{E4E0B44E-C38D-BE4B-8974-805C60EE8918}"/>
+              </a:ext>
+            </a:extLst>
+          </p:cNvPr>
+          <p:cNvSpPr>
+            <a:spLocks noGrp="1"/>
+          </p:cNvSpPr>
+          <p:nvPr>
+            <p:ph type="sldNum" sz="quarter" idx="12"/>
+          </p:nvPr>
+        </p:nvSpPr>
+        <p:spPr/>
+        <p:txBody>
+          <a:bodyPr/>
+          <a:lstStyle/>
+          <a:p>
+            <a:fld id="{A44B02FA-DD2D-1844-AE35-8B2EAB0CF4EF}" type="slidenum">
+              <a:rPr lang="en-US" smtClean="0"/>
+              <a:pPr/>
+              <a:t>18</a:t>
+            </a:fld>
+            <a:endParaRPr lang="en-US" dirty="0"/>
+          </a:p>
+        </p:txBody>
+      </p:sp>
+    </p:spTree>
+    <p:extLst>
+      <p:ext uri="{BB962C8B-B14F-4D97-AF65-F5344CB8AC3E}">
+        <p14:creationId xmlns:p14="http://schemas.microsoft.com/office/powerpoint/2010/main" val="508043100"/>
+      </p:ext>
+    </p:extLst>
+  </p:cSld>
+  <p:clrMapOvr>
+    <a:masterClrMapping/>
+  </p:clrMapOvr>
+  <mc:AlternateContent xmlns:mc="http://schemas.openxmlformats.org/markup-compatibility/2006" xmlns:p14="http://schemas.microsoft.com/office/powerpoint/2010/main">
+    <mc:Choice Requires="p14">
+      <p:transition spd="med" p14:dur="700">
+        <p:fade/>
+      </p:transition>
+    </mc:Choice>
+    <mc:Fallback xmlns="">
+      <p:transition spd="med">
+        <p:fade/>
+      </p:transition>
+    </mc:Fallback>
+  </mc:AlternateContent>
+</p:sld>
+</file>
+
+<file path=ppt/slides/slide19.xml><?xml version="1.0" encoding="utf-8"?>
+<p:sld xmlns:a="http://schemas.openxmlformats.org/drawingml/2006/main" xmlns:r="http://schemas.openxmlformats.org/officeDocument/2006/relationships" xmlns:p="http://schemas.openxmlformats.org/presentationml/2006/main">
+  <p:cSld>
+    <p:spTree>
+      <p:nvGrpSpPr>
+        <p:cNvPr id="1" name=""/>
+        <p:cNvGrpSpPr/>
+        <p:nvPr/>
+      </p:nvGrpSpPr>
+      <p:grpSpPr>
+        <a:xfrm>
+          <a:off x="0" y="0"/>
+          <a:ext cx="0" cy="0"/>
+          <a:chOff x="0" y="0"/>
+          <a:chExt cx="0" cy="0"/>
+        </a:xfrm>
+      </p:grpSpPr>
+      <p:sp>
+        <p:nvSpPr>
+          <p:cNvPr id="2" name="Title 1">
+            <a:extLst>
+              <a:ext uri="{FF2B5EF4-FFF2-40B4-BE49-F238E27FC236}">
                 <a16:creationId xmlns:a16="http://schemas.microsoft.com/office/drawing/2014/main" id="{61D361B5-F989-1B42-A9E6-11CEA715CBCF}"/>
               </a:ext>
             </a:extLst>
@@ -6719,7 +6894,7 @@
             <a:fld id="{A44B02FA-DD2D-1844-AE35-8B2EAB0CF4EF}" type="slidenum">
               <a:rPr lang="en-US" smtClean="0"/>
               <a:pPr/>
-              <a:t>18</a:t>
+              <a:t>19</a:t>
             </a:fld>
             <a:endParaRPr lang="en-US" dirty="0"/>
           </a:p>
@@ -15840,6 +16015,36 @@
           </a:p>
         </p:txBody>
       </p:sp>
+      <p:pic>
+        <p:nvPicPr>
+          <p:cNvPr id="9" name="Picture 8">
+            <a:extLst>
+              <a:ext uri="{FF2B5EF4-FFF2-40B4-BE49-F238E27FC236}">
+                <a16:creationId xmlns:a16="http://schemas.microsoft.com/office/drawing/2014/main" id="{A21770C8-A08E-A447-AF62-395311F78396}"/>
+              </a:ext>
+            </a:extLst>
+          </p:cNvPr>
+          <p:cNvPicPr>
+            <a:picLocks noChangeAspect="1"/>
+          </p:cNvPicPr>
+          <p:nvPr/>
+        </p:nvPicPr>
+        <p:blipFill>
+          <a:blip r:embed="rId3"/>
+          <a:stretch>
+            <a:fillRect/>
+          </a:stretch>
+        </p:blipFill>
+        <p:spPr>
+          <a:xfrm>
+            <a:off x="5035136" y="2718193"/>
+            <a:ext cx="6611175" cy="3548464"/>
+          </a:xfrm>
+          <a:prstGeom prst="rect">
+            <a:avLst/>
+          </a:prstGeom>
+        </p:spPr>
+      </p:pic>
     </p:spTree>
     <p:extLst>
       <p:ext uri="{BB962C8B-B14F-4D97-AF65-F5344CB8AC3E}">
@@ -15882,12 +16087,187 @@
           <a:chExt cx="0" cy="0"/>
         </a:xfrm>
       </p:grpSpPr>
+      <p:cxnSp>
+        <p:nvCxnSpPr>
+          <p:cNvPr id="26" name="Straight Connector 25">
+            <a:extLst>
+              <a:ext uri="{FF2B5EF4-FFF2-40B4-BE49-F238E27FC236}">
+                <a16:creationId xmlns:a16="http://schemas.microsoft.com/office/drawing/2014/main" id="{E9E5736A-9A37-7143-B059-B5843DF87E8D}"/>
+              </a:ext>
+            </a:extLst>
+          </p:cNvPr>
+          <p:cNvCxnSpPr>
+            <a:stCxn id="19" idx="2"/>
+            <a:endCxn id="20" idx="0"/>
+          </p:cNvCxnSpPr>
+          <p:nvPr/>
+        </p:nvCxnSpPr>
+        <p:spPr>
+          <a:xfrm>
+            <a:off x="1915391" y="2814452"/>
+            <a:ext cx="0" cy="1235034"/>
+          </a:xfrm>
+          <a:prstGeom prst="line">
+            <a:avLst/>
+          </a:prstGeom>
+          <a:ln w="50800">
+            <a:solidFill>
+              <a:srgbClr val="7030A0"/>
+            </a:solidFill>
+            <a:headEnd type="triangle"/>
+            <a:tailEnd type="triangle"/>
+          </a:ln>
+        </p:spPr>
+        <p:style>
+          <a:lnRef idx="1">
+            <a:schemeClr val="accent1"/>
+          </a:lnRef>
+          <a:fillRef idx="0">
+            <a:schemeClr val="accent1"/>
+          </a:fillRef>
+          <a:effectRef idx="0">
+            <a:schemeClr val="accent1"/>
+          </a:effectRef>
+          <a:fontRef idx="minor">
+            <a:schemeClr val="tx1"/>
+          </a:fontRef>
+        </p:style>
+      </p:cxnSp>
+      <p:cxnSp>
+        <p:nvCxnSpPr>
+          <p:cNvPr id="27" name="Straight Connector 26">
+            <a:extLst>
+              <a:ext uri="{FF2B5EF4-FFF2-40B4-BE49-F238E27FC236}">
+                <a16:creationId xmlns:a16="http://schemas.microsoft.com/office/drawing/2014/main" id="{CA524AD4-DD59-274B-8D4B-4328D09E4A5C}"/>
+              </a:ext>
+            </a:extLst>
+          </p:cNvPr>
+          <p:cNvCxnSpPr>
+            <a:cxnSpLocks/>
+          </p:cNvCxnSpPr>
+          <p:nvPr/>
+        </p:nvCxnSpPr>
+        <p:spPr>
+          <a:xfrm>
+            <a:off x="1915391" y="3429000"/>
+            <a:ext cx="1964252" cy="0"/>
+          </a:xfrm>
+          <a:prstGeom prst="line">
+            <a:avLst/>
+          </a:prstGeom>
+          <a:ln w="50800">
+            <a:solidFill>
+              <a:srgbClr val="7030A0"/>
+            </a:solidFill>
+          </a:ln>
+        </p:spPr>
+        <p:style>
+          <a:lnRef idx="1">
+            <a:schemeClr val="accent1"/>
+          </a:lnRef>
+          <a:fillRef idx="0">
+            <a:schemeClr val="accent1"/>
+          </a:fillRef>
+          <a:effectRef idx="0">
+            <a:schemeClr val="accent1"/>
+          </a:effectRef>
+          <a:fontRef idx="minor">
+            <a:schemeClr val="tx1"/>
+          </a:fontRef>
+        </p:style>
+      </p:cxnSp>
+      <p:cxnSp>
+        <p:nvCxnSpPr>
+          <p:cNvPr id="32" name="Straight Connector 31">
+            <a:extLst>
+              <a:ext uri="{FF2B5EF4-FFF2-40B4-BE49-F238E27FC236}">
+                <a16:creationId xmlns:a16="http://schemas.microsoft.com/office/drawing/2014/main" id="{5403B1B1-B636-274A-9E77-98CB611A0335}"/>
+              </a:ext>
+            </a:extLst>
+          </p:cNvPr>
+          <p:cNvCxnSpPr>
+            <a:cxnSpLocks/>
+          </p:cNvCxnSpPr>
+          <p:nvPr/>
+        </p:nvCxnSpPr>
+        <p:spPr>
+          <a:xfrm>
+            <a:off x="8312357" y="3429000"/>
+            <a:ext cx="1964252" cy="0"/>
+          </a:xfrm>
+          <a:prstGeom prst="line">
+            <a:avLst/>
+          </a:prstGeom>
+          <a:ln w="50800">
+            <a:solidFill>
+              <a:srgbClr val="7030A0"/>
+            </a:solidFill>
+          </a:ln>
+        </p:spPr>
+        <p:style>
+          <a:lnRef idx="1">
+            <a:schemeClr val="accent1"/>
+          </a:lnRef>
+          <a:fillRef idx="0">
+            <a:schemeClr val="accent1"/>
+          </a:fillRef>
+          <a:effectRef idx="0">
+            <a:schemeClr val="accent1"/>
+          </a:effectRef>
+          <a:fontRef idx="minor">
+            <a:schemeClr val="tx1"/>
+          </a:fontRef>
+        </p:style>
+      </p:cxnSp>
+      <p:cxnSp>
+        <p:nvCxnSpPr>
+          <p:cNvPr id="33" name="Straight Connector 32">
+            <a:extLst>
+              <a:ext uri="{FF2B5EF4-FFF2-40B4-BE49-F238E27FC236}">
+                <a16:creationId xmlns:a16="http://schemas.microsoft.com/office/drawing/2014/main" id="{E21FDB36-FA0B-1147-9C8B-431878DD1634}"/>
+              </a:ext>
+            </a:extLst>
+          </p:cNvPr>
+          <p:cNvCxnSpPr/>
+          <p:nvPr/>
+        </p:nvCxnSpPr>
+        <p:spPr>
+          <a:xfrm>
+            <a:off x="10278094" y="2814452"/>
+            <a:ext cx="0" cy="1235034"/>
+          </a:xfrm>
+          <a:prstGeom prst="line">
+            <a:avLst/>
+          </a:prstGeom>
+          <a:ln w="50800">
+            <a:solidFill>
+              <a:srgbClr val="7030A0"/>
+            </a:solidFill>
+            <a:headEnd type="triangle"/>
+            <a:tailEnd type="triangle"/>
+          </a:ln>
+        </p:spPr>
+        <p:style>
+          <a:lnRef idx="1">
+            <a:schemeClr val="accent1"/>
+          </a:lnRef>
+          <a:fillRef idx="0">
+            <a:schemeClr val="accent1"/>
+          </a:fillRef>
+          <a:effectRef idx="0">
+            <a:schemeClr val="accent1"/>
+          </a:effectRef>
+          <a:fontRef idx="minor">
+            <a:schemeClr val="tx1"/>
+          </a:fontRef>
+        </p:style>
+      </p:cxnSp>
       <p:sp>
         <p:nvSpPr>
           <p:cNvPr id="2" name="Title 1">
             <a:extLst>
               <a:ext uri="{FF2B5EF4-FFF2-40B4-BE49-F238E27FC236}">
-                <a16:creationId xmlns:a16="http://schemas.microsoft.com/office/drawing/2014/main" id="{178FC9BC-162C-754A-A134-D392F08CDBEE}"/>
+                <a16:creationId xmlns:a16="http://schemas.microsoft.com/office/drawing/2014/main" id="{DA5CEEB2-C6AA-4A43-8A45-A12E2CB0AE85}"/>
               </a:ext>
             </a:extLst>
           </p:cNvPr>
@@ -15905,22 +16285,17 @@
           <a:p>
             <a:r>
               <a:rPr lang="en-US" dirty="0"/>
-              <a:t>Installing</a:t>
-            </a:r>
-            <a:r>
-              <a:rPr lang="en-US" baseline="0" dirty="0"/>
-              <a:t> Docker</a:t>
-            </a:r>
-            <a:endParaRPr lang="en-US" dirty="0"/>
-          </a:p>
-        </p:txBody>
-      </p:sp>
-      <p:sp>
-        <p:nvSpPr>
-          <p:cNvPr id="3" name="Content Placeholder 2">
+              <a:t>Docker Engine Overview</a:t>
+            </a:r>
+          </a:p>
+        </p:txBody>
+      </p:sp>
+      <p:sp>
+        <p:nvSpPr>
+          <p:cNvPr id="4" name="Date Placeholder 3">
             <a:extLst>
               <a:ext uri="{FF2B5EF4-FFF2-40B4-BE49-F238E27FC236}">
-                <a16:creationId xmlns:a16="http://schemas.microsoft.com/office/drawing/2014/main" id="{0ECC7DC7-0671-F543-9991-CF8210E2567B}"/>
+                <a16:creationId xmlns:a16="http://schemas.microsoft.com/office/drawing/2014/main" id="{7A1D2CF8-A735-294A-94D1-C3E5DB8DA9EA}"/>
               </a:ext>
             </a:extLst>
           </p:cNvPr>
@@ -15928,46 +16303,6 @@
             <a:spLocks noGrp="1"/>
           </p:cNvSpPr>
           <p:nvPr>
-            <p:ph idx="1"/>
-          </p:nvPr>
-        </p:nvSpPr>
-        <p:spPr/>
-        <p:txBody>
-          <a:bodyPr/>
-          <a:lstStyle/>
-          <a:p>
-            <a:r>
-              <a:rPr lang="en-US" dirty="0"/>
-              <a:t>Setup Docker account</a:t>
-            </a:r>
-          </a:p>
-          <a:p>
-            <a:r>
-              <a:rPr lang="en-US" dirty="0"/>
-              <a:t>Verify docker installation (docker info docker --version)</a:t>
-            </a:r>
-          </a:p>
-          <a:p>
-            <a:r>
-              <a:rPr lang="en-US" dirty="0"/>
-              <a:t>docker run hello-world</a:t>
-            </a:r>
-          </a:p>
-        </p:txBody>
-      </p:sp>
-      <p:sp>
-        <p:nvSpPr>
-          <p:cNvPr id="4" name="Date Placeholder 3">
-            <a:extLst>
-              <a:ext uri="{FF2B5EF4-FFF2-40B4-BE49-F238E27FC236}">
-                <a16:creationId xmlns:a16="http://schemas.microsoft.com/office/drawing/2014/main" id="{38C6DDB4-CE9E-4843-86A9-EFC27330D02F}"/>
-              </a:ext>
-            </a:extLst>
-          </p:cNvPr>
-          <p:cNvSpPr>
-            <a:spLocks noGrp="1"/>
-          </p:cNvSpPr>
-          <p:nvPr>
             <p:ph type="dt" sz="half" idx="10"/>
           </p:nvPr>
         </p:nvSpPr>
@@ -15989,7 +16324,7 @@
           <p:cNvPr id="5" name="Slide Number Placeholder 4">
             <a:extLst>
               <a:ext uri="{FF2B5EF4-FFF2-40B4-BE49-F238E27FC236}">
-                <a16:creationId xmlns:a16="http://schemas.microsoft.com/office/drawing/2014/main" id="{09AD6D8E-DFAE-8E42-9152-B189D9284AD9}"/>
+                <a16:creationId xmlns:a16="http://schemas.microsoft.com/office/drawing/2014/main" id="{F2FC13A2-487D-CC4E-9B3E-0ECEE589E7D1}"/>
               </a:ext>
             </a:extLst>
           </p:cNvPr>
@@ -16014,10 +16349,690 @@
           </a:p>
         </p:txBody>
       </p:sp>
+      <p:sp>
+        <p:nvSpPr>
+          <p:cNvPr id="6" name="Oval 5">
+            <a:extLst>
+              <a:ext uri="{FF2B5EF4-FFF2-40B4-BE49-F238E27FC236}">
+                <a16:creationId xmlns:a16="http://schemas.microsoft.com/office/drawing/2014/main" id="{9174CEDD-AC87-6846-90B3-B8563EA71F39}"/>
+              </a:ext>
+            </a:extLst>
+          </p:cNvPr>
+          <p:cNvSpPr/>
+          <p:nvPr/>
+        </p:nvSpPr>
+        <p:spPr>
+          <a:xfrm>
+            <a:off x="3605150" y="1810989"/>
+            <a:ext cx="4975761" cy="4975761"/>
+          </a:xfrm>
+          <a:prstGeom prst="ellipse">
+            <a:avLst/>
+          </a:prstGeom>
+          <a:ln>
+            <a:solidFill>
+              <a:schemeClr val="bg1"/>
+            </a:solidFill>
+          </a:ln>
+        </p:spPr>
+        <p:style>
+          <a:lnRef idx="2">
+            <a:schemeClr val="accent1">
+              <a:shade val="50000"/>
+            </a:schemeClr>
+          </a:lnRef>
+          <a:fillRef idx="1">
+            <a:schemeClr val="accent1"/>
+          </a:fillRef>
+          <a:effectRef idx="0">
+            <a:schemeClr val="accent1"/>
+          </a:effectRef>
+          <a:fontRef idx="minor">
+            <a:schemeClr val="lt1"/>
+          </a:fontRef>
+        </p:style>
+        <p:txBody>
+          <a:bodyPr rtlCol="0" anchor="ctr"/>
+          <a:lstStyle/>
+          <a:p>
+            <a:pPr algn="ctr"/>
+            <a:endParaRPr lang="en-US"/>
+          </a:p>
+        </p:txBody>
+      </p:sp>
+      <p:sp>
+        <p:nvSpPr>
+          <p:cNvPr id="7" name="Oval 6">
+            <a:extLst>
+              <a:ext uri="{FF2B5EF4-FFF2-40B4-BE49-F238E27FC236}">
+                <a16:creationId xmlns:a16="http://schemas.microsoft.com/office/drawing/2014/main" id="{BE804999-D526-814B-8F18-0980DE510AA2}"/>
+              </a:ext>
+            </a:extLst>
+          </p:cNvPr>
+          <p:cNvSpPr/>
+          <p:nvPr/>
+        </p:nvSpPr>
+        <p:spPr>
+          <a:xfrm>
+            <a:off x="4003221" y="2814452"/>
+            <a:ext cx="4185557" cy="3972298"/>
+          </a:xfrm>
+          <a:prstGeom prst="ellipse">
+            <a:avLst/>
+          </a:prstGeom>
+          <a:solidFill>
+            <a:schemeClr val="accent5">
+              <a:lumMod val="75000"/>
+            </a:schemeClr>
+          </a:solidFill>
+          <a:ln>
+            <a:solidFill>
+              <a:schemeClr val="bg1"/>
+            </a:solidFill>
+          </a:ln>
+        </p:spPr>
+        <p:style>
+          <a:lnRef idx="2">
+            <a:schemeClr val="accent1">
+              <a:shade val="50000"/>
+            </a:schemeClr>
+          </a:lnRef>
+          <a:fillRef idx="1">
+            <a:schemeClr val="accent1"/>
+          </a:fillRef>
+          <a:effectRef idx="0">
+            <a:schemeClr val="accent1"/>
+          </a:effectRef>
+          <a:fontRef idx="minor">
+            <a:schemeClr val="lt1"/>
+          </a:fontRef>
+        </p:style>
+        <p:txBody>
+          <a:bodyPr rtlCol="0" anchor="ctr"/>
+          <a:lstStyle/>
+          <a:p>
+            <a:pPr algn="ctr"/>
+            <a:endParaRPr lang="en-US"/>
+          </a:p>
+        </p:txBody>
+      </p:sp>
+      <p:sp>
+        <p:nvSpPr>
+          <p:cNvPr id="8" name="Oval 7">
+            <a:extLst>
+              <a:ext uri="{FF2B5EF4-FFF2-40B4-BE49-F238E27FC236}">
+                <a16:creationId xmlns:a16="http://schemas.microsoft.com/office/drawing/2014/main" id="{2040E1FA-A78C-1D49-B27F-3473B8743AC1}"/>
+              </a:ext>
+            </a:extLst>
+          </p:cNvPr>
+          <p:cNvSpPr/>
+          <p:nvPr/>
+        </p:nvSpPr>
+        <p:spPr>
+          <a:xfrm>
+            <a:off x="4566679" y="3742706"/>
+            <a:ext cx="3052701" cy="3044044"/>
+          </a:xfrm>
+          <a:prstGeom prst="ellipse">
+            <a:avLst/>
+          </a:prstGeom>
+          <a:solidFill>
+            <a:schemeClr val="accent5">
+              <a:lumMod val="50000"/>
+            </a:schemeClr>
+          </a:solidFill>
+          <a:ln>
+            <a:solidFill>
+              <a:schemeClr val="bg1"/>
+            </a:solidFill>
+          </a:ln>
+        </p:spPr>
+        <p:style>
+          <a:lnRef idx="2">
+            <a:schemeClr val="accent1">
+              <a:shade val="50000"/>
+            </a:schemeClr>
+          </a:lnRef>
+          <a:fillRef idx="1">
+            <a:schemeClr val="accent1"/>
+          </a:fillRef>
+          <a:effectRef idx="0">
+            <a:schemeClr val="accent1"/>
+          </a:effectRef>
+          <a:fontRef idx="minor">
+            <a:schemeClr val="lt1"/>
+          </a:fontRef>
+        </p:style>
+        <p:txBody>
+          <a:bodyPr rtlCol="0" anchor="ctr"/>
+          <a:lstStyle/>
+          <a:p>
+            <a:pPr algn="ctr"/>
+            <a:endParaRPr lang="en-US"/>
+          </a:p>
+        </p:txBody>
+      </p:sp>
+      <p:sp>
+        <p:nvSpPr>
+          <p:cNvPr id="9" name="TextBox 8">
+            <a:extLst>
+              <a:ext uri="{FF2B5EF4-FFF2-40B4-BE49-F238E27FC236}">
+                <a16:creationId xmlns:a16="http://schemas.microsoft.com/office/drawing/2014/main" id="{979E8B5E-2C59-C643-B0E0-1B73468F6F2A}"/>
+              </a:ext>
+            </a:extLst>
+          </p:cNvPr>
+          <p:cNvSpPr txBox="1"/>
+          <p:nvPr/>
+        </p:nvSpPr>
+        <p:spPr>
+          <a:xfrm>
+            <a:off x="5259656" y="1882576"/>
+            <a:ext cx="1672688" cy="461665"/>
+          </a:xfrm>
+          <a:prstGeom prst="rect">
+            <a:avLst/>
+          </a:prstGeom>
+          <a:noFill/>
+        </p:spPr>
+        <p:txBody>
+          <a:bodyPr wrap="square" rtlCol="0">
+            <a:spAutoFit/>
+          </a:bodyPr>
+          <a:lstStyle/>
+          <a:p>
+            <a:pPr algn="ctr"/>
+            <a:r>
+              <a:rPr lang="en-US" sz="2400" dirty="0"/>
+              <a:t>Client</a:t>
+            </a:r>
+          </a:p>
+        </p:txBody>
+      </p:sp>
+      <p:sp>
+        <p:nvSpPr>
+          <p:cNvPr id="10" name="TextBox 9">
+            <a:extLst>
+              <a:ext uri="{FF2B5EF4-FFF2-40B4-BE49-F238E27FC236}">
+                <a16:creationId xmlns:a16="http://schemas.microsoft.com/office/drawing/2014/main" id="{0898B9F4-FA5B-8042-A77D-449744AC4EDC}"/>
+              </a:ext>
+            </a:extLst>
+          </p:cNvPr>
+          <p:cNvSpPr txBox="1"/>
+          <p:nvPr/>
+        </p:nvSpPr>
+        <p:spPr>
+          <a:xfrm>
+            <a:off x="5256685" y="3116871"/>
+            <a:ext cx="1672688" cy="461665"/>
+          </a:xfrm>
+          <a:prstGeom prst="rect">
+            <a:avLst/>
+          </a:prstGeom>
+          <a:noFill/>
+        </p:spPr>
+        <p:txBody>
+          <a:bodyPr wrap="square" rtlCol="0">
+            <a:spAutoFit/>
+          </a:bodyPr>
+          <a:lstStyle/>
+          <a:p>
+            <a:pPr algn="ctr"/>
+            <a:r>
+              <a:rPr lang="en-US" sz="2400" dirty="0"/>
+              <a:t>REST API</a:t>
+            </a:r>
+          </a:p>
+        </p:txBody>
+      </p:sp>
+      <p:sp>
+        <p:nvSpPr>
+          <p:cNvPr id="11" name="TextBox 10">
+            <a:extLst>
+              <a:ext uri="{FF2B5EF4-FFF2-40B4-BE49-F238E27FC236}">
+                <a16:creationId xmlns:a16="http://schemas.microsoft.com/office/drawing/2014/main" id="{E850B004-0BA2-BC41-8D81-2FB8ACF50918}"/>
+              </a:ext>
+            </a:extLst>
+          </p:cNvPr>
+          <p:cNvSpPr txBox="1"/>
+          <p:nvPr/>
+        </p:nvSpPr>
+        <p:spPr>
+          <a:xfrm>
+            <a:off x="5259656" y="3889502"/>
+            <a:ext cx="1672688" cy="461665"/>
+          </a:xfrm>
+          <a:prstGeom prst="rect">
+            <a:avLst/>
+          </a:prstGeom>
+          <a:noFill/>
+        </p:spPr>
+        <p:txBody>
+          <a:bodyPr wrap="square" rtlCol="0">
+            <a:spAutoFit/>
+          </a:bodyPr>
+          <a:lstStyle/>
+          <a:p>
+            <a:pPr algn="ctr"/>
+            <a:r>
+              <a:rPr lang="en-US" sz="2400" dirty="0"/>
+              <a:t>Server</a:t>
+            </a:r>
+          </a:p>
+        </p:txBody>
+      </p:sp>
+      <p:sp>
+        <p:nvSpPr>
+          <p:cNvPr id="12" name="TextBox 11">
+            <a:extLst>
+              <a:ext uri="{FF2B5EF4-FFF2-40B4-BE49-F238E27FC236}">
+                <a16:creationId xmlns:a16="http://schemas.microsoft.com/office/drawing/2014/main" id="{FCFBAB94-F03B-C443-9473-7178D387AA94}"/>
+              </a:ext>
+            </a:extLst>
+          </p:cNvPr>
+          <p:cNvSpPr txBox="1"/>
+          <p:nvPr/>
+        </p:nvSpPr>
+        <p:spPr>
+          <a:xfrm>
+            <a:off x="5256685" y="2186064"/>
+            <a:ext cx="1672688" cy="461665"/>
+          </a:xfrm>
+          <a:prstGeom prst="rect">
+            <a:avLst/>
+          </a:prstGeom>
+          <a:noFill/>
+        </p:spPr>
+        <p:txBody>
+          <a:bodyPr wrap="square" rtlCol="0">
+            <a:spAutoFit/>
+          </a:bodyPr>
+          <a:lstStyle/>
+          <a:p>
+            <a:pPr algn="ctr"/>
+            <a:r>
+              <a:rPr lang="en-US" sz="1600" dirty="0">
+                <a:latin typeface="Andale Mono" panose="020B0509000000000004" pitchFamily="49" charset="0"/>
+              </a:rPr>
+              <a:t>docker</a:t>
+            </a:r>
+            <a:r>
+              <a:rPr lang="en-US" sz="2400" dirty="0"/>
+              <a:t> CLI</a:t>
+            </a:r>
+          </a:p>
+        </p:txBody>
+      </p:sp>
+      <p:sp>
+        <p:nvSpPr>
+          <p:cNvPr id="13" name="TextBox 12">
+            <a:extLst>
+              <a:ext uri="{FF2B5EF4-FFF2-40B4-BE49-F238E27FC236}">
+                <a16:creationId xmlns:a16="http://schemas.microsoft.com/office/drawing/2014/main" id="{C8E213AB-B80F-C845-8795-C48ADD8EA9F1}"/>
+              </a:ext>
+            </a:extLst>
+          </p:cNvPr>
+          <p:cNvSpPr txBox="1"/>
+          <p:nvPr/>
+        </p:nvSpPr>
+        <p:spPr>
+          <a:xfrm>
+            <a:off x="5185497" y="4302191"/>
+            <a:ext cx="1821006" cy="338554"/>
+          </a:xfrm>
+          <a:prstGeom prst="rect">
+            <a:avLst/>
+          </a:prstGeom>
+          <a:noFill/>
+        </p:spPr>
+        <p:txBody>
+          <a:bodyPr wrap="square" rtlCol="0">
+            <a:spAutoFit/>
+          </a:bodyPr>
+          <a:lstStyle/>
+          <a:p>
+            <a:pPr algn="ctr"/>
+            <a:r>
+              <a:rPr lang="en-US" sz="1600" dirty="0">
+                <a:latin typeface="Andale Mono" panose="020B0509000000000004" pitchFamily="49" charset="0"/>
+              </a:rPr>
+              <a:t>docker daemon</a:t>
+            </a:r>
+            <a:endParaRPr lang="en-US" sz="2400" dirty="0"/>
+          </a:p>
+        </p:txBody>
+      </p:sp>
+      <p:pic>
+        <p:nvPicPr>
+          <p:cNvPr id="18" name="Picture 17" descr="A close up of a sign&#10;&#10;Description automatically generated">
+            <a:extLst>
+              <a:ext uri="{FF2B5EF4-FFF2-40B4-BE49-F238E27FC236}">
+                <a16:creationId xmlns:a16="http://schemas.microsoft.com/office/drawing/2014/main" id="{F4C69137-B339-BC42-AB62-A4D895978992}"/>
+              </a:ext>
+            </a:extLst>
+          </p:cNvPr>
+          <p:cNvPicPr>
+            <a:picLocks noChangeAspect="1"/>
+          </p:cNvPicPr>
+          <p:nvPr/>
+        </p:nvPicPr>
+        <p:blipFill>
+          <a:blip r:embed="rId2"/>
+          <a:stretch>
+            <a:fillRect/>
+          </a:stretch>
+        </p:blipFill>
+        <p:spPr>
+          <a:xfrm>
+            <a:off x="5029200" y="4581999"/>
+            <a:ext cx="2133600" cy="1816100"/>
+          </a:xfrm>
+          <a:prstGeom prst="rect">
+            <a:avLst/>
+          </a:prstGeom>
+        </p:spPr>
+      </p:pic>
+      <p:sp>
+        <p:nvSpPr>
+          <p:cNvPr id="19" name="Rectangle 18">
+            <a:extLst>
+              <a:ext uri="{FF2B5EF4-FFF2-40B4-BE49-F238E27FC236}">
+                <a16:creationId xmlns:a16="http://schemas.microsoft.com/office/drawing/2014/main" id="{582F5AE3-41EA-B14A-856F-7A3E229DC94F}"/>
+              </a:ext>
+            </a:extLst>
+          </p:cNvPr>
+          <p:cNvSpPr/>
+          <p:nvPr/>
+        </p:nvSpPr>
+        <p:spPr>
+          <a:xfrm>
+            <a:off x="838200" y="2101932"/>
+            <a:ext cx="2154382" cy="712520"/>
+          </a:xfrm>
+          <a:prstGeom prst="rect">
+            <a:avLst/>
+          </a:prstGeom>
+          <a:solidFill>
+            <a:schemeClr val="accent3"/>
+          </a:solidFill>
+          <a:ln>
+            <a:solidFill>
+              <a:schemeClr val="accent3"/>
+            </a:solidFill>
+          </a:ln>
+        </p:spPr>
+        <p:style>
+          <a:lnRef idx="2">
+            <a:schemeClr val="accent1">
+              <a:shade val="50000"/>
+            </a:schemeClr>
+          </a:lnRef>
+          <a:fillRef idx="1">
+            <a:schemeClr val="accent1"/>
+          </a:fillRef>
+          <a:effectRef idx="0">
+            <a:schemeClr val="accent1"/>
+          </a:effectRef>
+          <a:fontRef idx="minor">
+            <a:schemeClr val="lt1"/>
+          </a:fontRef>
+        </p:style>
+        <p:txBody>
+          <a:bodyPr rtlCol="0" anchor="ctr"/>
+          <a:lstStyle/>
+          <a:p>
+            <a:pPr algn="ctr"/>
+            <a:r>
+              <a:rPr lang="en-US" dirty="0"/>
+              <a:t>containers</a:t>
+            </a:r>
+          </a:p>
+        </p:txBody>
+      </p:sp>
+      <p:sp>
+        <p:nvSpPr>
+          <p:cNvPr id="20" name="Rectangle 19">
+            <a:extLst>
+              <a:ext uri="{FF2B5EF4-FFF2-40B4-BE49-F238E27FC236}">
+                <a16:creationId xmlns:a16="http://schemas.microsoft.com/office/drawing/2014/main" id="{8A2336DC-87A8-AF4C-A5A3-4F58C850EDB1}"/>
+              </a:ext>
+            </a:extLst>
+          </p:cNvPr>
+          <p:cNvSpPr/>
+          <p:nvPr/>
+        </p:nvSpPr>
+        <p:spPr>
+          <a:xfrm>
+            <a:off x="838200" y="4049486"/>
+            <a:ext cx="2154382" cy="712520"/>
+          </a:xfrm>
+          <a:prstGeom prst="rect">
+            <a:avLst/>
+          </a:prstGeom>
+          <a:solidFill>
+            <a:schemeClr val="accent3"/>
+          </a:solidFill>
+          <a:ln>
+            <a:solidFill>
+              <a:schemeClr val="accent3"/>
+            </a:solidFill>
+          </a:ln>
+        </p:spPr>
+        <p:style>
+          <a:lnRef idx="2">
+            <a:schemeClr val="accent1">
+              <a:shade val="50000"/>
+            </a:schemeClr>
+          </a:lnRef>
+          <a:fillRef idx="1">
+            <a:schemeClr val="accent1"/>
+          </a:fillRef>
+          <a:effectRef idx="0">
+            <a:schemeClr val="accent1"/>
+          </a:effectRef>
+          <a:fontRef idx="minor">
+            <a:schemeClr val="lt1"/>
+          </a:fontRef>
+        </p:style>
+        <p:txBody>
+          <a:bodyPr rtlCol="0" anchor="ctr"/>
+          <a:lstStyle/>
+          <a:p>
+            <a:pPr algn="ctr"/>
+            <a:r>
+              <a:rPr lang="en-US" dirty="0"/>
+              <a:t>images</a:t>
+            </a:r>
+          </a:p>
+        </p:txBody>
+      </p:sp>
+      <p:sp>
+        <p:nvSpPr>
+          <p:cNvPr id="21" name="Rectangle 20">
+            <a:extLst>
+              <a:ext uri="{FF2B5EF4-FFF2-40B4-BE49-F238E27FC236}">
+                <a16:creationId xmlns:a16="http://schemas.microsoft.com/office/drawing/2014/main" id="{48063958-E5A4-EA47-8F4A-7591E0740234}"/>
+              </a:ext>
+            </a:extLst>
+          </p:cNvPr>
+          <p:cNvSpPr/>
+          <p:nvPr/>
+        </p:nvSpPr>
+        <p:spPr>
+          <a:xfrm>
+            <a:off x="9199418" y="2098530"/>
+            <a:ext cx="2154382" cy="712520"/>
+          </a:xfrm>
+          <a:prstGeom prst="rect">
+            <a:avLst/>
+          </a:prstGeom>
+          <a:solidFill>
+            <a:schemeClr val="accent3"/>
+          </a:solidFill>
+          <a:ln>
+            <a:solidFill>
+              <a:schemeClr val="accent3"/>
+            </a:solidFill>
+          </a:ln>
+        </p:spPr>
+        <p:style>
+          <a:lnRef idx="2">
+            <a:schemeClr val="accent1">
+              <a:shade val="50000"/>
+            </a:schemeClr>
+          </a:lnRef>
+          <a:fillRef idx="1">
+            <a:schemeClr val="accent1"/>
+          </a:fillRef>
+          <a:effectRef idx="0">
+            <a:schemeClr val="accent1"/>
+          </a:effectRef>
+          <a:fontRef idx="minor">
+            <a:schemeClr val="lt1"/>
+          </a:fontRef>
+        </p:style>
+        <p:txBody>
+          <a:bodyPr rtlCol="0" anchor="ctr"/>
+          <a:lstStyle/>
+          <a:p>
+            <a:pPr algn="ctr"/>
+            <a:r>
+              <a:rPr lang="en-US" dirty="0"/>
+              <a:t>networks</a:t>
+            </a:r>
+          </a:p>
+        </p:txBody>
+      </p:sp>
+      <p:sp>
+        <p:nvSpPr>
+          <p:cNvPr id="22" name="Rectangle 21">
+            <a:extLst>
+              <a:ext uri="{FF2B5EF4-FFF2-40B4-BE49-F238E27FC236}">
+                <a16:creationId xmlns:a16="http://schemas.microsoft.com/office/drawing/2014/main" id="{87477E1A-E3A2-554D-929C-FBBD510AF418}"/>
+              </a:ext>
+            </a:extLst>
+          </p:cNvPr>
+          <p:cNvSpPr/>
+          <p:nvPr/>
+        </p:nvSpPr>
+        <p:spPr>
+          <a:xfrm>
+            <a:off x="9203438" y="4049486"/>
+            <a:ext cx="2154382" cy="712520"/>
+          </a:xfrm>
+          <a:prstGeom prst="rect">
+            <a:avLst/>
+          </a:prstGeom>
+          <a:solidFill>
+            <a:schemeClr val="accent3"/>
+          </a:solidFill>
+          <a:ln>
+            <a:solidFill>
+              <a:schemeClr val="accent3"/>
+            </a:solidFill>
+          </a:ln>
+        </p:spPr>
+        <p:style>
+          <a:lnRef idx="2">
+            <a:schemeClr val="accent1">
+              <a:shade val="50000"/>
+            </a:schemeClr>
+          </a:lnRef>
+          <a:fillRef idx="1">
+            <a:schemeClr val="accent1"/>
+          </a:fillRef>
+          <a:effectRef idx="0">
+            <a:schemeClr val="accent1"/>
+          </a:effectRef>
+          <a:fontRef idx="minor">
+            <a:schemeClr val="lt1"/>
+          </a:fontRef>
+        </p:style>
+        <p:txBody>
+          <a:bodyPr rtlCol="0" anchor="ctr"/>
+          <a:lstStyle/>
+          <a:p>
+            <a:pPr algn="ctr"/>
+            <a:r>
+              <a:rPr lang="en-US" dirty="0"/>
+              <a:t>data volumes</a:t>
+            </a:r>
+          </a:p>
+        </p:txBody>
+      </p:sp>
+      <p:sp>
+        <p:nvSpPr>
+          <p:cNvPr id="34" name="TextBox 33">
+            <a:extLst>
+              <a:ext uri="{FF2B5EF4-FFF2-40B4-BE49-F238E27FC236}">
+                <a16:creationId xmlns:a16="http://schemas.microsoft.com/office/drawing/2014/main" id="{279CF6A8-3753-364D-BABA-52ECD7693A7B}"/>
+              </a:ext>
+            </a:extLst>
+          </p:cNvPr>
+          <p:cNvSpPr txBox="1"/>
+          <p:nvPr/>
+        </p:nvSpPr>
+        <p:spPr>
+          <a:xfrm>
+            <a:off x="8740873" y="3100366"/>
+            <a:ext cx="1024319" cy="369332"/>
+          </a:xfrm>
+          <a:prstGeom prst="rect">
+            <a:avLst/>
+          </a:prstGeom>
+          <a:noFill/>
+        </p:spPr>
+        <p:txBody>
+          <a:bodyPr wrap="none" rtlCol="0">
+            <a:spAutoFit/>
+          </a:bodyPr>
+          <a:lstStyle/>
+          <a:p>
+            <a:r>
+              <a:rPr lang="en-US" dirty="0"/>
+              <a:t>manages</a:t>
+            </a:r>
+          </a:p>
+        </p:txBody>
+      </p:sp>
+      <p:sp>
+        <p:nvSpPr>
+          <p:cNvPr id="35" name="TextBox 34">
+            <a:extLst>
+              <a:ext uri="{FF2B5EF4-FFF2-40B4-BE49-F238E27FC236}">
+                <a16:creationId xmlns:a16="http://schemas.microsoft.com/office/drawing/2014/main" id="{EE9EA2BE-20AA-5B4A-A0A8-542B108C9586}"/>
+              </a:ext>
+            </a:extLst>
+          </p:cNvPr>
+          <p:cNvSpPr txBox="1"/>
+          <p:nvPr/>
+        </p:nvSpPr>
+        <p:spPr>
+          <a:xfrm>
+            <a:off x="2483499" y="3100366"/>
+            <a:ext cx="1024319" cy="369332"/>
+          </a:xfrm>
+          <a:prstGeom prst="rect">
+            <a:avLst/>
+          </a:prstGeom>
+          <a:noFill/>
+        </p:spPr>
+        <p:txBody>
+          <a:bodyPr wrap="none" rtlCol="0">
+            <a:spAutoFit/>
+          </a:bodyPr>
+          <a:lstStyle/>
+          <a:p>
+            <a:r>
+              <a:rPr lang="en-US" dirty="0"/>
+              <a:t>manages</a:t>
+            </a:r>
+          </a:p>
+        </p:txBody>
+      </p:sp>
     </p:spTree>
     <p:extLst>
       <p:ext uri="{BB962C8B-B14F-4D97-AF65-F5344CB8AC3E}">
-        <p14:creationId xmlns:p14="http://schemas.microsoft.com/office/powerpoint/2010/main" val="3971807622"/>
+        <p14:creationId xmlns:p14="http://schemas.microsoft.com/office/powerpoint/2010/main" val="1700221994"/>
       </p:ext>
     </p:extLst>
   </p:cSld>

</xml_diff>

<commit_message>
Added slide which outlines the requirements for hands-on participation
</commit_message>
<xml_diff>
--- a/docker-foundations.pptx
+++ b/docker-foundations.pptx
@@ -5,29 +5,30 @@
     <p:sldMasterId id="2147483660" r:id="rId1"/>
   </p:sldMasterIdLst>
   <p:notesMasterIdLst>
-    <p:notesMasterId r:id="rId22"/>
+    <p:notesMasterId r:id="rId23"/>
   </p:notesMasterIdLst>
   <p:sldIdLst>
     <p:sldId id="256" r:id="rId2"/>
-    <p:sldId id="272" r:id="rId3"/>
-    <p:sldId id="257" r:id="rId4"/>
-    <p:sldId id="270" r:id="rId5"/>
-    <p:sldId id="258" r:id="rId6"/>
-    <p:sldId id="271" r:id="rId7"/>
-    <p:sldId id="273" r:id="rId8"/>
-    <p:sldId id="275" r:id="rId9"/>
-    <p:sldId id="259" r:id="rId10"/>
-    <p:sldId id="274" r:id="rId11"/>
-    <p:sldId id="260" r:id="rId12"/>
-    <p:sldId id="261" r:id="rId13"/>
-    <p:sldId id="262" r:id="rId14"/>
-    <p:sldId id="263" r:id="rId15"/>
-    <p:sldId id="264" r:id="rId16"/>
-    <p:sldId id="265" r:id="rId17"/>
-    <p:sldId id="266" r:id="rId18"/>
-    <p:sldId id="267" r:id="rId19"/>
-    <p:sldId id="268" r:id="rId20"/>
-    <p:sldId id="269" r:id="rId21"/>
+    <p:sldId id="276" r:id="rId3"/>
+    <p:sldId id="272" r:id="rId4"/>
+    <p:sldId id="257" r:id="rId5"/>
+    <p:sldId id="270" r:id="rId6"/>
+    <p:sldId id="258" r:id="rId7"/>
+    <p:sldId id="271" r:id="rId8"/>
+    <p:sldId id="273" r:id="rId9"/>
+    <p:sldId id="275" r:id="rId10"/>
+    <p:sldId id="259" r:id="rId11"/>
+    <p:sldId id="274" r:id="rId12"/>
+    <p:sldId id="260" r:id="rId13"/>
+    <p:sldId id="261" r:id="rId14"/>
+    <p:sldId id="262" r:id="rId15"/>
+    <p:sldId id="263" r:id="rId16"/>
+    <p:sldId id="264" r:id="rId17"/>
+    <p:sldId id="265" r:id="rId18"/>
+    <p:sldId id="266" r:id="rId19"/>
+    <p:sldId id="267" r:id="rId20"/>
+    <p:sldId id="268" r:id="rId21"/>
+    <p:sldId id="269" r:id="rId22"/>
   </p:sldIdLst>
   <p:sldSz cx="12192000" cy="6858000"/>
   <p:notesSz cx="6858000" cy="9144000"/>
@@ -227,7 +228,7 @@
           <a:p>
             <a:fld id="{966F6F5D-167E-1849-B841-EB0817BB385A}" type="datetimeFigureOut">
               <a:rPr lang="en-US" smtClean="0"/>
-              <a:t>2/13/20</a:t>
+              <a:t>2/14/20</a:t>
             </a:fld>
             <a:endParaRPr lang="en-US"/>
           </a:p>
@@ -643,7 +644,7 @@
           <a:p>
             <a:fld id="{020CF8D1-BA82-5045-ACF9-1AA42AD6A519}" type="slidenum">
               <a:rPr lang="en-US" smtClean="0"/>
-              <a:t>13</a:t>
+              <a:t>14</a:t>
             </a:fld>
             <a:endParaRPr lang="en-US"/>
           </a:p>
@@ -727,7 +728,7 @@
           <a:p>
             <a:fld id="{020CF8D1-BA82-5045-ACF9-1AA42AD6A519}" type="slidenum">
               <a:rPr lang="en-US" smtClean="0"/>
-              <a:t>14</a:t>
+              <a:t>15</a:t>
             </a:fld>
             <a:endParaRPr lang="en-US"/>
           </a:p>
@@ -811,7 +812,7 @@
           <a:p>
             <a:fld id="{020CF8D1-BA82-5045-ACF9-1AA42AD6A519}" type="slidenum">
               <a:rPr lang="en-US" smtClean="0"/>
-              <a:t>15</a:t>
+              <a:t>16</a:t>
             </a:fld>
             <a:endParaRPr lang="en-US"/>
           </a:p>
@@ -895,7 +896,7 @@
           <a:p>
             <a:fld id="{020CF8D1-BA82-5045-ACF9-1AA42AD6A519}" type="slidenum">
               <a:rPr lang="en-US" smtClean="0"/>
-              <a:t>16</a:t>
+              <a:t>17</a:t>
             </a:fld>
             <a:endParaRPr lang="en-US"/>
           </a:p>
@@ -979,7 +980,7 @@
           <a:p>
             <a:fld id="{020CF8D1-BA82-5045-ACF9-1AA42AD6A519}" type="slidenum">
               <a:rPr lang="en-US" smtClean="0"/>
-              <a:t>17</a:t>
+              <a:t>18</a:t>
             </a:fld>
             <a:endParaRPr lang="en-US"/>
           </a:p>
@@ -1063,7 +1064,7 @@
           <a:p>
             <a:fld id="{020CF8D1-BA82-5045-ACF9-1AA42AD6A519}" type="slidenum">
               <a:rPr lang="en-US" smtClean="0"/>
-              <a:t>18</a:t>
+              <a:t>19</a:t>
             </a:fld>
             <a:endParaRPr lang="en-US"/>
           </a:p>
@@ -1147,7 +1148,7 @@
           <a:p>
             <a:fld id="{020CF8D1-BA82-5045-ACF9-1AA42AD6A519}" type="slidenum">
               <a:rPr lang="en-US" smtClean="0"/>
-              <a:t>19</a:t>
+              <a:t>20</a:t>
             </a:fld>
             <a:endParaRPr lang="en-US"/>
           </a:p>
@@ -1231,7 +1232,7 @@
           <a:p>
             <a:fld id="{020CF8D1-BA82-5045-ACF9-1AA42AD6A519}" type="slidenum">
               <a:rPr lang="en-US" smtClean="0"/>
-              <a:t>20</a:t>
+              <a:t>21</a:t>
             </a:fld>
             <a:endParaRPr lang="en-US"/>
           </a:p>
@@ -1315,7 +1316,7 @@
           <a:p>
             <a:fld id="{020CF8D1-BA82-5045-ACF9-1AA42AD6A519}" type="slidenum">
               <a:rPr lang="en-US" smtClean="0"/>
-              <a:t>3</a:t>
+              <a:t>4</a:t>
             </a:fld>
             <a:endParaRPr lang="en-US"/>
           </a:p>
@@ -1399,7 +1400,7 @@
           <a:p>
             <a:fld id="{020CF8D1-BA82-5045-ACF9-1AA42AD6A519}" type="slidenum">
               <a:rPr lang="en-US" smtClean="0"/>
-              <a:t>4</a:t>
+              <a:t>5</a:t>
             </a:fld>
             <a:endParaRPr lang="en-US"/>
           </a:p>
@@ -1483,7 +1484,7 @@
           <a:p>
             <a:fld id="{020CF8D1-BA82-5045-ACF9-1AA42AD6A519}" type="slidenum">
               <a:rPr lang="en-US" smtClean="0"/>
-              <a:t>5</a:t>
+              <a:t>6</a:t>
             </a:fld>
             <a:endParaRPr lang="en-US"/>
           </a:p>
@@ -1567,7 +1568,7 @@
           <a:p>
             <a:fld id="{020CF8D1-BA82-5045-ACF9-1AA42AD6A519}" type="slidenum">
               <a:rPr lang="en-US" smtClean="0"/>
-              <a:t>7</a:t>
+              <a:t>8</a:t>
             </a:fld>
             <a:endParaRPr lang="en-US"/>
           </a:p>
@@ -1747,7 +1748,7 @@
           <a:p>
             <a:fld id="{020CF8D1-BA82-5045-ACF9-1AA42AD6A519}" type="slidenum">
               <a:rPr lang="en-US" smtClean="0"/>
-              <a:t>8</a:t>
+              <a:t>9</a:t>
             </a:fld>
             <a:endParaRPr lang="en-US"/>
           </a:p>
@@ -1831,7 +1832,7 @@
           <a:p>
             <a:fld id="{020CF8D1-BA82-5045-ACF9-1AA42AD6A519}" type="slidenum">
               <a:rPr lang="en-US" smtClean="0"/>
-              <a:t>9</a:t>
+              <a:t>10</a:t>
             </a:fld>
             <a:endParaRPr lang="en-US"/>
           </a:p>
@@ -1915,7 +1916,7 @@
           <a:p>
             <a:fld id="{020CF8D1-BA82-5045-ACF9-1AA42AD6A519}" type="slidenum">
               <a:rPr lang="en-US" smtClean="0"/>
-              <a:t>11</a:t>
+              <a:t>12</a:t>
             </a:fld>
             <a:endParaRPr lang="en-US"/>
           </a:p>
@@ -1999,7 +2000,7 @@
           <a:p>
             <a:fld id="{020CF8D1-BA82-5045-ACF9-1AA42AD6A519}" type="slidenum">
               <a:rPr lang="en-US" smtClean="0"/>
-              <a:t>12</a:t>
+              <a:t>13</a:t>
             </a:fld>
             <a:endParaRPr lang="en-US"/>
           </a:p>
@@ -5186,6 +5187,203 @@
           <a:chExt cx="0" cy="0"/>
         </a:xfrm>
       </p:grpSpPr>
+      <p:sp>
+        <p:nvSpPr>
+          <p:cNvPr id="2" name="Title 1">
+            <a:extLst>
+              <a:ext uri="{FF2B5EF4-FFF2-40B4-BE49-F238E27FC236}">
+                <a16:creationId xmlns:a16="http://schemas.microsoft.com/office/drawing/2014/main" id="{6EF740B5-CBA6-E548-9EA6-5662EACB1D52}"/>
+              </a:ext>
+            </a:extLst>
+          </p:cNvPr>
+          <p:cNvSpPr>
+            <a:spLocks noGrp="1"/>
+          </p:cNvSpPr>
+          <p:nvPr>
+            <p:ph type="title"/>
+          </p:nvPr>
+        </p:nvSpPr>
+        <p:spPr/>
+        <p:txBody>
+          <a:bodyPr/>
+          <a:lstStyle/>
+          <a:p>
+            <a:r>
+              <a:rPr lang="en-US" dirty="0"/>
+              <a:t>The</a:t>
+            </a:r>
+            <a:r>
+              <a:rPr lang="en-US" baseline="0" dirty="0"/>
+              <a:t> Docker Architecture</a:t>
+            </a:r>
+            <a:endParaRPr lang="en-US" dirty="0"/>
+          </a:p>
+        </p:txBody>
+      </p:sp>
+      <p:sp>
+        <p:nvSpPr>
+          <p:cNvPr id="3" name="Content Placeholder 2">
+            <a:extLst>
+              <a:ext uri="{FF2B5EF4-FFF2-40B4-BE49-F238E27FC236}">
+                <a16:creationId xmlns:a16="http://schemas.microsoft.com/office/drawing/2014/main" id="{92BD0C8D-10FB-1549-A805-B147D845A1D5}"/>
+              </a:ext>
+            </a:extLst>
+          </p:cNvPr>
+          <p:cNvSpPr>
+            <a:spLocks noGrp="1"/>
+          </p:cNvSpPr>
+          <p:nvPr>
+            <p:ph idx="1"/>
+          </p:nvPr>
+        </p:nvSpPr>
+        <p:spPr/>
+        <p:txBody>
+          <a:bodyPr/>
+          <a:lstStyle/>
+          <a:p>
+            <a:r>
+              <a:rPr lang="en-US" dirty="0"/>
+              <a:t>Client, API,</a:t>
+            </a:r>
+            <a:r>
+              <a:rPr lang="en-US" baseline="0" dirty="0"/>
+              <a:t> daemon, repositories</a:t>
+            </a:r>
+            <a:endParaRPr lang="en-US" dirty="0"/>
+          </a:p>
+        </p:txBody>
+      </p:sp>
+      <p:sp>
+        <p:nvSpPr>
+          <p:cNvPr id="4" name="Date Placeholder 3">
+            <a:extLst>
+              <a:ext uri="{FF2B5EF4-FFF2-40B4-BE49-F238E27FC236}">
+                <a16:creationId xmlns:a16="http://schemas.microsoft.com/office/drawing/2014/main" id="{1D656B29-0CD4-2C4F-85C0-BFEFA8EB10B8}"/>
+              </a:ext>
+            </a:extLst>
+          </p:cNvPr>
+          <p:cNvSpPr>
+            <a:spLocks noGrp="1"/>
+          </p:cNvSpPr>
+          <p:nvPr>
+            <p:ph type="dt" sz="half" idx="10"/>
+          </p:nvPr>
+        </p:nvSpPr>
+        <p:spPr/>
+        <p:txBody>
+          <a:bodyPr/>
+          <a:lstStyle/>
+          <a:p>
+            <a:r>
+              <a:rPr lang="en-US"/>
+              <a:t>World Wide Technology ©</a:t>
+            </a:r>
+            <a:endParaRPr lang="en-US" dirty="0"/>
+          </a:p>
+        </p:txBody>
+      </p:sp>
+      <p:sp>
+        <p:nvSpPr>
+          <p:cNvPr id="5" name="Slide Number Placeholder 4">
+            <a:extLst>
+              <a:ext uri="{FF2B5EF4-FFF2-40B4-BE49-F238E27FC236}">
+                <a16:creationId xmlns:a16="http://schemas.microsoft.com/office/drawing/2014/main" id="{56AB9C4C-8731-6B42-B6FA-F9F1AD210224}"/>
+              </a:ext>
+            </a:extLst>
+          </p:cNvPr>
+          <p:cNvSpPr>
+            <a:spLocks noGrp="1"/>
+          </p:cNvSpPr>
+          <p:nvPr>
+            <p:ph type="sldNum" sz="quarter" idx="12"/>
+          </p:nvPr>
+        </p:nvSpPr>
+        <p:spPr/>
+        <p:txBody>
+          <a:bodyPr/>
+          <a:lstStyle/>
+          <a:p>
+            <a:fld id="{A44B02FA-DD2D-1844-AE35-8B2EAB0CF4EF}" type="slidenum">
+              <a:rPr lang="en-US" smtClean="0"/>
+              <a:pPr/>
+              <a:t>10</a:t>
+            </a:fld>
+            <a:endParaRPr lang="en-US" dirty="0"/>
+          </a:p>
+        </p:txBody>
+      </p:sp>
+      <p:pic>
+        <p:nvPicPr>
+          <p:cNvPr id="9" name="Picture 8">
+            <a:extLst>
+              <a:ext uri="{FF2B5EF4-FFF2-40B4-BE49-F238E27FC236}">
+                <a16:creationId xmlns:a16="http://schemas.microsoft.com/office/drawing/2014/main" id="{A21770C8-A08E-A447-AF62-395311F78396}"/>
+              </a:ext>
+            </a:extLst>
+          </p:cNvPr>
+          <p:cNvPicPr>
+            <a:picLocks noChangeAspect="1"/>
+          </p:cNvPicPr>
+          <p:nvPr/>
+        </p:nvPicPr>
+        <p:blipFill>
+          <a:blip r:embed="rId3"/>
+          <a:stretch>
+            <a:fillRect/>
+          </a:stretch>
+        </p:blipFill>
+        <p:spPr>
+          <a:xfrm>
+            <a:off x="5035136" y="2718193"/>
+            <a:ext cx="6611175" cy="3548464"/>
+          </a:xfrm>
+          <a:prstGeom prst="rect">
+            <a:avLst/>
+          </a:prstGeom>
+        </p:spPr>
+      </p:pic>
+    </p:spTree>
+    <p:extLst>
+      <p:ext uri="{BB962C8B-B14F-4D97-AF65-F5344CB8AC3E}">
+        <p14:creationId xmlns:p14="http://schemas.microsoft.com/office/powerpoint/2010/main" val="3511915314"/>
+      </p:ext>
+    </p:extLst>
+  </p:cSld>
+  <p:clrMapOvr>
+    <a:masterClrMapping/>
+  </p:clrMapOvr>
+  <mc:AlternateContent xmlns:mc="http://schemas.openxmlformats.org/markup-compatibility/2006" xmlns:p14="http://schemas.microsoft.com/office/powerpoint/2010/main">
+    <mc:Choice Requires="p14">
+      <p:transition spd="med" p14:dur="700">
+        <p:fade/>
+      </p:transition>
+    </mc:Choice>
+    <mc:Fallback xmlns="">
+      <p:transition spd="med">
+        <p:fade/>
+      </p:transition>
+    </mc:Fallback>
+  </mc:AlternateContent>
+</p:sld>
+</file>
+
+<file path=ppt/slides/slide11.xml><?xml version="1.0" encoding="utf-8"?>
+<p:sld xmlns:a="http://schemas.openxmlformats.org/drawingml/2006/main" xmlns:r="http://schemas.openxmlformats.org/officeDocument/2006/relationships" xmlns:p="http://schemas.openxmlformats.org/presentationml/2006/main">
+  <p:cSld>
+    <p:spTree>
+      <p:nvGrpSpPr>
+        <p:cNvPr id="1" name=""/>
+        <p:cNvGrpSpPr/>
+        <p:nvPr/>
+      </p:nvGrpSpPr>
+      <p:grpSpPr>
+        <a:xfrm>
+          <a:off x="0" y="0"/>
+          <a:ext cx="0" cy="0"/>
+          <a:chOff x="0" y="0"/>
+          <a:chExt cx="0" cy="0"/>
+        </a:xfrm>
+      </p:grpSpPr>
       <p:cxnSp>
         <p:nvCxnSpPr>
           <p:cNvPr id="26" name="Straight Connector 25">
@@ -5442,7 +5640,7 @@
             <a:fld id="{A44B02FA-DD2D-1844-AE35-8B2EAB0CF4EF}" type="slidenum">
               <a:rPr lang="en-US" smtClean="0"/>
               <a:pPr/>
-              <a:t>10</a:t>
+              <a:t>11</a:t>
             </a:fld>
             <a:endParaRPr lang="en-US" dirty="0"/>
           </a:p>
@@ -6153,180 +6351,6 @@
 </p:sld>
 </file>
 
-<file path=ppt/slides/slide11.xml><?xml version="1.0" encoding="utf-8"?>
-<p:sld xmlns:a="http://schemas.openxmlformats.org/drawingml/2006/main" xmlns:r="http://schemas.openxmlformats.org/officeDocument/2006/relationships" xmlns:p="http://schemas.openxmlformats.org/presentationml/2006/main">
-  <p:cSld>
-    <p:spTree>
-      <p:nvGrpSpPr>
-        <p:cNvPr id="1" name=""/>
-        <p:cNvGrpSpPr/>
-        <p:nvPr/>
-      </p:nvGrpSpPr>
-      <p:grpSpPr>
-        <a:xfrm>
-          <a:off x="0" y="0"/>
-          <a:ext cx="0" cy="0"/>
-          <a:chOff x="0" y="0"/>
-          <a:chExt cx="0" cy="0"/>
-        </a:xfrm>
-      </p:grpSpPr>
-      <p:sp>
-        <p:nvSpPr>
-          <p:cNvPr id="2" name="Title 1">
-            <a:extLst>
-              <a:ext uri="{FF2B5EF4-FFF2-40B4-BE49-F238E27FC236}">
-                <a16:creationId xmlns:a16="http://schemas.microsoft.com/office/drawing/2014/main" id="{178FC9BC-162C-754A-A134-D392F08CDBEE}"/>
-              </a:ext>
-            </a:extLst>
-          </p:cNvPr>
-          <p:cNvSpPr>
-            <a:spLocks noGrp="1"/>
-          </p:cNvSpPr>
-          <p:nvPr>
-            <p:ph type="title"/>
-          </p:nvPr>
-        </p:nvSpPr>
-        <p:spPr/>
-        <p:txBody>
-          <a:bodyPr/>
-          <a:lstStyle/>
-          <a:p>
-            <a:r>
-              <a:rPr lang="en-US" dirty="0"/>
-              <a:t>Installing</a:t>
-            </a:r>
-            <a:r>
-              <a:rPr lang="en-US" baseline="0" dirty="0"/>
-              <a:t> Docker</a:t>
-            </a:r>
-            <a:endParaRPr lang="en-US" dirty="0"/>
-          </a:p>
-        </p:txBody>
-      </p:sp>
-      <p:sp>
-        <p:nvSpPr>
-          <p:cNvPr id="3" name="Content Placeholder 2">
-            <a:extLst>
-              <a:ext uri="{FF2B5EF4-FFF2-40B4-BE49-F238E27FC236}">
-                <a16:creationId xmlns:a16="http://schemas.microsoft.com/office/drawing/2014/main" id="{0ECC7DC7-0671-F543-9991-CF8210E2567B}"/>
-              </a:ext>
-            </a:extLst>
-          </p:cNvPr>
-          <p:cNvSpPr>
-            <a:spLocks noGrp="1"/>
-          </p:cNvSpPr>
-          <p:nvPr>
-            <p:ph idx="1"/>
-          </p:nvPr>
-        </p:nvSpPr>
-        <p:spPr/>
-        <p:txBody>
-          <a:bodyPr/>
-          <a:lstStyle/>
-          <a:p>
-            <a:r>
-              <a:rPr lang="en-US" dirty="0"/>
-              <a:t>Setup Docker account</a:t>
-            </a:r>
-          </a:p>
-          <a:p>
-            <a:r>
-              <a:rPr lang="en-US" dirty="0"/>
-              <a:t>Verify docker installation (docker info docker --version)</a:t>
-            </a:r>
-          </a:p>
-          <a:p>
-            <a:r>
-              <a:rPr lang="en-US" dirty="0"/>
-              <a:t>docker run hello-world</a:t>
-            </a:r>
-          </a:p>
-        </p:txBody>
-      </p:sp>
-      <p:sp>
-        <p:nvSpPr>
-          <p:cNvPr id="4" name="Date Placeholder 3">
-            <a:extLst>
-              <a:ext uri="{FF2B5EF4-FFF2-40B4-BE49-F238E27FC236}">
-                <a16:creationId xmlns:a16="http://schemas.microsoft.com/office/drawing/2014/main" id="{38C6DDB4-CE9E-4843-86A9-EFC27330D02F}"/>
-              </a:ext>
-            </a:extLst>
-          </p:cNvPr>
-          <p:cNvSpPr>
-            <a:spLocks noGrp="1"/>
-          </p:cNvSpPr>
-          <p:nvPr>
-            <p:ph type="dt" sz="half" idx="10"/>
-          </p:nvPr>
-        </p:nvSpPr>
-        <p:spPr/>
-        <p:txBody>
-          <a:bodyPr/>
-          <a:lstStyle/>
-          <a:p>
-            <a:r>
-              <a:rPr lang="en-US"/>
-              <a:t>World Wide Technology ©</a:t>
-            </a:r>
-            <a:endParaRPr lang="en-US" dirty="0"/>
-          </a:p>
-        </p:txBody>
-      </p:sp>
-      <p:sp>
-        <p:nvSpPr>
-          <p:cNvPr id="5" name="Slide Number Placeholder 4">
-            <a:extLst>
-              <a:ext uri="{FF2B5EF4-FFF2-40B4-BE49-F238E27FC236}">
-                <a16:creationId xmlns:a16="http://schemas.microsoft.com/office/drawing/2014/main" id="{09AD6D8E-DFAE-8E42-9152-B189D9284AD9}"/>
-              </a:ext>
-            </a:extLst>
-          </p:cNvPr>
-          <p:cNvSpPr>
-            <a:spLocks noGrp="1"/>
-          </p:cNvSpPr>
-          <p:nvPr>
-            <p:ph type="sldNum" sz="quarter" idx="12"/>
-          </p:nvPr>
-        </p:nvSpPr>
-        <p:spPr/>
-        <p:txBody>
-          <a:bodyPr/>
-          <a:lstStyle/>
-          <a:p>
-            <a:fld id="{A44B02FA-DD2D-1844-AE35-8B2EAB0CF4EF}" type="slidenum">
-              <a:rPr lang="en-US" smtClean="0"/>
-              <a:pPr/>
-              <a:t>11</a:t>
-            </a:fld>
-            <a:endParaRPr lang="en-US" dirty="0"/>
-          </a:p>
-        </p:txBody>
-      </p:sp>
-    </p:spTree>
-    <p:extLst>
-      <p:ext uri="{BB962C8B-B14F-4D97-AF65-F5344CB8AC3E}">
-        <p14:creationId xmlns:p14="http://schemas.microsoft.com/office/powerpoint/2010/main" val="3971807622"/>
-      </p:ext>
-    </p:extLst>
-  </p:cSld>
-  <p:clrMapOvr>
-    <a:masterClrMapping/>
-  </p:clrMapOvr>
-  <mc:AlternateContent xmlns:mc="http://schemas.openxmlformats.org/markup-compatibility/2006" xmlns:p14="http://schemas.microsoft.com/office/powerpoint/2010/main">
-    <mc:Choice Requires="p14">
-      <p:transition spd="med" p14:dur="700">
-        <p:fade/>
-      </p:transition>
-    </mc:Choice>
-    <mc:Fallback xmlns="">
-      <p:transition spd="med">
-        <p:fade/>
-      </p:transition>
-    </mc:Fallback>
-  </mc:AlternateContent>
-</p:sld>
-</file>
-
 <file path=ppt/slides/slide12.xml><?xml version="1.0" encoding="utf-8"?>
 <p:sld xmlns:a="http://schemas.openxmlformats.org/drawingml/2006/main" xmlns:r="http://schemas.openxmlformats.org/officeDocument/2006/relationships" xmlns:p="http://schemas.openxmlformats.org/presentationml/2006/main">
   <p:cSld>
@@ -6349,7 +6373,7 @@
           <p:cNvPr id="2" name="Title 1">
             <a:extLst>
               <a:ext uri="{FF2B5EF4-FFF2-40B4-BE49-F238E27FC236}">
-                <a16:creationId xmlns:a16="http://schemas.microsoft.com/office/drawing/2014/main" id="{AC0D55DF-385E-9A4F-AB08-FEBC11990B8B}"/>
+                <a16:creationId xmlns:a16="http://schemas.microsoft.com/office/drawing/2014/main" id="{178FC9BC-162C-754A-A134-D392F08CDBEE}"/>
               </a:ext>
             </a:extLst>
           </p:cNvPr>
@@ -6367,11 +6391,11 @@
           <a:p>
             <a:r>
               <a:rPr lang="en-US" dirty="0"/>
-              <a:t>Docker Images</a:t>
+              <a:t>Installing</a:t>
             </a:r>
             <a:r>
               <a:rPr lang="en-US" baseline="0" dirty="0"/>
-              <a:t> &amp; Containers</a:t>
+              <a:t> Docker</a:t>
             </a:r>
             <a:endParaRPr lang="en-US" dirty="0"/>
           </a:p>
@@ -6382,7 +6406,7 @@
           <p:cNvPr id="3" name="Content Placeholder 2">
             <a:extLst>
               <a:ext uri="{FF2B5EF4-FFF2-40B4-BE49-F238E27FC236}">
-                <a16:creationId xmlns:a16="http://schemas.microsoft.com/office/drawing/2014/main" id="{4CB23FD9-ADE0-084E-A8CC-44CA0BA25AB3}"/>
+                <a16:creationId xmlns:a16="http://schemas.microsoft.com/office/drawing/2014/main" id="{0ECC7DC7-0671-F543-9991-CF8210E2567B}"/>
               </a:ext>
             </a:extLst>
           </p:cNvPr>
@@ -6398,7 +6422,22 @@
           <a:bodyPr/>
           <a:lstStyle/>
           <a:p>
-            <a:endParaRPr lang="en-US"/>
+            <a:r>
+              <a:rPr lang="en-US" dirty="0"/>
+              <a:t>Setup Docker account</a:t>
+            </a:r>
+          </a:p>
+          <a:p>
+            <a:r>
+              <a:rPr lang="en-US" dirty="0"/>
+              <a:t>Verify docker installation (docker info docker --version)</a:t>
+            </a:r>
+          </a:p>
+          <a:p>
+            <a:r>
+              <a:rPr lang="en-US" dirty="0"/>
+              <a:t>docker run hello-world</a:t>
+            </a:r>
           </a:p>
         </p:txBody>
       </p:sp>
@@ -6407,7 +6446,7 @@
           <p:cNvPr id="4" name="Date Placeholder 3">
             <a:extLst>
               <a:ext uri="{FF2B5EF4-FFF2-40B4-BE49-F238E27FC236}">
-                <a16:creationId xmlns:a16="http://schemas.microsoft.com/office/drawing/2014/main" id="{6E8781CE-B8A7-7540-B619-28D099093D8B}"/>
+                <a16:creationId xmlns:a16="http://schemas.microsoft.com/office/drawing/2014/main" id="{38C6DDB4-CE9E-4843-86A9-EFC27330D02F}"/>
               </a:ext>
             </a:extLst>
           </p:cNvPr>
@@ -6436,7 +6475,7 @@
           <p:cNvPr id="5" name="Slide Number Placeholder 4">
             <a:extLst>
               <a:ext uri="{FF2B5EF4-FFF2-40B4-BE49-F238E27FC236}">
-                <a16:creationId xmlns:a16="http://schemas.microsoft.com/office/drawing/2014/main" id="{222BEAA2-2326-1F4D-9BCE-0FC3EC23B201}"/>
+                <a16:creationId xmlns:a16="http://schemas.microsoft.com/office/drawing/2014/main" id="{09AD6D8E-DFAE-8E42-9152-B189D9284AD9}"/>
               </a:ext>
             </a:extLst>
           </p:cNvPr>
@@ -6464,7 +6503,7 @@
     </p:spTree>
     <p:extLst>
       <p:ext uri="{BB962C8B-B14F-4D97-AF65-F5344CB8AC3E}">
-        <p14:creationId xmlns:p14="http://schemas.microsoft.com/office/powerpoint/2010/main" val="3339272507"/>
+        <p14:creationId xmlns:p14="http://schemas.microsoft.com/office/powerpoint/2010/main" val="3971807622"/>
       </p:ext>
     </p:extLst>
   </p:cSld>
@@ -6508,7 +6547,7 @@
           <p:cNvPr id="2" name="Title 1">
             <a:extLst>
               <a:ext uri="{FF2B5EF4-FFF2-40B4-BE49-F238E27FC236}">
-                <a16:creationId xmlns:a16="http://schemas.microsoft.com/office/drawing/2014/main" id="{42BD247B-4264-A040-8FCB-C20FD3374FF4}"/>
+                <a16:creationId xmlns:a16="http://schemas.microsoft.com/office/drawing/2014/main" id="{AC0D55DF-385E-9A4F-AB08-FEBC11990B8B}"/>
               </a:ext>
             </a:extLst>
           </p:cNvPr>
@@ -6526,8 +6565,13 @@
           <a:p>
             <a:r>
               <a:rPr lang="en-US" dirty="0"/>
-              <a:t>Downloading &amp; Storing Images</a:t>
-            </a:r>
+              <a:t>Docker Images</a:t>
+            </a:r>
+            <a:r>
+              <a:rPr lang="en-US" baseline="0" dirty="0"/>
+              <a:t> &amp; Containers</a:t>
+            </a:r>
+            <a:endParaRPr lang="en-US" dirty="0"/>
           </a:p>
         </p:txBody>
       </p:sp>
@@ -6536,7 +6580,7 @@
           <p:cNvPr id="3" name="Content Placeholder 2">
             <a:extLst>
               <a:ext uri="{FF2B5EF4-FFF2-40B4-BE49-F238E27FC236}">
-                <a16:creationId xmlns:a16="http://schemas.microsoft.com/office/drawing/2014/main" id="{B0305AB4-6FFD-1443-85B0-D0B7EAF3A8B3}"/>
+                <a16:creationId xmlns:a16="http://schemas.microsoft.com/office/drawing/2014/main" id="{4CB23FD9-ADE0-084E-A8CC-44CA0BA25AB3}"/>
               </a:ext>
             </a:extLst>
           </p:cNvPr>
@@ -6552,7 +6596,7 @@
           <a:bodyPr/>
           <a:lstStyle/>
           <a:p>
-            <a:endParaRPr lang="en-US" dirty="0"/>
+            <a:endParaRPr lang="en-US"/>
           </a:p>
         </p:txBody>
       </p:sp>
@@ -6561,7 +6605,7 @@
           <p:cNvPr id="4" name="Date Placeholder 3">
             <a:extLst>
               <a:ext uri="{FF2B5EF4-FFF2-40B4-BE49-F238E27FC236}">
-                <a16:creationId xmlns:a16="http://schemas.microsoft.com/office/drawing/2014/main" id="{BCB84961-9207-314D-9F17-CB7953DAEC61}"/>
+                <a16:creationId xmlns:a16="http://schemas.microsoft.com/office/drawing/2014/main" id="{6E8781CE-B8A7-7540-B619-28D099093D8B}"/>
               </a:ext>
             </a:extLst>
           </p:cNvPr>
@@ -6590,7 +6634,7 @@
           <p:cNvPr id="5" name="Slide Number Placeholder 4">
             <a:extLst>
               <a:ext uri="{FF2B5EF4-FFF2-40B4-BE49-F238E27FC236}">
-                <a16:creationId xmlns:a16="http://schemas.microsoft.com/office/drawing/2014/main" id="{8DCD8B99-39C3-F945-B4FE-C794E71188E0}"/>
+                <a16:creationId xmlns:a16="http://schemas.microsoft.com/office/drawing/2014/main" id="{222BEAA2-2326-1F4D-9BCE-0FC3EC23B201}"/>
               </a:ext>
             </a:extLst>
           </p:cNvPr>
@@ -6618,7 +6662,7 @@
     </p:spTree>
     <p:extLst>
       <p:ext uri="{BB962C8B-B14F-4D97-AF65-F5344CB8AC3E}">
-        <p14:creationId xmlns:p14="http://schemas.microsoft.com/office/powerpoint/2010/main" val="3043587272"/>
+        <p14:creationId xmlns:p14="http://schemas.microsoft.com/office/powerpoint/2010/main" val="3339272507"/>
       </p:ext>
     </p:extLst>
   </p:cSld>
@@ -6662,7 +6706,7 @@
           <p:cNvPr id="2" name="Title 1">
             <a:extLst>
               <a:ext uri="{FF2B5EF4-FFF2-40B4-BE49-F238E27FC236}">
-                <a16:creationId xmlns:a16="http://schemas.microsoft.com/office/drawing/2014/main" id="{8433E226-C9CA-6940-939E-6C1F5B356A30}"/>
+                <a16:creationId xmlns:a16="http://schemas.microsoft.com/office/drawing/2014/main" id="{42BD247B-4264-A040-8FCB-C20FD3374FF4}"/>
               </a:ext>
             </a:extLst>
           </p:cNvPr>
@@ -6680,7 +6724,7 @@
           <a:p>
             <a:r>
               <a:rPr lang="en-US" dirty="0"/>
-              <a:t>Docker Images</a:t>
+              <a:t>Downloading &amp; Storing Images</a:t>
             </a:r>
           </a:p>
         </p:txBody>
@@ -6690,7 +6734,7 @@
           <p:cNvPr id="3" name="Content Placeholder 2">
             <a:extLst>
               <a:ext uri="{FF2B5EF4-FFF2-40B4-BE49-F238E27FC236}">
-                <a16:creationId xmlns:a16="http://schemas.microsoft.com/office/drawing/2014/main" id="{B3D06E7E-C378-CF4A-BAE8-73912C1352E6}"/>
+                <a16:creationId xmlns:a16="http://schemas.microsoft.com/office/drawing/2014/main" id="{B0305AB4-6FFD-1443-85B0-D0B7EAF3A8B3}"/>
               </a:ext>
             </a:extLst>
           </p:cNvPr>
@@ -6706,10 +6750,7 @@
           <a:bodyPr/>
           <a:lstStyle/>
           <a:p>
-            <a:r>
-              <a:rPr lang="en-US" dirty="0"/>
-              <a:t>Layers</a:t>
-            </a:r>
+            <a:endParaRPr lang="en-US" dirty="0"/>
           </a:p>
         </p:txBody>
       </p:sp>
@@ -6718,7 +6759,7 @@
           <p:cNvPr id="4" name="Date Placeholder 3">
             <a:extLst>
               <a:ext uri="{FF2B5EF4-FFF2-40B4-BE49-F238E27FC236}">
-                <a16:creationId xmlns:a16="http://schemas.microsoft.com/office/drawing/2014/main" id="{4F1B3995-BF30-9944-85E9-292F234D5C32}"/>
+                <a16:creationId xmlns:a16="http://schemas.microsoft.com/office/drawing/2014/main" id="{BCB84961-9207-314D-9F17-CB7953DAEC61}"/>
               </a:ext>
             </a:extLst>
           </p:cNvPr>
@@ -6747,7 +6788,7 @@
           <p:cNvPr id="5" name="Slide Number Placeholder 4">
             <a:extLst>
               <a:ext uri="{FF2B5EF4-FFF2-40B4-BE49-F238E27FC236}">
-                <a16:creationId xmlns:a16="http://schemas.microsoft.com/office/drawing/2014/main" id="{72FDF096-946D-D740-8B15-C2984C73CB55}"/>
+                <a16:creationId xmlns:a16="http://schemas.microsoft.com/office/drawing/2014/main" id="{8DCD8B99-39C3-F945-B4FE-C794E71188E0}"/>
               </a:ext>
             </a:extLst>
           </p:cNvPr>
@@ -6775,7 +6816,7 @@
     </p:spTree>
     <p:extLst>
       <p:ext uri="{BB962C8B-B14F-4D97-AF65-F5344CB8AC3E}">
-        <p14:creationId xmlns:p14="http://schemas.microsoft.com/office/powerpoint/2010/main" val="2543508427"/>
+        <p14:creationId xmlns:p14="http://schemas.microsoft.com/office/powerpoint/2010/main" val="3043587272"/>
       </p:ext>
     </p:extLst>
   </p:cSld>
@@ -6819,7 +6860,7 @@
           <p:cNvPr id="2" name="Title 1">
             <a:extLst>
               <a:ext uri="{FF2B5EF4-FFF2-40B4-BE49-F238E27FC236}">
-                <a16:creationId xmlns:a16="http://schemas.microsoft.com/office/drawing/2014/main" id="{50D24551-8433-1648-A045-8FBF82633296}"/>
+                <a16:creationId xmlns:a16="http://schemas.microsoft.com/office/drawing/2014/main" id="{8433E226-C9CA-6940-939E-6C1F5B356A30}"/>
               </a:ext>
             </a:extLst>
           </p:cNvPr>
@@ -6837,13 +6878,8 @@
           <a:p>
             <a:r>
               <a:rPr lang="en-US" dirty="0"/>
-              <a:t>The </a:t>
-            </a:r>
-            <a:r>
-              <a:rPr lang="en-US" dirty="0" err="1"/>
-              <a:t>Dockerfile</a:t>
-            </a:r>
-            <a:endParaRPr lang="en-US" dirty="0"/>
+              <a:t>Docker Images</a:t>
+            </a:r>
           </a:p>
         </p:txBody>
       </p:sp>
@@ -6852,7 +6888,7 @@
           <p:cNvPr id="3" name="Content Placeholder 2">
             <a:extLst>
               <a:ext uri="{FF2B5EF4-FFF2-40B4-BE49-F238E27FC236}">
-                <a16:creationId xmlns:a16="http://schemas.microsoft.com/office/drawing/2014/main" id="{2E80DB0F-50E2-A74A-8E43-27BCD108C388}"/>
+                <a16:creationId xmlns:a16="http://schemas.microsoft.com/office/drawing/2014/main" id="{B3D06E7E-C378-CF4A-BAE8-73912C1352E6}"/>
               </a:ext>
             </a:extLst>
           </p:cNvPr>
@@ -6870,37 +6906,7 @@
           <a:p>
             <a:r>
               <a:rPr lang="en-US" dirty="0"/>
-              <a:t>FROM</a:t>
-            </a:r>
-          </a:p>
-          <a:p>
-            <a:r>
-              <a:rPr lang="en-US" dirty="0"/>
-              <a:t>RUN</a:t>
-            </a:r>
-          </a:p>
-          <a:p>
-            <a:r>
-              <a:rPr lang="en-US" dirty="0"/>
-              <a:t>WORKDIR</a:t>
-            </a:r>
-          </a:p>
-          <a:p>
-            <a:r>
-              <a:rPr lang="en-US" dirty="0"/>
-              <a:t>COPY</a:t>
-            </a:r>
-          </a:p>
-          <a:p>
-            <a:r>
-              <a:rPr lang="en-US" dirty="0"/>
-              <a:t>LABEL</a:t>
-            </a:r>
-          </a:p>
-          <a:p>
-            <a:r>
-              <a:rPr lang="en-US" dirty="0"/>
-              <a:t>CMD</a:t>
+              <a:t>Layers</a:t>
             </a:r>
           </a:p>
         </p:txBody>
@@ -6910,7 +6916,7 @@
           <p:cNvPr id="4" name="Date Placeholder 3">
             <a:extLst>
               <a:ext uri="{FF2B5EF4-FFF2-40B4-BE49-F238E27FC236}">
-                <a16:creationId xmlns:a16="http://schemas.microsoft.com/office/drawing/2014/main" id="{39846D18-0182-8944-9632-5EC9FBE06918}"/>
+                <a16:creationId xmlns:a16="http://schemas.microsoft.com/office/drawing/2014/main" id="{4F1B3995-BF30-9944-85E9-292F234D5C32}"/>
               </a:ext>
             </a:extLst>
           </p:cNvPr>
@@ -6939,7 +6945,7 @@
           <p:cNvPr id="5" name="Slide Number Placeholder 4">
             <a:extLst>
               <a:ext uri="{FF2B5EF4-FFF2-40B4-BE49-F238E27FC236}">
-                <a16:creationId xmlns:a16="http://schemas.microsoft.com/office/drawing/2014/main" id="{9D302B0E-8A9B-A64D-BBA5-16F36A28D4D2}"/>
+                <a16:creationId xmlns:a16="http://schemas.microsoft.com/office/drawing/2014/main" id="{72FDF096-946D-D740-8B15-C2984C73CB55}"/>
               </a:ext>
             </a:extLst>
           </p:cNvPr>
@@ -6967,7 +6973,7 @@
     </p:spTree>
     <p:extLst>
       <p:ext uri="{BB962C8B-B14F-4D97-AF65-F5344CB8AC3E}">
-        <p14:creationId xmlns:p14="http://schemas.microsoft.com/office/powerpoint/2010/main" val="2181295849"/>
+        <p14:creationId xmlns:p14="http://schemas.microsoft.com/office/powerpoint/2010/main" val="2543508427"/>
       </p:ext>
     </p:extLst>
   </p:cSld>
@@ -7011,7 +7017,7 @@
           <p:cNvPr id="2" name="Title 1">
             <a:extLst>
               <a:ext uri="{FF2B5EF4-FFF2-40B4-BE49-F238E27FC236}">
-                <a16:creationId xmlns:a16="http://schemas.microsoft.com/office/drawing/2014/main" id="{94E0E83A-4B2A-E544-BF79-EC8A6F911A9E}"/>
+                <a16:creationId xmlns:a16="http://schemas.microsoft.com/office/drawing/2014/main" id="{50D24551-8433-1648-A045-8FBF82633296}"/>
               </a:ext>
             </a:extLst>
           </p:cNvPr>
@@ -7029,8 +7035,13 @@
           <a:p>
             <a:r>
               <a:rPr lang="en-US" dirty="0"/>
-              <a:t>Build Docker Images</a:t>
-            </a:r>
+              <a:t>The </a:t>
+            </a:r>
+            <a:r>
+              <a:rPr lang="en-US" dirty="0" err="1"/>
+              <a:t>Dockerfile</a:t>
+            </a:r>
+            <a:endParaRPr lang="en-US" dirty="0"/>
           </a:p>
         </p:txBody>
       </p:sp>
@@ -7039,7 +7050,7 @@
           <p:cNvPr id="3" name="Content Placeholder 2">
             <a:extLst>
               <a:ext uri="{FF2B5EF4-FFF2-40B4-BE49-F238E27FC236}">
-                <a16:creationId xmlns:a16="http://schemas.microsoft.com/office/drawing/2014/main" id="{34D58626-62C7-114E-81E1-0A0A21659024}"/>
+                <a16:creationId xmlns:a16="http://schemas.microsoft.com/office/drawing/2014/main" id="{2E80DB0F-50E2-A74A-8E43-27BCD108C388}"/>
               </a:ext>
             </a:extLst>
           </p:cNvPr>
@@ -7057,33 +7068,37 @@
           <a:p>
             <a:r>
               <a:rPr lang="en-US" dirty="0"/>
-              <a:t>docker image build -t </a:t>
-            </a:r>
-            <a:r>
-              <a:rPr lang="en-US" dirty="0" err="1"/>
-              <a:t>nnn</a:t>
-            </a:r>
+              <a:t>FROM</a:t>
+            </a:r>
+          </a:p>
+          <a:p>
             <a:r>
               <a:rPr lang="en-US" dirty="0"/>
-              <a:t> .</a:t>
+              <a:t>RUN</a:t>
             </a:r>
           </a:p>
           <a:p>
             <a:r>
               <a:rPr lang="en-US" dirty="0"/>
-              <a:t>docker image ls</a:t>
+              <a:t>WORKDIR</a:t>
             </a:r>
           </a:p>
           <a:p>
             <a:r>
               <a:rPr lang="en-US" dirty="0"/>
-              <a:t>docker image push</a:t>
+              <a:t>COPY</a:t>
             </a:r>
           </a:p>
           <a:p>
             <a:r>
               <a:rPr lang="en-US" dirty="0"/>
-              <a:t>docker image rm</a:t>
+              <a:t>LABEL</a:t>
+            </a:r>
+          </a:p>
+          <a:p>
+            <a:r>
+              <a:rPr lang="en-US" dirty="0"/>
+              <a:t>CMD</a:t>
             </a:r>
           </a:p>
         </p:txBody>
@@ -7093,7 +7108,7 @@
           <p:cNvPr id="4" name="Date Placeholder 3">
             <a:extLst>
               <a:ext uri="{FF2B5EF4-FFF2-40B4-BE49-F238E27FC236}">
-                <a16:creationId xmlns:a16="http://schemas.microsoft.com/office/drawing/2014/main" id="{CC4ADDAD-DA87-B242-A2FD-55D58FC589CB}"/>
+                <a16:creationId xmlns:a16="http://schemas.microsoft.com/office/drawing/2014/main" id="{39846D18-0182-8944-9632-5EC9FBE06918}"/>
               </a:ext>
             </a:extLst>
           </p:cNvPr>
@@ -7122,7 +7137,7 @@
           <p:cNvPr id="5" name="Slide Number Placeholder 4">
             <a:extLst>
               <a:ext uri="{FF2B5EF4-FFF2-40B4-BE49-F238E27FC236}">
-                <a16:creationId xmlns:a16="http://schemas.microsoft.com/office/drawing/2014/main" id="{A1DDA22E-7443-8A4B-9114-623E0D047796}"/>
+                <a16:creationId xmlns:a16="http://schemas.microsoft.com/office/drawing/2014/main" id="{9D302B0E-8A9B-A64D-BBA5-16F36A28D4D2}"/>
               </a:ext>
             </a:extLst>
           </p:cNvPr>
@@ -7150,7 +7165,7 @@
     </p:spTree>
     <p:extLst>
       <p:ext uri="{BB962C8B-B14F-4D97-AF65-F5344CB8AC3E}">
-        <p14:creationId xmlns:p14="http://schemas.microsoft.com/office/powerpoint/2010/main" val="3565611311"/>
+        <p14:creationId xmlns:p14="http://schemas.microsoft.com/office/powerpoint/2010/main" val="2181295849"/>
       </p:ext>
     </p:extLst>
   </p:cSld>
@@ -7194,7 +7209,7 @@
           <p:cNvPr id="2" name="Title 1">
             <a:extLst>
               <a:ext uri="{FF2B5EF4-FFF2-40B4-BE49-F238E27FC236}">
-                <a16:creationId xmlns:a16="http://schemas.microsoft.com/office/drawing/2014/main" id="{0DB06B14-C727-D448-B006-9B16C89B8923}"/>
+                <a16:creationId xmlns:a16="http://schemas.microsoft.com/office/drawing/2014/main" id="{94E0E83A-4B2A-E544-BF79-EC8A6F911A9E}"/>
               </a:ext>
             </a:extLst>
           </p:cNvPr>
@@ -7212,7 +7227,7 @@
           <a:p>
             <a:r>
               <a:rPr lang="en-US" dirty="0"/>
-              <a:t>Create Docker Containers</a:t>
+              <a:t>Build Docker Images</a:t>
             </a:r>
           </a:p>
         </p:txBody>
@@ -7222,7 +7237,7 @@
           <p:cNvPr id="3" name="Content Placeholder 2">
             <a:extLst>
               <a:ext uri="{FF2B5EF4-FFF2-40B4-BE49-F238E27FC236}">
-                <a16:creationId xmlns:a16="http://schemas.microsoft.com/office/drawing/2014/main" id="{D5FFDFF9-EB2F-BD49-B79C-EB08AF5D9C92}"/>
+                <a16:creationId xmlns:a16="http://schemas.microsoft.com/office/drawing/2014/main" id="{34D58626-62C7-114E-81E1-0A0A21659024}"/>
               </a:ext>
             </a:extLst>
           </p:cNvPr>
@@ -7235,170 +7250,38 @@
         </p:nvSpPr>
         <p:spPr/>
         <p:txBody>
-          <a:bodyPr>
-            <a:normAutofit fontScale="92500" lnSpcReduction="20000"/>
-          </a:bodyPr>
+          <a:bodyPr/>
           <a:lstStyle/>
           <a:p>
             <a:r>
               <a:rPr lang="en-US" dirty="0"/>
-              <a:t>docker container ls [-a]</a:t>
-            </a:r>
-          </a:p>
-          <a:p>
+              <a:t>docker image build -t </a:t>
+            </a:r>
+            <a:r>
+              <a:rPr lang="en-US" dirty="0" err="1"/>
+              <a:t>nnn</a:t>
+            </a:r>
             <a:r>
               <a:rPr lang="en-US" dirty="0"/>
-              <a:t>docker container run</a:t>
-            </a:r>
-          </a:p>
-          <a:p>
-            <a:pPr lvl="1"/>
+              <a:t> .</a:t>
+            </a:r>
+          </a:p>
+          <a:p>
             <a:r>
               <a:rPr lang="en-US" dirty="0"/>
-              <a:t>Flags</a:t>
-            </a:r>
-          </a:p>
-          <a:p>
-            <a:pPr lvl="2"/>
-            <a:r>
-              <a:rPr lang="en-US" dirty="0" err="1"/>
-              <a:t>i</a:t>
-            </a:r>
-            <a:endParaRPr lang="en-US" dirty="0"/>
-          </a:p>
-          <a:p>
-            <a:pPr lvl="2"/>
+              <a:t>docker image ls</a:t>
+            </a:r>
+          </a:p>
+          <a:p>
             <a:r>
               <a:rPr lang="en-US" dirty="0"/>
-              <a:t>t</a:t>
-            </a:r>
-          </a:p>
-          <a:p>
-            <a:pPr lvl="2"/>
+              <a:t>docker image push</a:t>
+            </a:r>
+          </a:p>
+          <a:p>
             <a:r>
               <a:rPr lang="en-US" dirty="0"/>
-              <a:t>d</a:t>
-            </a:r>
-          </a:p>
-          <a:p>
-            <a:pPr lvl="2"/>
-            <a:r>
-              <a:rPr lang="en-US" dirty="0"/>
-              <a:t>--name</a:t>
-            </a:r>
-          </a:p>
-          <a:p>
-            <a:pPr lvl="2"/>
-            <a:r>
-              <a:rPr lang="en-US" dirty="0"/>
-              <a:t>--rm</a:t>
-            </a:r>
-          </a:p>
-          <a:p>
-            <a:pPr lvl="2"/>
-            <a:r>
-              <a:rPr lang="en-US" dirty="0"/>
-              <a:t>Ctrl P + Q</a:t>
-            </a:r>
-          </a:p>
-          <a:p>
-            <a:pPr lvl="2"/>
-            <a:r>
-              <a:rPr lang="en-US" dirty="0"/>
-              <a:t>Ctrl D</a:t>
-            </a:r>
-          </a:p>
-          <a:p>
-            <a:pPr lvl="0"/>
-            <a:r>
-              <a:rPr lang="en-US" dirty="0"/>
-              <a:t>docker container start/stop/attach/rm</a:t>
-            </a:r>
-          </a:p>
-          <a:p>
-            <a:pPr marL="685800" marR="0" lvl="1" indent="-228600" algn="l" defTabSz="914400" rtl="0" eaLnBrk="1" fontAlgn="auto" latinLnBrk="0" hangingPunct="1">
-              <a:lnSpc>
-                <a:spcPct val="90000"/>
-              </a:lnSpc>
-              <a:spcBef>
-                <a:spcPts val="500"/>
-              </a:spcBef>
-              <a:spcAft>
-                <a:spcPts val="0"/>
-              </a:spcAft>
-              <a:buClrTx/>
-              <a:buSzTx/>
-              <a:buFont typeface="Arial" panose="020B0604020202020204" pitchFamily="34" charset="0"/>
-              <a:buChar char="•"/>
-              <a:tabLst/>
-              <a:defRPr/>
-            </a:pPr>
-            <a:r>
-              <a:rPr lang="en-US" sz="2400" kern="1200" dirty="0">
-                <a:solidFill>
-                  <a:schemeClr val="tx1"/>
-                </a:solidFill>
-                <a:effectLst/>
-                <a:latin typeface="+mn-lt"/>
-                <a:ea typeface="+mn-ea"/>
-                <a:cs typeface="+mn-cs"/>
-              </a:rPr>
-              <a:t>docker container</a:t>
-            </a:r>
-            <a:r>
-              <a:rPr lang="en-US" sz="2400" kern="1200" baseline="0" dirty="0">
-                <a:solidFill>
-                  <a:schemeClr val="tx1"/>
-                </a:solidFill>
-                <a:effectLst/>
-                <a:latin typeface="+mn-lt"/>
-                <a:ea typeface="+mn-ea"/>
-                <a:cs typeface="+mn-cs"/>
-              </a:rPr>
-              <a:t> stop container1 container2 container3</a:t>
-            </a:r>
-          </a:p>
-          <a:p>
-            <a:pPr marL="685800" marR="0" lvl="1" indent="-228600" algn="l" defTabSz="914400" rtl="0" eaLnBrk="1" fontAlgn="auto" latinLnBrk="0" hangingPunct="1">
-              <a:lnSpc>
-                <a:spcPct val="90000"/>
-              </a:lnSpc>
-              <a:spcBef>
-                <a:spcPts val="500"/>
-              </a:spcBef>
-              <a:spcAft>
-                <a:spcPts val="0"/>
-              </a:spcAft>
-              <a:buClrTx/>
-              <a:buSzTx/>
-              <a:buFont typeface="Arial" panose="020B0604020202020204" pitchFamily="34" charset="0"/>
-              <a:buChar char="•"/>
-              <a:tabLst/>
-              <a:defRPr/>
-            </a:pPr>
-            <a:r>
-              <a:rPr lang="en-US" sz="2400" kern="1200" dirty="0">
-                <a:solidFill>
-                  <a:schemeClr val="tx1"/>
-                </a:solidFill>
-                <a:effectLst/>
-                <a:latin typeface="+mn-lt"/>
-                <a:ea typeface="+mn-ea"/>
-                <a:cs typeface="+mn-cs"/>
-              </a:rPr>
-              <a:t>docker container</a:t>
-            </a:r>
-            <a:r>
-              <a:rPr lang="en-US" sz="2400" kern="1200" baseline="0" dirty="0">
-                <a:solidFill>
-                  <a:schemeClr val="tx1"/>
-                </a:solidFill>
-                <a:effectLst/>
-                <a:latin typeface="+mn-lt"/>
-                <a:ea typeface="+mn-ea"/>
-                <a:cs typeface="+mn-cs"/>
-              </a:rPr>
-              <a:t> stop $(docker container ls -a -q)</a:t>
+              <a:t>docker image rm</a:t>
             </a:r>
           </a:p>
         </p:txBody>
@@ -7408,7 +7291,7 @@
           <p:cNvPr id="4" name="Date Placeholder 3">
             <a:extLst>
               <a:ext uri="{FF2B5EF4-FFF2-40B4-BE49-F238E27FC236}">
-                <a16:creationId xmlns:a16="http://schemas.microsoft.com/office/drawing/2014/main" id="{E7AF9DB9-6A2B-8841-A7D0-6CEA791F9D17}"/>
+                <a16:creationId xmlns:a16="http://schemas.microsoft.com/office/drawing/2014/main" id="{CC4ADDAD-DA87-B242-A2FD-55D58FC589CB}"/>
               </a:ext>
             </a:extLst>
           </p:cNvPr>
@@ -7437,7 +7320,7 @@
           <p:cNvPr id="5" name="Slide Number Placeholder 4">
             <a:extLst>
               <a:ext uri="{FF2B5EF4-FFF2-40B4-BE49-F238E27FC236}">
-                <a16:creationId xmlns:a16="http://schemas.microsoft.com/office/drawing/2014/main" id="{25231814-AD22-424F-8371-36B475FB5D80}"/>
+                <a16:creationId xmlns:a16="http://schemas.microsoft.com/office/drawing/2014/main" id="{A1DDA22E-7443-8A4B-9114-623E0D047796}"/>
               </a:ext>
             </a:extLst>
           </p:cNvPr>
@@ -7465,7 +7348,7 @@
     </p:spTree>
     <p:extLst>
       <p:ext uri="{BB962C8B-B14F-4D97-AF65-F5344CB8AC3E}">
-        <p14:creationId xmlns:p14="http://schemas.microsoft.com/office/powerpoint/2010/main" val="2444915202"/>
+        <p14:creationId xmlns:p14="http://schemas.microsoft.com/office/powerpoint/2010/main" val="3565611311"/>
       </p:ext>
     </p:extLst>
   </p:cSld>
@@ -7509,7 +7392,7 @@
           <p:cNvPr id="2" name="Title 1">
             <a:extLst>
               <a:ext uri="{FF2B5EF4-FFF2-40B4-BE49-F238E27FC236}">
-                <a16:creationId xmlns:a16="http://schemas.microsoft.com/office/drawing/2014/main" id="{D84D405D-FCCC-E449-81AA-F627FC8CD5FE}"/>
+                <a16:creationId xmlns:a16="http://schemas.microsoft.com/office/drawing/2014/main" id="{0DB06B14-C727-D448-B006-9B16C89B8923}"/>
               </a:ext>
             </a:extLst>
           </p:cNvPr>
@@ -7527,13 +7410,8 @@
           <a:p>
             <a:r>
               <a:rPr lang="en-US" dirty="0"/>
-              <a:t>Mount</a:t>
-            </a:r>
-            <a:r>
-              <a:rPr lang="en-US" baseline="0" dirty="0"/>
-              <a:t> Local Volumes to Docker Containers</a:t>
-            </a:r>
-            <a:endParaRPr lang="en-US" dirty="0"/>
+              <a:t>Create Docker Containers</a:t>
+            </a:r>
           </a:p>
         </p:txBody>
       </p:sp>
@@ -7542,7 +7420,7 @@
           <p:cNvPr id="3" name="Content Placeholder 2">
             <a:extLst>
               <a:ext uri="{FF2B5EF4-FFF2-40B4-BE49-F238E27FC236}">
-                <a16:creationId xmlns:a16="http://schemas.microsoft.com/office/drawing/2014/main" id="{2797B28F-2840-2049-A94D-AACB96372593}"/>
+                <a16:creationId xmlns:a16="http://schemas.microsoft.com/office/drawing/2014/main" id="{D5FFDFF9-EB2F-BD49-B79C-EB08AF5D9C92}"/>
               </a:ext>
             </a:extLst>
           </p:cNvPr>
@@ -7555,11 +7433,171 @@
         </p:nvSpPr>
         <p:spPr/>
         <p:txBody>
-          <a:bodyPr/>
+          <a:bodyPr>
+            <a:normAutofit fontScale="92500" lnSpcReduction="20000"/>
+          </a:bodyPr>
           <a:lstStyle/>
           <a:p>
+            <a:r>
+              <a:rPr lang="en-US" dirty="0"/>
+              <a:t>docker container ls [-a]</a:t>
+            </a:r>
+          </a:p>
+          <a:p>
+            <a:r>
+              <a:rPr lang="en-US" dirty="0"/>
+              <a:t>docker container run</a:t>
+            </a:r>
+          </a:p>
+          <a:p>
+            <a:pPr lvl="1"/>
+            <a:r>
+              <a:rPr lang="en-US" dirty="0"/>
+              <a:t>Flags</a:t>
+            </a:r>
+          </a:p>
+          <a:p>
             <a:pPr lvl="2"/>
-            <a:endParaRPr lang="en-US"/>
+            <a:r>
+              <a:rPr lang="en-US" dirty="0" err="1"/>
+              <a:t>i</a:t>
+            </a:r>
+            <a:endParaRPr lang="en-US" dirty="0"/>
+          </a:p>
+          <a:p>
+            <a:pPr lvl="2"/>
+            <a:r>
+              <a:rPr lang="en-US" dirty="0"/>
+              <a:t>t</a:t>
+            </a:r>
+          </a:p>
+          <a:p>
+            <a:pPr lvl="2"/>
+            <a:r>
+              <a:rPr lang="en-US" dirty="0"/>
+              <a:t>d</a:t>
+            </a:r>
+          </a:p>
+          <a:p>
+            <a:pPr lvl="2"/>
+            <a:r>
+              <a:rPr lang="en-US" dirty="0"/>
+              <a:t>--name</a:t>
+            </a:r>
+          </a:p>
+          <a:p>
+            <a:pPr lvl="2"/>
+            <a:r>
+              <a:rPr lang="en-US" dirty="0"/>
+              <a:t>--rm</a:t>
+            </a:r>
+          </a:p>
+          <a:p>
+            <a:pPr lvl="2"/>
+            <a:r>
+              <a:rPr lang="en-US" dirty="0"/>
+              <a:t>Ctrl P + Q</a:t>
+            </a:r>
+          </a:p>
+          <a:p>
+            <a:pPr lvl="2"/>
+            <a:r>
+              <a:rPr lang="en-US" dirty="0"/>
+              <a:t>Ctrl D</a:t>
+            </a:r>
+          </a:p>
+          <a:p>
+            <a:pPr lvl="0"/>
+            <a:r>
+              <a:rPr lang="en-US" dirty="0"/>
+              <a:t>docker container start/stop/attach/rm</a:t>
+            </a:r>
+          </a:p>
+          <a:p>
+            <a:pPr marL="685800" marR="0" lvl="1" indent="-228600" algn="l" defTabSz="914400" rtl="0" eaLnBrk="1" fontAlgn="auto" latinLnBrk="0" hangingPunct="1">
+              <a:lnSpc>
+                <a:spcPct val="90000"/>
+              </a:lnSpc>
+              <a:spcBef>
+                <a:spcPts val="500"/>
+              </a:spcBef>
+              <a:spcAft>
+                <a:spcPts val="0"/>
+              </a:spcAft>
+              <a:buClrTx/>
+              <a:buSzTx/>
+              <a:buFont typeface="Arial" panose="020B0604020202020204" pitchFamily="34" charset="0"/>
+              <a:buChar char="•"/>
+              <a:tabLst/>
+              <a:defRPr/>
+            </a:pPr>
+            <a:r>
+              <a:rPr lang="en-US" sz="2400" kern="1200" dirty="0">
+                <a:solidFill>
+                  <a:schemeClr val="tx1"/>
+                </a:solidFill>
+                <a:effectLst/>
+                <a:latin typeface="+mn-lt"/>
+                <a:ea typeface="+mn-ea"/>
+                <a:cs typeface="+mn-cs"/>
+              </a:rPr>
+              <a:t>docker container</a:t>
+            </a:r>
+            <a:r>
+              <a:rPr lang="en-US" sz="2400" kern="1200" baseline="0" dirty="0">
+                <a:solidFill>
+                  <a:schemeClr val="tx1"/>
+                </a:solidFill>
+                <a:effectLst/>
+                <a:latin typeface="+mn-lt"/>
+                <a:ea typeface="+mn-ea"/>
+                <a:cs typeface="+mn-cs"/>
+              </a:rPr>
+              <a:t> stop container1 container2 container3</a:t>
+            </a:r>
+          </a:p>
+          <a:p>
+            <a:pPr marL="685800" marR="0" lvl="1" indent="-228600" algn="l" defTabSz="914400" rtl="0" eaLnBrk="1" fontAlgn="auto" latinLnBrk="0" hangingPunct="1">
+              <a:lnSpc>
+                <a:spcPct val="90000"/>
+              </a:lnSpc>
+              <a:spcBef>
+                <a:spcPts val="500"/>
+              </a:spcBef>
+              <a:spcAft>
+                <a:spcPts val="0"/>
+              </a:spcAft>
+              <a:buClrTx/>
+              <a:buSzTx/>
+              <a:buFont typeface="Arial" panose="020B0604020202020204" pitchFamily="34" charset="0"/>
+              <a:buChar char="•"/>
+              <a:tabLst/>
+              <a:defRPr/>
+            </a:pPr>
+            <a:r>
+              <a:rPr lang="en-US" sz="2400" kern="1200" dirty="0">
+                <a:solidFill>
+                  <a:schemeClr val="tx1"/>
+                </a:solidFill>
+                <a:effectLst/>
+                <a:latin typeface="+mn-lt"/>
+                <a:ea typeface="+mn-ea"/>
+                <a:cs typeface="+mn-cs"/>
+              </a:rPr>
+              <a:t>docker container</a:t>
+            </a:r>
+            <a:r>
+              <a:rPr lang="en-US" sz="2400" kern="1200" baseline="0" dirty="0">
+                <a:solidFill>
+                  <a:schemeClr val="tx1"/>
+                </a:solidFill>
+                <a:effectLst/>
+                <a:latin typeface="+mn-lt"/>
+                <a:ea typeface="+mn-ea"/>
+                <a:cs typeface="+mn-cs"/>
+              </a:rPr>
+              <a:t> stop $(docker container ls -a -q)</a:t>
+            </a:r>
           </a:p>
         </p:txBody>
       </p:sp>
@@ -7568,7 +7606,7 @@
           <p:cNvPr id="4" name="Date Placeholder 3">
             <a:extLst>
               <a:ext uri="{FF2B5EF4-FFF2-40B4-BE49-F238E27FC236}">
-                <a16:creationId xmlns:a16="http://schemas.microsoft.com/office/drawing/2014/main" id="{5840314C-3351-514D-A9AA-DF0F5D7C2BAD}"/>
+                <a16:creationId xmlns:a16="http://schemas.microsoft.com/office/drawing/2014/main" id="{E7AF9DB9-6A2B-8841-A7D0-6CEA791F9D17}"/>
               </a:ext>
             </a:extLst>
           </p:cNvPr>
@@ -7597,7 +7635,7 @@
           <p:cNvPr id="5" name="Slide Number Placeholder 4">
             <a:extLst>
               <a:ext uri="{FF2B5EF4-FFF2-40B4-BE49-F238E27FC236}">
-                <a16:creationId xmlns:a16="http://schemas.microsoft.com/office/drawing/2014/main" id="{9E247962-C086-7B42-9DBE-A2FF934C2CBD}"/>
+                <a16:creationId xmlns:a16="http://schemas.microsoft.com/office/drawing/2014/main" id="{25231814-AD22-424F-8371-36B475FB5D80}"/>
               </a:ext>
             </a:extLst>
           </p:cNvPr>
@@ -7625,7 +7663,7 @@
     </p:spTree>
     <p:extLst>
       <p:ext uri="{BB962C8B-B14F-4D97-AF65-F5344CB8AC3E}">
-        <p14:creationId xmlns:p14="http://schemas.microsoft.com/office/powerpoint/2010/main" val="109380659"/>
+        <p14:creationId xmlns:p14="http://schemas.microsoft.com/office/powerpoint/2010/main" val="2444915202"/>
       </p:ext>
     </p:extLst>
   </p:cSld>
@@ -7669,6 +7707,844 @@
           <p:cNvPr id="2" name="Title 1">
             <a:extLst>
               <a:ext uri="{FF2B5EF4-FFF2-40B4-BE49-F238E27FC236}">
+                <a16:creationId xmlns:a16="http://schemas.microsoft.com/office/drawing/2014/main" id="{D84D405D-FCCC-E449-81AA-F627FC8CD5FE}"/>
+              </a:ext>
+            </a:extLst>
+          </p:cNvPr>
+          <p:cNvSpPr>
+            <a:spLocks noGrp="1"/>
+          </p:cNvSpPr>
+          <p:nvPr>
+            <p:ph type="title"/>
+          </p:nvPr>
+        </p:nvSpPr>
+        <p:spPr/>
+        <p:txBody>
+          <a:bodyPr/>
+          <a:lstStyle/>
+          <a:p>
+            <a:r>
+              <a:rPr lang="en-US" dirty="0"/>
+              <a:t>Mount</a:t>
+            </a:r>
+            <a:r>
+              <a:rPr lang="en-US" baseline="0" dirty="0"/>
+              <a:t> Local Volumes to Docker Containers</a:t>
+            </a:r>
+            <a:endParaRPr lang="en-US" dirty="0"/>
+          </a:p>
+        </p:txBody>
+      </p:sp>
+      <p:sp>
+        <p:nvSpPr>
+          <p:cNvPr id="3" name="Content Placeholder 2">
+            <a:extLst>
+              <a:ext uri="{FF2B5EF4-FFF2-40B4-BE49-F238E27FC236}">
+                <a16:creationId xmlns:a16="http://schemas.microsoft.com/office/drawing/2014/main" id="{2797B28F-2840-2049-A94D-AACB96372593}"/>
+              </a:ext>
+            </a:extLst>
+          </p:cNvPr>
+          <p:cNvSpPr>
+            <a:spLocks noGrp="1"/>
+          </p:cNvSpPr>
+          <p:nvPr>
+            <p:ph idx="1"/>
+          </p:nvPr>
+        </p:nvSpPr>
+        <p:spPr/>
+        <p:txBody>
+          <a:bodyPr/>
+          <a:lstStyle/>
+          <a:p>
+            <a:pPr lvl="2"/>
+            <a:endParaRPr lang="en-US"/>
+          </a:p>
+        </p:txBody>
+      </p:sp>
+      <p:sp>
+        <p:nvSpPr>
+          <p:cNvPr id="4" name="Date Placeholder 3">
+            <a:extLst>
+              <a:ext uri="{FF2B5EF4-FFF2-40B4-BE49-F238E27FC236}">
+                <a16:creationId xmlns:a16="http://schemas.microsoft.com/office/drawing/2014/main" id="{5840314C-3351-514D-A9AA-DF0F5D7C2BAD}"/>
+              </a:ext>
+            </a:extLst>
+          </p:cNvPr>
+          <p:cNvSpPr>
+            <a:spLocks noGrp="1"/>
+          </p:cNvSpPr>
+          <p:nvPr>
+            <p:ph type="dt" sz="half" idx="10"/>
+          </p:nvPr>
+        </p:nvSpPr>
+        <p:spPr/>
+        <p:txBody>
+          <a:bodyPr/>
+          <a:lstStyle/>
+          <a:p>
+            <a:r>
+              <a:rPr lang="en-US"/>
+              <a:t>World Wide Technology ©</a:t>
+            </a:r>
+            <a:endParaRPr lang="en-US" dirty="0"/>
+          </a:p>
+        </p:txBody>
+      </p:sp>
+      <p:sp>
+        <p:nvSpPr>
+          <p:cNvPr id="5" name="Slide Number Placeholder 4">
+            <a:extLst>
+              <a:ext uri="{FF2B5EF4-FFF2-40B4-BE49-F238E27FC236}">
+                <a16:creationId xmlns:a16="http://schemas.microsoft.com/office/drawing/2014/main" id="{9E247962-C086-7B42-9DBE-A2FF934C2CBD}"/>
+              </a:ext>
+            </a:extLst>
+          </p:cNvPr>
+          <p:cNvSpPr>
+            <a:spLocks noGrp="1"/>
+          </p:cNvSpPr>
+          <p:nvPr>
+            <p:ph type="sldNum" sz="quarter" idx="12"/>
+          </p:nvPr>
+        </p:nvSpPr>
+        <p:spPr/>
+        <p:txBody>
+          <a:bodyPr/>
+          <a:lstStyle/>
+          <a:p>
+            <a:fld id="{A44B02FA-DD2D-1844-AE35-8B2EAB0CF4EF}" type="slidenum">
+              <a:rPr lang="en-US" smtClean="0"/>
+              <a:pPr/>
+              <a:t>19</a:t>
+            </a:fld>
+            <a:endParaRPr lang="en-US" dirty="0"/>
+          </a:p>
+        </p:txBody>
+      </p:sp>
+    </p:spTree>
+    <p:extLst>
+      <p:ext uri="{BB962C8B-B14F-4D97-AF65-F5344CB8AC3E}">
+        <p14:creationId xmlns:p14="http://schemas.microsoft.com/office/powerpoint/2010/main" val="109380659"/>
+      </p:ext>
+    </p:extLst>
+  </p:cSld>
+  <p:clrMapOvr>
+    <a:masterClrMapping/>
+  </p:clrMapOvr>
+  <mc:AlternateContent xmlns:mc="http://schemas.openxmlformats.org/markup-compatibility/2006" xmlns:p14="http://schemas.microsoft.com/office/powerpoint/2010/main">
+    <mc:Choice Requires="p14">
+      <p:transition spd="med" p14:dur="700">
+        <p:fade/>
+      </p:transition>
+    </mc:Choice>
+    <mc:Fallback xmlns="">
+      <p:transition spd="med">
+        <p:fade/>
+      </p:transition>
+    </mc:Fallback>
+  </mc:AlternateContent>
+</p:sld>
+</file>
+
+<file path=ppt/slides/slide2.xml><?xml version="1.0" encoding="utf-8"?>
+<p:sld xmlns:a="http://schemas.openxmlformats.org/drawingml/2006/main" xmlns:r="http://schemas.openxmlformats.org/officeDocument/2006/relationships" xmlns:p="http://schemas.openxmlformats.org/presentationml/2006/main">
+  <p:cSld>
+    <p:spTree>
+      <p:nvGrpSpPr>
+        <p:cNvPr id="1" name=""/>
+        <p:cNvGrpSpPr/>
+        <p:nvPr/>
+      </p:nvGrpSpPr>
+      <p:grpSpPr>
+        <a:xfrm>
+          <a:off x="0" y="0"/>
+          <a:ext cx="0" cy="0"/>
+          <a:chOff x="0" y="0"/>
+          <a:chExt cx="0" cy="0"/>
+        </a:xfrm>
+      </p:grpSpPr>
+      <p:sp>
+        <p:nvSpPr>
+          <p:cNvPr id="2" name="Title 1">
+            <a:extLst>
+              <a:ext uri="{FF2B5EF4-FFF2-40B4-BE49-F238E27FC236}">
+                <a16:creationId xmlns:a16="http://schemas.microsoft.com/office/drawing/2014/main" id="{6CE16E0C-D068-ED4D-B752-805C58895FD2}"/>
+              </a:ext>
+            </a:extLst>
+          </p:cNvPr>
+          <p:cNvSpPr>
+            <a:spLocks noGrp="1"/>
+          </p:cNvSpPr>
+          <p:nvPr>
+            <p:ph type="title"/>
+          </p:nvPr>
+        </p:nvSpPr>
+        <p:spPr/>
+        <p:txBody>
+          <a:bodyPr/>
+          <a:lstStyle/>
+          <a:p>
+            <a:r>
+              <a:rPr lang="en-US" dirty="0"/>
+              <a:t>If you want hands-on practice…</a:t>
+            </a:r>
+          </a:p>
+        </p:txBody>
+      </p:sp>
+      <p:sp>
+        <p:nvSpPr>
+          <p:cNvPr id="3" name="Content Placeholder 2">
+            <a:extLst>
+              <a:ext uri="{FF2B5EF4-FFF2-40B4-BE49-F238E27FC236}">
+                <a16:creationId xmlns:a16="http://schemas.microsoft.com/office/drawing/2014/main" id="{779388B1-3A7F-E043-AF74-EC6E9DE415BD}"/>
+              </a:ext>
+            </a:extLst>
+          </p:cNvPr>
+          <p:cNvSpPr>
+            <a:spLocks noGrp="1"/>
+          </p:cNvSpPr>
+          <p:nvPr>
+            <p:ph idx="1"/>
+          </p:nvPr>
+        </p:nvSpPr>
+        <p:spPr/>
+        <p:txBody>
+          <a:bodyPr/>
+          <a:lstStyle/>
+          <a:p>
+            <a:r>
+              <a:rPr lang="en-US" dirty="0"/>
+              <a:t>Install Docker Desktop</a:t>
+            </a:r>
+          </a:p>
+          <a:p>
+            <a:pPr lvl="1"/>
+            <a:r>
+              <a:rPr lang="en-US" dirty="0">
+                <a:hlinkClick r:id="rId2"/>
+              </a:rPr>
+              <a:t>https://www.docker.com/products/docker-desktop</a:t>
+            </a:r>
+            <a:endParaRPr lang="en-US" dirty="0"/>
+          </a:p>
+          <a:p>
+            <a:r>
+              <a:rPr lang="en-US" dirty="0"/>
+              <a:t>Connect to the ATC VPN</a:t>
+            </a:r>
+          </a:p>
+          <a:p>
+            <a:pPr lvl="1"/>
+            <a:r>
+              <a:rPr lang="en-US" dirty="0">
+                <a:hlinkClick r:id="rId3"/>
+              </a:rPr>
+              <a:t>https://atc-support.apps.wwtatc.com/vpn_access</a:t>
+            </a:r>
+            <a:endParaRPr lang="en-US" dirty="0"/>
+          </a:p>
+          <a:p>
+            <a:r>
+              <a:rPr lang="en-US" dirty="0"/>
+              <a:t>Download this presentation from WWT’s GitHub</a:t>
+            </a:r>
+          </a:p>
+          <a:p>
+            <a:pPr lvl="1"/>
+            <a:r>
+              <a:rPr lang="en-US" dirty="0">
+                <a:hlinkClick r:id="rId4"/>
+              </a:rPr>
+              <a:t>https://github.wwt.com/hullt/docker-foundations</a:t>
+            </a:r>
+            <a:endParaRPr lang="en-US" dirty="0"/>
+          </a:p>
+          <a:p>
+            <a:r>
+              <a:rPr lang="en-US" dirty="0"/>
+              <a:t>Install a code editor</a:t>
+            </a:r>
+          </a:p>
+          <a:p>
+            <a:pPr lvl="1"/>
+            <a:r>
+              <a:rPr lang="en-US" dirty="0">
+                <a:hlinkClick r:id="rId5"/>
+              </a:rPr>
+              <a:t>https://code.visualstudio.com/Download</a:t>
+            </a:r>
+            <a:endParaRPr lang="en-US" dirty="0"/>
+          </a:p>
+          <a:p>
+            <a:r>
+              <a:rPr lang="en-US" dirty="0"/>
+              <a:t>Wait a few minutes while we get through a Docker overview</a:t>
+            </a:r>
+          </a:p>
+          <a:p>
+            <a:pPr lvl="1"/>
+            <a:endParaRPr lang="en-US" dirty="0"/>
+          </a:p>
+        </p:txBody>
+      </p:sp>
+      <p:sp>
+        <p:nvSpPr>
+          <p:cNvPr id="4" name="Date Placeholder 3">
+            <a:extLst>
+              <a:ext uri="{FF2B5EF4-FFF2-40B4-BE49-F238E27FC236}">
+                <a16:creationId xmlns:a16="http://schemas.microsoft.com/office/drawing/2014/main" id="{D30A9DD6-B80A-4740-AB4C-12C4FA701C0E}"/>
+              </a:ext>
+            </a:extLst>
+          </p:cNvPr>
+          <p:cNvSpPr>
+            <a:spLocks noGrp="1"/>
+          </p:cNvSpPr>
+          <p:nvPr>
+            <p:ph type="dt" sz="half" idx="10"/>
+          </p:nvPr>
+        </p:nvSpPr>
+        <p:spPr/>
+        <p:txBody>
+          <a:bodyPr/>
+          <a:lstStyle/>
+          <a:p>
+            <a:r>
+              <a:rPr lang="en-US"/>
+              <a:t>World Wide Technology ©</a:t>
+            </a:r>
+            <a:endParaRPr lang="en-US" dirty="0"/>
+          </a:p>
+        </p:txBody>
+      </p:sp>
+      <p:sp>
+        <p:nvSpPr>
+          <p:cNvPr id="5" name="Slide Number Placeholder 4">
+            <a:extLst>
+              <a:ext uri="{FF2B5EF4-FFF2-40B4-BE49-F238E27FC236}">
+                <a16:creationId xmlns:a16="http://schemas.microsoft.com/office/drawing/2014/main" id="{AC52D06F-E711-DC4F-93B7-4B4954638CA4}"/>
+              </a:ext>
+            </a:extLst>
+          </p:cNvPr>
+          <p:cNvSpPr>
+            <a:spLocks noGrp="1"/>
+          </p:cNvSpPr>
+          <p:nvPr>
+            <p:ph type="sldNum" sz="quarter" idx="12"/>
+          </p:nvPr>
+        </p:nvSpPr>
+        <p:spPr/>
+        <p:txBody>
+          <a:bodyPr/>
+          <a:lstStyle/>
+          <a:p>
+            <a:fld id="{A44B02FA-DD2D-1844-AE35-8B2EAB0CF4EF}" type="slidenum">
+              <a:rPr lang="en-US" smtClean="0"/>
+              <a:pPr/>
+              <a:t>2</a:t>
+            </a:fld>
+            <a:endParaRPr lang="en-US" dirty="0"/>
+          </a:p>
+        </p:txBody>
+      </p:sp>
+    </p:spTree>
+    <p:extLst>
+      <p:ext uri="{BB962C8B-B14F-4D97-AF65-F5344CB8AC3E}">
+        <p14:creationId xmlns:p14="http://schemas.microsoft.com/office/powerpoint/2010/main" val="930070517"/>
+      </p:ext>
+    </p:extLst>
+  </p:cSld>
+  <p:clrMapOvr>
+    <a:masterClrMapping/>
+  </p:clrMapOvr>
+  <mc:AlternateContent xmlns:mc="http://schemas.openxmlformats.org/markup-compatibility/2006" xmlns:p14="http://schemas.microsoft.com/office/powerpoint/2010/main">
+    <mc:Choice Requires="p14">
+      <p:transition spd="med" p14:dur="700">
+        <p:fade/>
+      </p:transition>
+    </mc:Choice>
+    <mc:Fallback xmlns="">
+      <p:transition spd="med">
+        <p:fade/>
+      </p:transition>
+    </mc:Fallback>
+  </mc:AlternateContent>
+  <p:timing>
+    <p:tnLst>
+      <p:par>
+        <p:cTn id="1" dur="indefinite" restart="never" nodeType="tmRoot">
+          <p:childTnLst>
+            <p:seq concurrent="1" nextAc="seek">
+              <p:cTn id="2" dur="indefinite" nodeType="mainSeq">
+                <p:childTnLst>
+                  <p:par>
+                    <p:cTn id="3" fill="hold">
+                      <p:stCondLst>
+                        <p:cond delay="indefinite"/>
+                      </p:stCondLst>
+                      <p:childTnLst>
+                        <p:par>
+                          <p:cTn id="4" fill="hold">
+                            <p:stCondLst>
+                              <p:cond delay="0"/>
+                            </p:stCondLst>
+                            <p:childTnLst>
+                              <p:par>
+                                <p:cTn id="5" presetID="9" presetClass="entr" presetSubtype="0" fill="hold" nodeType="clickEffect">
+                                  <p:stCondLst>
+                                    <p:cond delay="0"/>
+                                  </p:stCondLst>
+                                  <p:childTnLst>
+                                    <p:set>
+                                      <p:cBhvr>
+                                        <p:cTn id="6" dur="1" fill="hold">
+                                          <p:stCondLst>
+                                            <p:cond delay="0"/>
+                                          </p:stCondLst>
+                                        </p:cTn>
+                                        <p:tgtEl>
+                                          <p:spTgt spid="3">
+                                            <p:txEl>
+                                              <p:pRg st="0" end="0"/>
+                                            </p:txEl>
+                                          </p:spTgt>
+                                        </p:tgtEl>
+                                        <p:attrNameLst>
+                                          <p:attrName>style.visibility</p:attrName>
+                                        </p:attrNameLst>
+                                      </p:cBhvr>
+                                      <p:to>
+                                        <p:strVal val="visible"/>
+                                      </p:to>
+                                    </p:set>
+                                    <p:animEffect transition="in" filter="dissolve">
+                                      <p:cBhvr>
+                                        <p:cTn id="7" dur="500"/>
+                                        <p:tgtEl>
+                                          <p:spTgt spid="3">
+                                            <p:txEl>
+                                              <p:pRg st="0" end="0"/>
+                                            </p:txEl>
+                                          </p:spTgt>
+                                        </p:tgtEl>
+                                      </p:cBhvr>
+                                    </p:animEffect>
+                                  </p:childTnLst>
+                                </p:cTn>
+                              </p:par>
+                              <p:par>
+                                <p:cTn id="8" presetID="9" presetClass="entr" presetSubtype="0" fill="hold" nodeType="withEffect">
+                                  <p:stCondLst>
+                                    <p:cond delay="0"/>
+                                  </p:stCondLst>
+                                  <p:childTnLst>
+                                    <p:set>
+                                      <p:cBhvr>
+                                        <p:cTn id="9" dur="1" fill="hold">
+                                          <p:stCondLst>
+                                            <p:cond delay="0"/>
+                                          </p:stCondLst>
+                                        </p:cTn>
+                                        <p:tgtEl>
+                                          <p:spTgt spid="3">
+                                            <p:txEl>
+                                              <p:pRg st="1" end="1"/>
+                                            </p:txEl>
+                                          </p:spTgt>
+                                        </p:tgtEl>
+                                        <p:attrNameLst>
+                                          <p:attrName>style.visibility</p:attrName>
+                                        </p:attrNameLst>
+                                      </p:cBhvr>
+                                      <p:to>
+                                        <p:strVal val="visible"/>
+                                      </p:to>
+                                    </p:set>
+                                    <p:animEffect transition="in" filter="dissolve">
+                                      <p:cBhvr>
+                                        <p:cTn id="10" dur="500"/>
+                                        <p:tgtEl>
+                                          <p:spTgt spid="3">
+                                            <p:txEl>
+                                              <p:pRg st="1" end="1"/>
+                                            </p:txEl>
+                                          </p:spTgt>
+                                        </p:tgtEl>
+                                      </p:cBhvr>
+                                    </p:animEffect>
+                                  </p:childTnLst>
+                                </p:cTn>
+                              </p:par>
+                              <p:par>
+                                <p:cTn id="11" presetID="9" presetClass="entr" presetSubtype="0" fill="hold" nodeType="withEffect">
+                                  <p:stCondLst>
+                                    <p:cond delay="0"/>
+                                  </p:stCondLst>
+                                  <p:childTnLst>
+                                    <p:set>
+                                      <p:cBhvr>
+                                        <p:cTn id="12" dur="1" fill="hold">
+                                          <p:stCondLst>
+                                            <p:cond delay="0"/>
+                                          </p:stCondLst>
+                                        </p:cTn>
+                                        <p:tgtEl>
+                                          <p:spTgt spid="3">
+                                            <p:txEl>
+                                              <p:pRg st="2" end="2"/>
+                                            </p:txEl>
+                                          </p:spTgt>
+                                        </p:tgtEl>
+                                        <p:attrNameLst>
+                                          <p:attrName>style.visibility</p:attrName>
+                                        </p:attrNameLst>
+                                      </p:cBhvr>
+                                      <p:to>
+                                        <p:strVal val="visible"/>
+                                      </p:to>
+                                    </p:set>
+                                    <p:animEffect transition="in" filter="dissolve">
+                                      <p:cBhvr>
+                                        <p:cTn id="13" dur="500"/>
+                                        <p:tgtEl>
+                                          <p:spTgt spid="3">
+                                            <p:txEl>
+                                              <p:pRg st="2" end="2"/>
+                                            </p:txEl>
+                                          </p:spTgt>
+                                        </p:tgtEl>
+                                      </p:cBhvr>
+                                    </p:animEffect>
+                                  </p:childTnLst>
+                                </p:cTn>
+                              </p:par>
+                              <p:par>
+                                <p:cTn id="14" presetID="9" presetClass="entr" presetSubtype="0" fill="hold" nodeType="withEffect">
+                                  <p:stCondLst>
+                                    <p:cond delay="0"/>
+                                  </p:stCondLst>
+                                  <p:childTnLst>
+                                    <p:set>
+                                      <p:cBhvr>
+                                        <p:cTn id="15" dur="1" fill="hold">
+                                          <p:stCondLst>
+                                            <p:cond delay="0"/>
+                                          </p:stCondLst>
+                                        </p:cTn>
+                                        <p:tgtEl>
+                                          <p:spTgt spid="3">
+                                            <p:txEl>
+                                              <p:pRg st="3" end="3"/>
+                                            </p:txEl>
+                                          </p:spTgt>
+                                        </p:tgtEl>
+                                        <p:attrNameLst>
+                                          <p:attrName>style.visibility</p:attrName>
+                                        </p:attrNameLst>
+                                      </p:cBhvr>
+                                      <p:to>
+                                        <p:strVal val="visible"/>
+                                      </p:to>
+                                    </p:set>
+                                    <p:animEffect transition="in" filter="dissolve">
+                                      <p:cBhvr>
+                                        <p:cTn id="16" dur="500"/>
+                                        <p:tgtEl>
+                                          <p:spTgt spid="3">
+                                            <p:txEl>
+                                              <p:pRg st="3" end="3"/>
+                                            </p:txEl>
+                                          </p:spTgt>
+                                        </p:tgtEl>
+                                      </p:cBhvr>
+                                    </p:animEffect>
+                                  </p:childTnLst>
+                                </p:cTn>
+                              </p:par>
+                              <p:par>
+                                <p:cTn id="17" presetID="9" presetClass="entr" presetSubtype="0" fill="hold" nodeType="withEffect">
+                                  <p:stCondLst>
+                                    <p:cond delay="0"/>
+                                  </p:stCondLst>
+                                  <p:childTnLst>
+                                    <p:set>
+                                      <p:cBhvr>
+                                        <p:cTn id="18" dur="1" fill="hold">
+                                          <p:stCondLst>
+                                            <p:cond delay="0"/>
+                                          </p:stCondLst>
+                                        </p:cTn>
+                                        <p:tgtEl>
+                                          <p:spTgt spid="3">
+                                            <p:txEl>
+                                              <p:pRg st="4" end="4"/>
+                                            </p:txEl>
+                                          </p:spTgt>
+                                        </p:tgtEl>
+                                        <p:attrNameLst>
+                                          <p:attrName>style.visibility</p:attrName>
+                                        </p:attrNameLst>
+                                      </p:cBhvr>
+                                      <p:to>
+                                        <p:strVal val="visible"/>
+                                      </p:to>
+                                    </p:set>
+                                    <p:animEffect transition="in" filter="dissolve">
+                                      <p:cBhvr>
+                                        <p:cTn id="19" dur="500"/>
+                                        <p:tgtEl>
+                                          <p:spTgt spid="3">
+                                            <p:txEl>
+                                              <p:pRg st="4" end="4"/>
+                                            </p:txEl>
+                                          </p:spTgt>
+                                        </p:tgtEl>
+                                      </p:cBhvr>
+                                    </p:animEffect>
+                                  </p:childTnLst>
+                                </p:cTn>
+                              </p:par>
+                              <p:par>
+                                <p:cTn id="20" presetID="9" presetClass="entr" presetSubtype="0" fill="hold" nodeType="withEffect">
+                                  <p:stCondLst>
+                                    <p:cond delay="0"/>
+                                  </p:stCondLst>
+                                  <p:childTnLst>
+                                    <p:set>
+                                      <p:cBhvr>
+                                        <p:cTn id="21" dur="1" fill="hold">
+                                          <p:stCondLst>
+                                            <p:cond delay="0"/>
+                                          </p:stCondLst>
+                                        </p:cTn>
+                                        <p:tgtEl>
+                                          <p:spTgt spid="3">
+                                            <p:txEl>
+                                              <p:pRg st="5" end="5"/>
+                                            </p:txEl>
+                                          </p:spTgt>
+                                        </p:tgtEl>
+                                        <p:attrNameLst>
+                                          <p:attrName>style.visibility</p:attrName>
+                                        </p:attrNameLst>
+                                      </p:cBhvr>
+                                      <p:to>
+                                        <p:strVal val="visible"/>
+                                      </p:to>
+                                    </p:set>
+                                    <p:animEffect transition="in" filter="dissolve">
+                                      <p:cBhvr>
+                                        <p:cTn id="22" dur="500"/>
+                                        <p:tgtEl>
+                                          <p:spTgt spid="3">
+                                            <p:txEl>
+                                              <p:pRg st="5" end="5"/>
+                                            </p:txEl>
+                                          </p:spTgt>
+                                        </p:tgtEl>
+                                      </p:cBhvr>
+                                    </p:animEffect>
+                                  </p:childTnLst>
+                                </p:cTn>
+                              </p:par>
+                              <p:par>
+                                <p:cTn id="23" presetID="9" presetClass="entr" presetSubtype="0" fill="hold" nodeType="withEffect">
+                                  <p:stCondLst>
+                                    <p:cond delay="0"/>
+                                  </p:stCondLst>
+                                  <p:childTnLst>
+                                    <p:set>
+                                      <p:cBhvr>
+                                        <p:cTn id="24" dur="1" fill="hold">
+                                          <p:stCondLst>
+                                            <p:cond delay="0"/>
+                                          </p:stCondLst>
+                                        </p:cTn>
+                                        <p:tgtEl>
+                                          <p:spTgt spid="3">
+                                            <p:txEl>
+                                              <p:pRg st="6" end="6"/>
+                                            </p:txEl>
+                                          </p:spTgt>
+                                        </p:tgtEl>
+                                        <p:attrNameLst>
+                                          <p:attrName>style.visibility</p:attrName>
+                                        </p:attrNameLst>
+                                      </p:cBhvr>
+                                      <p:to>
+                                        <p:strVal val="visible"/>
+                                      </p:to>
+                                    </p:set>
+                                    <p:animEffect transition="in" filter="dissolve">
+                                      <p:cBhvr>
+                                        <p:cTn id="25" dur="500"/>
+                                        <p:tgtEl>
+                                          <p:spTgt spid="3">
+                                            <p:txEl>
+                                              <p:pRg st="6" end="6"/>
+                                            </p:txEl>
+                                          </p:spTgt>
+                                        </p:tgtEl>
+                                      </p:cBhvr>
+                                    </p:animEffect>
+                                  </p:childTnLst>
+                                </p:cTn>
+                              </p:par>
+                              <p:par>
+                                <p:cTn id="26" presetID="9" presetClass="entr" presetSubtype="0" fill="hold" nodeType="withEffect">
+                                  <p:stCondLst>
+                                    <p:cond delay="0"/>
+                                  </p:stCondLst>
+                                  <p:childTnLst>
+                                    <p:set>
+                                      <p:cBhvr>
+                                        <p:cTn id="27" dur="1" fill="hold">
+                                          <p:stCondLst>
+                                            <p:cond delay="0"/>
+                                          </p:stCondLst>
+                                        </p:cTn>
+                                        <p:tgtEl>
+                                          <p:spTgt spid="3">
+                                            <p:txEl>
+                                              <p:pRg st="7" end="7"/>
+                                            </p:txEl>
+                                          </p:spTgt>
+                                        </p:tgtEl>
+                                        <p:attrNameLst>
+                                          <p:attrName>style.visibility</p:attrName>
+                                        </p:attrNameLst>
+                                      </p:cBhvr>
+                                      <p:to>
+                                        <p:strVal val="visible"/>
+                                      </p:to>
+                                    </p:set>
+                                    <p:animEffect transition="in" filter="dissolve">
+                                      <p:cBhvr>
+                                        <p:cTn id="28" dur="500"/>
+                                        <p:tgtEl>
+                                          <p:spTgt spid="3">
+                                            <p:txEl>
+                                              <p:pRg st="7" end="7"/>
+                                            </p:txEl>
+                                          </p:spTgt>
+                                        </p:tgtEl>
+                                      </p:cBhvr>
+                                    </p:animEffect>
+                                  </p:childTnLst>
+                                </p:cTn>
+                              </p:par>
+                            </p:childTnLst>
+                          </p:cTn>
+                        </p:par>
+                      </p:childTnLst>
+                    </p:cTn>
+                  </p:par>
+                  <p:par>
+                    <p:cTn id="29" fill="hold">
+                      <p:stCondLst>
+                        <p:cond delay="indefinite"/>
+                      </p:stCondLst>
+                      <p:childTnLst>
+                        <p:par>
+                          <p:cTn id="30" fill="hold">
+                            <p:stCondLst>
+                              <p:cond delay="0"/>
+                            </p:stCondLst>
+                            <p:childTnLst>
+                              <p:par>
+                                <p:cTn id="31" presetID="9" presetClass="entr" presetSubtype="0" fill="hold" nodeType="clickEffect">
+                                  <p:stCondLst>
+                                    <p:cond delay="0"/>
+                                  </p:stCondLst>
+                                  <p:childTnLst>
+                                    <p:set>
+                                      <p:cBhvr>
+                                        <p:cTn id="32" dur="1" fill="hold">
+                                          <p:stCondLst>
+                                            <p:cond delay="0"/>
+                                          </p:stCondLst>
+                                        </p:cTn>
+                                        <p:tgtEl>
+                                          <p:spTgt spid="3">
+                                            <p:txEl>
+                                              <p:pRg st="8" end="8"/>
+                                            </p:txEl>
+                                          </p:spTgt>
+                                        </p:tgtEl>
+                                        <p:attrNameLst>
+                                          <p:attrName>style.visibility</p:attrName>
+                                        </p:attrNameLst>
+                                      </p:cBhvr>
+                                      <p:to>
+                                        <p:strVal val="visible"/>
+                                      </p:to>
+                                    </p:set>
+                                    <p:animEffect transition="in" filter="dissolve">
+                                      <p:cBhvr>
+                                        <p:cTn id="33" dur="500"/>
+                                        <p:tgtEl>
+                                          <p:spTgt spid="3">
+                                            <p:txEl>
+                                              <p:pRg st="8" end="8"/>
+                                            </p:txEl>
+                                          </p:spTgt>
+                                        </p:tgtEl>
+                                      </p:cBhvr>
+                                    </p:animEffect>
+                                  </p:childTnLst>
+                                </p:cTn>
+                              </p:par>
+                            </p:childTnLst>
+                          </p:cTn>
+                        </p:par>
+                      </p:childTnLst>
+                    </p:cTn>
+                  </p:par>
+                </p:childTnLst>
+              </p:cTn>
+              <p:prevCondLst>
+                <p:cond evt="onPrev" delay="0">
+                  <p:tgtEl>
+                    <p:sldTgt/>
+                  </p:tgtEl>
+                </p:cond>
+              </p:prevCondLst>
+              <p:nextCondLst>
+                <p:cond evt="onNext" delay="0">
+                  <p:tgtEl>
+                    <p:sldTgt/>
+                  </p:tgtEl>
+                </p:cond>
+              </p:nextCondLst>
+            </p:seq>
+          </p:childTnLst>
+        </p:cTn>
+      </p:par>
+    </p:tnLst>
+  </p:timing>
+</p:sld>
+</file>
+
+<file path=ppt/slides/slide20.xml><?xml version="1.0" encoding="utf-8"?>
+<p:sld xmlns:a="http://schemas.openxmlformats.org/drawingml/2006/main" xmlns:r="http://schemas.openxmlformats.org/officeDocument/2006/relationships" xmlns:p="http://schemas.openxmlformats.org/presentationml/2006/main">
+  <p:cSld>
+    <p:spTree>
+      <p:nvGrpSpPr>
+        <p:cNvPr id="1" name=""/>
+        <p:cNvGrpSpPr/>
+        <p:nvPr/>
+      </p:nvGrpSpPr>
+      <p:grpSpPr>
+        <a:xfrm>
+          <a:off x="0" y="0"/>
+          <a:ext cx="0" cy="0"/>
+          <a:chOff x="0" y="0"/>
+          <a:chExt cx="0" cy="0"/>
+        </a:xfrm>
+      </p:grpSpPr>
+      <p:sp>
+        <p:nvSpPr>
+          <p:cNvPr id="2" name="Title 1">
+            <a:extLst>
+              <a:ext uri="{FF2B5EF4-FFF2-40B4-BE49-F238E27FC236}">
                 <a16:creationId xmlns:a16="http://schemas.microsoft.com/office/drawing/2014/main" id="{E1CC3210-9CAD-894F-953C-7E96E99B1584}"/>
               </a:ext>
             </a:extLst>
@@ -7775,7 +8651,7 @@
             <a:fld id="{A44B02FA-DD2D-1844-AE35-8B2EAB0CF4EF}" type="slidenum">
               <a:rPr lang="en-US" smtClean="0"/>
               <a:pPr/>
-              <a:t>19</a:t>
+              <a:t>20</a:t>
             </a:fld>
             <a:endParaRPr lang="en-US" dirty="0"/>
           </a:p>
@@ -7806,7 +8682,291 @@
 </p:sld>
 </file>
 
-<file path=ppt/slides/slide2.xml><?xml version="1.0" encoding="utf-8"?>
+<file path=ppt/slides/slide21.xml><?xml version="1.0" encoding="utf-8"?>
+<p:sld xmlns:a="http://schemas.openxmlformats.org/drawingml/2006/main" xmlns:r="http://schemas.openxmlformats.org/officeDocument/2006/relationships" xmlns:p="http://schemas.openxmlformats.org/presentationml/2006/main">
+  <p:cSld>
+    <p:spTree>
+      <p:nvGrpSpPr>
+        <p:cNvPr id="1" name=""/>
+        <p:cNvGrpSpPr/>
+        <p:nvPr/>
+      </p:nvGrpSpPr>
+      <p:grpSpPr>
+        <a:xfrm>
+          <a:off x="0" y="0"/>
+          <a:ext cx="0" cy="0"/>
+          <a:chOff x="0" y="0"/>
+          <a:chExt cx="0" cy="0"/>
+        </a:xfrm>
+      </p:grpSpPr>
+      <p:sp>
+        <p:nvSpPr>
+          <p:cNvPr id="2" name="Title 1">
+            <a:extLst>
+              <a:ext uri="{FF2B5EF4-FFF2-40B4-BE49-F238E27FC236}">
+                <a16:creationId xmlns:a16="http://schemas.microsoft.com/office/drawing/2014/main" id="{61D361B5-F989-1B42-A9E6-11CEA715CBCF}"/>
+              </a:ext>
+            </a:extLst>
+          </p:cNvPr>
+          <p:cNvSpPr>
+            <a:spLocks noGrp="1"/>
+          </p:cNvSpPr>
+          <p:nvPr>
+            <p:ph type="title"/>
+          </p:nvPr>
+        </p:nvSpPr>
+        <p:spPr/>
+        <p:txBody>
+          <a:bodyPr/>
+          <a:lstStyle/>
+          <a:p>
+            <a:r>
+              <a:rPr lang="en-US" dirty="0"/>
+              <a:t>Cleaning Up</a:t>
+            </a:r>
+          </a:p>
+        </p:txBody>
+      </p:sp>
+      <p:sp>
+        <p:nvSpPr>
+          <p:cNvPr id="3" name="Content Placeholder 2">
+            <a:extLst>
+              <a:ext uri="{FF2B5EF4-FFF2-40B4-BE49-F238E27FC236}">
+                <a16:creationId xmlns:a16="http://schemas.microsoft.com/office/drawing/2014/main" id="{DBC3E629-5E5A-A241-BF15-ED951123C708}"/>
+              </a:ext>
+            </a:extLst>
+          </p:cNvPr>
+          <p:cNvSpPr>
+            <a:spLocks noGrp="1"/>
+          </p:cNvSpPr>
+          <p:nvPr>
+            <p:ph idx="1"/>
+          </p:nvPr>
+        </p:nvSpPr>
+        <p:spPr/>
+        <p:txBody>
+          <a:bodyPr/>
+          <a:lstStyle/>
+          <a:p>
+            <a:pPr lvl="1"/>
+            <a:r>
+              <a:rPr lang="en-US" dirty="0"/>
+              <a:t>docker system df [-v]</a:t>
+            </a:r>
+          </a:p>
+          <a:p>
+            <a:pPr lvl="1"/>
+            <a:r>
+              <a:rPr lang="en-US" dirty="0"/>
+              <a:t>Dangling images (&lt;none&gt;</a:t>
+            </a:r>
+            <a:r>
+              <a:rPr lang="en-US" baseline="0" dirty="0"/>
+              <a:t> repository and tag names)</a:t>
+            </a:r>
+          </a:p>
+          <a:p>
+            <a:pPr marL="685800" marR="0" lvl="1" indent="-228600" algn="l" defTabSz="914400" rtl="0" eaLnBrk="1" fontAlgn="auto" latinLnBrk="0" hangingPunct="1">
+              <a:lnSpc>
+                <a:spcPct val="90000"/>
+              </a:lnSpc>
+              <a:spcBef>
+                <a:spcPts val="500"/>
+              </a:spcBef>
+              <a:spcAft>
+                <a:spcPts val="0"/>
+              </a:spcAft>
+              <a:buClrTx/>
+              <a:buSzTx/>
+              <a:buFont typeface="Arial" panose="020B0604020202020204" pitchFamily="34" charset="0"/>
+              <a:buChar char="•"/>
+              <a:tabLst/>
+              <a:defRPr/>
+            </a:pPr>
+            <a:r>
+              <a:rPr lang="en-US" sz="2400" kern="1200" dirty="0">
+                <a:solidFill>
+                  <a:schemeClr val="tx1"/>
+                </a:solidFill>
+                <a:effectLst/>
+                <a:latin typeface="+mn-lt"/>
+                <a:ea typeface="+mn-ea"/>
+                <a:cs typeface="+mn-cs"/>
+              </a:rPr>
+              <a:t>docker system info</a:t>
+            </a:r>
+            <a:endParaRPr lang="en-US" sz="2400" dirty="0">
+              <a:effectLst/>
+            </a:endParaRPr>
+          </a:p>
+          <a:p>
+            <a:pPr marL="685800" marR="0" lvl="1" indent="-228600" algn="l" defTabSz="914400" rtl="0" eaLnBrk="1" fontAlgn="auto" latinLnBrk="0" hangingPunct="1">
+              <a:lnSpc>
+                <a:spcPct val="90000"/>
+              </a:lnSpc>
+              <a:spcBef>
+                <a:spcPts val="500"/>
+              </a:spcBef>
+              <a:spcAft>
+                <a:spcPts val="0"/>
+              </a:spcAft>
+              <a:buClrTx/>
+              <a:buSzTx/>
+              <a:buFont typeface="Arial" panose="020B0604020202020204" pitchFamily="34" charset="0"/>
+              <a:buChar char="•"/>
+              <a:tabLst/>
+              <a:defRPr/>
+            </a:pPr>
+            <a:r>
+              <a:rPr lang="en-US" sz="2400" kern="1200" dirty="0">
+                <a:solidFill>
+                  <a:schemeClr val="tx1"/>
+                </a:solidFill>
+                <a:effectLst/>
+                <a:latin typeface="+mn-lt"/>
+                <a:ea typeface="+mn-ea"/>
+                <a:cs typeface="+mn-cs"/>
+              </a:rPr>
+              <a:t>docker system</a:t>
+            </a:r>
+            <a:r>
+              <a:rPr lang="en-US" sz="2400" kern="1200" baseline="0" dirty="0">
+                <a:solidFill>
+                  <a:schemeClr val="tx1"/>
+                </a:solidFill>
+                <a:effectLst/>
+                <a:latin typeface="+mn-lt"/>
+                <a:ea typeface="+mn-ea"/>
+                <a:cs typeface="+mn-cs"/>
+              </a:rPr>
+              <a:t> prune</a:t>
+            </a:r>
+          </a:p>
+          <a:p>
+            <a:pPr marL="685800" marR="0" lvl="1" indent="-228600" algn="l" defTabSz="914400" rtl="0" eaLnBrk="1" fontAlgn="auto" latinLnBrk="0" hangingPunct="1">
+              <a:lnSpc>
+                <a:spcPct val="90000"/>
+              </a:lnSpc>
+              <a:spcBef>
+                <a:spcPts val="500"/>
+              </a:spcBef>
+              <a:spcAft>
+                <a:spcPts val="0"/>
+              </a:spcAft>
+              <a:buClrTx/>
+              <a:buSzTx/>
+              <a:buFont typeface="Arial" panose="020B0604020202020204" pitchFamily="34" charset="0"/>
+              <a:buChar char="•"/>
+              <a:tabLst/>
+              <a:defRPr/>
+            </a:pPr>
+            <a:r>
+              <a:rPr lang="en-US" sz="2400" kern="1200" baseline="0" dirty="0">
+                <a:solidFill>
+                  <a:schemeClr val="tx1"/>
+                </a:solidFill>
+                <a:effectLst/>
+                <a:latin typeface="+mn-lt"/>
+                <a:ea typeface="+mn-ea"/>
+                <a:cs typeface="+mn-cs"/>
+              </a:rPr>
+              <a:t>docker image/container prune</a:t>
+            </a:r>
+            <a:endParaRPr lang="en-US" sz="2400" dirty="0">
+              <a:effectLst/>
+            </a:endParaRPr>
+          </a:p>
+          <a:p>
+            <a:pPr lvl="1"/>
+            <a:endParaRPr lang="en-US" dirty="0"/>
+          </a:p>
+        </p:txBody>
+      </p:sp>
+      <p:sp>
+        <p:nvSpPr>
+          <p:cNvPr id="4" name="Date Placeholder 3">
+            <a:extLst>
+              <a:ext uri="{FF2B5EF4-FFF2-40B4-BE49-F238E27FC236}">
+                <a16:creationId xmlns:a16="http://schemas.microsoft.com/office/drawing/2014/main" id="{DF7B6D93-0D34-764F-BA13-54BACE11E271}"/>
+              </a:ext>
+            </a:extLst>
+          </p:cNvPr>
+          <p:cNvSpPr>
+            <a:spLocks noGrp="1"/>
+          </p:cNvSpPr>
+          <p:nvPr>
+            <p:ph type="dt" sz="half" idx="10"/>
+          </p:nvPr>
+        </p:nvSpPr>
+        <p:spPr/>
+        <p:txBody>
+          <a:bodyPr/>
+          <a:lstStyle/>
+          <a:p>
+            <a:r>
+              <a:rPr lang="en-US"/>
+              <a:t>World Wide Technology ©</a:t>
+            </a:r>
+            <a:endParaRPr lang="en-US" dirty="0"/>
+          </a:p>
+        </p:txBody>
+      </p:sp>
+      <p:sp>
+        <p:nvSpPr>
+          <p:cNvPr id="5" name="Slide Number Placeholder 4">
+            <a:extLst>
+              <a:ext uri="{FF2B5EF4-FFF2-40B4-BE49-F238E27FC236}">
+                <a16:creationId xmlns:a16="http://schemas.microsoft.com/office/drawing/2014/main" id="{37522B27-1E0E-0342-B7E3-F19EF286A62D}"/>
+              </a:ext>
+            </a:extLst>
+          </p:cNvPr>
+          <p:cNvSpPr>
+            <a:spLocks noGrp="1"/>
+          </p:cNvSpPr>
+          <p:nvPr>
+            <p:ph type="sldNum" sz="quarter" idx="12"/>
+          </p:nvPr>
+        </p:nvSpPr>
+        <p:spPr/>
+        <p:txBody>
+          <a:bodyPr/>
+          <a:lstStyle/>
+          <a:p>
+            <a:fld id="{A44B02FA-DD2D-1844-AE35-8B2EAB0CF4EF}" type="slidenum">
+              <a:rPr lang="en-US" smtClean="0"/>
+              <a:pPr/>
+              <a:t>21</a:t>
+            </a:fld>
+            <a:endParaRPr lang="en-US" dirty="0"/>
+          </a:p>
+        </p:txBody>
+      </p:sp>
+    </p:spTree>
+    <p:extLst>
+      <p:ext uri="{BB962C8B-B14F-4D97-AF65-F5344CB8AC3E}">
+        <p14:creationId xmlns:p14="http://schemas.microsoft.com/office/powerpoint/2010/main" val="2609123940"/>
+      </p:ext>
+    </p:extLst>
+  </p:cSld>
+  <p:clrMapOvr>
+    <a:masterClrMapping/>
+  </p:clrMapOvr>
+  <mc:AlternateContent xmlns:mc="http://schemas.openxmlformats.org/markup-compatibility/2006" xmlns:p14="http://schemas.microsoft.com/office/powerpoint/2010/main">
+    <mc:Choice Requires="p14">
+      <p:transition spd="med" p14:dur="700">
+        <p:fade/>
+      </p:transition>
+    </mc:Choice>
+    <mc:Fallback xmlns="">
+      <p:transition spd="med">
+        <p:fade/>
+      </p:transition>
+    </mc:Fallback>
+  </mc:AlternateContent>
+</p:sld>
+</file>
+
+<file path=ppt/slides/slide3.xml><?xml version="1.0" encoding="utf-8"?>
 <p:sld xmlns:a="http://schemas.openxmlformats.org/drawingml/2006/main" xmlns:r="http://schemas.openxmlformats.org/officeDocument/2006/relationships" xmlns:p="http://schemas.openxmlformats.org/presentationml/2006/main">
   <p:cSld>
     <p:spTree>
@@ -8156,7 +9316,7 @@
             <a:fld id="{A44B02FA-DD2D-1844-AE35-8B2EAB0CF4EF}" type="slidenum">
               <a:rPr lang="en-US" smtClean="0"/>
               <a:pPr/>
-              <a:t>2</a:t>
+              <a:t>3</a:t>
             </a:fld>
             <a:endParaRPr lang="en-US" dirty="0"/>
           </a:p>
@@ -8205,7 +9365,7 @@
                             </p:stCondLst>
                             <p:childTnLst>
                               <p:par>
-                                <p:cTn id="5" presetID="22" presetClass="entr" presetSubtype="8" fill="hold" grpId="1" nodeType="clickEffect">
+                                <p:cTn id="5" presetID="9" presetClass="entr" presetSubtype="0" fill="hold" grpId="0" nodeType="clickEffect">
                                   <p:stCondLst>
                                     <p:cond delay="0"/>
                                   </p:stCondLst>
@@ -8218,7 +9378,11 @@
                                           </p:stCondLst>
                                         </p:cTn>
                                         <p:tgtEl>
-                                          <p:spTgt spid="4"/>
+                                          <p:spTgt spid="3">
+                                            <p:txEl>
+                                              <p:pRg st="0" end="0"/>
+                                            </p:txEl>
+                                          </p:spTgt>
                                         </p:tgtEl>
                                         <p:attrNameLst>
                                           <p:attrName>style.visibility</p:attrName>
@@ -8228,11 +9392,15 @@
                                         <p:strVal val="visible"/>
                                       </p:to>
                                     </p:set>
-                                    <p:animEffect transition="in" filter="wipe(left)">
+                                    <p:animEffect transition="in" filter="dissolve">
                                       <p:cBhvr>
-                                        <p:cTn id="7" dur="2000"/>
+                                        <p:cTn id="7" dur="500"/>
                                         <p:tgtEl>
-                                          <p:spTgt spid="4"/>
+                                          <p:spTgt spid="3">
+                                            <p:txEl>
+                                              <p:pRg st="0" end="0"/>
+                                            </p:txEl>
+                                          </p:spTgt>
                                         </p:tgtEl>
                                       </p:cBhvr>
                                     </p:animEffect>
@@ -8273,7 +9441,7 @@
                                         <p:tgtEl>
                                           <p:spTgt spid="3">
                                             <p:txEl>
-                                              <p:pRg st="0" end="0"/>
+                                              <p:pRg st="1" end="1"/>
                                             </p:txEl>
                                           </p:spTgt>
                                         </p:tgtEl>
@@ -8291,7 +9459,7 @@
                                         <p:tgtEl>
                                           <p:spTgt spid="3">
                                             <p:txEl>
-                                              <p:pRg st="0" end="0"/>
+                                              <p:pRg st="1" end="1"/>
                                             </p:txEl>
                                           </p:spTgt>
                                         </p:tgtEl>
@@ -8334,7 +9502,7 @@
                                         <p:tgtEl>
                                           <p:spTgt spid="3">
                                             <p:txEl>
-                                              <p:pRg st="1" end="1"/>
+                                              <p:pRg st="2" end="2"/>
                                             </p:txEl>
                                           </p:spTgt>
                                         </p:tgtEl>
@@ -8352,7 +9520,7 @@
                                         <p:tgtEl>
                                           <p:spTgt spid="3">
                                             <p:txEl>
-                                              <p:pRg st="1" end="1"/>
+                                              <p:pRg st="2" end="2"/>
                                             </p:txEl>
                                           </p:spTgt>
                                         </p:tgtEl>
@@ -8380,7 +9548,7 @@
                             </p:stCondLst>
                             <p:childTnLst>
                               <p:par>
-                                <p:cTn id="20" presetID="9" presetClass="entr" presetSubtype="0" fill="hold" grpId="0" nodeType="clickEffect">
+                                <p:cTn id="20" presetID="22" presetClass="entr" presetSubtype="8" fill="hold" grpId="1" nodeType="clickEffect">
                                   <p:stCondLst>
                                     <p:cond delay="0"/>
                                   </p:stCondLst>
@@ -8393,11 +9561,7 @@
                                           </p:stCondLst>
                                         </p:cTn>
                                         <p:tgtEl>
-                                          <p:spTgt spid="3">
-                                            <p:txEl>
-                                              <p:pRg st="2" end="2"/>
-                                            </p:txEl>
-                                          </p:spTgt>
+                                          <p:spTgt spid="4"/>
                                         </p:tgtEl>
                                         <p:attrNameLst>
                                           <p:attrName>style.visibility</p:attrName>
@@ -8407,15 +9571,11 @@
                                         <p:strVal val="visible"/>
                                       </p:to>
                                     </p:set>
-                                    <p:animEffect transition="in" filter="dissolve">
+                                    <p:animEffect transition="in" filter="wipe(left)">
                                       <p:cBhvr>
-                                        <p:cTn id="22" dur="500"/>
+                                        <p:cTn id="22" dur="2000"/>
                                         <p:tgtEl>
-                                          <p:spTgt spid="3">
-                                            <p:txEl>
-                                              <p:pRg st="2" end="2"/>
-                                            </p:txEl>
-                                          </p:spTgt>
+                                          <p:spTgt spid="4"/>
                                         </p:tgtEl>
                                       </p:cBhvr>
                                     </p:animEffect>
@@ -8457,291 +9617,7 @@
 </p:sld>
 </file>
 
-<file path=ppt/slides/slide20.xml><?xml version="1.0" encoding="utf-8"?>
-<p:sld xmlns:a="http://schemas.openxmlformats.org/drawingml/2006/main" xmlns:r="http://schemas.openxmlformats.org/officeDocument/2006/relationships" xmlns:p="http://schemas.openxmlformats.org/presentationml/2006/main">
-  <p:cSld>
-    <p:spTree>
-      <p:nvGrpSpPr>
-        <p:cNvPr id="1" name=""/>
-        <p:cNvGrpSpPr/>
-        <p:nvPr/>
-      </p:nvGrpSpPr>
-      <p:grpSpPr>
-        <a:xfrm>
-          <a:off x="0" y="0"/>
-          <a:ext cx="0" cy="0"/>
-          <a:chOff x="0" y="0"/>
-          <a:chExt cx="0" cy="0"/>
-        </a:xfrm>
-      </p:grpSpPr>
-      <p:sp>
-        <p:nvSpPr>
-          <p:cNvPr id="2" name="Title 1">
-            <a:extLst>
-              <a:ext uri="{FF2B5EF4-FFF2-40B4-BE49-F238E27FC236}">
-                <a16:creationId xmlns:a16="http://schemas.microsoft.com/office/drawing/2014/main" id="{61D361B5-F989-1B42-A9E6-11CEA715CBCF}"/>
-              </a:ext>
-            </a:extLst>
-          </p:cNvPr>
-          <p:cNvSpPr>
-            <a:spLocks noGrp="1"/>
-          </p:cNvSpPr>
-          <p:nvPr>
-            <p:ph type="title"/>
-          </p:nvPr>
-        </p:nvSpPr>
-        <p:spPr/>
-        <p:txBody>
-          <a:bodyPr/>
-          <a:lstStyle/>
-          <a:p>
-            <a:r>
-              <a:rPr lang="en-US" dirty="0"/>
-              <a:t>Cleaning Up</a:t>
-            </a:r>
-          </a:p>
-        </p:txBody>
-      </p:sp>
-      <p:sp>
-        <p:nvSpPr>
-          <p:cNvPr id="3" name="Content Placeholder 2">
-            <a:extLst>
-              <a:ext uri="{FF2B5EF4-FFF2-40B4-BE49-F238E27FC236}">
-                <a16:creationId xmlns:a16="http://schemas.microsoft.com/office/drawing/2014/main" id="{DBC3E629-5E5A-A241-BF15-ED951123C708}"/>
-              </a:ext>
-            </a:extLst>
-          </p:cNvPr>
-          <p:cNvSpPr>
-            <a:spLocks noGrp="1"/>
-          </p:cNvSpPr>
-          <p:nvPr>
-            <p:ph idx="1"/>
-          </p:nvPr>
-        </p:nvSpPr>
-        <p:spPr/>
-        <p:txBody>
-          <a:bodyPr/>
-          <a:lstStyle/>
-          <a:p>
-            <a:pPr lvl="1"/>
-            <a:r>
-              <a:rPr lang="en-US" dirty="0"/>
-              <a:t>docker system df [-v]</a:t>
-            </a:r>
-          </a:p>
-          <a:p>
-            <a:pPr lvl="1"/>
-            <a:r>
-              <a:rPr lang="en-US" dirty="0"/>
-              <a:t>Dangling images (&lt;none&gt;</a:t>
-            </a:r>
-            <a:r>
-              <a:rPr lang="en-US" baseline="0" dirty="0"/>
-              <a:t> repository and tag names)</a:t>
-            </a:r>
-          </a:p>
-          <a:p>
-            <a:pPr marL="685800" marR="0" lvl="1" indent="-228600" algn="l" defTabSz="914400" rtl="0" eaLnBrk="1" fontAlgn="auto" latinLnBrk="0" hangingPunct="1">
-              <a:lnSpc>
-                <a:spcPct val="90000"/>
-              </a:lnSpc>
-              <a:spcBef>
-                <a:spcPts val="500"/>
-              </a:spcBef>
-              <a:spcAft>
-                <a:spcPts val="0"/>
-              </a:spcAft>
-              <a:buClrTx/>
-              <a:buSzTx/>
-              <a:buFont typeface="Arial" panose="020B0604020202020204" pitchFamily="34" charset="0"/>
-              <a:buChar char="•"/>
-              <a:tabLst/>
-              <a:defRPr/>
-            </a:pPr>
-            <a:r>
-              <a:rPr lang="en-US" sz="2400" kern="1200" dirty="0">
-                <a:solidFill>
-                  <a:schemeClr val="tx1"/>
-                </a:solidFill>
-                <a:effectLst/>
-                <a:latin typeface="+mn-lt"/>
-                <a:ea typeface="+mn-ea"/>
-                <a:cs typeface="+mn-cs"/>
-              </a:rPr>
-              <a:t>docker system info</a:t>
-            </a:r>
-            <a:endParaRPr lang="en-US" sz="2400" dirty="0">
-              <a:effectLst/>
-            </a:endParaRPr>
-          </a:p>
-          <a:p>
-            <a:pPr marL="685800" marR="0" lvl="1" indent="-228600" algn="l" defTabSz="914400" rtl="0" eaLnBrk="1" fontAlgn="auto" latinLnBrk="0" hangingPunct="1">
-              <a:lnSpc>
-                <a:spcPct val="90000"/>
-              </a:lnSpc>
-              <a:spcBef>
-                <a:spcPts val="500"/>
-              </a:spcBef>
-              <a:spcAft>
-                <a:spcPts val="0"/>
-              </a:spcAft>
-              <a:buClrTx/>
-              <a:buSzTx/>
-              <a:buFont typeface="Arial" panose="020B0604020202020204" pitchFamily="34" charset="0"/>
-              <a:buChar char="•"/>
-              <a:tabLst/>
-              <a:defRPr/>
-            </a:pPr>
-            <a:r>
-              <a:rPr lang="en-US" sz="2400" kern="1200" dirty="0">
-                <a:solidFill>
-                  <a:schemeClr val="tx1"/>
-                </a:solidFill>
-                <a:effectLst/>
-                <a:latin typeface="+mn-lt"/>
-                <a:ea typeface="+mn-ea"/>
-                <a:cs typeface="+mn-cs"/>
-              </a:rPr>
-              <a:t>docker system</a:t>
-            </a:r>
-            <a:r>
-              <a:rPr lang="en-US" sz="2400" kern="1200" baseline="0" dirty="0">
-                <a:solidFill>
-                  <a:schemeClr val="tx1"/>
-                </a:solidFill>
-                <a:effectLst/>
-                <a:latin typeface="+mn-lt"/>
-                <a:ea typeface="+mn-ea"/>
-                <a:cs typeface="+mn-cs"/>
-              </a:rPr>
-              <a:t> prune</a:t>
-            </a:r>
-          </a:p>
-          <a:p>
-            <a:pPr marL="685800" marR="0" lvl="1" indent="-228600" algn="l" defTabSz="914400" rtl="0" eaLnBrk="1" fontAlgn="auto" latinLnBrk="0" hangingPunct="1">
-              <a:lnSpc>
-                <a:spcPct val="90000"/>
-              </a:lnSpc>
-              <a:spcBef>
-                <a:spcPts val="500"/>
-              </a:spcBef>
-              <a:spcAft>
-                <a:spcPts val="0"/>
-              </a:spcAft>
-              <a:buClrTx/>
-              <a:buSzTx/>
-              <a:buFont typeface="Arial" panose="020B0604020202020204" pitchFamily="34" charset="0"/>
-              <a:buChar char="•"/>
-              <a:tabLst/>
-              <a:defRPr/>
-            </a:pPr>
-            <a:r>
-              <a:rPr lang="en-US" sz="2400" kern="1200" baseline="0" dirty="0">
-                <a:solidFill>
-                  <a:schemeClr val="tx1"/>
-                </a:solidFill>
-                <a:effectLst/>
-                <a:latin typeface="+mn-lt"/>
-                <a:ea typeface="+mn-ea"/>
-                <a:cs typeface="+mn-cs"/>
-              </a:rPr>
-              <a:t>docker image/container prune</a:t>
-            </a:r>
-            <a:endParaRPr lang="en-US" sz="2400" dirty="0">
-              <a:effectLst/>
-            </a:endParaRPr>
-          </a:p>
-          <a:p>
-            <a:pPr lvl="1"/>
-            <a:endParaRPr lang="en-US" dirty="0"/>
-          </a:p>
-        </p:txBody>
-      </p:sp>
-      <p:sp>
-        <p:nvSpPr>
-          <p:cNvPr id="4" name="Date Placeholder 3">
-            <a:extLst>
-              <a:ext uri="{FF2B5EF4-FFF2-40B4-BE49-F238E27FC236}">
-                <a16:creationId xmlns:a16="http://schemas.microsoft.com/office/drawing/2014/main" id="{DF7B6D93-0D34-764F-BA13-54BACE11E271}"/>
-              </a:ext>
-            </a:extLst>
-          </p:cNvPr>
-          <p:cNvSpPr>
-            <a:spLocks noGrp="1"/>
-          </p:cNvSpPr>
-          <p:nvPr>
-            <p:ph type="dt" sz="half" idx="10"/>
-          </p:nvPr>
-        </p:nvSpPr>
-        <p:spPr/>
-        <p:txBody>
-          <a:bodyPr/>
-          <a:lstStyle/>
-          <a:p>
-            <a:r>
-              <a:rPr lang="en-US"/>
-              <a:t>World Wide Technology ©</a:t>
-            </a:r>
-            <a:endParaRPr lang="en-US" dirty="0"/>
-          </a:p>
-        </p:txBody>
-      </p:sp>
-      <p:sp>
-        <p:nvSpPr>
-          <p:cNvPr id="5" name="Slide Number Placeholder 4">
-            <a:extLst>
-              <a:ext uri="{FF2B5EF4-FFF2-40B4-BE49-F238E27FC236}">
-                <a16:creationId xmlns:a16="http://schemas.microsoft.com/office/drawing/2014/main" id="{37522B27-1E0E-0342-B7E3-F19EF286A62D}"/>
-              </a:ext>
-            </a:extLst>
-          </p:cNvPr>
-          <p:cNvSpPr>
-            <a:spLocks noGrp="1"/>
-          </p:cNvSpPr>
-          <p:nvPr>
-            <p:ph type="sldNum" sz="quarter" idx="12"/>
-          </p:nvPr>
-        </p:nvSpPr>
-        <p:spPr/>
-        <p:txBody>
-          <a:bodyPr/>
-          <a:lstStyle/>
-          <a:p>
-            <a:fld id="{A44B02FA-DD2D-1844-AE35-8B2EAB0CF4EF}" type="slidenum">
-              <a:rPr lang="en-US" smtClean="0"/>
-              <a:pPr/>
-              <a:t>20</a:t>
-            </a:fld>
-            <a:endParaRPr lang="en-US" dirty="0"/>
-          </a:p>
-        </p:txBody>
-      </p:sp>
-    </p:spTree>
-    <p:extLst>
-      <p:ext uri="{BB962C8B-B14F-4D97-AF65-F5344CB8AC3E}">
-        <p14:creationId xmlns:p14="http://schemas.microsoft.com/office/powerpoint/2010/main" val="2609123940"/>
-      </p:ext>
-    </p:extLst>
-  </p:cSld>
-  <p:clrMapOvr>
-    <a:masterClrMapping/>
-  </p:clrMapOvr>
-  <mc:AlternateContent xmlns:mc="http://schemas.openxmlformats.org/markup-compatibility/2006" xmlns:p14="http://schemas.microsoft.com/office/powerpoint/2010/main">
-    <mc:Choice Requires="p14">
-      <p:transition spd="med" p14:dur="700">
-        <p:fade/>
-      </p:transition>
-    </mc:Choice>
-    <mc:Fallback xmlns="">
-      <p:transition spd="med">
-        <p:fade/>
-      </p:transition>
-    </mc:Fallback>
-  </mc:AlternateContent>
-</p:sld>
-</file>
-
-<file path=ppt/slides/slide3.xml><?xml version="1.0" encoding="utf-8"?>
+<file path=ppt/slides/slide4.xml><?xml version="1.0" encoding="utf-8"?>
 <p:sld xmlns:a="http://schemas.openxmlformats.org/drawingml/2006/main" xmlns:r="http://schemas.openxmlformats.org/officeDocument/2006/relationships" xmlns:p="http://schemas.openxmlformats.org/presentationml/2006/main">
   <p:cSld>
     <p:spTree>
@@ -9129,7 +10005,7 @@
             <a:fld id="{A44B02FA-DD2D-1844-AE35-8B2EAB0CF4EF}" type="slidenum">
               <a:rPr lang="en-US" smtClean="0"/>
               <a:pPr/>
-              <a:t>3</a:t>
+              <a:t>4</a:t>
             </a:fld>
             <a:endParaRPr lang="en-US" dirty="0"/>
           </a:p>
@@ -9300,7 +10176,7 @@
 </p:sld>
 </file>
 
-<file path=ppt/slides/slide4.xml><?xml version="1.0" encoding="utf-8"?>
+<file path=ppt/slides/slide5.xml><?xml version="1.0" encoding="utf-8"?>
 <p:sld xmlns:a="http://schemas.openxmlformats.org/drawingml/2006/main" xmlns:r="http://schemas.openxmlformats.org/officeDocument/2006/relationships" xmlns:p="http://schemas.openxmlformats.org/presentationml/2006/main">
   <p:cSld>
     <p:spTree>
@@ -9701,7 +10577,7 @@
             <a:fld id="{A44B02FA-DD2D-1844-AE35-8B2EAB0CF4EF}" type="slidenum">
               <a:rPr lang="en-US" smtClean="0"/>
               <a:pPr/>
-              <a:t>4</a:t>
+              <a:t>5</a:t>
             </a:fld>
             <a:endParaRPr lang="en-US" dirty="0"/>
           </a:p>
@@ -9872,7 +10748,7 @@
 </p:sld>
 </file>
 
-<file path=ppt/slides/slide5.xml><?xml version="1.0" encoding="utf-8"?>
+<file path=ppt/slides/slide6.xml><?xml version="1.0" encoding="utf-8"?>
 <p:sld xmlns:a="http://schemas.openxmlformats.org/drawingml/2006/main" xmlns:r="http://schemas.openxmlformats.org/officeDocument/2006/relationships" xmlns:p="http://schemas.openxmlformats.org/presentationml/2006/main">
   <p:cSld>
     <p:spTree>
@@ -10870,7 +11746,7 @@
             <a:fld id="{A44B02FA-DD2D-1844-AE35-8B2EAB0CF4EF}" type="slidenum">
               <a:rPr lang="en-US" smtClean="0"/>
               <a:pPr/>
-              <a:t>5</a:t>
+              <a:t>6</a:t>
             </a:fld>
             <a:endParaRPr lang="en-US" dirty="0"/>
           </a:p>
@@ -11619,7 +12495,7 @@
 </p:sld>
 </file>
 
-<file path=ppt/slides/slide6.xml><?xml version="1.0" encoding="utf-8"?>
+<file path=ppt/slides/slide7.xml><?xml version="1.0" encoding="utf-8"?>
 <p:sld xmlns:a="http://schemas.openxmlformats.org/drawingml/2006/main" xmlns:r="http://schemas.openxmlformats.org/officeDocument/2006/relationships" xmlns:p="http://schemas.openxmlformats.org/presentationml/2006/main">
   <p:cSld>
     <p:spTree>
@@ -11896,7 +12772,7 @@
             <a:fld id="{A44B02FA-DD2D-1844-AE35-8B2EAB0CF4EF}" type="slidenum">
               <a:rPr lang="en-US" smtClean="0"/>
               <a:pPr/>
-              <a:t>6</a:t>
+              <a:t>7</a:t>
             </a:fld>
             <a:endParaRPr lang="en-US" dirty="0"/>
           </a:p>
@@ -12198,7 +13074,7 @@
                               <p:par>
                                 <p:cTn id="9" presetID="22" presetClass="entr" presetSubtype="8" fill="hold" grpId="0" nodeType="afterEffect">
                                   <p:stCondLst>
-                                    <p:cond delay="2000"/>
+                                    <p:cond delay="1000"/>
                                   </p:stCondLst>
                                   <p:childTnLst>
                                     <p:set>
@@ -12265,7 +13141,7 @@
 </p:sld>
 </file>
 
-<file path=ppt/slides/slide7.xml><?xml version="1.0" encoding="utf-8"?>
+<file path=ppt/slides/slide8.xml><?xml version="1.0" encoding="utf-8"?>
 <p:sld xmlns:a="http://schemas.openxmlformats.org/drawingml/2006/main" xmlns:r="http://schemas.openxmlformats.org/officeDocument/2006/relationships" xmlns:p="http://schemas.openxmlformats.org/presentationml/2006/main">
   <p:cSld>
     <p:spTree>
@@ -12362,7 +13238,7 @@
             <a:fld id="{A44B02FA-DD2D-1844-AE35-8B2EAB0CF4EF}" type="slidenum">
               <a:rPr lang="en-US" smtClean="0"/>
               <a:pPr/>
-              <a:t>7</a:t>
+              <a:t>8</a:t>
             </a:fld>
             <a:endParaRPr lang="en-US" dirty="0"/>
           </a:p>
@@ -17478,7 +18354,7 @@
 </p:sld>
 </file>
 
-<file path=ppt/slides/slide8.xml><?xml version="1.0" encoding="utf-8"?>
+<file path=ppt/slides/slide9.xml><?xml version="1.0" encoding="utf-8"?>
 <p:sld xmlns:a="http://schemas.openxmlformats.org/drawingml/2006/main" xmlns:r="http://schemas.openxmlformats.org/officeDocument/2006/relationships" xmlns:p="http://schemas.openxmlformats.org/presentationml/2006/main">
   <p:cSld>
     <p:spTree>
@@ -17552,7 +18428,7 @@
           <a:p>
             <a:r>
               <a:rPr lang="en-US" dirty="0"/>
-              <a:t>Distributed, especially multi-cloud, applications</a:t>
+              <a:t>Distributed, especially multi-cloud, environments</a:t>
             </a:r>
           </a:p>
           <a:p>
@@ -17628,7 +18504,7 @@
             <a:fld id="{A44B02FA-DD2D-1844-AE35-8B2EAB0CF4EF}" type="slidenum">
               <a:rPr lang="en-US" smtClean="0"/>
               <a:pPr/>
-              <a:t>8</a:t>
+              <a:t>9</a:t>
             </a:fld>
             <a:endParaRPr lang="en-US" dirty="0"/>
           </a:p>
@@ -19190,7 +20066,10 @@
           <a:lstStyle/>
           <a:p>
             <a:pPr algn="ctr"/>
-            <a:endParaRPr lang="en-US"/>
+            <a:r>
+              <a:rPr lang="en-US" dirty="0"/>
+              <a:t>Service C</a:t>
+            </a:r>
           </a:p>
         </p:txBody>
       </p:sp>
@@ -19244,7 +20123,10 @@
           <a:lstStyle/>
           <a:p>
             <a:pPr algn="ctr"/>
-            <a:endParaRPr lang="en-US"/>
+            <a:r>
+              <a:rPr lang="en-US" dirty="0"/>
+              <a:t>Service B</a:t>
+            </a:r>
           </a:p>
         </p:txBody>
       </p:sp>
@@ -19298,7 +20180,10 @@
           <a:lstStyle/>
           <a:p>
             <a:pPr algn="ctr"/>
-            <a:endParaRPr lang="en-US"/>
+            <a:r>
+              <a:rPr lang="en-US" dirty="0"/>
+              <a:t>Service A</a:t>
+            </a:r>
           </a:p>
         </p:txBody>
       </p:sp>
@@ -19352,7 +20237,10 @@
           <a:lstStyle/>
           <a:p>
             <a:pPr algn="ctr"/>
-            <a:endParaRPr lang="en-US"/>
+            <a:r>
+              <a:rPr lang="en-US" dirty="0"/>
+              <a:t>Service C</a:t>
+            </a:r>
           </a:p>
         </p:txBody>
       </p:sp>
@@ -19406,7 +20294,10 @@
           <a:lstStyle/>
           <a:p>
             <a:pPr algn="ctr"/>
-            <a:endParaRPr lang="en-US"/>
+            <a:r>
+              <a:rPr lang="en-US" dirty="0"/>
+              <a:t>Service B</a:t>
+            </a:r>
           </a:p>
         </p:txBody>
       </p:sp>
@@ -19460,7 +20351,10 @@
           <a:lstStyle/>
           <a:p>
             <a:pPr algn="ctr"/>
-            <a:endParaRPr lang="en-US"/>
+            <a:r>
+              <a:rPr lang="en-US" dirty="0"/>
+              <a:t>Service A</a:t>
+            </a:r>
           </a:p>
         </p:txBody>
       </p:sp>
@@ -21265,203 +22159,6 @@
 </p:sld>
 </file>
 
-<file path=ppt/slides/slide9.xml><?xml version="1.0" encoding="utf-8"?>
-<p:sld xmlns:a="http://schemas.openxmlformats.org/drawingml/2006/main" xmlns:r="http://schemas.openxmlformats.org/officeDocument/2006/relationships" xmlns:p="http://schemas.openxmlformats.org/presentationml/2006/main">
-  <p:cSld>
-    <p:spTree>
-      <p:nvGrpSpPr>
-        <p:cNvPr id="1" name=""/>
-        <p:cNvGrpSpPr/>
-        <p:nvPr/>
-      </p:nvGrpSpPr>
-      <p:grpSpPr>
-        <a:xfrm>
-          <a:off x="0" y="0"/>
-          <a:ext cx="0" cy="0"/>
-          <a:chOff x="0" y="0"/>
-          <a:chExt cx="0" cy="0"/>
-        </a:xfrm>
-      </p:grpSpPr>
-      <p:sp>
-        <p:nvSpPr>
-          <p:cNvPr id="2" name="Title 1">
-            <a:extLst>
-              <a:ext uri="{FF2B5EF4-FFF2-40B4-BE49-F238E27FC236}">
-                <a16:creationId xmlns:a16="http://schemas.microsoft.com/office/drawing/2014/main" id="{6EF740B5-CBA6-E548-9EA6-5662EACB1D52}"/>
-              </a:ext>
-            </a:extLst>
-          </p:cNvPr>
-          <p:cNvSpPr>
-            <a:spLocks noGrp="1"/>
-          </p:cNvSpPr>
-          <p:nvPr>
-            <p:ph type="title"/>
-          </p:nvPr>
-        </p:nvSpPr>
-        <p:spPr/>
-        <p:txBody>
-          <a:bodyPr/>
-          <a:lstStyle/>
-          <a:p>
-            <a:r>
-              <a:rPr lang="en-US" dirty="0"/>
-              <a:t>The</a:t>
-            </a:r>
-            <a:r>
-              <a:rPr lang="en-US" baseline="0" dirty="0"/>
-              <a:t> Docker Architecture</a:t>
-            </a:r>
-            <a:endParaRPr lang="en-US" dirty="0"/>
-          </a:p>
-        </p:txBody>
-      </p:sp>
-      <p:sp>
-        <p:nvSpPr>
-          <p:cNvPr id="3" name="Content Placeholder 2">
-            <a:extLst>
-              <a:ext uri="{FF2B5EF4-FFF2-40B4-BE49-F238E27FC236}">
-                <a16:creationId xmlns:a16="http://schemas.microsoft.com/office/drawing/2014/main" id="{92BD0C8D-10FB-1549-A805-B147D845A1D5}"/>
-              </a:ext>
-            </a:extLst>
-          </p:cNvPr>
-          <p:cNvSpPr>
-            <a:spLocks noGrp="1"/>
-          </p:cNvSpPr>
-          <p:nvPr>
-            <p:ph idx="1"/>
-          </p:nvPr>
-        </p:nvSpPr>
-        <p:spPr/>
-        <p:txBody>
-          <a:bodyPr/>
-          <a:lstStyle/>
-          <a:p>
-            <a:r>
-              <a:rPr lang="en-US" dirty="0"/>
-              <a:t>Client, API,</a:t>
-            </a:r>
-            <a:r>
-              <a:rPr lang="en-US" baseline="0" dirty="0"/>
-              <a:t> daemon, repositories</a:t>
-            </a:r>
-            <a:endParaRPr lang="en-US" dirty="0"/>
-          </a:p>
-        </p:txBody>
-      </p:sp>
-      <p:sp>
-        <p:nvSpPr>
-          <p:cNvPr id="4" name="Date Placeholder 3">
-            <a:extLst>
-              <a:ext uri="{FF2B5EF4-FFF2-40B4-BE49-F238E27FC236}">
-                <a16:creationId xmlns:a16="http://schemas.microsoft.com/office/drawing/2014/main" id="{1D656B29-0CD4-2C4F-85C0-BFEFA8EB10B8}"/>
-              </a:ext>
-            </a:extLst>
-          </p:cNvPr>
-          <p:cNvSpPr>
-            <a:spLocks noGrp="1"/>
-          </p:cNvSpPr>
-          <p:nvPr>
-            <p:ph type="dt" sz="half" idx="10"/>
-          </p:nvPr>
-        </p:nvSpPr>
-        <p:spPr/>
-        <p:txBody>
-          <a:bodyPr/>
-          <a:lstStyle/>
-          <a:p>
-            <a:r>
-              <a:rPr lang="en-US"/>
-              <a:t>World Wide Technology ©</a:t>
-            </a:r>
-            <a:endParaRPr lang="en-US" dirty="0"/>
-          </a:p>
-        </p:txBody>
-      </p:sp>
-      <p:sp>
-        <p:nvSpPr>
-          <p:cNvPr id="5" name="Slide Number Placeholder 4">
-            <a:extLst>
-              <a:ext uri="{FF2B5EF4-FFF2-40B4-BE49-F238E27FC236}">
-                <a16:creationId xmlns:a16="http://schemas.microsoft.com/office/drawing/2014/main" id="{56AB9C4C-8731-6B42-B6FA-F9F1AD210224}"/>
-              </a:ext>
-            </a:extLst>
-          </p:cNvPr>
-          <p:cNvSpPr>
-            <a:spLocks noGrp="1"/>
-          </p:cNvSpPr>
-          <p:nvPr>
-            <p:ph type="sldNum" sz="quarter" idx="12"/>
-          </p:nvPr>
-        </p:nvSpPr>
-        <p:spPr/>
-        <p:txBody>
-          <a:bodyPr/>
-          <a:lstStyle/>
-          <a:p>
-            <a:fld id="{A44B02FA-DD2D-1844-AE35-8B2EAB0CF4EF}" type="slidenum">
-              <a:rPr lang="en-US" smtClean="0"/>
-              <a:pPr/>
-              <a:t>9</a:t>
-            </a:fld>
-            <a:endParaRPr lang="en-US" dirty="0"/>
-          </a:p>
-        </p:txBody>
-      </p:sp>
-      <p:pic>
-        <p:nvPicPr>
-          <p:cNvPr id="9" name="Picture 8">
-            <a:extLst>
-              <a:ext uri="{FF2B5EF4-FFF2-40B4-BE49-F238E27FC236}">
-                <a16:creationId xmlns:a16="http://schemas.microsoft.com/office/drawing/2014/main" id="{A21770C8-A08E-A447-AF62-395311F78396}"/>
-              </a:ext>
-            </a:extLst>
-          </p:cNvPr>
-          <p:cNvPicPr>
-            <a:picLocks noChangeAspect="1"/>
-          </p:cNvPicPr>
-          <p:nvPr/>
-        </p:nvPicPr>
-        <p:blipFill>
-          <a:blip r:embed="rId3"/>
-          <a:stretch>
-            <a:fillRect/>
-          </a:stretch>
-        </p:blipFill>
-        <p:spPr>
-          <a:xfrm>
-            <a:off x="5035136" y="2718193"/>
-            <a:ext cx="6611175" cy="3548464"/>
-          </a:xfrm>
-          <a:prstGeom prst="rect">
-            <a:avLst/>
-          </a:prstGeom>
-        </p:spPr>
-      </p:pic>
-    </p:spTree>
-    <p:extLst>
-      <p:ext uri="{BB962C8B-B14F-4D97-AF65-F5344CB8AC3E}">
-        <p14:creationId xmlns:p14="http://schemas.microsoft.com/office/powerpoint/2010/main" val="3511915314"/>
-      </p:ext>
-    </p:extLst>
-  </p:cSld>
-  <p:clrMapOvr>
-    <a:masterClrMapping/>
-  </p:clrMapOvr>
-  <mc:AlternateContent xmlns:mc="http://schemas.openxmlformats.org/markup-compatibility/2006" xmlns:p14="http://schemas.microsoft.com/office/powerpoint/2010/main">
-    <mc:Choice Requires="p14">
-      <p:transition spd="med" p14:dur="700">
-        <p:fade/>
-      </p:transition>
-    </mc:Choice>
-    <mc:Fallback xmlns="">
-      <p:transition spd="med">
-        <p:fade/>
-      </p:transition>
-    </mc:Fallback>
-  </mc:AlternateContent>
-</p:sld>
-</file>
-
 <file path=ppt/theme/theme1.xml><?xml version="1.0" encoding="utf-8"?>
 <a:theme xmlns:a="http://schemas.openxmlformats.org/drawingml/2006/main" name="Office Theme">
   <a:themeElements>

</xml_diff>

<commit_message>
Finished Docker Architecture animation and added placeholders to each slide for presenter notes
</commit_message>
<xml_diff>
--- a/docker-foundations.pptx
+++ b/docker-foundations.pptx
@@ -5,7 +5,7 @@
     <p:sldMasterId id="2147483660" r:id="rId1"/>
   </p:sldMasterIdLst>
   <p:notesMasterIdLst>
-    <p:notesMasterId r:id="rId25"/>
+    <p:notesMasterId r:id="rId27"/>
   </p:notesMasterIdLst>
   <p:sldIdLst>
     <p:sldId id="256" r:id="rId2"/>
@@ -31,6 +31,8 @@
     <p:sldId id="267" r:id="rId22"/>
     <p:sldId id="268" r:id="rId23"/>
     <p:sldId id="269" r:id="rId24"/>
+    <p:sldId id="279" r:id="rId25"/>
+    <p:sldId id="280" r:id="rId26"/>
   </p:sldIdLst>
   <p:sldSz cx="12192000" cy="6858000"/>
   <p:notesSz cx="6858000" cy="9144000"/>
@@ -230,7 +232,7 @@
           <a:p>
             <a:fld id="{966F6F5D-167E-1849-B841-EB0817BB385A}" type="datetimeFigureOut">
               <a:rPr lang="en-US" smtClean="0"/>
-              <a:t>2/14/20</a:t>
+              <a:t>2/15/20</a:t>
             </a:fld>
             <a:endParaRPr lang="en-US"/>
           </a:p>
@@ -541,7 +543,27 @@
           <a:bodyPr/>
           <a:lstStyle/>
           <a:p>
-            <a:endParaRPr lang="en-US"/>
+            <a:pPr marL="0" marR="0" lvl="0" indent="0" algn="l" defTabSz="914400" rtl="0" eaLnBrk="1" fontAlgn="auto" latinLnBrk="0" hangingPunct="1">
+              <a:lnSpc>
+                <a:spcPct val="100000"/>
+              </a:lnSpc>
+              <a:spcBef>
+                <a:spcPts val="0"/>
+              </a:spcBef>
+              <a:spcAft>
+                <a:spcPts val="0"/>
+              </a:spcAft>
+              <a:buClrTx/>
+              <a:buSzTx/>
+              <a:buFontTx/>
+              <a:buNone/>
+              <a:tabLst/>
+              <a:defRPr/>
+            </a:pPr>
+            <a:r>
+              <a:rPr lang="en-US" dirty="0"/>
+              <a:t>// TODO</a:t>
+            </a:r>
           </a:p>
         </p:txBody>
       </p:sp>
@@ -625,7 +647,103 @@
           <a:bodyPr/>
           <a:lstStyle/>
           <a:p>
-            <a:endParaRPr lang="en-US"/>
+            <a:pPr marL="171450" indent="-171450">
+              <a:buFont typeface="Arial" panose="020B0604020202020204" pitchFamily="34" charset="0"/>
+              <a:buChar char="•"/>
+            </a:pPr>
+            <a:r>
+              <a:rPr lang="en-US" dirty="0"/>
+              <a:t>Standardized developer environments – standardize development tools, platforms, dependencies, etc.</a:t>
+            </a:r>
+          </a:p>
+          <a:p>
+            <a:pPr marL="171450" marR="0" lvl="0" indent="-171450" algn="l" defTabSz="914400" rtl="0" eaLnBrk="1" fontAlgn="auto" latinLnBrk="0" hangingPunct="1">
+              <a:lnSpc>
+                <a:spcPct val="100000"/>
+              </a:lnSpc>
+              <a:spcBef>
+                <a:spcPts val="0"/>
+              </a:spcBef>
+              <a:spcAft>
+                <a:spcPts val="0"/>
+              </a:spcAft>
+              <a:buClrTx/>
+              <a:buSzTx/>
+              <a:buFont typeface="Arial" panose="020B0604020202020204" pitchFamily="34" charset="0"/>
+              <a:buChar char="•"/>
+              <a:tabLst/>
+              <a:defRPr/>
+            </a:pPr>
+            <a:r>
+              <a:rPr lang="en-US" dirty="0"/>
+              <a:t>Distributed, especially multi-cloud – containers are highly portable without requiring re-platforming</a:t>
+            </a:r>
+          </a:p>
+          <a:p>
+            <a:pPr marL="171450" marR="0" lvl="0" indent="-171450" algn="l" defTabSz="914400" rtl="0" eaLnBrk="1" fontAlgn="auto" latinLnBrk="0" hangingPunct="1">
+              <a:lnSpc>
+                <a:spcPct val="100000"/>
+              </a:lnSpc>
+              <a:spcBef>
+                <a:spcPts val="0"/>
+              </a:spcBef>
+              <a:spcAft>
+                <a:spcPts val="0"/>
+              </a:spcAft>
+              <a:buClrTx/>
+              <a:buSzTx/>
+              <a:buFont typeface="Arial" panose="020B0604020202020204" pitchFamily="34" charset="0"/>
+              <a:buChar char="•"/>
+              <a:tabLst/>
+              <a:defRPr/>
+            </a:pPr>
+            <a:r>
+              <a:rPr lang="en-US" dirty="0"/>
+              <a:t>Micro-services architectures – isolate processes/services, each component of an application; if one service fails, the application can still mostly function</a:t>
+            </a:r>
+          </a:p>
+          <a:p>
+            <a:pPr marL="171450" marR="0" lvl="0" indent="-171450" algn="l" defTabSz="914400" rtl="0" eaLnBrk="1" fontAlgn="auto" latinLnBrk="0" hangingPunct="1">
+              <a:lnSpc>
+                <a:spcPct val="100000"/>
+              </a:lnSpc>
+              <a:spcBef>
+                <a:spcPts val="0"/>
+              </a:spcBef>
+              <a:spcAft>
+                <a:spcPts val="0"/>
+              </a:spcAft>
+              <a:buClrTx/>
+              <a:buSzTx/>
+              <a:buFont typeface="Arial" panose="020B0604020202020204" pitchFamily="34" charset="0"/>
+              <a:buChar char="•"/>
+              <a:tabLst/>
+              <a:defRPr/>
+            </a:pPr>
+            <a:r>
+              <a:rPr lang="en-US" dirty="0"/>
+              <a:t>Cross-OS tool usage – download/install/run a Linux tool on Windows or macOS platforms, within a Docker container</a:t>
+            </a:r>
+          </a:p>
+          <a:p>
+            <a:pPr marL="0" marR="0" lvl="0" indent="0" algn="l" defTabSz="914400" rtl="0" eaLnBrk="1" fontAlgn="auto" latinLnBrk="0" hangingPunct="1">
+              <a:lnSpc>
+                <a:spcPct val="100000"/>
+              </a:lnSpc>
+              <a:spcBef>
+                <a:spcPts val="0"/>
+              </a:spcBef>
+              <a:spcAft>
+                <a:spcPts val="0"/>
+              </a:spcAft>
+              <a:buClrTx/>
+              <a:buSzTx/>
+              <a:buFontTx/>
+              <a:buNone/>
+              <a:tabLst/>
+              <a:defRPr/>
+            </a:pPr>
+            <a:endParaRPr lang="en-US" dirty="0"/>
           </a:p>
         </p:txBody>
       </p:sp>
@@ -646,7 +764,7 @@
           <a:p>
             <a:fld id="{020CF8D1-BA82-5045-ACF9-1AA42AD6A519}" type="slidenum">
               <a:rPr lang="en-US" smtClean="0"/>
-              <a:t>14</a:t>
+              <a:t>10</a:t>
             </a:fld>
             <a:endParaRPr lang="en-US"/>
           </a:p>
@@ -655,7 +773,7 @@
     </p:spTree>
     <p:extLst>
       <p:ext uri="{BB962C8B-B14F-4D97-AF65-F5344CB8AC3E}">
-        <p14:creationId xmlns:p14="http://schemas.microsoft.com/office/powerpoint/2010/main" val="2804571794"/>
+        <p14:creationId xmlns:p14="http://schemas.microsoft.com/office/powerpoint/2010/main" val="1749289504"/>
       </p:ext>
     </p:extLst>
   </p:cSld>
@@ -709,7 +827,27 @@
           <a:bodyPr/>
           <a:lstStyle/>
           <a:p>
-            <a:endParaRPr lang="en-US"/>
+            <a:pPr marL="0" marR="0" lvl="0" indent="0" algn="l" defTabSz="914400" rtl="0" eaLnBrk="1" fontAlgn="auto" latinLnBrk="0" hangingPunct="1">
+              <a:lnSpc>
+                <a:spcPct val="100000"/>
+              </a:lnSpc>
+              <a:spcBef>
+                <a:spcPts val="0"/>
+              </a:spcBef>
+              <a:spcAft>
+                <a:spcPts val="0"/>
+              </a:spcAft>
+              <a:buClrTx/>
+              <a:buSzTx/>
+              <a:buFontTx/>
+              <a:buNone/>
+              <a:tabLst/>
+              <a:defRPr/>
+            </a:pPr>
+            <a:r>
+              <a:rPr lang="en-US" dirty="0"/>
+              <a:t>// TODO</a:t>
+            </a:r>
           </a:p>
         </p:txBody>
       </p:sp>
@@ -730,7 +868,7 @@
           <a:p>
             <a:fld id="{020CF8D1-BA82-5045-ACF9-1AA42AD6A519}" type="slidenum">
               <a:rPr lang="en-US" smtClean="0"/>
-              <a:t>15</a:t>
+              <a:t>11</a:t>
             </a:fld>
             <a:endParaRPr lang="en-US"/>
           </a:p>
@@ -739,7 +877,7 @@
     </p:spTree>
     <p:extLst>
       <p:ext uri="{BB962C8B-B14F-4D97-AF65-F5344CB8AC3E}">
-        <p14:creationId xmlns:p14="http://schemas.microsoft.com/office/powerpoint/2010/main" val="3035932777"/>
+        <p14:creationId xmlns:p14="http://schemas.microsoft.com/office/powerpoint/2010/main" val="2649993546"/>
       </p:ext>
     </p:extLst>
   </p:cSld>
@@ -793,7 +931,27 @@
           <a:bodyPr/>
           <a:lstStyle/>
           <a:p>
-            <a:endParaRPr lang="en-US"/>
+            <a:pPr marL="0" marR="0" lvl="0" indent="0" algn="l" defTabSz="914400" rtl="0" eaLnBrk="1" fontAlgn="auto" latinLnBrk="0" hangingPunct="1">
+              <a:lnSpc>
+                <a:spcPct val="100000"/>
+              </a:lnSpc>
+              <a:spcBef>
+                <a:spcPts val="0"/>
+              </a:spcBef>
+              <a:spcAft>
+                <a:spcPts val="0"/>
+              </a:spcAft>
+              <a:buClrTx/>
+              <a:buSzTx/>
+              <a:buFontTx/>
+              <a:buNone/>
+              <a:tabLst/>
+              <a:defRPr/>
+            </a:pPr>
+            <a:r>
+              <a:rPr lang="en-US" dirty="0"/>
+              <a:t>// TODO</a:t>
+            </a:r>
           </a:p>
         </p:txBody>
       </p:sp>
@@ -814,7 +972,7 @@
           <a:p>
             <a:fld id="{020CF8D1-BA82-5045-ACF9-1AA42AD6A519}" type="slidenum">
               <a:rPr lang="en-US" smtClean="0"/>
-              <a:t>16</a:t>
+              <a:t>12</a:t>
             </a:fld>
             <a:endParaRPr lang="en-US"/>
           </a:p>
@@ -823,7 +981,7 @@
     </p:spTree>
     <p:extLst>
       <p:ext uri="{BB962C8B-B14F-4D97-AF65-F5344CB8AC3E}">
-        <p14:creationId xmlns:p14="http://schemas.microsoft.com/office/powerpoint/2010/main" val="3403845459"/>
+        <p14:creationId xmlns:p14="http://schemas.microsoft.com/office/powerpoint/2010/main" val="1037279643"/>
       </p:ext>
     </p:extLst>
   </p:cSld>
@@ -877,7 +1035,27 @@
           <a:bodyPr/>
           <a:lstStyle/>
           <a:p>
-            <a:endParaRPr lang="en-US"/>
+            <a:pPr marL="0" marR="0" lvl="0" indent="0" algn="l" defTabSz="914400" rtl="0" eaLnBrk="1" fontAlgn="auto" latinLnBrk="0" hangingPunct="1">
+              <a:lnSpc>
+                <a:spcPct val="100000"/>
+              </a:lnSpc>
+              <a:spcBef>
+                <a:spcPts val="0"/>
+              </a:spcBef>
+              <a:spcAft>
+                <a:spcPts val="0"/>
+              </a:spcAft>
+              <a:buClrTx/>
+              <a:buSzTx/>
+              <a:buFontTx/>
+              <a:buNone/>
+              <a:tabLst/>
+              <a:defRPr/>
+            </a:pPr>
+            <a:r>
+              <a:rPr lang="en-US" dirty="0"/>
+              <a:t>// TODO</a:t>
+            </a:r>
           </a:p>
         </p:txBody>
       </p:sp>
@@ -898,7 +1076,7 @@
           <a:p>
             <a:fld id="{020CF8D1-BA82-5045-ACF9-1AA42AD6A519}" type="slidenum">
               <a:rPr lang="en-US" smtClean="0"/>
-              <a:t>17</a:t>
+              <a:t>13</a:t>
             </a:fld>
             <a:endParaRPr lang="en-US"/>
           </a:p>
@@ -907,7 +1085,7 @@
     </p:spTree>
     <p:extLst>
       <p:ext uri="{BB962C8B-B14F-4D97-AF65-F5344CB8AC3E}">
-        <p14:creationId xmlns:p14="http://schemas.microsoft.com/office/powerpoint/2010/main" val="2097880621"/>
+        <p14:creationId xmlns:p14="http://schemas.microsoft.com/office/powerpoint/2010/main" val="3139730376"/>
       </p:ext>
     </p:extLst>
   </p:cSld>
@@ -961,7 +1139,10 @@
           <a:bodyPr/>
           <a:lstStyle/>
           <a:p>
-            <a:endParaRPr lang="en-US"/>
+            <a:r>
+              <a:rPr lang="en-US" dirty="0"/>
+              <a:t>// TODO</a:t>
+            </a:r>
           </a:p>
         </p:txBody>
       </p:sp>
@@ -982,7 +1163,7 @@
           <a:p>
             <a:fld id="{020CF8D1-BA82-5045-ACF9-1AA42AD6A519}" type="slidenum">
               <a:rPr lang="en-US" smtClean="0"/>
-              <a:t>18</a:t>
+              <a:t>14</a:t>
             </a:fld>
             <a:endParaRPr lang="en-US"/>
           </a:p>
@@ -991,7 +1172,7 @@
     </p:spTree>
     <p:extLst>
       <p:ext uri="{BB962C8B-B14F-4D97-AF65-F5344CB8AC3E}">
-        <p14:creationId xmlns:p14="http://schemas.microsoft.com/office/powerpoint/2010/main" val="1146841283"/>
+        <p14:creationId xmlns:p14="http://schemas.microsoft.com/office/powerpoint/2010/main" val="2804571794"/>
       </p:ext>
     </p:extLst>
   </p:cSld>
@@ -1045,7 +1226,10 @@
           <a:bodyPr/>
           <a:lstStyle/>
           <a:p>
-            <a:endParaRPr lang="en-US"/>
+            <a:r>
+              <a:rPr lang="en-US" dirty="0"/>
+              <a:t>// TODO</a:t>
+            </a:r>
           </a:p>
         </p:txBody>
       </p:sp>
@@ -1066,7 +1250,7 @@
           <a:p>
             <a:fld id="{020CF8D1-BA82-5045-ACF9-1AA42AD6A519}" type="slidenum">
               <a:rPr lang="en-US" smtClean="0"/>
-              <a:t>19</a:t>
+              <a:t>15</a:t>
             </a:fld>
             <a:endParaRPr lang="en-US"/>
           </a:p>
@@ -1075,7 +1259,7 @@
     </p:spTree>
     <p:extLst>
       <p:ext uri="{BB962C8B-B14F-4D97-AF65-F5344CB8AC3E}">
-        <p14:creationId xmlns:p14="http://schemas.microsoft.com/office/powerpoint/2010/main" val="1408554522"/>
+        <p14:creationId xmlns:p14="http://schemas.microsoft.com/office/powerpoint/2010/main" val="3035932777"/>
       </p:ext>
     </p:extLst>
   </p:cSld>
@@ -1129,7 +1313,10 @@
           <a:bodyPr/>
           <a:lstStyle/>
           <a:p>
-            <a:endParaRPr lang="en-US"/>
+            <a:r>
+              <a:rPr lang="en-US" dirty="0"/>
+              <a:t>// TODO</a:t>
+            </a:r>
           </a:p>
         </p:txBody>
       </p:sp>
@@ -1150,7 +1337,7 @@
           <a:p>
             <a:fld id="{020CF8D1-BA82-5045-ACF9-1AA42AD6A519}" type="slidenum">
               <a:rPr lang="en-US" smtClean="0"/>
-              <a:t>20</a:t>
+              <a:t>16</a:t>
             </a:fld>
             <a:endParaRPr lang="en-US"/>
           </a:p>
@@ -1159,7 +1346,7 @@
     </p:spTree>
     <p:extLst>
       <p:ext uri="{BB962C8B-B14F-4D97-AF65-F5344CB8AC3E}">
-        <p14:creationId xmlns:p14="http://schemas.microsoft.com/office/powerpoint/2010/main" val="2627609559"/>
+        <p14:creationId xmlns:p14="http://schemas.microsoft.com/office/powerpoint/2010/main" val="3403845459"/>
       </p:ext>
     </p:extLst>
   </p:cSld>
@@ -1213,7 +1400,10 @@
           <a:bodyPr/>
           <a:lstStyle/>
           <a:p>
-            <a:endParaRPr lang="en-US"/>
+            <a:r>
+              <a:rPr lang="en-US" dirty="0"/>
+              <a:t>// TODO</a:t>
+            </a:r>
           </a:p>
         </p:txBody>
       </p:sp>
@@ -1234,7 +1424,7 @@
           <a:p>
             <a:fld id="{020CF8D1-BA82-5045-ACF9-1AA42AD6A519}" type="slidenum">
               <a:rPr lang="en-US" smtClean="0"/>
-              <a:t>21</a:t>
+              <a:t>17</a:t>
             </a:fld>
             <a:endParaRPr lang="en-US"/>
           </a:p>
@@ -1243,7 +1433,7 @@
     </p:spTree>
     <p:extLst>
       <p:ext uri="{BB962C8B-B14F-4D97-AF65-F5344CB8AC3E}">
-        <p14:creationId xmlns:p14="http://schemas.microsoft.com/office/powerpoint/2010/main" val="2425256119"/>
+        <p14:creationId xmlns:p14="http://schemas.microsoft.com/office/powerpoint/2010/main" val="2097880621"/>
       </p:ext>
     </p:extLst>
   </p:cSld>
@@ -1297,7 +1487,10 @@
           <a:bodyPr/>
           <a:lstStyle/>
           <a:p>
-            <a:endParaRPr lang="en-US"/>
+            <a:r>
+              <a:rPr lang="en-US" dirty="0"/>
+              <a:t>// TODO</a:t>
+            </a:r>
           </a:p>
         </p:txBody>
       </p:sp>
@@ -1318,7 +1511,7 @@
           <a:p>
             <a:fld id="{020CF8D1-BA82-5045-ACF9-1AA42AD6A519}" type="slidenum">
               <a:rPr lang="en-US" smtClean="0"/>
-              <a:t>22</a:t>
+              <a:t>18</a:t>
             </a:fld>
             <a:endParaRPr lang="en-US"/>
           </a:p>
@@ -1327,7 +1520,7 @@
     </p:spTree>
     <p:extLst>
       <p:ext uri="{BB962C8B-B14F-4D97-AF65-F5344CB8AC3E}">
-        <p14:creationId xmlns:p14="http://schemas.microsoft.com/office/powerpoint/2010/main" val="3906023703"/>
+        <p14:creationId xmlns:p14="http://schemas.microsoft.com/office/powerpoint/2010/main" val="1146841283"/>
       </p:ext>
     </p:extLst>
   </p:cSld>
@@ -1381,7 +1574,10 @@
           <a:bodyPr/>
           <a:lstStyle/>
           <a:p>
-            <a:endParaRPr lang="en-US"/>
+            <a:r>
+              <a:rPr lang="en-US" dirty="0"/>
+              <a:t>// TODO</a:t>
+            </a:r>
           </a:p>
         </p:txBody>
       </p:sp>
@@ -1402,7 +1598,7 @@
           <a:p>
             <a:fld id="{020CF8D1-BA82-5045-ACF9-1AA42AD6A519}" type="slidenum">
               <a:rPr lang="en-US" smtClean="0"/>
-              <a:t>23</a:t>
+              <a:t>19</a:t>
             </a:fld>
             <a:endParaRPr lang="en-US"/>
           </a:p>
@@ -1411,7 +1607,7 @@
     </p:spTree>
     <p:extLst>
       <p:ext uri="{BB962C8B-B14F-4D97-AF65-F5344CB8AC3E}">
-        <p14:creationId xmlns:p14="http://schemas.microsoft.com/office/powerpoint/2010/main" val="1289901690"/>
+        <p14:creationId xmlns:p14="http://schemas.microsoft.com/office/powerpoint/2010/main" val="1408554522"/>
       </p:ext>
     </p:extLst>
   </p:cSld>
@@ -1465,7 +1661,10 @@
           <a:bodyPr/>
           <a:lstStyle/>
           <a:p>
-            <a:endParaRPr lang="en-US" dirty="0"/>
+            <a:r>
+              <a:rPr lang="en-US" dirty="0"/>
+              <a:t>// TODO</a:t>
+            </a:r>
           </a:p>
         </p:txBody>
       </p:sp>
@@ -1486,7 +1685,7 @@
           <a:p>
             <a:fld id="{020CF8D1-BA82-5045-ACF9-1AA42AD6A519}" type="slidenum">
               <a:rPr lang="en-US" smtClean="0"/>
-              <a:t>3</a:t>
+              <a:t>2</a:t>
             </a:fld>
             <a:endParaRPr lang="en-US"/>
           </a:p>
@@ -1495,7 +1694,459 @@
     </p:spTree>
     <p:extLst>
       <p:ext uri="{BB962C8B-B14F-4D97-AF65-F5344CB8AC3E}">
-        <p14:creationId xmlns:p14="http://schemas.microsoft.com/office/powerpoint/2010/main" val="872969698"/>
+        <p14:creationId xmlns:p14="http://schemas.microsoft.com/office/powerpoint/2010/main" val="61558101"/>
+      </p:ext>
+    </p:extLst>
+  </p:cSld>
+  <p:clrMapOvr>
+    <a:masterClrMapping/>
+  </p:clrMapOvr>
+</p:notes>
+</file>
+
+<file path=ppt/notesSlides/notesSlide20.xml><?xml version="1.0" encoding="utf-8"?>
+<p:notes xmlns:a="http://schemas.openxmlformats.org/drawingml/2006/main" xmlns:r="http://schemas.openxmlformats.org/officeDocument/2006/relationships" xmlns:p="http://schemas.openxmlformats.org/presentationml/2006/main">
+  <p:cSld>
+    <p:spTree>
+      <p:nvGrpSpPr>
+        <p:cNvPr id="1" name=""/>
+        <p:cNvGrpSpPr/>
+        <p:nvPr/>
+      </p:nvGrpSpPr>
+      <p:grpSpPr>
+        <a:xfrm>
+          <a:off x="0" y="0"/>
+          <a:ext cx="0" cy="0"/>
+          <a:chOff x="0" y="0"/>
+          <a:chExt cx="0" cy="0"/>
+        </a:xfrm>
+      </p:grpSpPr>
+      <p:sp>
+        <p:nvSpPr>
+          <p:cNvPr id="2" name="Slide Image Placeholder 1"/>
+          <p:cNvSpPr>
+            <a:spLocks noGrp="1" noRot="1" noChangeAspect="1"/>
+          </p:cNvSpPr>
+          <p:nvPr>
+            <p:ph type="sldImg"/>
+          </p:nvPr>
+        </p:nvSpPr>
+        <p:spPr/>
+      </p:sp>
+      <p:sp>
+        <p:nvSpPr>
+          <p:cNvPr id="3" name="Notes Placeholder 2"/>
+          <p:cNvSpPr>
+            <a:spLocks noGrp="1"/>
+          </p:cNvSpPr>
+          <p:nvPr>
+            <p:ph type="body" idx="1"/>
+          </p:nvPr>
+        </p:nvSpPr>
+        <p:spPr/>
+        <p:txBody>
+          <a:bodyPr/>
+          <a:lstStyle/>
+          <a:p>
+            <a:r>
+              <a:rPr lang="en-US" dirty="0"/>
+              <a:t>// TODO</a:t>
+            </a:r>
+          </a:p>
+        </p:txBody>
+      </p:sp>
+      <p:sp>
+        <p:nvSpPr>
+          <p:cNvPr id="4" name="Slide Number Placeholder 3"/>
+          <p:cNvSpPr>
+            <a:spLocks noGrp="1"/>
+          </p:cNvSpPr>
+          <p:nvPr>
+            <p:ph type="sldNum" sz="quarter" idx="5"/>
+          </p:nvPr>
+        </p:nvSpPr>
+        <p:spPr/>
+        <p:txBody>
+          <a:bodyPr/>
+          <a:lstStyle/>
+          <a:p>
+            <a:fld id="{020CF8D1-BA82-5045-ACF9-1AA42AD6A519}" type="slidenum">
+              <a:rPr lang="en-US" smtClean="0"/>
+              <a:t>20</a:t>
+            </a:fld>
+            <a:endParaRPr lang="en-US"/>
+          </a:p>
+        </p:txBody>
+      </p:sp>
+    </p:spTree>
+    <p:extLst>
+      <p:ext uri="{BB962C8B-B14F-4D97-AF65-F5344CB8AC3E}">
+        <p14:creationId xmlns:p14="http://schemas.microsoft.com/office/powerpoint/2010/main" val="2627609559"/>
+      </p:ext>
+    </p:extLst>
+  </p:cSld>
+  <p:clrMapOvr>
+    <a:masterClrMapping/>
+  </p:clrMapOvr>
+</p:notes>
+</file>
+
+<file path=ppt/notesSlides/notesSlide21.xml><?xml version="1.0" encoding="utf-8"?>
+<p:notes xmlns:a="http://schemas.openxmlformats.org/drawingml/2006/main" xmlns:r="http://schemas.openxmlformats.org/officeDocument/2006/relationships" xmlns:p="http://schemas.openxmlformats.org/presentationml/2006/main">
+  <p:cSld>
+    <p:spTree>
+      <p:nvGrpSpPr>
+        <p:cNvPr id="1" name=""/>
+        <p:cNvGrpSpPr/>
+        <p:nvPr/>
+      </p:nvGrpSpPr>
+      <p:grpSpPr>
+        <a:xfrm>
+          <a:off x="0" y="0"/>
+          <a:ext cx="0" cy="0"/>
+          <a:chOff x="0" y="0"/>
+          <a:chExt cx="0" cy="0"/>
+        </a:xfrm>
+      </p:grpSpPr>
+      <p:sp>
+        <p:nvSpPr>
+          <p:cNvPr id="2" name="Slide Image Placeholder 1"/>
+          <p:cNvSpPr>
+            <a:spLocks noGrp="1" noRot="1" noChangeAspect="1"/>
+          </p:cNvSpPr>
+          <p:nvPr>
+            <p:ph type="sldImg"/>
+          </p:nvPr>
+        </p:nvSpPr>
+        <p:spPr/>
+      </p:sp>
+      <p:sp>
+        <p:nvSpPr>
+          <p:cNvPr id="3" name="Notes Placeholder 2"/>
+          <p:cNvSpPr>
+            <a:spLocks noGrp="1"/>
+          </p:cNvSpPr>
+          <p:nvPr>
+            <p:ph type="body" idx="1"/>
+          </p:nvPr>
+        </p:nvSpPr>
+        <p:spPr/>
+        <p:txBody>
+          <a:bodyPr/>
+          <a:lstStyle/>
+          <a:p>
+            <a:r>
+              <a:rPr lang="en-US" dirty="0"/>
+              <a:t>// TODO</a:t>
+            </a:r>
+          </a:p>
+        </p:txBody>
+      </p:sp>
+      <p:sp>
+        <p:nvSpPr>
+          <p:cNvPr id="4" name="Slide Number Placeholder 3"/>
+          <p:cNvSpPr>
+            <a:spLocks noGrp="1"/>
+          </p:cNvSpPr>
+          <p:nvPr>
+            <p:ph type="sldNum" sz="quarter" idx="5"/>
+          </p:nvPr>
+        </p:nvSpPr>
+        <p:spPr/>
+        <p:txBody>
+          <a:bodyPr/>
+          <a:lstStyle/>
+          <a:p>
+            <a:fld id="{020CF8D1-BA82-5045-ACF9-1AA42AD6A519}" type="slidenum">
+              <a:rPr lang="en-US" smtClean="0"/>
+              <a:t>21</a:t>
+            </a:fld>
+            <a:endParaRPr lang="en-US"/>
+          </a:p>
+        </p:txBody>
+      </p:sp>
+    </p:spTree>
+    <p:extLst>
+      <p:ext uri="{BB962C8B-B14F-4D97-AF65-F5344CB8AC3E}">
+        <p14:creationId xmlns:p14="http://schemas.microsoft.com/office/powerpoint/2010/main" val="2425256119"/>
+      </p:ext>
+    </p:extLst>
+  </p:cSld>
+  <p:clrMapOvr>
+    <a:masterClrMapping/>
+  </p:clrMapOvr>
+</p:notes>
+</file>
+
+<file path=ppt/notesSlides/notesSlide22.xml><?xml version="1.0" encoding="utf-8"?>
+<p:notes xmlns:a="http://schemas.openxmlformats.org/drawingml/2006/main" xmlns:r="http://schemas.openxmlformats.org/officeDocument/2006/relationships" xmlns:p="http://schemas.openxmlformats.org/presentationml/2006/main">
+  <p:cSld>
+    <p:spTree>
+      <p:nvGrpSpPr>
+        <p:cNvPr id="1" name=""/>
+        <p:cNvGrpSpPr/>
+        <p:nvPr/>
+      </p:nvGrpSpPr>
+      <p:grpSpPr>
+        <a:xfrm>
+          <a:off x="0" y="0"/>
+          <a:ext cx="0" cy="0"/>
+          <a:chOff x="0" y="0"/>
+          <a:chExt cx="0" cy="0"/>
+        </a:xfrm>
+      </p:grpSpPr>
+      <p:sp>
+        <p:nvSpPr>
+          <p:cNvPr id="2" name="Slide Image Placeholder 1"/>
+          <p:cNvSpPr>
+            <a:spLocks noGrp="1" noRot="1" noChangeAspect="1"/>
+          </p:cNvSpPr>
+          <p:nvPr>
+            <p:ph type="sldImg"/>
+          </p:nvPr>
+        </p:nvSpPr>
+        <p:spPr/>
+      </p:sp>
+      <p:sp>
+        <p:nvSpPr>
+          <p:cNvPr id="3" name="Notes Placeholder 2"/>
+          <p:cNvSpPr>
+            <a:spLocks noGrp="1"/>
+          </p:cNvSpPr>
+          <p:nvPr>
+            <p:ph type="body" idx="1"/>
+          </p:nvPr>
+        </p:nvSpPr>
+        <p:spPr/>
+        <p:txBody>
+          <a:bodyPr/>
+          <a:lstStyle/>
+          <a:p>
+            <a:r>
+              <a:rPr lang="en-US" dirty="0"/>
+              <a:t>// TODO</a:t>
+            </a:r>
+          </a:p>
+        </p:txBody>
+      </p:sp>
+      <p:sp>
+        <p:nvSpPr>
+          <p:cNvPr id="4" name="Slide Number Placeholder 3"/>
+          <p:cNvSpPr>
+            <a:spLocks noGrp="1"/>
+          </p:cNvSpPr>
+          <p:nvPr>
+            <p:ph type="sldNum" sz="quarter" idx="5"/>
+          </p:nvPr>
+        </p:nvSpPr>
+        <p:spPr/>
+        <p:txBody>
+          <a:bodyPr/>
+          <a:lstStyle/>
+          <a:p>
+            <a:fld id="{020CF8D1-BA82-5045-ACF9-1AA42AD6A519}" type="slidenum">
+              <a:rPr lang="en-US" smtClean="0"/>
+              <a:t>22</a:t>
+            </a:fld>
+            <a:endParaRPr lang="en-US"/>
+          </a:p>
+        </p:txBody>
+      </p:sp>
+    </p:spTree>
+    <p:extLst>
+      <p:ext uri="{BB962C8B-B14F-4D97-AF65-F5344CB8AC3E}">
+        <p14:creationId xmlns:p14="http://schemas.microsoft.com/office/powerpoint/2010/main" val="3906023703"/>
+      </p:ext>
+    </p:extLst>
+  </p:cSld>
+  <p:clrMapOvr>
+    <a:masterClrMapping/>
+  </p:clrMapOvr>
+</p:notes>
+</file>
+
+<file path=ppt/notesSlides/notesSlide23.xml><?xml version="1.0" encoding="utf-8"?>
+<p:notes xmlns:a="http://schemas.openxmlformats.org/drawingml/2006/main" xmlns:r="http://schemas.openxmlformats.org/officeDocument/2006/relationships" xmlns:p="http://schemas.openxmlformats.org/presentationml/2006/main">
+  <p:cSld>
+    <p:spTree>
+      <p:nvGrpSpPr>
+        <p:cNvPr id="1" name=""/>
+        <p:cNvGrpSpPr/>
+        <p:nvPr/>
+      </p:nvGrpSpPr>
+      <p:grpSpPr>
+        <a:xfrm>
+          <a:off x="0" y="0"/>
+          <a:ext cx="0" cy="0"/>
+          <a:chOff x="0" y="0"/>
+          <a:chExt cx="0" cy="0"/>
+        </a:xfrm>
+      </p:grpSpPr>
+      <p:sp>
+        <p:nvSpPr>
+          <p:cNvPr id="2" name="Slide Image Placeholder 1"/>
+          <p:cNvSpPr>
+            <a:spLocks noGrp="1" noRot="1" noChangeAspect="1"/>
+          </p:cNvSpPr>
+          <p:nvPr>
+            <p:ph type="sldImg"/>
+          </p:nvPr>
+        </p:nvSpPr>
+        <p:spPr/>
+      </p:sp>
+      <p:sp>
+        <p:nvSpPr>
+          <p:cNvPr id="3" name="Notes Placeholder 2"/>
+          <p:cNvSpPr>
+            <a:spLocks noGrp="1"/>
+          </p:cNvSpPr>
+          <p:nvPr>
+            <p:ph type="body" idx="1"/>
+          </p:nvPr>
+        </p:nvSpPr>
+        <p:spPr/>
+        <p:txBody>
+          <a:bodyPr/>
+          <a:lstStyle/>
+          <a:p>
+            <a:r>
+              <a:rPr lang="en-US" dirty="0"/>
+              <a:t>// TODO</a:t>
+            </a:r>
+          </a:p>
+        </p:txBody>
+      </p:sp>
+      <p:sp>
+        <p:nvSpPr>
+          <p:cNvPr id="4" name="Slide Number Placeholder 3"/>
+          <p:cNvSpPr>
+            <a:spLocks noGrp="1"/>
+          </p:cNvSpPr>
+          <p:nvPr>
+            <p:ph type="sldNum" sz="quarter" idx="5"/>
+          </p:nvPr>
+        </p:nvSpPr>
+        <p:spPr/>
+        <p:txBody>
+          <a:bodyPr/>
+          <a:lstStyle/>
+          <a:p>
+            <a:fld id="{020CF8D1-BA82-5045-ACF9-1AA42AD6A519}" type="slidenum">
+              <a:rPr lang="en-US" smtClean="0"/>
+              <a:t>23</a:t>
+            </a:fld>
+            <a:endParaRPr lang="en-US"/>
+          </a:p>
+        </p:txBody>
+      </p:sp>
+    </p:spTree>
+    <p:extLst>
+      <p:ext uri="{BB962C8B-B14F-4D97-AF65-F5344CB8AC3E}">
+        <p14:creationId xmlns:p14="http://schemas.microsoft.com/office/powerpoint/2010/main" val="1289901690"/>
+      </p:ext>
+    </p:extLst>
+  </p:cSld>
+  <p:clrMapOvr>
+    <a:masterClrMapping/>
+  </p:clrMapOvr>
+</p:notes>
+</file>
+
+<file path=ppt/notesSlides/notesSlide24.xml><?xml version="1.0" encoding="utf-8"?>
+<p:notes xmlns:a="http://schemas.openxmlformats.org/drawingml/2006/main" xmlns:r="http://schemas.openxmlformats.org/officeDocument/2006/relationships" xmlns:p="http://schemas.openxmlformats.org/presentationml/2006/main">
+  <p:cSld>
+    <p:spTree>
+      <p:nvGrpSpPr>
+        <p:cNvPr id="1" name=""/>
+        <p:cNvGrpSpPr/>
+        <p:nvPr/>
+      </p:nvGrpSpPr>
+      <p:grpSpPr>
+        <a:xfrm>
+          <a:off x="0" y="0"/>
+          <a:ext cx="0" cy="0"/>
+          <a:chOff x="0" y="0"/>
+          <a:chExt cx="0" cy="0"/>
+        </a:xfrm>
+      </p:grpSpPr>
+      <p:sp>
+        <p:nvSpPr>
+          <p:cNvPr id="2" name="Slide Image Placeholder 1"/>
+          <p:cNvSpPr>
+            <a:spLocks noGrp="1" noRot="1" noChangeAspect="1"/>
+          </p:cNvSpPr>
+          <p:nvPr>
+            <p:ph type="sldImg"/>
+          </p:nvPr>
+        </p:nvSpPr>
+        <p:spPr/>
+      </p:sp>
+      <p:sp>
+        <p:nvSpPr>
+          <p:cNvPr id="3" name="Notes Placeholder 2"/>
+          <p:cNvSpPr>
+            <a:spLocks noGrp="1"/>
+          </p:cNvSpPr>
+          <p:nvPr>
+            <p:ph type="body" idx="1"/>
+          </p:nvPr>
+        </p:nvSpPr>
+        <p:spPr/>
+        <p:txBody>
+          <a:bodyPr/>
+          <a:lstStyle/>
+          <a:p>
+            <a:pPr marL="0" marR="0" lvl="0" indent="0" algn="l" defTabSz="914400" rtl="0" eaLnBrk="1" fontAlgn="auto" latinLnBrk="0" hangingPunct="1">
+              <a:lnSpc>
+                <a:spcPct val="100000"/>
+              </a:lnSpc>
+              <a:spcBef>
+                <a:spcPts val="0"/>
+              </a:spcBef>
+              <a:spcAft>
+                <a:spcPts val="0"/>
+              </a:spcAft>
+              <a:buClrTx/>
+              <a:buSzTx/>
+              <a:buFontTx/>
+              <a:buNone/>
+              <a:tabLst/>
+              <a:defRPr/>
+            </a:pPr>
+            <a:r>
+              <a:rPr lang="en-US" dirty="0"/>
+              <a:t>// TODO</a:t>
+            </a:r>
+          </a:p>
+        </p:txBody>
+      </p:sp>
+      <p:sp>
+        <p:nvSpPr>
+          <p:cNvPr id="4" name="Slide Number Placeholder 3"/>
+          <p:cNvSpPr>
+            <a:spLocks noGrp="1"/>
+          </p:cNvSpPr>
+          <p:nvPr>
+            <p:ph type="sldNum" sz="quarter" idx="5"/>
+          </p:nvPr>
+        </p:nvSpPr>
+        <p:spPr/>
+        <p:txBody>
+          <a:bodyPr/>
+          <a:lstStyle/>
+          <a:p>
+            <a:fld id="{020CF8D1-BA82-5045-ACF9-1AA42AD6A519}" type="slidenum">
+              <a:rPr lang="en-US" smtClean="0"/>
+              <a:t>24</a:t>
+            </a:fld>
+            <a:endParaRPr lang="en-US"/>
+          </a:p>
+        </p:txBody>
+      </p:sp>
+    </p:spTree>
+    <p:extLst>
+      <p:ext uri="{BB962C8B-B14F-4D97-AF65-F5344CB8AC3E}">
+        <p14:creationId xmlns:p14="http://schemas.microsoft.com/office/powerpoint/2010/main" val="4194303824"/>
       </p:ext>
     </p:extLst>
   </p:cSld>
@@ -1549,7 +2200,27 @@
           <a:bodyPr/>
           <a:lstStyle/>
           <a:p>
-            <a:endParaRPr lang="en-US"/>
+            <a:pPr marL="0" marR="0" lvl="0" indent="0" algn="l" defTabSz="914400" rtl="0" eaLnBrk="1" fontAlgn="auto" latinLnBrk="0" hangingPunct="1">
+              <a:lnSpc>
+                <a:spcPct val="100000"/>
+              </a:lnSpc>
+              <a:spcBef>
+                <a:spcPts val="0"/>
+              </a:spcBef>
+              <a:spcAft>
+                <a:spcPts val="0"/>
+              </a:spcAft>
+              <a:buClrTx/>
+              <a:buSzTx/>
+              <a:buFontTx/>
+              <a:buNone/>
+              <a:tabLst/>
+              <a:defRPr/>
+            </a:pPr>
+            <a:r>
+              <a:rPr lang="en-US" dirty="0"/>
+              <a:t>// TODO</a:t>
+            </a:r>
           </a:p>
         </p:txBody>
       </p:sp>
@@ -1570,7 +2241,7 @@
           <a:p>
             <a:fld id="{020CF8D1-BA82-5045-ACF9-1AA42AD6A519}" type="slidenum">
               <a:rPr lang="en-US" smtClean="0"/>
-              <a:t>5</a:t>
+              <a:t>3</a:t>
             </a:fld>
             <a:endParaRPr lang="en-US"/>
           </a:p>
@@ -1579,7 +2250,7 @@
     </p:spTree>
     <p:extLst>
       <p:ext uri="{BB962C8B-B14F-4D97-AF65-F5344CB8AC3E}">
-        <p14:creationId xmlns:p14="http://schemas.microsoft.com/office/powerpoint/2010/main" val="1449554835"/>
+        <p14:creationId xmlns:p14="http://schemas.microsoft.com/office/powerpoint/2010/main" val="872969698"/>
       </p:ext>
     </p:extLst>
   </p:cSld>
@@ -1633,7 +2304,27 @@
           <a:bodyPr/>
           <a:lstStyle/>
           <a:p>
-            <a:endParaRPr lang="en-US"/>
+            <a:pPr marL="0" marR="0" lvl="0" indent="0" algn="l" defTabSz="914400" rtl="0" eaLnBrk="1" fontAlgn="auto" latinLnBrk="0" hangingPunct="1">
+              <a:lnSpc>
+                <a:spcPct val="100000"/>
+              </a:lnSpc>
+              <a:spcBef>
+                <a:spcPts val="0"/>
+              </a:spcBef>
+              <a:spcAft>
+                <a:spcPts val="0"/>
+              </a:spcAft>
+              <a:buClrTx/>
+              <a:buSzTx/>
+              <a:buFontTx/>
+              <a:buNone/>
+              <a:tabLst/>
+              <a:defRPr/>
+            </a:pPr>
+            <a:r>
+              <a:rPr lang="en-US" dirty="0"/>
+              <a:t>// TODO</a:t>
+            </a:r>
           </a:p>
         </p:txBody>
       </p:sp>
@@ -1654,7 +2345,7 @@
           <a:p>
             <a:fld id="{020CF8D1-BA82-5045-ACF9-1AA42AD6A519}" type="slidenum">
               <a:rPr lang="en-US" smtClean="0"/>
-              <a:t>6</a:t>
+              <a:t>4</a:t>
             </a:fld>
             <a:endParaRPr lang="en-US"/>
           </a:p>
@@ -1663,7 +2354,7 @@
     </p:spTree>
     <p:extLst>
       <p:ext uri="{BB962C8B-B14F-4D97-AF65-F5344CB8AC3E}">
-        <p14:creationId xmlns:p14="http://schemas.microsoft.com/office/powerpoint/2010/main" val="520155400"/>
+        <p14:creationId xmlns:p14="http://schemas.microsoft.com/office/powerpoint/2010/main" val="3043503657"/>
       </p:ext>
     </p:extLst>
   </p:cSld>
@@ -1717,7 +2408,27 @@
           <a:bodyPr/>
           <a:lstStyle/>
           <a:p>
-            <a:endParaRPr lang="en-US"/>
+            <a:pPr marL="0" marR="0" lvl="0" indent="0" algn="l" defTabSz="914400" rtl="0" eaLnBrk="1" fontAlgn="auto" latinLnBrk="0" hangingPunct="1">
+              <a:lnSpc>
+                <a:spcPct val="100000"/>
+              </a:lnSpc>
+              <a:spcBef>
+                <a:spcPts val="0"/>
+              </a:spcBef>
+              <a:spcAft>
+                <a:spcPts val="0"/>
+              </a:spcAft>
+              <a:buClrTx/>
+              <a:buSzTx/>
+              <a:buFontTx/>
+              <a:buNone/>
+              <a:tabLst/>
+              <a:defRPr/>
+            </a:pPr>
+            <a:r>
+              <a:rPr lang="en-US" dirty="0"/>
+              <a:t>// TODO</a:t>
+            </a:r>
           </a:p>
         </p:txBody>
       </p:sp>
@@ -1738,7 +2449,7 @@
           <a:p>
             <a:fld id="{020CF8D1-BA82-5045-ACF9-1AA42AD6A519}" type="slidenum">
               <a:rPr lang="en-US" smtClean="0"/>
-              <a:t>7</a:t>
+              <a:t>5</a:t>
             </a:fld>
             <a:endParaRPr lang="en-US"/>
           </a:p>
@@ -1747,7 +2458,7 @@
     </p:spTree>
     <p:extLst>
       <p:ext uri="{BB962C8B-B14F-4D97-AF65-F5344CB8AC3E}">
-        <p14:creationId xmlns:p14="http://schemas.microsoft.com/office/powerpoint/2010/main" val="1380605321"/>
+        <p14:creationId xmlns:p14="http://schemas.microsoft.com/office/powerpoint/2010/main" val="1449554835"/>
       </p:ext>
     </p:extLst>
   </p:cSld>
@@ -1801,7 +2512,27 @@
           <a:bodyPr/>
           <a:lstStyle/>
           <a:p>
-            <a:endParaRPr lang="en-US" dirty="0"/>
+            <a:pPr marL="0" marR="0" lvl="0" indent="0" algn="l" defTabSz="914400" rtl="0" eaLnBrk="1" fontAlgn="auto" latinLnBrk="0" hangingPunct="1">
+              <a:lnSpc>
+                <a:spcPct val="100000"/>
+              </a:lnSpc>
+              <a:spcBef>
+                <a:spcPts val="0"/>
+              </a:spcBef>
+              <a:spcAft>
+                <a:spcPts val="0"/>
+              </a:spcAft>
+              <a:buClrTx/>
+              <a:buSzTx/>
+              <a:buFontTx/>
+              <a:buNone/>
+              <a:tabLst/>
+              <a:defRPr/>
+            </a:pPr>
+            <a:r>
+              <a:rPr lang="en-US" dirty="0"/>
+              <a:t>// TODO</a:t>
+            </a:r>
           </a:p>
         </p:txBody>
       </p:sp>
@@ -1822,7 +2553,7 @@
           <a:p>
             <a:fld id="{020CF8D1-BA82-5045-ACF9-1AA42AD6A519}" type="slidenum">
               <a:rPr lang="en-US" smtClean="0"/>
-              <a:t>9</a:t>
+              <a:t>6</a:t>
             </a:fld>
             <a:endParaRPr lang="en-US"/>
           </a:p>
@@ -1831,7 +2562,7 @@
     </p:spTree>
     <p:extLst>
       <p:ext uri="{BB962C8B-B14F-4D97-AF65-F5344CB8AC3E}">
-        <p14:creationId xmlns:p14="http://schemas.microsoft.com/office/powerpoint/2010/main" val="1304958301"/>
+        <p14:creationId xmlns:p14="http://schemas.microsoft.com/office/powerpoint/2010/main" val="520155400"/>
       </p:ext>
     </p:extLst>
   </p:cSld>
@@ -1885,85 +2616,6 @@
           <a:bodyPr/>
           <a:lstStyle/>
           <a:p>
-            <a:pPr marL="171450" indent="-171450">
-              <a:buFont typeface="Arial" panose="020B0604020202020204" pitchFamily="34" charset="0"/>
-              <a:buChar char="•"/>
-            </a:pPr>
-            <a:r>
-              <a:rPr lang="en-US" dirty="0"/>
-              <a:t>Standardized developer environments – standardize development tools, platforms, dependencies, etc.</a:t>
-            </a:r>
-          </a:p>
-          <a:p>
-            <a:pPr marL="171450" marR="0" lvl="0" indent="-171450" algn="l" defTabSz="914400" rtl="0" eaLnBrk="1" fontAlgn="auto" latinLnBrk="0" hangingPunct="1">
-              <a:lnSpc>
-                <a:spcPct val="100000"/>
-              </a:lnSpc>
-              <a:spcBef>
-                <a:spcPts val="0"/>
-              </a:spcBef>
-              <a:spcAft>
-                <a:spcPts val="0"/>
-              </a:spcAft>
-              <a:buClrTx/>
-              <a:buSzTx/>
-              <a:buFont typeface="Arial" panose="020B0604020202020204" pitchFamily="34" charset="0"/>
-              <a:buChar char="•"/>
-              <a:tabLst/>
-              <a:defRPr/>
-            </a:pPr>
-            <a:r>
-              <a:rPr lang="en-US" dirty="0"/>
-              <a:t>Distributed, especially multi-cloud – containers are highly portable without requiring re-platforming</a:t>
-            </a:r>
-          </a:p>
-          <a:p>
-            <a:pPr marL="171450" marR="0" lvl="0" indent="-171450" algn="l" defTabSz="914400" rtl="0" eaLnBrk="1" fontAlgn="auto" latinLnBrk="0" hangingPunct="1">
-              <a:lnSpc>
-                <a:spcPct val="100000"/>
-              </a:lnSpc>
-              <a:spcBef>
-                <a:spcPts val="0"/>
-              </a:spcBef>
-              <a:spcAft>
-                <a:spcPts val="0"/>
-              </a:spcAft>
-              <a:buClrTx/>
-              <a:buSzTx/>
-              <a:buFont typeface="Arial" panose="020B0604020202020204" pitchFamily="34" charset="0"/>
-              <a:buChar char="•"/>
-              <a:tabLst/>
-              <a:defRPr/>
-            </a:pPr>
-            <a:r>
-              <a:rPr lang="en-US" dirty="0"/>
-              <a:t>Micro-services architectures – isolate processes/services, each component of an application; if one service fails, the application can still mostly function</a:t>
-            </a:r>
-          </a:p>
-          <a:p>
-            <a:pPr marL="171450" marR="0" lvl="0" indent="-171450" algn="l" defTabSz="914400" rtl="0" eaLnBrk="1" fontAlgn="auto" latinLnBrk="0" hangingPunct="1">
-              <a:lnSpc>
-                <a:spcPct val="100000"/>
-              </a:lnSpc>
-              <a:spcBef>
-                <a:spcPts val="0"/>
-              </a:spcBef>
-              <a:spcAft>
-                <a:spcPts val="0"/>
-              </a:spcAft>
-              <a:buClrTx/>
-              <a:buSzTx/>
-              <a:buFont typeface="Arial" panose="020B0604020202020204" pitchFamily="34" charset="0"/>
-              <a:buChar char="•"/>
-              <a:tabLst/>
-              <a:defRPr/>
-            </a:pPr>
-            <a:r>
-              <a:rPr lang="en-US" dirty="0"/>
-              <a:t>Cross-OS tool usage – download/install/run a Linux tool on Windows or macOS platforms, within a Docker container</a:t>
-            </a:r>
-          </a:p>
-          <a:p>
             <a:pPr marL="0" marR="0" lvl="0" indent="0" algn="l" defTabSz="914400" rtl="0" eaLnBrk="1" fontAlgn="auto" latinLnBrk="0" hangingPunct="1">
               <a:lnSpc>
                 <a:spcPct val="100000"/>
@@ -1981,7 +2633,10 @@
               <a:tabLst/>
               <a:defRPr/>
             </a:pPr>
-            <a:endParaRPr lang="en-US" dirty="0"/>
+            <a:r>
+              <a:rPr lang="en-US" dirty="0"/>
+              <a:t>// TODO</a:t>
+            </a:r>
           </a:p>
         </p:txBody>
       </p:sp>
@@ -2002,7 +2657,7 @@
           <a:p>
             <a:fld id="{020CF8D1-BA82-5045-ACF9-1AA42AD6A519}" type="slidenum">
               <a:rPr lang="en-US" smtClean="0"/>
-              <a:t>10</a:t>
+              <a:t>7</a:t>
             </a:fld>
             <a:endParaRPr lang="en-US"/>
           </a:p>
@@ -2011,7 +2666,7 @@
     </p:spTree>
     <p:extLst>
       <p:ext uri="{BB962C8B-B14F-4D97-AF65-F5344CB8AC3E}">
-        <p14:creationId xmlns:p14="http://schemas.microsoft.com/office/powerpoint/2010/main" val="1749289504"/>
+        <p14:creationId xmlns:p14="http://schemas.microsoft.com/office/powerpoint/2010/main" val="1380605321"/>
       </p:ext>
     </p:extLst>
   </p:cSld>
@@ -2065,7 +2720,27 @@
           <a:bodyPr/>
           <a:lstStyle/>
           <a:p>
-            <a:endParaRPr lang="en-US" dirty="0"/>
+            <a:pPr marL="0" marR="0" lvl="0" indent="0" algn="l" defTabSz="914400" rtl="0" eaLnBrk="1" fontAlgn="auto" latinLnBrk="0" hangingPunct="1">
+              <a:lnSpc>
+                <a:spcPct val="100000"/>
+              </a:lnSpc>
+              <a:spcBef>
+                <a:spcPts val="0"/>
+              </a:spcBef>
+              <a:spcAft>
+                <a:spcPts val="0"/>
+              </a:spcAft>
+              <a:buClrTx/>
+              <a:buSzTx/>
+              <a:buFontTx/>
+              <a:buNone/>
+              <a:tabLst/>
+              <a:defRPr/>
+            </a:pPr>
+            <a:r>
+              <a:rPr lang="en-US" dirty="0"/>
+              <a:t>// TODO</a:t>
+            </a:r>
           </a:p>
         </p:txBody>
       </p:sp>
@@ -2086,7 +2761,7 @@
           <a:p>
             <a:fld id="{020CF8D1-BA82-5045-ACF9-1AA42AD6A519}" type="slidenum">
               <a:rPr lang="en-US" smtClean="0"/>
-              <a:t>12</a:t>
+              <a:t>8</a:t>
             </a:fld>
             <a:endParaRPr lang="en-US"/>
           </a:p>
@@ -2095,7 +2770,7 @@
     </p:spTree>
     <p:extLst>
       <p:ext uri="{BB962C8B-B14F-4D97-AF65-F5344CB8AC3E}">
-        <p14:creationId xmlns:p14="http://schemas.microsoft.com/office/powerpoint/2010/main" val="1037279643"/>
+        <p14:creationId xmlns:p14="http://schemas.microsoft.com/office/powerpoint/2010/main" val="45220704"/>
       </p:ext>
     </p:extLst>
   </p:cSld>
@@ -2149,7 +2824,27 @@
           <a:bodyPr/>
           <a:lstStyle/>
           <a:p>
-            <a:endParaRPr lang="en-US" dirty="0"/>
+            <a:pPr marL="0" marR="0" lvl="0" indent="0" algn="l" defTabSz="914400" rtl="0" eaLnBrk="1" fontAlgn="auto" latinLnBrk="0" hangingPunct="1">
+              <a:lnSpc>
+                <a:spcPct val="100000"/>
+              </a:lnSpc>
+              <a:spcBef>
+                <a:spcPts val="0"/>
+              </a:spcBef>
+              <a:spcAft>
+                <a:spcPts val="0"/>
+              </a:spcAft>
+              <a:buClrTx/>
+              <a:buSzTx/>
+              <a:buFontTx/>
+              <a:buNone/>
+              <a:tabLst/>
+              <a:defRPr/>
+            </a:pPr>
+            <a:r>
+              <a:rPr lang="en-US" dirty="0"/>
+              <a:t>// TODO</a:t>
+            </a:r>
           </a:p>
         </p:txBody>
       </p:sp>
@@ -2170,7 +2865,7 @@
           <a:p>
             <a:fld id="{020CF8D1-BA82-5045-ACF9-1AA42AD6A519}" type="slidenum">
               <a:rPr lang="en-US" smtClean="0"/>
-              <a:t>13</a:t>
+              <a:t>9</a:t>
             </a:fld>
             <a:endParaRPr lang="en-US"/>
           </a:p>
@@ -2179,7 +2874,7 @@
     </p:spTree>
     <p:extLst>
       <p:ext uri="{BB962C8B-B14F-4D97-AF65-F5344CB8AC3E}">
-        <p14:creationId xmlns:p14="http://schemas.microsoft.com/office/powerpoint/2010/main" val="3139730376"/>
+        <p14:creationId xmlns:p14="http://schemas.microsoft.com/office/powerpoint/2010/main" val="1304958301"/>
       </p:ext>
     </p:extLst>
   </p:cSld>
@@ -10151,7 +10846,7 @@
             <p:nvPr/>
           </p:nvPicPr>
           <p:blipFill>
-            <a:blip r:embed="rId2"/>
+            <a:blip r:embed="rId3"/>
             <a:stretch>
               <a:fillRect/>
             </a:stretch>
@@ -10792,6 +11487,261 @@
           <a:chExt cx="0" cy="0"/>
         </a:xfrm>
       </p:grpSpPr>
+      <p:grpSp>
+        <p:nvGrpSpPr>
+          <p:cNvPr id="26" name="Group 25">
+            <a:extLst>
+              <a:ext uri="{FF2B5EF4-FFF2-40B4-BE49-F238E27FC236}">
+                <a16:creationId xmlns:a16="http://schemas.microsoft.com/office/drawing/2014/main" id="{97A15F7A-9454-8147-95DD-6631EE72A0C3}"/>
+              </a:ext>
+            </a:extLst>
+          </p:cNvPr>
+          <p:cNvGrpSpPr/>
+          <p:nvPr/>
+        </p:nvGrpSpPr>
+        <p:grpSpPr>
+          <a:xfrm>
+            <a:off x="4320868" y="1544493"/>
+            <a:ext cx="3658318" cy="4187299"/>
+            <a:chOff x="4320868" y="1544493"/>
+            <a:chExt cx="3658318" cy="4187299"/>
+          </a:xfrm>
+        </p:grpSpPr>
+        <p:grpSp>
+          <p:nvGrpSpPr>
+            <p:cNvPr id="12" name="Group 11">
+              <a:extLst>
+                <a:ext uri="{FF2B5EF4-FFF2-40B4-BE49-F238E27FC236}">
+                  <a16:creationId xmlns:a16="http://schemas.microsoft.com/office/drawing/2014/main" id="{446EFD58-D78B-8943-BE7F-116FCB4BB4F5}"/>
+                </a:ext>
+              </a:extLst>
+            </p:cNvPr>
+            <p:cNvGrpSpPr/>
+            <p:nvPr/>
+          </p:nvGrpSpPr>
+          <p:grpSpPr>
+            <a:xfrm>
+              <a:off x="4320868" y="1544493"/>
+              <a:ext cx="3658318" cy="4187299"/>
+              <a:chOff x="4320868" y="1544493"/>
+              <a:chExt cx="3658318" cy="4187299"/>
+            </a:xfrm>
+          </p:grpSpPr>
+          <p:grpSp>
+            <p:nvGrpSpPr>
+              <p:cNvPr id="6" name="Group 5">
+                <a:extLst>
+                  <a:ext uri="{FF2B5EF4-FFF2-40B4-BE49-F238E27FC236}">
+                    <a16:creationId xmlns:a16="http://schemas.microsoft.com/office/drawing/2014/main" id="{B83C59EE-7E98-874D-983F-2962A3CEDDEE}"/>
+                  </a:ext>
+                </a:extLst>
+              </p:cNvPr>
+              <p:cNvGrpSpPr/>
+              <p:nvPr/>
+            </p:nvGrpSpPr>
+            <p:grpSpPr>
+              <a:xfrm>
+                <a:off x="4320868" y="1544493"/>
+                <a:ext cx="3658318" cy="4187299"/>
+                <a:chOff x="4320868" y="1544493"/>
+                <a:chExt cx="3658318" cy="4187299"/>
+              </a:xfrm>
+            </p:grpSpPr>
+            <p:pic>
+              <p:nvPicPr>
+                <p:cNvPr id="16" name="Picture 15" descr="A screenshot of a video game&#10;&#10;Description automatically generated">
+                  <a:extLst>
+                    <a:ext uri="{FF2B5EF4-FFF2-40B4-BE49-F238E27FC236}">
+                      <a16:creationId xmlns:a16="http://schemas.microsoft.com/office/drawing/2014/main" id="{BCBCE6E8-14E1-E04F-B539-F4E32882321B}"/>
+                    </a:ext>
+                  </a:extLst>
+                </p:cNvPr>
+                <p:cNvPicPr>
+                  <a:picLocks noChangeAspect="1"/>
+                </p:cNvPicPr>
+                <p:nvPr/>
+              </p:nvPicPr>
+              <p:blipFill>
+                <a:blip r:embed="rId3"/>
+                <a:stretch>
+                  <a:fillRect/>
+                </a:stretch>
+              </p:blipFill>
+              <p:spPr>
+                <a:xfrm>
+                  <a:off x="4320868" y="1544493"/>
+                  <a:ext cx="3658318" cy="4187299"/>
+                </a:xfrm>
+                <a:prstGeom prst="rect">
+                  <a:avLst/>
+                </a:prstGeom>
+              </p:spPr>
+            </p:pic>
+            <p:sp>
+              <p:nvSpPr>
+                <p:cNvPr id="3" name="Rectangle 2">
+                  <a:extLst>
+                    <a:ext uri="{FF2B5EF4-FFF2-40B4-BE49-F238E27FC236}">
+                      <a16:creationId xmlns:a16="http://schemas.microsoft.com/office/drawing/2014/main" id="{C9E6FD47-08DA-4147-9F3D-A53B5C1D96DB}"/>
+                    </a:ext>
+                  </a:extLst>
+                </p:cNvPr>
+                <p:cNvSpPr/>
+                <p:nvPr/>
+              </p:nvSpPr>
+              <p:spPr>
+                <a:xfrm>
+                  <a:off x="6739982" y="3005684"/>
+                  <a:ext cx="593078" cy="610791"/>
+                </a:xfrm>
+                <a:prstGeom prst="rect">
+                  <a:avLst/>
+                </a:prstGeom>
+                <a:solidFill>
+                  <a:schemeClr val="tx1"/>
+                </a:solidFill>
+                <a:ln>
+                  <a:solidFill>
+                    <a:schemeClr val="tx1"/>
+                  </a:solidFill>
+                </a:ln>
+              </p:spPr>
+              <p:style>
+                <a:lnRef idx="2">
+                  <a:schemeClr val="accent1">
+                    <a:shade val="50000"/>
+                  </a:schemeClr>
+                </a:lnRef>
+                <a:fillRef idx="1">
+                  <a:schemeClr val="accent1"/>
+                </a:fillRef>
+                <a:effectRef idx="0">
+                  <a:schemeClr val="accent1"/>
+                </a:effectRef>
+                <a:fontRef idx="minor">
+                  <a:schemeClr val="lt1"/>
+                </a:fontRef>
+              </p:style>
+              <p:txBody>
+                <a:bodyPr rtlCol="0" anchor="ctr"/>
+                <a:lstStyle/>
+                <a:p>
+                  <a:pPr algn="ctr"/>
+                  <a:endParaRPr lang="en-US"/>
+                </a:p>
+              </p:txBody>
+            </p:sp>
+          </p:grpSp>
+          <p:sp>
+            <p:nvSpPr>
+              <p:cNvPr id="9" name="Rectangle 8">
+                <a:extLst>
+                  <a:ext uri="{FF2B5EF4-FFF2-40B4-BE49-F238E27FC236}">
+                    <a16:creationId xmlns:a16="http://schemas.microsoft.com/office/drawing/2014/main" id="{BE1D3176-920B-D141-BAAB-A79698101254}"/>
+                  </a:ext>
+                </a:extLst>
+              </p:cNvPr>
+              <p:cNvSpPr/>
+              <p:nvPr/>
+            </p:nvSpPr>
+            <p:spPr>
+              <a:xfrm>
+                <a:off x="6709986" y="3823692"/>
+                <a:ext cx="683795" cy="629896"/>
+              </a:xfrm>
+              <a:prstGeom prst="rect">
+                <a:avLst/>
+              </a:prstGeom>
+              <a:solidFill>
+                <a:schemeClr val="tx1"/>
+              </a:solidFill>
+              <a:ln>
+                <a:solidFill>
+                  <a:schemeClr val="tx1"/>
+                </a:solidFill>
+              </a:ln>
+            </p:spPr>
+            <p:style>
+              <a:lnRef idx="2">
+                <a:schemeClr val="accent1">
+                  <a:shade val="50000"/>
+                </a:schemeClr>
+              </a:lnRef>
+              <a:fillRef idx="1">
+                <a:schemeClr val="accent1"/>
+              </a:fillRef>
+              <a:effectRef idx="0">
+                <a:schemeClr val="accent1"/>
+              </a:effectRef>
+              <a:fontRef idx="minor">
+                <a:schemeClr val="lt1"/>
+              </a:fontRef>
+            </p:style>
+            <p:txBody>
+              <a:bodyPr rtlCol="0" anchor="ctr"/>
+              <a:lstStyle/>
+              <a:p>
+                <a:pPr algn="ctr"/>
+                <a:endParaRPr lang="en-US"/>
+              </a:p>
+            </p:txBody>
+          </p:sp>
+        </p:grpSp>
+        <p:sp>
+          <p:nvSpPr>
+            <p:cNvPr id="25" name="Rectangle 24">
+              <a:extLst>
+                <a:ext uri="{FF2B5EF4-FFF2-40B4-BE49-F238E27FC236}">
+                  <a16:creationId xmlns:a16="http://schemas.microsoft.com/office/drawing/2014/main" id="{9643F5CD-0C7B-5B4F-9313-B39E77827197}"/>
+                </a:ext>
+              </a:extLst>
+            </p:cNvPr>
+            <p:cNvSpPr/>
+            <p:nvPr/>
+          </p:nvSpPr>
+          <p:spPr>
+            <a:xfrm>
+              <a:off x="4923263" y="2944136"/>
+              <a:ext cx="719254" cy="2285786"/>
+            </a:xfrm>
+            <a:prstGeom prst="rect">
+              <a:avLst/>
+            </a:prstGeom>
+            <a:solidFill>
+              <a:schemeClr val="tx1"/>
+            </a:solidFill>
+            <a:ln>
+              <a:solidFill>
+                <a:schemeClr val="tx1"/>
+              </a:solidFill>
+            </a:ln>
+          </p:spPr>
+          <p:style>
+            <a:lnRef idx="2">
+              <a:schemeClr val="accent1">
+                <a:shade val="50000"/>
+              </a:schemeClr>
+            </a:lnRef>
+            <a:fillRef idx="1">
+              <a:schemeClr val="accent1"/>
+            </a:fillRef>
+            <a:effectRef idx="0">
+              <a:schemeClr val="accent1"/>
+            </a:effectRef>
+            <a:fontRef idx="minor">
+              <a:schemeClr val="lt1"/>
+            </a:fontRef>
+          </p:style>
+          <p:txBody>
+            <a:bodyPr rtlCol="0" anchor="ctr"/>
+            <a:lstStyle/>
+            <a:p>
+              <a:pPr algn="ctr"/>
+              <a:endParaRPr lang="en-US"/>
+            </a:p>
+          </p:txBody>
+        </p:sp>
+      </p:grpSp>
       <p:sp>
         <p:nvSpPr>
           <p:cNvPr id="2" name="Title 1">
@@ -10899,7 +11849,7 @@
           <p:nvPr/>
         </p:nvPicPr>
         <p:blipFill>
-          <a:blip r:embed="rId3"/>
+          <a:blip r:embed="rId4"/>
           <a:stretch>
             <a:fillRect/>
           </a:stretch>
@@ -10908,36 +11858,6 @@
           <a:xfrm>
             <a:off x="1295196" y="1544493"/>
             <a:ext cx="2745007" cy="2799287"/>
-          </a:xfrm>
-          <a:prstGeom prst="rect">
-            <a:avLst/>
-          </a:prstGeom>
-        </p:spPr>
-      </p:pic>
-      <p:pic>
-        <p:nvPicPr>
-          <p:cNvPr id="16" name="Picture 15" descr="A screenshot of a video game&#10;&#10;Description automatically generated">
-            <a:extLst>
-              <a:ext uri="{FF2B5EF4-FFF2-40B4-BE49-F238E27FC236}">
-                <a16:creationId xmlns:a16="http://schemas.microsoft.com/office/drawing/2014/main" id="{BCBCE6E8-14E1-E04F-B539-F4E32882321B}"/>
-              </a:ext>
-            </a:extLst>
-          </p:cNvPr>
-          <p:cNvPicPr>
-            <a:picLocks noChangeAspect="1"/>
-          </p:cNvPicPr>
-          <p:nvPr/>
-        </p:nvPicPr>
-        <p:blipFill>
-          <a:blip r:embed="rId4"/>
-          <a:stretch>
-            <a:fillRect/>
-          </a:stretch>
-        </p:blipFill>
-        <p:spPr>
-          <a:xfrm>
-            <a:off x="4320868" y="1544493"/>
-            <a:ext cx="3658318" cy="4187299"/>
           </a:xfrm>
           <a:prstGeom prst="rect">
             <a:avLst/>
@@ -11240,50 +12160,6 @@
       </p:cxnSp>
       <p:cxnSp>
         <p:nvCxnSpPr>
-          <p:cNvPr id="46" name="Straight Arrow Connector 45">
-            <a:extLst>
-              <a:ext uri="{FF2B5EF4-FFF2-40B4-BE49-F238E27FC236}">
-                <a16:creationId xmlns:a16="http://schemas.microsoft.com/office/drawing/2014/main" id="{1F346F87-30DB-794E-B104-BB37F69E21B2}"/>
-              </a:ext>
-            </a:extLst>
-          </p:cNvPr>
-          <p:cNvCxnSpPr>
-            <a:cxnSpLocks/>
-          </p:cNvCxnSpPr>
-          <p:nvPr/>
-        </p:nvCxnSpPr>
-        <p:spPr>
-          <a:xfrm>
-            <a:off x="5766072" y="2279758"/>
-            <a:ext cx="1011246" cy="1011104"/>
-          </a:xfrm>
-          <a:prstGeom prst="straightConnector1">
-            <a:avLst/>
-          </a:prstGeom>
-          <a:ln w="57150">
-            <a:solidFill>
-              <a:srgbClr val="C00000"/>
-            </a:solidFill>
-            <a:tailEnd type="triangle"/>
-          </a:ln>
-        </p:spPr>
-        <p:style>
-          <a:lnRef idx="1">
-            <a:schemeClr val="accent1"/>
-          </a:lnRef>
-          <a:fillRef idx="0">
-            <a:schemeClr val="accent1"/>
-          </a:fillRef>
-          <a:effectRef idx="0">
-            <a:schemeClr val="accent1"/>
-          </a:effectRef>
-          <a:fontRef idx="minor">
-            <a:schemeClr val="tx1"/>
-          </a:fontRef>
-        </p:style>
-      </p:cxnSp>
-      <p:cxnSp>
-        <p:nvCxnSpPr>
           <p:cNvPr id="51" name="Straight Arrow Connector 50">
             <a:extLst>
               <a:ext uri="{FF2B5EF4-FFF2-40B4-BE49-F238E27FC236}">
@@ -11385,9 +12261,9 @@
           <p:nvPr/>
         </p:nvCxnSpPr>
         <p:spPr>
-          <a:xfrm flipH="1">
-            <a:off x="5577841" y="3365862"/>
-            <a:ext cx="1199477" cy="457830"/>
+          <a:xfrm flipH="1" flipV="1">
+            <a:off x="5577840" y="3867463"/>
+            <a:ext cx="1235710" cy="336237"/>
           </a:xfrm>
           <a:prstGeom prst="straightConnector1">
             <a:avLst/>
@@ -11430,8 +12306,8 @@
         </p:nvCxnSpPr>
         <p:spPr>
           <a:xfrm flipH="1">
-            <a:off x="5577841" y="3365861"/>
-            <a:ext cx="1199477" cy="1040676"/>
+            <a:off x="5577842" y="4203700"/>
+            <a:ext cx="1235708" cy="202837"/>
           </a:xfrm>
           <a:prstGeom prst="straightConnector1">
             <a:avLst/>
@@ -11458,6 +12334,186 @@
           </a:fontRef>
         </p:style>
       </p:cxnSp>
+      <p:pic>
+        <p:nvPicPr>
+          <p:cNvPr id="8" name="Picture 7" descr="A close up of a logo&#10;&#10;Description automatically generated">
+            <a:extLst>
+              <a:ext uri="{FF2B5EF4-FFF2-40B4-BE49-F238E27FC236}">
+                <a16:creationId xmlns:a16="http://schemas.microsoft.com/office/drawing/2014/main" id="{675800C7-046B-1045-847D-E0E2D712AC69}"/>
+              </a:ext>
+            </a:extLst>
+          </p:cNvPr>
+          <p:cNvPicPr>
+            <a:picLocks noChangeAspect="1"/>
+          </p:cNvPicPr>
+          <p:nvPr/>
+        </p:nvPicPr>
+        <p:blipFill>
+          <a:blip r:embed="rId6"/>
+          <a:stretch>
+            <a:fillRect/>
+          </a:stretch>
+        </p:blipFill>
+        <p:spPr>
+          <a:xfrm>
+            <a:off x="6756462" y="3022167"/>
+            <a:ext cx="560117" cy="560117"/>
+          </a:xfrm>
+          <a:prstGeom prst="rect">
+            <a:avLst/>
+          </a:prstGeom>
+        </p:spPr>
+      </p:pic>
+      <p:pic>
+        <p:nvPicPr>
+          <p:cNvPr id="28" name="Picture 27" descr="A picture containing drawing&#10;&#10;Description automatically generated">
+            <a:extLst>
+              <a:ext uri="{FF2B5EF4-FFF2-40B4-BE49-F238E27FC236}">
+                <a16:creationId xmlns:a16="http://schemas.microsoft.com/office/drawing/2014/main" id="{85C42BFF-C19A-CB4B-B98B-275F5077AD15}"/>
+              </a:ext>
+            </a:extLst>
+          </p:cNvPr>
+          <p:cNvPicPr>
+            <a:picLocks noChangeAspect="1"/>
+          </p:cNvPicPr>
+          <p:nvPr/>
+        </p:nvPicPr>
+        <p:blipFill>
+          <a:blip r:embed="rId7"/>
+          <a:stretch>
+            <a:fillRect/>
+          </a:stretch>
+        </p:blipFill>
+        <p:spPr>
+          <a:xfrm>
+            <a:off x="6710197" y="3867463"/>
+            <a:ext cx="641998" cy="567020"/>
+          </a:xfrm>
+          <a:prstGeom prst="rect">
+            <a:avLst/>
+          </a:prstGeom>
+        </p:spPr>
+      </p:pic>
+      <p:pic>
+        <p:nvPicPr>
+          <p:cNvPr id="39" name="Picture 38" descr="A close up of a box&#10;&#10;Description automatically generated">
+            <a:extLst>
+              <a:ext uri="{FF2B5EF4-FFF2-40B4-BE49-F238E27FC236}">
+                <a16:creationId xmlns:a16="http://schemas.microsoft.com/office/drawing/2014/main" id="{1F8A3688-5BA9-264E-B82C-C55B0EA0B714}"/>
+              </a:ext>
+            </a:extLst>
+          </p:cNvPr>
+          <p:cNvPicPr>
+            <a:picLocks noChangeAspect="1"/>
+          </p:cNvPicPr>
+          <p:nvPr/>
+        </p:nvPicPr>
+        <p:blipFill>
+          <a:blip r:embed="rId8"/>
+          <a:stretch>
+            <a:fillRect/>
+          </a:stretch>
+        </p:blipFill>
+        <p:spPr>
+          <a:xfrm>
+            <a:off x="4920448" y="3548508"/>
+            <a:ext cx="712191" cy="562911"/>
+          </a:xfrm>
+          <a:prstGeom prst="rect">
+            <a:avLst/>
+          </a:prstGeom>
+        </p:spPr>
+      </p:pic>
+      <p:pic>
+        <p:nvPicPr>
+          <p:cNvPr id="40" name="Picture 39" descr="A close up of a box&#10;&#10;Description automatically generated">
+            <a:extLst>
+              <a:ext uri="{FF2B5EF4-FFF2-40B4-BE49-F238E27FC236}">
+                <a16:creationId xmlns:a16="http://schemas.microsoft.com/office/drawing/2014/main" id="{5E9C92DB-DDBA-E246-BB4A-8BE563D8B95E}"/>
+              </a:ext>
+            </a:extLst>
+          </p:cNvPr>
+          <p:cNvPicPr>
+            <a:picLocks noChangeAspect="1"/>
+          </p:cNvPicPr>
+          <p:nvPr/>
+        </p:nvPicPr>
+        <p:blipFill>
+          <a:blip r:embed="rId8"/>
+          <a:stretch>
+            <a:fillRect/>
+          </a:stretch>
+        </p:blipFill>
+        <p:spPr>
+          <a:xfrm>
+            <a:off x="4920447" y="4111419"/>
+            <a:ext cx="712191" cy="562911"/>
+          </a:xfrm>
+          <a:prstGeom prst="rect">
+            <a:avLst/>
+          </a:prstGeom>
+        </p:spPr>
+      </p:pic>
+      <p:pic>
+        <p:nvPicPr>
+          <p:cNvPr id="42" name="Picture 41" descr="A picture containing computer, table&#10;&#10;Description automatically generated">
+            <a:extLst>
+              <a:ext uri="{FF2B5EF4-FFF2-40B4-BE49-F238E27FC236}">
+                <a16:creationId xmlns:a16="http://schemas.microsoft.com/office/drawing/2014/main" id="{1BA4645E-904B-544E-BB45-4F291E925786}"/>
+              </a:ext>
+            </a:extLst>
+          </p:cNvPr>
+          <p:cNvPicPr>
+            <a:picLocks noChangeAspect="1"/>
+          </p:cNvPicPr>
+          <p:nvPr/>
+        </p:nvPicPr>
+        <p:blipFill>
+          <a:blip r:embed="rId9"/>
+          <a:stretch>
+            <a:fillRect/>
+          </a:stretch>
+        </p:blipFill>
+        <p:spPr>
+          <a:xfrm>
+            <a:off x="4875439" y="2990993"/>
+            <a:ext cx="757200" cy="585399"/>
+          </a:xfrm>
+          <a:prstGeom prst="rect">
+            <a:avLst/>
+          </a:prstGeom>
+        </p:spPr>
+      </p:pic>
+      <p:pic>
+        <p:nvPicPr>
+          <p:cNvPr id="44" name="Picture 43" descr="A picture containing computer, table&#10;&#10;Description automatically generated">
+            <a:extLst>
+              <a:ext uri="{FF2B5EF4-FFF2-40B4-BE49-F238E27FC236}">
+                <a16:creationId xmlns:a16="http://schemas.microsoft.com/office/drawing/2014/main" id="{C8046E5F-C345-A444-827A-C673A6F06315}"/>
+              </a:ext>
+            </a:extLst>
+          </p:cNvPr>
+          <p:cNvPicPr>
+            <a:picLocks noChangeAspect="1"/>
+          </p:cNvPicPr>
+          <p:nvPr/>
+        </p:nvPicPr>
+        <p:blipFill>
+          <a:blip r:embed="rId9"/>
+          <a:stretch>
+            <a:fillRect/>
+          </a:stretch>
+        </p:blipFill>
+        <p:spPr>
+          <a:xfrm>
+            <a:off x="4881789" y="4652796"/>
+            <a:ext cx="757200" cy="585399"/>
+          </a:xfrm>
+          <a:prstGeom prst="rect">
+            <a:avLst/>
+          </a:prstGeom>
+        </p:spPr>
+      </p:pic>
     </p:spTree>
     <p:extLst>
       <p:ext uri="{BB962C8B-B14F-4D97-AF65-F5344CB8AC3E}">
@@ -11567,7 +12623,7 @@
                                           </p:stCondLst>
                                         </p:cTn>
                                         <p:tgtEl>
-                                          <p:spTgt spid="16"/>
+                                          <p:spTgt spid="26"/>
                                         </p:tgtEl>
                                         <p:attrNameLst>
                                           <p:attrName>style.visibility</p:attrName>
@@ -11581,7 +12637,7 @@
                                       <p:cBhvr>
                                         <p:cTn id="12" dur="500"/>
                                         <p:tgtEl>
-                                          <p:spTgt spid="16"/>
+                                          <p:spTgt spid="26"/>
                                         </p:tgtEl>
                                       </p:cBhvr>
                                     </p:animEffect>
@@ -11748,7 +12804,7 @@
                             </p:stCondLst>
                             <p:childTnLst>
                               <p:par>
-                                <p:cTn id="28" presetID="22" presetClass="entr" presetSubtype="1" fill="hold" nodeType="clickEffect">
+                                <p:cTn id="28" presetID="9" presetClass="entr" presetSubtype="0" fill="hold" nodeType="clickEffect">
                                   <p:stCondLst>
                                     <p:cond delay="0"/>
                                   </p:stCondLst>
@@ -11761,7 +12817,7 @@
                                           </p:stCondLst>
                                         </p:cTn>
                                         <p:tgtEl>
-                                          <p:spTgt spid="36"/>
+                                          <p:spTgt spid="8"/>
                                         </p:tgtEl>
                                         <p:attrNameLst>
                                           <p:attrName>style.visibility</p:attrName>
@@ -11771,11 +12827,11 @@
                                         <p:strVal val="visible"/>
                                       </p:to>
                                     </p:set>
-                                    <p:animEffect transition="in" filter="wipe(up)">
+                                    <p:animEffect transition="in" filter="dissolve">
                                       <p:cBhvr>
                                         <p:cTn id="30" dur="500"/>
                                         <p:tgtEl>
-                                          <p:spTgt spid="36"/>
+                                          <p:spTgt spid="8"/>
                                         </p:tgtEl>
                                       </p:cBhvr>
                                     </p:animEffect>
@@ -11801,7 +12857,7 @@
                             </p:stCondLst>
                             <p:childTnLst>
                               <p:par>
-                                <p:cTn id="33" presetID="22" presetClass="entr" presetSubtype="8" fill="hold" nodeType="clickEffect">
+                                <p:cTn id="33" presetID="22" presetClass="entr" presetSubtype="1" fill="hold" nodeType="clickEffect">
                                   <p:stCondLst>
                                     <p:cond delay="0"/>
                                   </p:stCondLst>
@@ -11814,7 +12870,7 @@
                                           </p:stCondLst>
                                         </p:cTn>
                                         <p:tgtEl>
-                                          <p:spTgt spid="46"/>
+                                          <p:spTgt spid="36"/>
                                         </p:tgtEl>
                                         <p:attrNameLst>
                                           <p:attrName>style.visibility</p:attrName>
@@ -11824,11 +12880,11 @@
                                         <p:strVal val="visible"/>
                                       </p:to>
                                     </p:set>
-                                    <p:animEffect transition="in" filter="wipe(left)">
+                                    <p:animEffect transition="in" filter="wipe(up)">
                                       <p:cBhvr>
                                         <p:cTn id="35" dur="500"/>
                                         <p:tgtEl>
-                                          <p:spTgt spid="46"/>
+                                          <p:spTgt spid="36"/>
                                         </p:tgtEl>
                                       </p:cBhvr>
                                     </p:animEffect>
@@ -11838,30 +12894,21 @@
                             </p:childTnLst>
                           </p:cTn>
                         </p:par>
-                      </p:childTnLst>
-                    </p:cTn>
-                  </p:par>
-                  <p:par>
-                    <p:cTn id="36" fill="hold">
-                      <p:stCondLst>
-                        <p:cond delay="indefinite"/>
-                      </p:stCondLst>
-                      <p:childTnLst>
                         <p:par>
-                          <p:cTn id="37" fill="hold">
+                          <p:cTn id="36" fill="hold">
                             <p:stCondLst>
-                              <p:cond delay="0"/>
+                              <p:cond delay="500"/>
                             </p:stCondLst>
                             <p:childTnLst>
                               <p:par>
-                                <p:cTn id="38" presetID="22" presetClass="entr" presetSubtype="2" fill="hold" nodeType="clickEffect">
+                                <p:cTn id="37" presetID="22" presetClass="entr" presetSubtype="2" fill="hold" nodeType="afterEffect">
                                   <p:stCondLst>
                                     <p:cond delay="0"/>
                                   </p:stCondLst>
                                   <p:childTnLst>
                                     <p:set>
                                       <p:cBhvr>
-                                        <p:cTn id="39" dur="1" fill="hold">
+                                        <p:cTn id="38" dur="1" fill="hold">
                                           <p:stCondLst>
                                             <p:cond delay="0"/>
                                           </p:stCondLst>
@@ -11879,7 +12926,7 @@
                                     </p:set>
                                     <p:animEffect transition="in" filter="wipe(right)">
                                       <p:cBhvr>
-                                        <p:cTn id="40" dur="500"/>
+                                        <p:cTn id="39" dur="500"/>
                                         <p:tgtEl>
                                           <p:spTgt spid="51"/>
                                         </p:tgtEl>
@@ -11892,20 +12939,64 @@
                           </p:cTn>
                         </p:par>
                         <p:par>
-                          <p:cTn id="41" fill="hold">
+                          <p:cTn id="40" fill="hold">
                             <p:stCondLst>
-                              <p:cond delay="500"/>
+                              <p:cond delay="1000"/>
                             </p:stCondLst>
                             <p:childTnLst>
                               <p:par>
-                                <p:cTn id="42" presetID="22" presetClass="entr" presetSubtype="2" fill="hold" nodeType="afterEffect">
+                                <p:cTn id="41" presetID="9" presetClass="entr" presetSubtype="0" fill="hold" nodeType="afterEffect">
                                   <p:stCondLst>
                                     <p:cond delay="0"/>
                                   </p:stCondLst>
                                   <p:childTnLst>
                                     <p:set>
                                       <p:cBhvr>
-                                        <p:cTn id="43" dur="1" fill="hold">
+                                        <p:cTn id="42" dur="1" fill="hold">
+                                          <p:stCondLst>
+                                            <p:cond delay="0"/>
+                                          </p:stCondLst>
+                                        </p:cTn>
+                                        <p:tgtEl>
+                                          <p:spTgt spid="42"/>
+                                        </p:tgtEl>
+                                        <p:attrNameLst>
+                                          <p:attrName>style.visibility</p:attrName>
+                                        </p:attrNameLst>
+                                      </p:cBhvr>
+                                      <p:to>
+                                        <p:strVal val="visible"/>
+                                      </p:to>
+                                    </p:set>
+                                    <p:animEffect transition="in" filter="dissolve">
+                                      <p:cBhvr>
+                                        <p:cTn id="43" dur="500"/>
+                                        <p:tgtEl>
+                                          <p:spTgt spid="42"/>
+                                        </p:tgtEl>
+                                      </p:cBhvr>
+                                    </p:animEffect>
+                                  </p:childTnLst>
+                                </p:cTn>
+                              </p:par>
+                            </p:childTnLst>
+                          </p:cTn>
+                        </p:par>
+                        <p:par>
+                          <p:cTn id="44" fill="hold">
+                            <p:stCondLst>
+                              <p:cond delay="1500"/>
+                            </p:stCondLst>
+                            <p:childTnLst>
+                              <p:par>
+                                <p:cTn id="45" presetID="22" presetClass="entr" presetSubtype="2" fill="hold" nodeType="afterEffect">
+                                  <p:stCondLst>
+                                    <p:cond delay="0"/>
+                                  </p:stCondLst>
+                                  <p:childTnLst>
+                                    <p:set>
+                                      <p:cBhvr>
+                                        <p:cTn id="46" dur="1" fill="hold">
                                           <p:stCondLst>
                                             <p:cond delay="0"/>
                                           </p:stCondLst>
@@ -11923,9 +13014,441 @@
                                     </p:set>
                                     <p:animEffect transition="in" filter="wipe(right)">
                                       <p:cBhvr>
-                                        <p:cTn id="44" dur="500"/>
+                                        <p:cTn id="47" dur="500"/>
                                         <p:tgtEl>
                                           <p:spTgt spid="55"/>
+                                        </p:tgtEl>
+                                      </p:cBhvr>
+                                    </p:animEffect>
+                                  </p:childTnLst>
+                                </p:cTn>
+                              </p:par>
+                            </p:childTnLst>
+                          </p:cTn>
+                        </p:par>
+                        <p:par>
+                          <p:cTn id="48" fill="hold">
+                            <p:stCondLst>
+                              <p:cond delay="2000"/>
+                            </p:stCondLst>
+                            <p:childTnLst>
+                              <p:par>
+                                <p:cTn id="49" presetID="9" presetClass="entr" presetSubtype="0" fill="hold" nodeType="afterEffect">
+                                  <p:stCondLst>
+                                    <p:cond delay="0"/>
+                                  </p:stCondLst>
+                                  <p:childTnLst>
+                                    <p:set>
+                                      <p:cBhvr>
+                                        <p:cTn id="50" dur="1" fill="hold">
+                                          <p:stCondLst>
+                                            <p:cond delay="0"/>
+                                          </p:stCondLst>
+                                        </p:cTn>
+                                        <p:tgtEl>
+                                          <p:spTgt spid="44"/>
+                                        </p:tgtEl>
+                                        <p:attrNameLst>
+                                          <p:attrName>style.visibility</p:attrName>
+                                        </p:attrNameLst>
+                                      </p:cBhvr>
+                                      <p:to>
+                                        <p:strVal val="visible"/>
+                                      </p:to>
+                                    </p:set>
+                                    <p:animEffect transition="in" filter="dissolve">
+                                      <p:cBhvr>
+                                        <p:cTn id="51" dur="500"/>
+                                        <p:tgtEl>
+                                          <p:spTgt spid="44"/>
+                                        </p:tgtEl>
+                                      </p:cBhvr>
+                                    </p:animEffect>
+                                  </p:childTnLst>
+                                </p:cTn>
+                              </p:par>
+                            </p:childTnLst>
+                          </p:cTn>
+                        </p:par>
+                      </p:childTnLst>
+                    </p:cTn>
+                  </p:par>
+                  <p:par>
+                    <p:cTn id="52" fill="hold">
+                      <p:stCondLst>
+                        <p:cond delay="indefinite"/>
+                      </p:stCondLst>
+                      <p:childTnLst>
+                        <p:par>
+                          <p:cTn id="53" fill="hold">
+                            <p:stCondLst>
+                              <p:cond delay="0"/>
+                            </p:stCondLst>
+                            <p:childTnLst>
+                              <p:par>
+                                <p:cTn id="54" presetID="9" presetClass="entr" presetSubtype="0" fill="hold" nodeType="clickEffect">
+                                  <p:stCondLst>
+                                    <p:cond delay="0"/>
+                                  </p:stCondLst>
+                                  <p:childTnLst>
+                                    <p:set>
+                                      <p:cBhvr>
+                                        <p:cTn id="55" dur="1" fill="hold">
+                                          <p:stCondLst>
+                                            <p:cond delay="0"/>
+                                          </p:stCondLst>
+                                        </p:cTn>
+                                        <p:tgtEl>
+                                          <p:spTgt spid="18"/>
+                                        </p:tgtEl>
+                                        <p:attrNameLst>
+                                          <p:attrName>style.visibility</p:attrName>
+                                        </p:attrNameLst>
+                                      </p:cBhvr>
+                                      <p:to>
+                                        <p:strVal val="visible"/>
+                                      </p:to>
+                                    </p:set>
+                                    <p:animEffect transition="in" filter="dissolve">
+                                      <p:cBhvr>
+                                        <p:cTn id="56" dur="500"/>
+                                        <p:tgtEl>
+                                          <p:spTgt spid="18"/>
+                                        </p:tgtEl>
+                                      </p:cBhvr>
+                                    </p:animEffect>
+                                  </p:childTnLst>
+                                </p:cTn>
+                              </p:par>
+                            </p:childTnLst>
+                          </p:cTn>
+                        </p:par>
+                      </p:childTnLst>
+                    </p:cTn>
+                  </p:par>
+                  <p:par>
+                    <p:cTn id="57" fill="hold">
+                      <p:stCondLst>
+                        <p:cond delay="indefinite"/>
+                      </p:stCondLst>
+                      <p:childTnLst>
+                        <p:par>
+                          <p:cTn id="58" fill="hold">
+                            <p:stCondLst>
+                              <p:cond delay="0"/>
+                            </p:stCondLst>
+                            <p:childTnLst>
+                              <p:par>
+                                <p:cTn id="59" presetID="22" presetClass="entr" presetSubtype="8" fill="hold" nodeType="clickEffect">
+                                  <p:stCondLst>
+                                    <p:cond delay="0"/>
+                                  </p:stCondLst>
+                                  <p:childTnLst>
+                                    <p:set>
+                                      <p:cBhvr>
+                                        <p:cTn id="60" dur="1" fill="hold">
+                                          <p:stCondLst>
+                                            <p:cond delay="0"/>
+                                          </p:stCondLst>
+                                        </p:cTn>
+                                        <p:tgtEl>
+                                          <p:spTgt spid="41"/>
+                                        </p:tgtEl>
+                                        <p:attrNameLst>
+                                          <p:attrName>style.visibility</p:attrName>
+                                        </p:attrNameLst>
+                                      </p:cBhvr>
+                                      <p:to>
+                                        <p:strVal val="visible"/>
+                                      </p:to>
+                                    </p:set>
+                                    <p:animEffect transition="in" filter="wipe(left)">
+                                      <p:cBhvr>
+                                        <p:cTn id="61" dur="500"/>
+                                        <p:tgtEl>
+                                          <p:spTgt spid="41"/>
+                                        </p:tgtEl>
+                                      </p:cBhvr>
+                                    </p:animEffect>
+                                  </p:childTnLst>
+                                </p:cTn>
+                              </p:par>
+                            </p:childTnLst>
+                          </p:cTn>
+                        </p:par>
+                      </p:childTnLst>
+                    </p:cTn>
+                  </p:par>
+                  <p:par>
+                    <p:cTn id="62" fill="hold">
+                      <p:stCondLst>
+                        <p:cond delay="indefinite"/>
+                      </p:stCondLst>
+                      <p:childTnLst>
+                        <p:par>
+                          <p:cTn id="63" fill="hold">
+                            <p:stCondLst>
+                              <p:cond delay="0"/>
+                            </p:stCondLst>
+                            <p:childTnLst>
+                              <p:par>
+                                <p:cTn id="64" presetID="22" presetClass="entr" presetSubtype="2" fill="hold" nodeType="clickEffect">
+                                  <p:stCondLst>
+                                    <p:cond delay="0"/>
+                                  </p:stCondLst>
+                                  <p:childTnLst>
+                                    <p:set>
+                                      <p:cBhvr>
+                                        <p:cTn id="65" dur="1" fill="hold">
+                                          <p:stCondLst>
+                                            <p:cond delay="0"/>
+                                          </p:stCondLst>
+                                        </p:cTn>
+                                        <p:tgtEl>
+                                          <p:spTgt spid="43"/>
+                                        </p:tgtEl>
+                                        <p:attrNameLst>
+                                          <p:attrName>style.visibility</p:attrName>
+                                        </p:attrNameLst>
+                                      </p:cBhvr>
+                                      <p:to>
+                                        <p:strVal val="visible"/>
+                                      </p:to>
+                                    </p:set>
+                                    <p:animEffect transition="in" filter="wipe(right)">
+                                      <p:cBhvr>
+                                        <p:cTn id="66" dur="500"/>
+                                        <p:tgtEl>
+                                          <p:spTgt spid="43"/>
+                                        </p:tgtEl>
+                                      </p:cBhvr>
+                                    </p:animEffect>
+                                  </p:childTnLst>
+                                </p:cTn>
+                              </p:par>
+                            </p:childTnLst>
+                          </p:cTn>
+                        </p:par>
+                        <p:par>
+                          <p:cTn id="67" fill="hold">
+                            <p:stCondLst>
+                              <p:cond delay="500"/>
+                            </p:stCondLst>
+                            <p:childTnLst>
+                              <p:par>
+                                <p:cTn id="68" presetID="9" presetClass="entr" presetSubtype="0" fill="hold" nodeType="afterEffect">
+                                  <p:stCondLst>
+                                    <p:cond delay="0"/>
+                                  </p:stCondLst>
+                                  <p:childTnLst>
+                                    <p:set>
+                                      <p:cBhvr>
+                                        <p:cTn id="69" dur="1" fill="hold">
+                                          <p:stCondLst>
+                                            <p:cond delay="0"/>
+                                          </p:stCondLst>
+                                        </p:cTn>
+                                        <p:tgtEl>
+                                          <p:spTgt spid="28"/>
+                                        </p:tgtEl>
+                                        <p:attrNameLst>
+                                          <p:attrName>style.visibility</p:attrName>
+                                        </p:attrNameLst>
+                                      </p:cBhvr>
+                                      <p:to>
+                                        <p:strVal val="visible"/>
+                                      </p:to>
+                                    </p:set>
+                                    <p:animEffect transition="in" filter="dissolve">
+                                      <p:cBhvr>
+                                        <p:cTn id="70" dur="500"/>
+                                        <p:tgtEl>
+                                          <p:spTgt spid="28"/>
+                                        </p:tgtEl>
+                                      </p:cBhvr>
+                                    </p:animEffect>
+                                  </p:childTnLst>
+                                </p:cTn>
+                              </p:par>
+                            </p:childTnLst>
+                          </p:cTn>
+                        </p:par>
+                      </p:childTnLst>
+                    </p:cTn>
+                  </p:par>
+                  <p:par>
+                    <p:cTn id="71" fill="hold">
+                      <p:stCondLst>
+                        <p:cond delay="indefinite"/>
+                      </p:stCondLst>
+                      <p:childTnLst>
+                        <p:par>
+                          <p:cTn id="72" fill="hold">
+                            <p:stCondLst>
+                              <p:cond delay="0"/>
+                            </p:stCondLst>
+                            <p:childTnLst>
+                              <p:par>
+                                <p:cTn id="73" presetID="22" presetClass="entr" presetSubtype="4" fill="hold" nodeType="clickEffect">
+                                  <p:stCondLst>
+                                    <p:cond delay="0"/>
+                                  </p:stCondLst>
+                                  <p:childTnLst>
+                                    <p:set>
+                                      <p:cBhvr>
+                                        <p:cTn id="74" dur="1" fill="hold">
+                                          <p:stCondLst>
+                                            <p:cond delay="0"/>
+                                          </p:stCondLst>
+                                        </p:cTn>
+                                        <p:tgtEl>
+                                          <p:spTgt spid="58"/>
+                                        </p:tgtEl>
+                                        <p:attrNameLst>
+                                          <p:attrName>style.visibility</p:attrName>
+                                        </p:attrNameLst>
+                                      </p:cBhvr>
+                                      <p:to>
+                                        <p:strVal val="visible"/>
+                                      </p:to>
+                                    </p:set>
+                                    <p:animEffect transition="in" filter="wipe(down)">
+                                      <p:cBhvr>
+                                        <p:cTn id="75" dur="500"/>
+                                        <p:tgtEl>
+                                          <p:spTgt spid="58"/>
+                                        </p:tgtEl>
+                                      </p:cBhvr>
+                                    </p:animEffect>
+                                  </p:childTnLst>
+                                </p:cTn>
+                              </p:par>
+                            </p:childTnLst>
+                          </p:cTn>
+                        </p:par>
+                        <p:par>
+                          <p:cTn id="76" fill="hold">
+                            <p:stCondLst>
+                              <p:cond delay="500"/>
+                            </p:stCondLst>
+                            <p:childTnLst>
+                              <p:par>
+                                <p:cTn id="77" presetID="9" presetClass="entr" presetSubtype="0" fill="hold" nodeType="afterEffect">
+                                  <p:stCondLst>
+                                    <p:cond delay="0"/>
+                                  </p:stCondLst>
+                                  <p:childTnLst>
+                                    <p:set>
+                                      <p:cBhvr>
+                                        <p:cTn id="78" dur="1" fill="hold">
+                                          <p:stCondLst>
+                                            <p:cond delay="0"/>
+                                          </p:stCondLst>
+                                        </p:cTn>
+                                        <p:tgtEl>
+                                          <p:spTgt spid="39"/>
+                                        </p:tgtEl>
+                                        <p:attrNameLst>
+                                          <p:attrName>style.visibility</p:attrName>
+                                        </p:attrNameLst>
+                                      </p:cBhvr>
+                                      <p:to>
+                                        <p:strVal val="visible"/>
+                                      </p:to>
+                                    </p:set>
+                                    <p:animEffect transition="in" filter="dissolve">
+                                      <p:cBhvr>
+                                        <p:cTn id="79" dur="500"/>
+                                        <p:tgtEl>
+                                          <p:spTgt spid="39"/>
+                                        </p:tgtEl>
+                                      </p:cBhvr>
+                                    </p:animEffect>
+                                  </p:childTnLst>
+                                </p:cTn>
+                              </p:par>
+                            </p:childTnLst>
+                          </p:cTn>
+                        </p:par>
+                        <p:par>
+                          <p:cTn id="80" fill="hold">
+                            <p:stCondLst>
+                              <p:cond delay="1000"/>
+                            </p:stCondLst>
+                            <p:childTnLst>
+                              <p:par>
+                                <p:cTn id="81" presetID="22" presetClass="entr" presetSubtype="2" fill="hold" nodeType="afterEffect">
+                                  <p:stCondLst>
+                                    <p:cond delay="0"/>
+                                  </p:stCondLst>
+                                  <p:childTnLst>
+                                    <p:set>
+                                      <p:cBhvr>
+                                        <p:cTn id="82" dur="1" fill="hold">
+                                          <p:stCondLst>
+                                            <p:cond delay="0"/>
+                                          </p:stCondLst>
+                                        </p:cTn>
+                                        <p:tgtEl>
+                                          <p:spTgt spid="61"/>
+                                        </p:tgtEl>
+                                        <p:attrNameLst>
+                                          <p:attrName>style.visibility</p:attrName>
+                                        </p:attrNameLst>
+                                      </p:cBhvr>
+                                      <p:to>
+                                        <p:strVal val="visible"/>
+                                      </p:to>
+                                    </p:set>
+                                    <p:animEffect transition="in" filter="wipe(right)">
+                                      <p:cBhvr>
+                                        <p:cTn id="83" dur="500"/>
+                                        <p:tgtEl>
+                                          <p:spTgt spid="61"/>
+                                        </p:tgtEl>
+                                      </p:cBhvr>
+                                    </p:animEffect>
+                                  </p:childTnLst>
+                                </p:cTn>
+                              </p:par>
+                            </p:childTnLst>
+                          </p:cTn>
+                        </p:par>
+                        <p:par>
+                          <p:cTn id="84" fill="hold">
+                            <p:stCondLst>
+                              <p:cond delay="1500"/>
+                            </p:stCondLst>
+                            <p:childTnLst>
+                              <p:par>
+                                <p:cTn id="85" presetID="9" presetClass="entr" presetSubtype="0" fill="hold" nodeType="afterEffect">
+                                  <p:stCondLst>
+                                    <p:cond delay="0"/>
+                                  </p:stCondLst>
+                                  <p:childTnLst>
+                                    <p:set>
+                                      <p:cBhvr>
+                                        <p:cTn id="86" dur="1" fill="hold">
+                                          <p:stCondLst>
+                                            <p:cond delay="0"/>
+                                          </p:stCondLst>
+                                        </p:cTn>
+                                        <p:tgtEl>
+                                          <p:spTgt spid="40"/>
+                                        </p:tgtEl>
+                                        <p:attrNameLst>
+                                          <p:attrName>style.visibility</p:attrName>
+                                        </p:attrNameLst>
+                                      </p:cBhvr>
+                                      <p:to>
+                                        <p:strVal val="visible"/>
+                                      </p:to>
+                                    </p:set>
+                                    <p:animEffect transition="in" filter="dissolve">
+                                      <p:cBhvr>
+                                        <p:cTn id="87" dur="500"/>
+                                        <p:tgtEl>
+                                          <p:spTgt spid="40"/>
                                         </p:tgtEl>
                                       </p:cBhvr>
                                     </p:animEffect>
@@ -13165,7 +14688,7 @@
             <a:pPr lvl="1"/>
             <a:r>
               <a:rPr lang="en-US" dirty="0">
-                <a:hlinkClick r:id="rId2"/>
+                <a:hlinkClick r:id="rId3"/>
               </a:rPr>
               <a:t>https://www.docker.com/products/docker-desktop</a:t>
             </a:r>
@@ -13175,22 +14698,6 @@
             <a:r>
               <a:rPr lang="en-US" dirty="0"/>
               <a:t>Connect to the ATC VPN</a:t>
-            </a:r>
-          </a:p>
-          <a:p>
-            <a:pPr lvl="1"/>
-            <a:r>
-              <a:rPr lang="en-US" dirty="0">
-                <a:hlinkClick r:id="rId3"/>
-              </a:rPr>
-              <a:t>https://atc-support.apps.wwtatc.com/vpn_access</a:t>
-            </a:r>
-            <a:endParaRPr lang="en-US" dirty="0"/>
-          </a:p>
-          <a:p>
-            <a:r>
-              <a:rPr lang="en-US" dirty="0"/>
-              <a:t>Download this presentation from WWT’s GitHub</a:t>
             </a:r>
           </a:p>
           <a:p>
@@ -13199,6 +14706,22 @@
               <a:rPr lang="en-US" dirty="0">
                 <a:hlinkClick r:id="rId4"/>
               </a:rPr>
+              <a:t>https://atc-support.apps.wwtatc.com/vpn_access</a:t>
+            </a:r>
+            <a:endParaRPr lang="en-US" dirty="0"/>
+          </a:p>
+          <a:p>
+            <a:r>
+              <a:rPr lang="en-US" dirty="0"/>
+              <a:t>Download this presentation from WWT’s GitHub</a:t>
+            </a:r>
+          </a:p>
+          <a:p>
+            <a:pPr lvl="1"/>
+            <a:r>
+              <a:rPr lang="en-US" dirty="0">
+                <a:hlinkClick r:id="rId5"/>
+              </a:rPr>
               <a:t>https://github.wwt.com/hullt/docker-foundations</a:t>
             </a:r>
             <a:endParaRPr lang="en-US" dirty="0"/>
@@ -13213,7 +14736,7 @@
             <a:pPr lvl="1"/>
             <a:r>
               <a:rPr lang="en-US" dirty="0">
-                <a:hlinkClick r:id="rId5"/>
+                <a:hlinkClick r:id="rId6"/>
               </a:rPr>
               <a:t>https://code.visualstudio.com/Download</a:t>
             </a:r>
@@ -14665,6 +16188,179 @@
     <p:extLst>
       <p:ext uri="{BB962C8B-B14F-4D97-AF65-F5344CB8AC3E}">
         <p14:creationId xmlns:p14="http://schemas.microsoft.com/office/powerpoint/2010/main" val="2609123940"/>
+      </p:ext>
+    </p:extLst>
+  </p:cSld>
+  <p:clrMapOvr>
+    <a:masterClrMapping/>
+  </p:clrMapOvr>
+  <mc:AlternateContent xmlns:mc="http://schemas.openxmlformats.org/markup-compatibility/2006" xmlns:p14="http://schemas.microsoft.com/office/powerpoint/2010/main">
+    <mc:Choice Requires="p14">
+      <p:transition spd="med" p14:dur="700">
+        <p:fade/>
+      </p:transition>
+    </mc:Choice>
+    <mc:Fallback xmlns="">
+      <p:transition spd="med">
+        <p:fade/>
+      </p:transition>
+    </mc:Fallback>
+  </mc:AlternateContent>
+</p:sld>
+</file>
+
+<file path=ppt/slides/slide24.xml><?xml version="1.0" encoding="utf-8"?>
+<p:sld xmlns:a="http://schemas.openxmlformats.org/drawingml/2006/main" xmlns:r="http://schemas.openxmlformats.org/officeDocument/2006/relationships" xmlns:p="http://schemas.openxmlformats.org/presentationml/2006/main">
+  <p:cSld>
+    <p:spTree>
+      <p:nvGrpSpPr>
+        <p:cNvPr id="1" name=""/>
+        <p:cNvGrpSpPr/>
+        <p:nvPr/>
+      </p:nvGrpSpPr>
+      <p:grpSpPr>
+        <a:xfrm>
+          <a:off x="0" y="0"/>
+          <a:ext cx="0" cy="0"/>
+          <a:chOff x="0" y="0"/>
+          <a:chExt cx="0" cy="0"/>
+        </a:xfrm>
+      </p:grpSpPr>
+      <p:pic>
+        <p:nvPicPr>
+          <p:cNvPr id="11" name="Picture 10" descr="A close up of a sign&#10;&#10;Description automatically generated">
+            <a:extLst>
+              <a:ext uri="{FF2B5EF4-FFF2-40B4-BE49-F238E27FC236}">
+                <a16:creationId xmlns:a16="http://schemas.microsoft.com/office/drawing/2014/main" id="{B65EBD54-CF93-1D4A-A39B-E0E2861C9378}"/>
+              </a:ext>
+            </a:extLst>
+          </p:cNvPr>
+          <p:cNvPicPr>
+            <a:picLocks noChangeAspect="1"/>
+          </p:cNvPicPr>
+          <p:nvPr/>
+        </p:nvPicPr>
+        <p:blipFill>
+          <a:blip r:embed="rId3"/>
+          <a:stretch>
+            <a:fillRect/>
+          </a:stretch>
+        </p:blipFill>
+        <p:spPr>
+          <a:xfrm>
+            <a:off x="4202610" y="1817365"/>
+            <a:ext cx="3786779" cy="3223270"/>
+          </a:xfrm>
+          <a:prstGeom prst="rect">
+            <a:avLst/>
+          </a:prstGeom>
+        </p:spPr>
+      </p:pic>
+    </p:spTree>
+    <p:extLst>
+      <p:ext uri="{BB962C8B-B14F-4D97-AF65-F5344CB8AC3E}">
+        <p14:creationId xmlns:p14="http://schemas.microsoft.com/office/powerpoint/2010/main" val="3759662578"/>
+      </p:ext>
+    </p:extLst>
+  </p:cSld>
+  <p:clrMapOvr>
+    <a:masterClrMapping/>
+  </p:clrMapOvr>
+  <mc:AlternateContent xmlns:mc="http://schemas.openxmlformats.org/markup-compatibility/2006" xmlns:p14="http://schemas.microsoft.com/office/powerpoint/2010/main">
+    <mc:Choice Requires="p14">
+      <p:transition spd="med" p14:dur="700">
+        <p:fade/>
+      </p:transition>
+    </mc:Choice>
+    <mc:Fallback xmlns="">
+      <p:transition spd="med">
+        <p:fade/>
+      </p:transition>
+    </mc:Fallback>
+  </mc:AlternateContent>
+</p:sld>
+</file>
+
+<file path=ppt/slides/slide25.xml><?xml version="1.0" encoding="utf-8"?>
+<p:sld xmlns:a="http://schemas.openxmlformats.org/drawingml/2006/main" xmlns:r="http://schemas.openxmlformats.org/officeDocument/2006/relationships" xmlns:p="http://schemas.openxmlformats.org/presentationml/2006/main">
+  <p:cSld>
+    <p:spTree>
+      <p:nvGrpSpPr>
+        <p:cNvPr id="1" name=""/>
+        <p:cNvGrpSpPr/>
+        <p:nvPr/>
+      </p:nvGrpSpPr>
+      <p:grpSpPr>
+        <a:xfrm>
+          <a:off x="0" y="0"/>
+          <a:ext cx="0" cy="0"/>
+          <a:chOff x="0" y="0"/>
+          <a:chExt cx="0" cy="0"/>
+        </a:xfrm>
+      </p:grpSpPr>
+      <p:sp>
+        <p:nvSpPr>
+          <p:cNvPr id="4" name="Date Placeholder 3">
+            <a:extLst>
+              <a:ext uri="{FF2B5EF4-FFF2-40B4-BE49-F238E27FC236}">
+                <a16:creationId xmlns:a16="http://schemas.microsoft.com/office/drawing/2014/main" id="{0CD670A9-B06A-3448-BABA-FAD627500859}"/>
+              </a:ext>
+            </a:extLst>
+          </p:cNvPr>
+          <p:cNvSpPr>
+            <a:spLocks noGrp="1"/>
+          </p:cNvSpPr>
+          <p:nvPr>
+            <p:ph type="dt" sz="half" idx="10"/>
+          </p:nvPr>
+        </p:nvSpPr>
+        <p:spPr/>
+        <p:txBody>
+          <a:bodyPr/>
+          <a:lstStyle/>
+          <a:p>
+            <a:r>
+              <a:rPr lang="en-US"/>
+              <a:t>World Wide Technology ©</a:t>
+            </a:r>
+            <a:endParaRPr lang="en-US" dirty="0"/>
+          </a:p>
+        </p:txBody>
+      </p:sp>
+      <p:sp>
+        <p:nvSpPr>
+          <p:cNvPr id="5" name="Slide Number Placeholder 4">
+            <a:extLst>
+              <a:ext uri="{FF2B5EF4-FFF2-40B4-BE49-F238E27FC236}">
+                <a16:creationId xmlns:a16="http://schemas.microsoft.com/office/drawing/2014/main" id="{119DACAD-17C1-C249-A498-C4A1A1ADD334}"/>
+              </a:ext>
+            </a:extLst>
+          </p:cNvPr>
+          <p:cNvSpPr>
+            <a:spLocks noGrp="1"/>
+          </p:cNvSpPr>
+          <p:nvPr>
+            <p:ph type="sldNum" sz="quarter" idx="12"/>
+          </p:nvPr>
+        </p:nvSpPr>
+        <p:spPr/>
+        <p:txBody>
+          <a:bodyPr/>
+          <a:lstStyle/>
+          <a:p>
+            <a:fld id="{A44B02FA-DD2D-1844-AE35-8B2EAB0CF4EF}" type="slidenum">
+              <a:rPr lang="en-US" smtClean="0"/>
+              <a:pPr/>
+              <a:t>25</a:t>
+            </a:fld>
+            <a:endParaRPr lang="en-US" dirty="0"/>
+          </a:p>
+        </p:txBody>
+      </p:sp>
+    </p:spTree>
+    <p:extLst>
+      <p:ext uri="{BB962C8B-B14F-4D97-AF65-F5344CB8AC3E}">
+        <p14:creationId xmlns:p14="http://schemas.microsoft.com/office/powerpoint/2010/main" val="756638364"/>
       </p:ext>
     </p:extLst>
   </p:cSld>

</xml_diff>

<commit_message>
Started Docker hands-on section
</commit_message>
<xml_diff>
--- a/docker-foundations.pptx
+++ b/docker-foundations.pptx
@@ -13634,11 +13634,11 @@
           <a:p>
             <a:r>
               <a:rPr lang="en-US" dirty="0"/>
-              <a:t>Installing</a:t>
+              <a:t>Verify Your</a:t>
             </a:r>
             <a:r>
               <a:rPr lang="en-US" baseline="0" dirty="0"/>
-              <a:t> Docker</a:t>
+              <a:t> Docker Installation</a:t>
             </a:r>
             <a:endParaRPr lang="en-US" dirty="0"/>
           </a:p>
@@ -13667,18 +13667,59 @@
           <a:p>
             <a:r>
               <a:rPr lang="en-US" dirty="0"/>
-              <a:t>Setup Docker account</a:t>
+              <a:t>Open/start Docker Desktop</a:t>
             </a:r>
           </a:p>
           <a:p>
             <a:r>
               <a:rPr lang="en-US" dirty="0"/>
-              <a:t>Verify docker installation (docker info docker --version)</a:t>
-            </a:r>
-          </a:p>
-          <a:p>
+              <a:t>Open your terminal (bash, PowerShell, </a:t>
+            </a:r>
+            <a:r>
+              <a:rPr lang="en-US" dirty="0" err="1"/>
+              <a:t>zsh</a:t>
+            </a:r>
             <a:r>
               <a:rPr lang="en-US" dirty="0"/>
+              <a:t>, etc.)</a:t>
+            </a:r>
+          </a:p>
+          <a:p>
+            <a:r>
+              <a:rPr lang="en-US" dirty="0"/>
+              <a:t>Enter the commands:</a:t>
+            </a:r>
+          </a:p>
+          <a:p>
+            <a:pPr lvl="1"/>
+            <a:r>
+              <a:rPr lang="en-US" b="1" i="1" dirty="0">
+                <a:solidFill>
+                  <a:srgbClr val="FFFF00"/>
+                </a:solidFill>
+              </a:rPr>
+              <a:t>docker info</a:t>
+            </a:r>
+          </a:p>
+          <a:p>
+            <a:pPr lvl="1"/>
+            <a:r>
+              <a:rPr lang="en-US" b="1" i="1" dirty="0">
+                <a:solidFill>
+                  <a:srgbClr val="FFFF00"/>
+                </a:solidFill>
+              </a:rPr>
+              <a:t>docker --version</a:t>
+            </a:r>
+          </a:p>
+          <a:p>
+            <a:pPr lvl="1"/>
+            <a:r>
+              <a:rPr lang="en-US" b="1" i="1" dirty="0">
+                <a:solidFill>
+                  <a:srgbClr val="FFFF00"/>
+                </a:solidFill>
+              </a:rPr>
               <a:t>docker run hello-world</a:t>
             </a:r>
           </a:p>
@@ -14676,12 +14717,14 @@
         </p:nvSpPr>
         <p:spPr/>
         <p:txBody>
-          <a:bodyPr/>
+          <a:bodyPr>
+            <a:normAutofit fontScale="92500" lnSpcReduction="10000"/>
+          </a:bodyPr>
           <a:lstStyle/>
           <a:p>
             <a:r>
               <a:rPr lang="en-US" dirty="0"/>
-              <a:t>Install Docker Desktop</a:t>
+              <a:t>Create a Docker Hub Account</a:t>
             </a:r>
           </a:p>
           <a:p>
@@ -14690,14 +14733,14 @@
               <a:rPr lang="en-US" dirty="0">
                 <a:hlinkClick r:id="rId3"/>
               </a:rPr>
-              <a:t>https://www.docker.com/products/docker-desktop</a:t>
+              <a:t>https://hub.docker.com/signup</a:t>
             </a:r>
             <a:endParaRPr lang="en-US" dirty="0"/>
           </a:p>
           <a:p>
             <a:r>
               <a:rPr lang="en-US" dirty="0"/>
-              <a:t>Connect to the ATC VPN</a:t>
+              <a:t>Download and install Docker Desktop</a:t>
             </a:r>
           </a:p>
           <a:p>
@@ -14706,14 +14749,14 @@
               <a:rPr lang="en-US" dirty="0">
                 <a:hlinkClick r:id="rId4"/>
               </a:rPr>
-              <a:t>https://atc-support.apps.wwtatc.com/vpn_access</a:t>
+              <a:t>https://www.docker.com/products/docker-desktop</a:t>
             </a:r>
             <a:endParaRPr lang="en-US" dirty="0"/>
           </a:p>
           <a:p>
             <a:r>
               <a:rPr lang="en-US" dirty="0"/>
-              <a:t>Download this presentation from WWT’s GitHub</a:t>
+              <a:t>Connect to the ATC VPN</a:t>
             </a:r>
           </a:p>
           <a:p>
@@ -14722,14 +14765,14 @@
               <a:rPr lang="en-US" dirty="0">
                 <a:hlinkClick r:id="rId5"/>
               </a:rPr>
-              <a:t>https://github.wwt.com/hullt/docker-foundations</a:t>
+              <a:t>https://atc-support.apps.wwtatc.com/vpn_access</a:t>
             </a:r>
             <a:endParaRPr lang="en-US" dirty="0"/>
           </a:p>
           <a:p>
             <a:r>
               <a:rPr lang="en-US" dirty="0"/>
-              <a:t>Install a code editor</a:t>
+              <a:t>Download this presentation from WWT’s internal GitHub</a:t>
             </a:r>
           </a:p>
           <a:p>
@@ -14738,13 +14781,33 @@
               <a:rPr lang="en-US" dirty="0">
                 <a:hlinkClick r:id="rId6"/>
               </a:rPr>
+              <a:t>https://github.wwt.com/hullt/docker-foundations</a:t>
+            </a:r>
+            <a:endParaRPr lang="en-US" dirty="0"/>
+          </a:p>
+          <a:p>
+            <a:r>
+              <a:rPr lang="en-US" dirty="0"/>
+              <a:t>Install a code editor</a:t>
+            </a:r>
+          </a:p>
+          <a:p>
+            <a:pPr lvl="1"/>
+            <a:r>
+              <a:rPr lang="en-US" dirty="0">
+                <a:hlinkClick r:id="rId7"/>
+              </a:rPr>
               <a:t>https://code.visualstudio.com/Download</a:t>
             </a:r>
             <a:endParaRPr lang="en-US" dirty="0"/>
           </a:p>
           <a:p>
             <a:r>
-              <a:rPr lang="en-US" dirty="0"/>
+              <a:rPr lang="en-US" dirty="0">
+                <a:solidFill>
+                  <a:srgbClr val="FFFF00"/>
+                </a:solidFill>
+              </a:rPr>
               <a:t>Wait a few minutes while we get through a Docker overview</a:t>
             </a:r>
           </a:p>
@@ -14856,7 +14919,7 @@
                             </p:stCondLst>
                             <p:childTnLst>
                               <p:par>
-                                <p:cTn id="5" presetID="9" presetClass="entr" presetSubtype="0" fill="hold" nodeType="clickEffect">
+                                <p:cTn id="5" presetID="9" presetClass="entr" presetSubtype="0" fill="hold" grpId="0" nodeType="clickEffect">
                                   <p:stCondLst>
                                     <p:cond delay="0"/>
                                   </p:stCondLst>
@@ -14899,7 +14962,7 @@
                                 </p:cTn>
                               </p:par>
                               <p:par>
-                                <p:cTn id="8" presetID="9" presetClass="entr" presetSubtype="0" fill="hold" nodeType="withEffect">
+                                <p:cTn id="8" presetID="9" presetClass="entr" presetSubtype="0" fill="hold" grpId="0" nodeType="withEffect">
                                   <p:stCondLst>
                                     <p:cond delay="0"/>
                                   </p:stCondLst>
@@ -14933,264 +14996,6 @@
                                           <p:spTgt spid="3">
                                             <p:txEl>
                                               <p:pRg st="1" end="1"/>
-                                            </p:txEl>
-                                          </p:spTgt>
-                                        </p:tgtEl>
-                                      </p:cBhvr>
-                                    </p:animEffect>
-                                  </p:childTnLst>
-                                </p:cTn>
-                              </p:par>
-                              <p:par>
-                                <p:cTn id="11" presetID="9" presetClass="entr" presetSubtype="0" fill="hold" nodeType="withEffect">
-                                  <p:stCondLst>
-                                    <p:cond delay="0"/>
-                                  </p:stCondLst>
-                                  <p:childTnLst>
-                                    <p:set>
-                                      <p:cBhvr>
-                                        <p:cTn id="12" dur="1" fill="hold">
-                                          <p:stCondLst>
-                                            <p:cond delay="0"/>
-                                          </p:stCondLst>
-                                        </p:cTn>
-                                        <p:tgtEl>
-                                          <p:spTgt spid="3">
-                                            <p:txEl>
-                                              <p:pRg st="2" end="2"/>
-                                            </p:txEl>
-                                          </p:spTgt>
-                                        </p:tgtEl>
-                                        <p:attrNameLst>
-                                          <p:attrName>style.visibility</p:attrName>
-                                        </p:attrNameLst>
-                                      </p:cBhvr>
-                                      <p:to>
-                                        <p:strVal val="visible"/>
-                                      </p:to>
-                                    </p:set>
-                                    <p:animEffect transition="in" filter="dissolve">
-                                      <p:cBhvr>
-                                        <p:cTn id="13" dur="500"/>
-                                        <p:tgtEl>
-                                          <p:spTgt spid="3">
-                                            <p:txEl>
-                                              <p:pRg st="2" end="2"/>
-                                            </p:txEl>
-                                          </p:spTgt>
-                                        </p:tgtEl>
-                                      </p:cBhvr>
-                                    </p:animEffect>
-                                  </p:childTnLst>
-                                </p:cTn>
-                              </p:par>
-                              <p:par>
-                                <p:cTn id="14" presetID="9" presetClass="entr" presetSubtype="0" fill="hold" nodeType="withEffect">
-                                  <p:stCondLst>
-                                    <p:cond delay="0"/>
-                                  </p:stCondLst>
-                                  <p:childTnLst>
-                                    <p:set>
-                                      <p:cBhvr>
-                                        <p:cTn id="15" dur="1" fill="hold">
-                                          <p:stCondLst>
-                                            <p:cond delay="0"/>
-                                          </p:stCondLst>
-                                        </p:cTn>
-                                        <p:tgtEl>
-                                          <p:spTgt spid="3">
-                                            <p:txEl>
-                                              <p:pRg st="3" end="3"/>
-                                            </p:txEl>
-                                          </p:spTgt>
-                                        </p:tgtEl>
-                                        <p:attrNameLst>
-                                          <p:attrName>style.visibility</p:attrName>
-                                        </p:attrNameLst>
-                                      </p:cBhvr>
-                                      <p:to>
-                                        <p:strVal val="visible"/>
-                                      </p:to>
-                                    </p:set>
-                                    <p:animEffect transition="in" filter="dissolve">
-                                      <p:cBhvr>
-                                        <p:cTn id="16" dur="500"/>
-                                        <p:tgtEl>
-                                          <p:spTgt spid="3">
-                                            <p:txEl>
-                                              <p:pRg st="3" end="3"/>
-                                            </p:txEl>
-                                          </p:spTgt>
-                                        </p:tgtEl>
-                                      </p:cBhvr>
-                                    </p:animEffect>
-                                  </p:childTnLst>
-                                </p:cTn>
-                              </p:par>
-                              <p:par>
-                                <p:cTn id="17" presetID="9" presetClass="entr" presetSubtype="0" fill="hold" nodeType="withEffect">
-                                  <p:stCondLst>
-                                    <p:cond delay="0"/>
-                                  </p:stCondLst>
-                                  <p:childTnLst>
-                                    <p:set>
-                                      <p:cBhvr>
-                                        <p:cTn id="18" dur="1" fill="hold">
-                                          <p:stCondLst>
-                                            <p:cond delay="0"/>
-                                          </p:stCondLst>
-                                        </p:cTn>
-                                        <p:tgtEl>
-                                          <p:spTgt spid="3">
-                                            <p:txEl>
-                                              <p:pRg st="4" end="4"/>
-                                            </p:txEl>
-                                          </p:spTgt>
-                                        </p:tgtEl>
-                                        <p:attrNameLst>
-                                          <p:attrName>style.visibility</p:attrName>
-                                        </p:attrNameLst>
-                                      </p:cBhvr>
-                                      <p:to>
-                                        <p:strVal val="visible"/>
-                                      </p:to>
-                                    </p:set>
-                                    <p:animEffect transition="in" filter="dissolve">
-                                      <p:cBhvr>
-                                        <p:cTn id="19" dur="500"/>
-                                        <p:tgtEl>
-                                          <p:spTgt spid="3">
-                                            <p:txEl>
-                                              <p:pRg st="4" end="4"/>
-                                            </p:txEl>
-                                          </p:spTgt>
-                                        </p:tgtEl>
-                                      </p:cBhvr>
-                                    </p:animEffect>
-                                  </p:childTnLst>
-                                </p:cTn>
-                              </p:par>
-                              <p:par>
-                                <p:cTn id="20" presetID="9" presetClass="entr" presetSubtype="0" fill="hold" nodeType="withEffect">
-                                  <p:stCondLst>
-                                    <p:cond delay="0"/>
-                                  </p:stCondLst>
-                                  <p:childTnLst>
-                                    <p:set>
-                                      <p:cBhvr>
-                                        <p:cTn id="21" dur="1" fill="hold">
-                                          <p:stCondLst>
-                                            <p:cond delay="0"/>
-                                          </p:stCondLst>
-                                        </p:cTn>
-                                        <p:tgtEl>
-                                          <p:spTgt spid="3">
-                                            <p:txEl>
-                                              <p:pRg st="5" end="5"/>
-                                            </p:txEl>
-                                          </p:spTgt>
-                                        </p:tgtEl>
-                                        <p:attrNameLst>
-                                          <p:attrName>style.visibility</p:attrName>
-                                        </p:attrNameLst>
-                                      </p:cBhvr>
-                                      <p:to>
-                                        <p:strVal val="visible"/>
-                                      </p:to>
-                                    </p:set>
-                                    <p:animEffect transition="in" filter="dissolve">
-                                      <p:cBhvr>
-                                        <p:cTn id="22" dur="500"/>
-                                        <p:tgtEl>
-                                          <p:spTgt spid="3">
-                                            <p:txEl>
-                                              <p:pRg st="5" end="5"/>
-                                            </p:txEl>
-                                          </p:spTgt>
-                                        </p:tgtEl>
-                                      </p:cBhvr>
-                                    </p:animEffect>
-                                  </p:childTnLst>
-                                </p:cTn>
-                              </p:par>
-                              <p:par>
-                                <p:cTn id="23" presetID="9" presetClass="entr" presetSubtype="0" fill="hold" nodeType="withEffect">
-                                  <p:stCondLst>
-                                    <p:cond delay="0"/>
-                                  </p:stCondLst>
-                                  <p:childTnLst>
-                                    <p:set>
-                                      <p:cBhvr>
-                                        <p:cTn id="24" dur="1" fill="hold">
-                                          <p:stCondLst>
-                                            <p:cond delay="0"/>
-                                          </p:stCondLst>
-                                        </p:cTn>
-                                        <p:tgtEl>
-                                          <p:spTgt spid="3">
-                                            <p:txEl>
-                                              <p:pRg st="6" end="6"/>
-                                            </p:txEl>
-                                          </p:spTgt>
-                                        </p:tgtEl>
-                                        <p:attrNameLst>
-                                          <p:attrName>style.visibility</p:attrName>
-                                        </p:attrNameLst>
-                                      </p:cBhvr>
-                                      <p:to>
-                                        <p:strVal val="visible"/>
-                                      </p:to>
-                                    </p:set>
-                                    <p:animEffect transition="in" filter="dissolve">
-                                      <p:cBhvr>
-                                        <p:cTn id="25" dur="500"/>
-                                        <p:tgtEl>
-                                          <p:spTgt spid="3">
-                                            <p:txEl>
-                                              <p:pRg st="6" end="6"/>
-                                            </p:txEl>
-                                          </p:spTgt>
-                                        </p:tgtEl>
-                                      </p:cBhvr>
-                                    </p:animEffect>
-                                  </p:childTnLst>
-                                </p:cTn>
-                              </p:par>
-                              <p:par>
-                                <p:cTn id="26" presetID="9" presetClass="entr" presetSubtype="0" fill="hold" nodeType="withEffect">
-                                  <p:stCondLst>
-                                    <p:cond delay="0"/>
-                                  </p:stCondLst>
-                                  <p:childTnLst>
-                                    <p:set>
-                                      <p:cBhvr>
-                                        <p:cTn id="27" dur="1" fill="hold">
-                                          <p:stCondLst>
-                                            <p:cond delay="0"/>
-                                          </p:stCondLst>
-                                        </p:cTn>
-                                        <p:tgtEl>
-                                          <p:spTgt spid="3">
-                                            <p:txEl>
-                                              <p:pRg st="7" end="7"/>
-                                            </p:txEl>
-                                          </p:spTgt>
-                                        </p:tgtEl>
-                                        <p:attrNameLst>
-                                          <p:attrName>style.visibility</p:attrName>
-                                        </p:attrNameLst>
-                                      </p:cBhvr>
-                                      <p:to>
-                                        <p:strVal val="visible"/>
-                                      </p:to>
-                                    </p:set>
-                                    <p:animEffect transition="in" filter="dissolve">
-                                      <p:cBhvr>
-                                        <p:cTn id="28" dur="500"/>
-                                        <p:tgtEl>
-                                          <p:spTgt spid="3">
-                                            <p:txEl>
-                                              <p:pRg st="7" end="7"/>
                                             </p:txEl>
                                           </p:spTgt>
                                         </p:tgtEl>
@@ -15206,26 +15011,338 @@
                     </p:cTn>
                   </p:par>
                   <p:par>
-                    <p:cTn id="29" fill="hold">
+                    <p:cTn id="11" fill="hold">
                       <p:stCondLst>
                         <p:cond delay="indefinite"/>
                       </p:stCondLst>
                       <p:childTnLst>
                         <p:par>
-                          <p:cTn id="30" fill="hold">
+                          <p:cTn id="12" fill="hold">
                             <p:stCondLst>
                               <p:cond delay="0"/>
                             </p:stCondLst>
                             <p:childTnLst>
                               <p:par>
-                                <p:cTn id="31" presetID="9" presetClass="entr" presetSubtype="0" fill="hold" nodeType="clickEffect">
+                                <p:cTn id="13" presetID="9" presetClass="entr" presetSubtype="0" fill="hold" grpId="0" nodeType="clickEffect">
                                   <p:stCondLst>
                                     <p:cond delay="0"/>
                                   </p:stCondLst>
                                   <p:childTnLst>
                                     <p:set>
                                       <p:cBhvr>
-                                        <p:cTn id="32" dur="1" fill="hold">
+                                        <p:cTn id="14" dur="1" fill="hold">
+                                          <p:stCondLst>
+                                            <p:cond delay="0"/>
+                                          </p:stCondLst>
+                                        </p:cTn>
+                                        <p:tgtEl>
+                                          <p:spTgt spid="3">
+                                            <p:txEl>
+                                              <p:pRg st="2" end="2"/>
+                                            </p:txEl>
+                                          </p:spTgt>
+                                        </p:tgtEl>
+                                        <p:attrNameLst>
+                                          <p:attrName>style.visibility</p:attrName>
+                                        </p:attrNameLst>
+                                      </p:cBhvr>
+                                      <p:to>
+                                        <p:strVal val="visible"/>
+                                      </p:to>
+                                    </p:set>
+                                    <p:animEffect transition="in" filter="dissolve">
+                                      <p:cBhvr>
+                                        <p:cTn id="15" dur="500"/>
+                                        <p:tgtEl>
+                                          <p:spTgt spid="3">
+                                            <p:txEl>
+                                              <p:pRg st="2" end="2"/>
+                                            </p:txEl>
+                                          </p:spTgt>
+                                        </p:tgtEl>
+                                      </p:cBhvr>
+                                    </p:animEffect>
+                                  </p:childTnLst>
+                                </p:cTn>
+                              </p:par>
+                              <p:par>
+                                <p:cTn id="16" presetID="9" presetClass="entr" presetSubtype="0" fill="hold" grpId="0" nodeType="withEffect">
+                                  <p:stCondLst>
+                                    <p:cond delay="0"/>
+                                  </p:stCondLst>
+                                  <p:childTnLst>
+                                    <p:set>
+                                      <p:cBhvr>
+                                        <p:cTn id="17" dur="1" fill="hold">
+                                          <p:stCondLst>
+                                            <p:cond delay="0"/>
+                                          </p:stCondLst>
+                                        </p:cTn>
+                                        <p:tgtEl>
+                                          <p:spTgt spid="3">
+                                            <p:txEl>
+                                              <p:pRg st="3" end="3"/>
+                                            </p:txEl>
+                                          </p:spTgt>
+                                        </p:tgtEl>
+                                        <p:attrNameLst>
+                                          <p:attrName>style.visibility</p:attrName>
+                                        </p:attrNameLst>
+                                      </p:cBhvr>
+                                      <p:to>
+                                        <p:strVal val="visible"/>
+                                      </p:to>
+                                    </p:set>
+                                    <p:animEffect transition="in" filter="dissolve">
+                                      <p:cBhvr>
+                                        <p:cTn id="18" dur="500"/>
+                                        <p:tgtEl>
+                                          <p:spTgt spid="3">
+                                            <p:txEl>
+                                              <p:pRg st="3" end="3"/>
+                                            </p:txEl>
+                                          </p:spTgt>
+                                        </p:tgtEl>
+                                      </p:cBhvr>
+                                    </p:animEffect>
+                                  </p:childTnLst>
+                                </p:cTn>
+                              </p:par>
+                            </p:childTnLst>
+                          </p:cTn>
+                        </p:par>
+                      </p:childTnLst>
+                    </p:cTn>
+                  </p:par>
+                  <p:par>
+                    <p:cTn id="19" fill="hold">
+                      <p:stCondLst>
+                        <p:cond delay="indefinite"/>
+                      </p:stCondLst>
+                      <p:childTnLst>
+                        <p:par>
+                          <p:cTn id="20" fill="hold">
+                            <p:stCondLst>
+                              <p:cond delay="0"/>
+                            </p:stCondLst>
+                            <p:childTnLst>
+                              <p:par>
+                                <p:cTn id="21" presetID="9" presetClass="entr" presetSubtype="0" fill="hold" grpId="0" nodeType="clickEffect">
+                                  <p:stCondLst>
+                                    <p:cond delay="0"/>
+                                  </p:stCondLst>
+                                  <p:childTnLst>
+                                    <p:set>
+                                      <p:cBhvr>
+                                        <p:cTn id="22" dur="1" fill="hold">
+                                          <p:stCondLst>
+                                            <p:cond delay="0"/>
+                                          </p:stCondLst>
+                                        </p:cTn>
+                                        <p:tgtEl>
+                                          <p:spTgt spid="3">
+                                            <p:txEl>
+                                              <p:pRg st="4" end="4"/>
+                                            </p:txEl>
+                                          </p:spTgt>
+                                        </p:tgtEl>
+                                        <p:attrNameLst>
+                                          <p:attrName>style.visibility</p:attrName>
+                                        </p:attrNameLst>
+                                      </p:cBhvr>
+                                      <p:to>
+                                        <p:strVal val="visible"/>
+                                      </p:to>
+                                    </p:set>
+                                    <p:animEffect transition="in" filter="dissolve">
+                                      <p:cBhvr>
+                                        <p:cTn id="23" dur="500"/>
+                                        <p:tgtEl>
+                                          <p:spTgt spid="3">
+                                            <p:txEl>
+                                              <p:pRg st="4" end="4"/>
+                                            </p:txEl>
+                                          </p:spTgt>
+                                        </p:tgtEl>
+                                      </p:cBhvr>
+                                    </p:animEffect>
+                                  </p:childTnLst>
+                                </p:cTn>
+                              </p:par>
+                              <p:par>
+                                <p:cTn id="24" presetID="9" presetClass="entr" presetSubtype="0" fill="hold" grpId="0" nodeType="withEffect">
+                                  <p:stCondLst>
+                                    <p:cond delay="0"/>
+                                  </p:stCondLst>
+                                  <p:childTnLst>
+                                    <p:set>
+                                      <p:cBhvr>
+                                        <p:cTn id="25" dur="1" fill="hold">
+                                          <p:stCondLst>
+                                            <p:cond delay="0"/>
+                                          </p:stCondLst>
+                                        </p:cTn>
+                                        <p:tgtEl>
+                                          <p:spTgt spid="3">
+                                            <p:txEl>
+                                              <p:pRg st="5" end="5"/>
+                                            </p:txEl>
+                                          </p:spTgt>
+                                        </p:tgtEl>
+                                        <p:attrNameLst>
+                                          <p:attrName>style.visibility</p:attrName>
+                                        </p:attrNameLst>
+                                      </p:cBhvr>
+                                      <p:to>
+                                        <p:strVal val="visible"/>
+                                      </p:to>
+                                    </p:set>
+                                    <p:animEffect transition="in" filter="dissolve">
+                                      <p:cBhvr>
+                                        <p:cTn id="26" dur="500"/>
+                                        <p:tgtEl>
+                                          <p:spTgt spid="3">
+                                            <p:txEl>
+                                              <p:pRg st="5" end="5"/>
+                                            </p:txEl>
+                                          </p:spTgt>
+                                        </p:tgtEl>
+                                      </p:cBhvr>
+                                    </p:animEffect>
+                                  </p:childTnLst>
+                                </p:cTn>
+                              </p:par>
+                            </p:childTnLst>
+                          </p:cTn>
+                        </p:par>
+                      </p:childTnLst>
+                    </p:cTn>
+                  </p:par>
+                  <p:par>
+                    <p:cTn id="27" fill="hold">
+                      <p:stCondLst>
+                        <p:cond delay="indefinite"/>
+                      </p:stCondLst>
+                      <p:childTnLst>
+                        <p:par>
+                          <p:cTn id="28" fill="hold">
+                            <p:stCondLst>
+                              <p:cond delay="0"/>
+                            </p:stCondLst>
+                            <p:childTnLst>
+                              <p:par>
+                                <p:cTn id="29" presetID="9" presetClass="entr" presetSubtype="0" fill="hold" grpId="0" nodeType="clickEffect">
+                                  <p:stCondLst>
+                                    <p:cond delay="0"/>
+                                  </p:stCondLst>
+                                  <p:childTnLst>
+                                    <p:set>
+                                      <p:cBhvr>
+                                        <p:cTn id="30" dur="1" fill="hold">
+                                          <p:stCondLst>
+                                            <p:cond delay="0"/>
+                                          </p:stCondLst>
+                                        </p:cTn>
+                                        <p:tgtEl>
+                                          <p:spTgt spid="3">
+                                            <p:txEl>
+                                              <p:pRg st="6" end="6"/>
+                                            </p:txEl>
+                                          </p:spTgt>
+                                        </p:tgtEl>
+                                        <p:attrNameLst>
+                                          <p:attrName>style.visibility</p:attrName>
+                                        </p:attrNameLst>
+                                      </p:cBhvr>
+                                      <p:to>
+                                        <p:strVal val="visible"/>
+                                      </p:to>
+                                    </p:set>
+                                    <p:animEffect transition="in" filter="dissolve">
+                                      <p:cBhvr>
+                                        <p:cTn id="31" dur="500"/>
+                                        <p:tgtEl>
+                                          <p:spTgt spid="3">
+                                            <p:txEl>
+                                              <p:pRg st="6" end="6"/>
+                                            </p:txEl>
+                                          </p:spTgt>
+                                        </p:tgtEl>
+                                      </p:cBhvr>
+                                    </p:animEffect>
+                                  </p:childTnLst>
+                                </p:cTn>
+                              </p:par>
+                              <p:par>
+                                <p:cTn id="32" presetID="9" presetClass="entr" presetSubtype="0" fill="hold" grpId="0" nodeType="withEffect">
+                                  <p:stCondLst>
+                                    <p:cond delay="0"/>
+                                  </p:stCondLst>
+                                  <p:childTnLst>
+                                    <p:set>
+                                      <p:cBhvr>
+                                        <p:cTn id="33" dur="1" fill="hold">
+                                          <p:stCondLst>
+                                            <p:cond delay="0"/>
+                                          </p:stCondLst>
+                                        </p:cTn>
+                                        <p:tgtEl>
+                                          <p:spTgt spid="3">
+                                            <p:txEl>
+                                              <p:pRg st="7" end="7"/>
+                                            </p:txEl>
+                                          </p:spTgt>
+                                        </p:tgtEl>
+                                        <p:attrNameLst>
+                                          <p:attrName>style.visibility</p:attrName>
+                                        </p:attrNameLst>
+                                      </p:cBhvr>
+                                      <p:to>
+                                        <p:strVal val="visible"/>
+                                      </p:to>
+                                    </p:set>
+                                    <p:animEffect transition="in" filter="dissolve">
+                                      <p:cBhvr>
+                                        <p:cTn id="34" dur="500"/>
+                                        <p:tgtEl>
+                                          <p:spTgt spid="3">
+                                            <p:txEl>
+                                              <p:pRg st="7" end="7"/>
+                                            </p:txEl>
+                                          </p:spTgt>
+                                        </p:tgtEl>
+                                      </p:cBhvr>
+                                    </p:animEffect>
+                                  </p:childTnLst>
+                                </p:cTn>
+                              </p:par>
+                            </p:childTnLst>
+                          </p:cTn>
+                        </p:par>
+                      </p:childTnLst>
+                    </p:cTn>
+                  </p:par>
+                  <p:par>
+                    <p:cTn id="35" fill="hold">
+                      <p:stCondLst>
+                        <p:cond delay="indefinite"/>
+                      </p:stCondLst>
+                      <p:childTnLst>
+                        <p:par>
+                          <p:cTn id="36" fill="hold">
+                            <p:stCondLst>
+                              <p:cond delay="0"/>
+                            </p:stCondLst>
+                            <p:childTnLst>
+                              <p:par>
+                                <p:cTn id="37" presetID="9" presetClass="entr" presetSubtype="0" fill="hold" grpId="0" nodeType="clickEffect">
+                                  <p:stCondLst>
+                                    <p:cond delay="0"/>
+                                  </p:stCondLst>
+                                  <p:childTnLst>
+                                    <p:set>
+                                      <p:cBhvr>
+                                        <p:cTn id="38" dur="1" fill="hold">
                                           <p:stCondLst>
                                             <p:cond delay="0"/>
                                           </p:stCondLst>
@@ -15247,11 +15364,115 @@
                                     </p:set>
                                     <p:animEffect transition="in" filter="dissolve">
                                       <p:cBhvr>
-                                        <p:cTn id="33" dur="500"/>
+                                        <p:cTn id="39" dur="500"/>
                                         <p:tgtEl>
                                           <p:spTgt spid="3">
                                             <p:txEl>
                                               <p:pRg st="8" end="8"/>
+                                            </p:txEl>
+                                          </p:spTgt>
+                                        </p:tgtEl>
+                                      </p:cBhvr>
+                                    </p:animEffect>
+                                  </p:childTnLst>
+                                </p:cTn>
+                              </p:par>
+                              <p:par>
+                                <p:cTn id="40" presetID="9" presetClass="entr" presetSubtype="0" fill="hold" grpId="0" nodeType="withEffect">
+                                  <p:stCondLst>
+                                    <p:cond delay="0"/>
+                                  </p:stCondLst>
+                                  <p:childTnLst>
+                                    <p:set>
+                                      <p:cBhvr>
+                                        <p:cTn id="41" dur="1" fill="hold">
+                                          <p:stCondLst>
+                                            <p:cond delay="0"/>
+                                          </p:stCondLst>
+                                        </p:cTn>
+                                        <p:tgtEl>
+                                          <p:spTgt spid="3">
+                                            <p:txEl>
+                                              <p:pRg st="9" end="9"/>
+                                            </p:txEl>
+                                          </p:spTgt>
+                                        </p:tgtEl>
+                                        <p:attrNameLst>
+                                          <p:attrName>style.visibility</p:attrName>
+                                        </p:attrNameLst>
+                                      </p:cBhvr>
+                                      <p:to>
+                                        <p:strVal val="visible"/>
+                                      </p:to>
+                                    </p:set>
+                                    <p:animEffect transition="in" filter="dissolve">
+                                      <p:cBhvr>
+                                        <p:cTn id="42" dur="500"/>
+                                        <p:tgtEl>
+                                          <p:spTgt spid="3">
+                                            <p:txEl>
+                                              <p:pRg st="9" end="9"/>
+                                            </p:txEl>
+                                          </p:spTgt>
+                                        </p:tgtEl>
+                                      </p:cBhvr>
+                                    </p:animEffect>
+                                  </p:childTnLst>
+                                </p:cTn>
+                              </p:par>
+                            </p:childTnLst>
+                          </p:cTn>
+                        </p:par>
+                      </p:childTnLst>
+                    </p:cTn>
+                  </p:par>
+                  <p:par>
+                    <p:cTn id="43" fill="hold">
+                      <p:stCondLst>
+                        <p:cond delay="indefinite"/>
+                      </p:stCondLst>
+                      <p:childTnLst>
+                        <p:par>
+                          <p:cTn id="44" fill="hold">
+                            <p:stCondLst>
+                              <p:cond delay="0"/>
+                            </p:stCondLst>
+                            <p:childTnLst>
+                              <p:par>
+                                <p:cTn id="45" presetID="9" presetClass="entr" presetSubtype="0" fill="hold" grpId="0" nodeType="clickEffect">
+                                  <p:stCondLst>
+                                    <p:cond delay="0"/>
+                                  </p:stCondLst>
+                                  <p:childTnLst>
+                                    <p:set>
+                                      <p:cBhvr>
+                                        <p:cTn id="46" dur="1" fill="hold">
+                                          <p:stCondLst>
+                                            <p:cond delay="0"/>
+                                          </p:stCondLst>
+                                        </p:cTn>
+                                        <p:tgtEl>
+                                          <p:spTgt spid="3">
+                                            <p:txEl>
+                                              <p:pRg st="10" end="10"/>
+                                            </p:txEl>
+                                          </p:spTgt>
+                                        </p:tgtEl>
+                                        <p:attrNameLst>
+                                          <p:attrName>style.visibility</p:attrName>
+                                        </p:attrNameLst>
+                                      </p:cBhvr>
+                                      <p:to>
+                                        <p:strVal val="visible"/>
+                                      </p:to>
+                                    </p:set>
+                                    <p:animEffect transition="in" filter="dissolve">
+                                      <p:cBhvr>
+                                        <p:cTn id="47" dur="500"/>
+                                        <p:tgtEl>
+                                          <p:spTgt spid="3">
+                                            <p:txEl>
+                                              <p:pRg st="10" end="10"/>
                                             </p:txEl>
                                           </p:spTgt>
                                         </p:tgtEl>
@@ -15287,6 +15508,9 @@
         </p:cTn>
       </p:par>
     </p:tnLst>
+    <p:bldLst>
+      <p:bldP spid="3" grpId="0" build="p"/>
+    </p:bldLst>
   </p:timing>
 </p:sld>
 </file>

</xml_diff>

<commit_message>
Added Dockerfile and FROM instruction overview
</commit_message>
<xml_diff>
--- a/docker-foundations.pptx
+++ b/docker-foundations.pptx
@@ -5,7 +5,7 @@
     <p:sldMasterId id="2147483660" r:id="rId1"/>
   </p:sldMasterIdLst>
   <p:notesMasterIdLst>
-    <p:notesMasterId r:id="rId32"/>
+    <p:notesMasterId r:id="rId33"/>
   </p:notesMasterIdLst>
   <p:sldIdLst>
     <p:sldId id="256" r:id="rId2"/>
@@ -27,17 +27,18 @@
     <p:sldId id="283" r:id="rId18"/>
     <p:sldId id="284" r:id="rId19"/>
     <p:sldId id="261" r:id="rId20"/>
-    <p:sldId id="285" r:id="rId21"/>
-    <p:sldId id="262" r:id="rId22"/>
-    <p:sldId id="263" r:id="rId23"/>
-    <p:sldId id="264" r:id="rId24"/>
-    <p:sldId id="265" r:id="rId25"/>
-    <p:sldId id="266" r:id="rId26"/>
-    <p:sldId id="267" r:id="rId27"/>
-    <p:sldId id="268" r:id="rId28"/>
-    <p:sldId id="269" r:id="rId29"/>
-    <p:sldId id="279" r:id="rId30"/>
-    <p:sldId id="280" r:id="rId31"/>
+    <p:sldId id="286" r:id="rId21"/>
+    <p:sldId id="264" r:id="rId22"/>
+    <p:sldId id="287" r:id="rId23"/>
+    <p:sldId id="285" r:id="rId24"/>
+    <p:sldId id="262" r:id="rId25"/>
+    <p:sldId id="265" r:id="rId26"/>
+    <p:sldId id="266" r:id="rId27"/>
+    <p:sldId id="267" r:id="rId28"/>
+    <p:sldId id="268" r:id="rId29"/>
+    <p:sldId id="269" r:id="rId30"/>
+    <p:sldId id="279" r:id="rId31"/>
+    <p:sldId id="280" r:id="rId32"/>
   </p:sldIdLst>
   <p:sldSz cx="12192000" cy="6858000"/>
   <p:notesSz cx="6858000" cy="9144000"/>
@@ -1786,7 +1787,7 @@
     </p:spTree>
     <p:extLst>
       <p:ext uri="{BB962C8B-B14F-4D97-AF65-F5344CB8AC3E}">
-        <p14:creationId xmlns:p14="http://schemas.microsoft.com/office/powerpoint/2010/main" val="263503964"/>
+        <p14:creationId xmlns:p14="http://schemas.microsoft.com/office/powerpoint/2010/main" val="954636182"/>
       </p:ext>
     </p:extLst>
   </p:cSld>
@@ -1873,7 +1874,7 @@
     </p:spTree>
     <p:extLst>
       <p:ext uri="{BB962C8B-B14F-4D97-AF65-F5344CB8AC3E}">
-        <p14:creationId xmlns:p14="http://schemas.microsoft.com/office/powerpoint/2010/main" val="3403845459"/>
+        <p14:creationId xmlns:p14="http://schemas.microsoft.com/office/powerpoint/2010/main" val="1146841283"/>
       </p:ext>
     </p:extLst>
   </p:cSld>
@@ -1960,7 +1961,7 @@
     </p:spTree>
     <p:extLst>
       <p:ext uri="{BB962C8B-B14F-4D97-AF65-F5344CB8AC3E}">
-        <p14:creationId xmlns:p14="http://schemas.microsoft.com/office/powerpoint/2010/main" val="2097880621"/>
+        <p14:creationId xmlns:p14="http://schemas.microsoft.com/office/powerpoint/2010/main" val="1823738617"/>
       </p:ext>
     </p:extLst>
   </p:cSld>
@@ -2047,7 +2048,7 @@
     </p:spTree>
     <p:extLst>
       <p:ext uri="{BB962C8B-B14F-4D97-AF65-F5344CB8AC3E}">
-        <p14:creationId xmlns:p14="http://schemas.microsoft.com/office/powerpoint/2010/main" val="1146841283"/>
+        <p14:creationId xmlns:p14="http://schemas.microsoft.com/office/powerpoint/2010/main" val="263503964"/>
       </p:ext>
     </p:extLst>
   </p:cSld>
@@ -2134,7 +2135,7 @@
     </p:spTree>
     <p:extLst>
       <p:ext uri="{BB962C8B-B14F-4D97-AF65-F5344CB8AC3E}">
-        <p14:creationId xmlns:p14="http://schemas.microsoft.com/office/powerpoint/2010/main" val="1408554522"/>
+        <p14:creationId xmlns:p14="http://schemas.microsoft.com/office/powerpoint/2010/main" val="3403845459"/>
       </p:ext>
     </p:extLst>
   </p:cSld>
@@ -2221,7 +2222,7 @@
     </p:spTree>
     <p:extLst>
       <p:ext uri="{BB962C8B-B14F-4D97-AF65-F5344CB8AC3E}">
-        <p14:creationId xmlns:p14="http://schemas.microsoft.com/office/powerpoint/2010/main" val="2627609559"/>
+        <p14:creationId xmlns:p14="http://schemas.microsoft.com/office/powerpoint/2010/main" val="1408554522"/>
       </p:ext>
     </p:extLst>
   </p:cSld>
@@ -2308,7 +2309,7 @@
     </p:spTree>
     <p:extLst>
       <p:ext uri="{BB962C8B-B14F-4D97-AF65-F5344CB8AC3E}">
-        <p14:creationId xmlns:p14="http://schemas.microsoft.com/office/powerpoint/2010/main" val="2425256119"/>
+        <p14:creationId xmlns:p14="http://schemas.microsoft.com/office/powerpoint/2010/main" val="2627609559"/>
       </p:ext>
     </p:extLst>
   </p:cSld>
@@ -2395,7 +2396,7 @@
     </p:spTree>
     <p:extLst>
       <p:ext uri="{BB962C8B-B14F-4D97-AF65-F5344CB8AC3E}">
-        <p14:creationId xmlns:p14="http://schemas.microsoft.com/office/powerpoint/2010/main" val="3906023703"/>
+        <p14:creationId xmlns:p14="http://schemas.microsoft.com/office/powerpoint/2010/main" val="2425256119"/>
       </p:ext>
     </p:extLst>
   </p:cSld>
@@ -2482,7 +2483,7 @@
     </p:spTree>
     <p:extLst>
       <p:ext uri="{BB962C8B-B14F-4D97-AF65-F5344CB8AC3E}">
-        <p14:creationId xmlns:p14="http://schemas.microsoft.com/office/powerpoint/2010/main" val="1289901690"/>
+        <p14:creationId xmlns:p14="http://schemas.microsoft.com/office/powerpoint/2010/main" val="3906023703"/>
       </p:ext>
     </p:extLst>
   </p:cSld>
@@ -2536,23 +2537,6 @@
           <a:bodyPr/>
           <a:lstStyle/>
           <a:p>
-            <a:pPr marL="0" marR="0" lvl="0" indent="0" algn="l" defTabSz="914400" rtl="0" eaLnBrk="1" fontAlgn="auto" latinLnBrk="0" hangingPunct="1">
-              <a:lnSpc>
-                <a:spcPct val="100000"/>
-              </a:lnSpc>
-              <a:spcBef>
-                <a:spcPts val="0"/>
-              </a:spcBef>
-              <a:spcAft>
-                <a:spcPts val="0"/>
-              </a:spcAft>
-              <a:buClrTx/>
-              <a:buSzTx/>
-              <a:buFontTx/>
-              <a:buNone/>
-              <a:tabLst/>
-              <a:defRPr/>
-            </a:pPr>
             <a:r>
               <a:rPr lang="en-US" dirty="0"/>
               <a:t>// TODO</a:t>
@@ -2586,7 +2570,7 @@
     </p:spTree>
     <p:extLst>
       <p:ext uri="{BB962C8B-B14F-4D97-AF65-F5344CB8AC3E}">
-        <p14:creationId xmlns:p14="http://schemas.microsoft.com/office/powerpoint/2010/main" val="4194303824"/>
+        <p14:creationId xmlns:p14="http://schemas.microsoft.com/office/powerpoint/2010/main" val="1289901690"/>
       </p:ext>
     </p:extLst>
   </p:cSld>
@@ -2691,6 +2675,110 @@
     <p:extLst>
       <p:ext uri="{BB962C8B-B14F-4D97-AF65-F5344CB8AC3E}">
         <p14:creationId xmlns:p14="http://schemas.microsoft.com/office/powerpoint/2010/main" val="872969698"/>
+      </p:ext>
+    </p:extLst>
+  </p:cSld>
+  <p:clrMapOvr>
+    <a:masterClrMapping/>
+  </p:clrMapOvr>
+</p:notes>
+</file>
+
+<file path=ppt/notesSlides/notesSlide30.xml><?xml version="1.0" encoding="utf-8"?>
+<p:notes xmlns:a="http://schemas.openxmlformats.org/drawingml/2006/main" xmlns:r="http://schemas.openxmlformats.org/officeDocument/2006/relationships" xmlns:p="http://schemas.openxmlformats.org/presentationml/2006/main">
+  <p:cSld>
+    <p:spTree>
+      <p:nvGrpSpPr>
+        <p:cNvPr id="1" name=""/>
+        <p:cNvGrpSpPr/>
+        <p:nvPr/>
+      </p:nvGrpSpPr>
+      <p:grpSpPr>
+        <a:xfrm>
+          <a:off x="0" y="0"/>
+          <a:ext cx="0" cy="0"/>
+          <a:chOff x="0" y="0"/>
+          <a:chExt cx="0" cy="0"/>
+        </a:xfrm>
+      </p:grpSpPr>
+      <p:sp>
+        <p:nvSpPr>
+          <p:cNvPr id="2" name="Slide Image Placeholder 1"/>
+          <p:cNvSpPr>
+            <a:spLocks noGrp="1" noRot="1" noChangeAspect="1"/>
+          </p:cNvSpPr>
+          <p:nvPr>
+            <p:ph type="sldImg"/>
+          </p:nvPr>
+        </p:nvSpPr>
+        <p:spPr/>
+      </p:sp>
+      <p:sp>
+        <p:nvSpPr>
+          <p:cNvPr id="3" name="Notes Placeholder 2"/>
+          <p:cNvSpPr>
+            <a:spLocks noGrp="1"/>
+          </p:cNvSpPr>
+          <p:nvPr>
+            <p:ph type="body" idx="1"/>
+          </p:nvPr>
+        </p:nvSpPr>
+        <p:spPr/>
+        <p:txBody>
+          <a:bodyPr/>
+          <a:lstStyle/>
+          <a:p>
+            <a:pPr marL="0" marR="0" lvl="0" indent="0" algn="l" defTabSz="914400" rtl="0" eaLnBrk="1" fontAlgn="auto" latinLnBrk="0" hangingPunct="1">
+              <a:lnSpc>
+                <a:spcPct val="100000"/>
+              </a:lnSpc>
+              <a:spcBef>
+                <a:spcPts val="0"/>
+              </a:spcBef>
+              <a:spcAft>
+                <a:spcPts val="0"/>
+              </a:spcAft>
+              <a:buClrTx/>
+              <a:buSzTx/>
+              <a:buFontTx/>
+              <a:buNone/>
+              <a:tabLst/>
+              <a:defRPr/>
+            </a:pPr>
+            <a:r>
+              <a:rPr lang="en-US" dirty="0"/>
+              <a:t>// TODO</a:t>
+            </a:r>
+          </a:p>
+        </p:txBody>
+      </p:sp>
+      <p:sp>
+        <p:nvSpPr>
+          <p:cNvPr id="4" name="Slide Number Placeholder 3"/>
+          <p:cNvSpPr>
+            <a:spLocks noGrp="1"/>
+          </p:cNvSpPr>
+          <p:nvPr>
+            <p:ph type="sldNum" sz="quarter" idx="5"/>
+          </p:nvPr>
+        </p:nvSpPr>
+        <p:spPr/>
+        <p:txBody>
+          <a:bodyPr/>
+          <a:lstStyle/>
+          <a:p>
+            <a:fld id="{020CF8D1-BA82-5045-ACF9-1AA42AD6A519}" type="slidenum">
+              <a:rPr lang="en-US" smtClean="0"/>
+              <a:t>30</a:t>
+            </a:fld>
+            <a:endParaRPr lang="en-US"/>
+          </a:p>
+        </p:txBody>
+      </p:sp>
+    </p:spTree>
+    <p:extLst>
+      <p:ext uri="{BB962C8B-B14F-4D97-AF65-F5344CB8AC3E}">
+        <p14:creationId xmlns:p14="http://schemas.microsoft.com/office/powerpoint/2010/main" val="4194303824"/>
       </p:ext>
     </p:extLst>
   </p:cSld>
@@ -18596,7 +18684,7 @@
           <p:cNvPr id="2" name="Title 1">
             <a:extLst>
               <a:ext uri="{FF2B5EF4-FFF2-40B4-BE49-F238E27FC236}">
-                <a16:creationId xmlns:a16="http://schemas.microsoft.com/office/drawing/2014/main" id="{AC0D55DF-385E-9A4F-AB08-FEBC11990B8B}"/>
+                <a16:creationId xmlns:a16="http://schemas.microsoft.com/office/drawing/2014/main" id="{50D24551-8433-1648-A045-8FBF82633296}"/>
               </a:ext>
             </a:extLst>
           </p:cNvPr>
@@ -18614,11 +18702,11 @@
           <a:p>
             <a:r>
               <a:rPr lang="en-US" dirty="0"/>
-              <a:t>Docker </a:t>
+              <a:t>The </a:t>
             </a:r>
             <a:r>
-              <a:rPr lang="en-US" baseline="0" dirty="0"/>
-              <a:t>Containers</a:t>
+              <a:rPr lang="en-US" dirty="0" err="1"/>
+              <a:t>Dockerfile</a:t>
             </a:r>
             <a:endParaRPr lang="en-US" dirty="0"/>
           </a:p>
@@ -18629,7 +18717,7 @@
           <p:cNvPr id="3" name="Content Placeholder 2">
             <a:extLst>
               <a:ext uri="{FF2B5EF4-FFF2-40B4-BE49-F238E27FC236}">
-                <a16:creationId xmlns:a16="http://schemas.microsoft.com/office/drawing/2014/main" id="{4CB23FD9-ADE0-084E-A8CC-44CA0BA25AB3}"/>
+                <a16:creationId xmlns:a16="http://schemas.microsoft.com/office/drawing/2014/main" id="{2E80DB0F-50E2-A74A-8E43-27BCD108C388}"/>
               </a:ext>
             </a:extLst>
           </p:cNvPr>
@@ -18645,7 +18733,74 @@
           <a:bodyPr/>
           <a:lstStyle/>
           <a:p>
-            <a:endParaRPr lang="en-US"/>
+            <a:r>
+              <a:rPr lang="en-US" dirty="0"/>
+              <a:t>The Docker Image blueprint</a:t>
+            </a:r>
+          </a:p>
+          <a:p>
+            <a:r>
+              <a:rPr lang="en-US" dirty="0"/>
+              <a:t>A plain text file named “</a:t>
+            </a:r>
+            <a:r>
+              <a:rPr lang="en-US" dirty="0" err="1">
+                <a:solidFill>
+                  <a:srgbClr val="FFFF00"/>
+                </a:solidFill>
+              </a:rPr>
+              <a:t>Dockerfile</a:t>
+            </a:r>
+            <a:r>
+              <a:rPr lang="en-US" dirty="0"/>
+              <a:t>”</a:t>
+            </a:r>
+          </a:p>
+          <a:p>
+            <a:r>
+              <a:rPr lang="en-US" dirty="0"/>
+              <a:t>Comprised of UPPERCASE </a:t>
+            </a:r>
+            <a:r>
+              <a:rPr lang="en-US" dirty="0">
+                <a:solidFill>
+                  <a:srgbClr val="FFFF00"/>
+                </a:solidFill>
+              </a:rPr>
+              <a:t>instructions</a:t>
+            </a:r>
+          </a:p>
+          <a:p>
+            <a:r>
+              <a:rPr lang="en-US" dirty="0"/>
+              <a:t>Each instruction represents a </a:t>
+            </a:r>
+            <a:r>
+              <a:rPr lang="en-US" dirty="0">
+                <a:solidFill>
+                  <a:srgbClr val="FFFF00"/>
+                </a:solidFill>
+              </a:rPr>
+              <a:t>layer</a:t>
+            </a:r>
+            <a:r>
+              <a:rPr lang="en-US" dirty="0"/>
+              <a:t> of the image</a:t>
+            </a:r>
+            <a:endParaRPr lang="en-US" dirty="0">
+              <a:solidFill>
+                <a:srgbClr val="FFFF00"/>
+              </a:solidFill>
+            </a:endParaRPr>
+          </a:p>
+          <a:p>
+            <a:r>
+              <a:rPr lang="en-US" dirty="0"/>
+              <a:t>Read from top to bottom</a:t>
+            </a:r>
+          </a:p>
+          <a:p>
+            <a:endParaRPr lang="en-US" dirty="0"/>
           </a:p>
         </p:txBody>
       </p:sp>
@@ -18654,7 +18809,7 @@
           <p:cNvPr id="4" name="Date Placeholder 3">
             <a:extLst>
               <a:ext uri="{FF2B5EF4-FFF2-40B4-BE49-F238E27FC236}">
-                <a16:creationId xmlns:a16="http://schemas.microsoft.com/office/drawing/2014/main" id="{6E8781CE-B8A7-7540-B619-28D099093D8B}"/>
+                <a16:creationId xmlns:a16="http://schemas.microsoft.com/office/drawing/2014/main" id="{39846D18-0182-8944-9632-5EC9FBE06918}"/>
               </a:ext>
             </a:extLst>
           </p:cNvPr>
@@ -18683,7 +18838,7 @@
           <p:cNvPr id="5" name="Slide Number Placeholder 4">
             <a:extLst>
               <a:ext uri="{FF2B5EF4-FFF2-40B4-BE49-F238E27FC236}">
-                <a16:creationId xmlns:a16="http://schemas.microsoft.com/office/drawing/2014/main" id="{222BEAA2-2326-1F4D-9BCE-0FC3EC23B201}"/>
+                <a16:creationId xmlns:a16="http://schemas.microsoft.com/office/drawing/2014/main" id="{9D302B0E-8A9B-A64D-BBA5-16F36A28D4D2}"/>
               </a:ext>
             </a:extLst>
           </p:cNvPr>
@@ -18708,10 +18863,40 @@
           </a:p>
         </p:txBody>
       </p:sp>
+      <p:pic>
+        <p:nvPicPr>
+          <p:cNvPr id="9" name="Picture 8" descr="A picture containing drawing&#10;&#10;Description automatically generated">
+            <a:extLst>
+              <a:ext uri="{FF2B5EF4-FFF2-40B4-BE49-F238E27FC236}">
+                <a16:creationId xmlns:a16="http://schemas.microsoft.com/office/drawing/2014/main" id="{087C9268-C9DF-E045-9D55-DB501F16ACD5}"/>
+              </a:ext>
+            </a:extLst>
+          </p:cNvPr>
+          <p:cNvPicPr>
+            <a:picLocks noChangeAspect="1"/>
+          </p:cNvPicPr>
+          <p:nvPr/>
+        </p:nvPicPr>
+        <p:blipFill>
+          <a:blip r:embed="rId3"/>
+          <a:stretch>
+            <a:fillRect/>
+          </a:stretch>
+        </p:blipFill>
+        <p:spPr>
+          <a:xfrm>
+            <a:off x="4898467" y="3948880"/>
+            <a:ext cx="7023215" cy="2363019"/>
+          </a:xfrm>
+          <a:prstGeom prst="rect">
+            <a:avLst/>
+          </a:prstGeom>
+        </p:spPr>
+      </p:pic>
     </p:spTree>
     <p:extLst>
       <p:ext uri="{BB962C8B-B14F-4D97-AF65-F5344CB8AC3E}">
-        <p14:creationId xmlns:p14="http://schemas.microsoft.com/office/powerpoint/2010/main" val="2588513431"/>
+        <p14:creationId xmlns:p14="http://schemas.microsoft.com/office/powerpoint/2010/main" val="292166191"/>
       </p:ext>
     </p:extLst>
   </p:cSld>
@@ -18730,6 +18915,388 @@
       </p:transition>
     </mc:Fallback>
   </mc:AlternateContent>
+  <p:timing>
+    <p:tnLst>
+      <p:par>
+        <p:cTn id="1" dur="indefinite" restart="never" nodeType="tmRoot">
+          <p:childTnLst>
+            <p:seq concurrent="1" nextAc="seek">
+              <p:cTn id="2" dur="indefinite" nodeType="mainSeq">
+                <p:childTnLst>
+                  <p:par>
+                    <p:cTn id="3" fill="hold">
+                      <p:stCondLst>
+                        <p:cond delay="indefinite"/>
+                      </p:stCondLst>
+                      <p:childTnLst>
+                        <p:par>
+                          <p:cTn id="4" fill="hold">
+                            <p:stCondLst>
+                              <p:cond delay="0"/>
+                            </p:stCondLst>
+                            <p:childTnLst>
+                              <p:par>
+                                <p:cTn id="5" presetID="9" presetClass="entr" presetSubtype="0" fill="hold" grpId="0" nodeType="clickEffect">
+                                  <p:stCondLst>
+                                    <p:cond delay="0"/>
+                                  </p:stCondLst>
+                                  <p:childTnLst>
+                                    <p:set>
+                                      <p:cBhvr>
+                                        <p:cTn id="6" dur="1" fill="hold">
+                                          <p:stCondLst>
+                                            <p:cond delay="0"/>
+                                          </p:stCondLst>
+                                        </p:cTn>
+                                        <p:tgtEl>
+                                          <p:spTgt spid="3">
+                                            <p:txEl>
+                                              <p:pRg st="0" end="0"/>
+                                            </p:txEl>
+                                          </p:spTgt>
+                                        </p:tgtEl>
+                                        <p:attrNameLst>
+                                          <p:attrName>style.visibility</p:attrName>
+                                        </p:attrNameLst>
+                                      </p:cBhvr>
+                                      <p:to>
+                                        <p:strVal val="visible"/>
+                                      </p:to>
+                                    </p:set>
+                                    <p:animEffect transition="in" filter="dissolve">
+                                      <p:cBhvr>
+                                        <p:cTn id="7" dur="500"/>
+                                        <p:tgtEl>
+                                          <p:spTgt spid="3">
+                                            <p:txEl>
+                                              <p:pRg st="0" end="0"/>
+                                            </p:txEl>
+                                          </p:spTgt>
+                                        </p:tgtEl>
+                                      </p:cBhvr>
+                                    </p:animEffect>
+                                  </p:childTnLst>
+                                </p:cTn>
+                              </p:par>
+                            </p:childTnLst>
+                          </p:cTn>
+                        </p:par>
+                      </p:childTnLst>
+                    </p:cTn>
+                  </p:par>
+                  <p:par>
+                    <p:cTn id="8" fill="hold">
+                      <p:stCondLst>
+                        <p:cond delay="indefinite"/>
+                      </p:stCondLst>
+                      <p:childTnLst>
+                        <p:par>
+                          <p:cTn id="9" fill="hold">
+                            <p:stCondLst>
+                              <p:cond delay="0"/>
+                            </p:stCondLst>
+                            <p:childTnLst>
+                              <p:par>
+                                <p:cTn id="10" presetID="9" presetClass="entr" presetSubtype="0" fill="hold" grpId="0" nodeType="clickEffect">
+                                  <p:stCondLst>
+                                    <p:cond delay="0"/>
+                                  </p:stCondLst>
+                                  <p:childTnLst>
+                                    <p:set>
+                                      <p:cBhvr>
+                                        <p:cTn id="11" dur="1" fill="hold">
+                                          <p:stCondLst>
+                                            <p:cond delay="0"/>
+                                          </p:stCondLst>
+                                        </p:cTn>
+                                        <p:tgtEl>
+                                          <p:spTgt spid="3">
+                                            <p:txEl>
+                                              <p:pRg st="1" end="1"/>
+                                            </p:txEl>
+                                          </p:spTgt>
+                                        </p:tgtEl>
+                                        <p:attrNameLst>
+                                          <p:attrName>style.visibility</p:attrName>
+                                        </p:attrNameLst>
+                                      </p:cBhvr>
+                                      <p:to>
+                                        <p:strVal val="visible"/>
+                                      </p:to>
+                                    </p:set>
+                                    <p:animEffect transition="in" filter="dissolve">
+                                      <p:cBhvr>
+                                        <p:cTn id="12" dur="500"/>
+                                        <p:tgtEl>
+                                          <p:spTgt spid="3">
+                                            <p:txEl>
+                                              <p:pRg st="1" end="1"/>
+                                            </p:txEl>
+                                          </p:spTgt>
+                                        </p:tgtEl>
+                                      </p:cBhvr>
+                                    </p:animEffect>
+                                  </p:childTnLst>
+                                </p:cTn>
+                              </p:par>
+                            </p:childTnLst>
+                          </p:cTn>
+                        </p:par>
+                      </p:childTnLst>
+                    </p:cTn>
+                  </p:par>
+                  <p:par>
+                    <p:cTn id="13" fill="hold">
+                      <p:stCondLst>
+                        <p:cond delay="indefinite"/>
+                      </p:stCondLst>
+                      <p:childTnLst>
+                        <p:par>
+                          <p:cTn id="14" fill="hold">
+                            <p:stCondLst>
+                              <p:cond delay="0"/>
+                            </p:stCondLst>
+                            <p:childTnLst>
+                              <p:par>
+                                <p:cTn id="15" presetID="9" presetClass="entr" presetSubtype="0" fill="hold" grpId="0" nodeType="clickEffect">
+                                  <p:stCondLst>
+                                    <p:cond delay="0"/>
+                                  </p:stCondLst>
+                                  <p:childTnLst>
+                                    <p:set>
+                                      <p:cBhvr>
+                                        <p:cTn id="16" dur="1" fill="hold">
+                                          <p:stCondLst>
+                                            <p:cond delay="0"/>
+                                          </p:stCondLst>
+                                        </p:cTn>
+                                        <p:tgtEl>
+                                          <p:spTgt spid="3">
+                                            <p:txEl>
+                                              <p:pRg st="2" end="2"/>
+                                            </p:txEl>
+                                          </p:spTgt>
+                                        </p:tgtEl>
+                                        <p:attrNameLst>
+                                          <p:attrName>style.visibility</p:attrName>
+                                        </p:attrNameLst>
+                                      </p:cBhvr>
+                                      <p:to>
+                                        <p:strVal val="visible"/>
+                                      </p:to>
+                                    </p:set>
+                                    <p:animEffect transition="in" filter="dissolve">
+                                      <p:cBhvr>
+                                        <p:cTn id="17" dur="500"/>
+                                        <p:tgtEl>
+                                          <p:spTgt spid="3">
+                                            <p:txEl>
+                                              <p:pRg st="2" end="2"/>
+                                            </p:txEl>
+                                          </p:spTgt>
+                                        </p:tgtEl>
+                                      </p:cBhvr>
+                                    </p:animEffect>
+                                  </p:childTnLst>
+                                </p:cTn>
+                              </p:par>
+                            </p:childTnLst>
+                          </p:cTn>
+                        </p:par>
+                      </p:childTnLst>
+                    </p:cTn>
+                  </p:par>
+                  <p:par>
+                    <p:cTn id="18" fill="hold">
+                      <p:stCondLst>
+                        <p:cond delay="indefinite"/>
+                      </p:stCondLst>
+                      <p:childTnLst>
+                        <p:par>
+                          <p:cTn id="19" fill="hold">
+                            <p:stCondLst>
+                              <p:cond delay="0"/>
+                            </p:stCondLst>
+                            <p:childTnLst>
+                              <p:par>
+                                <p:cTn id="20" presetID="9" presetClass="entr" presetSubtype="0" fill="hold" grpId="0" nodeType="clickEffect">
+                                  <p:stCondLst>
+                                    <p:cond delay="0"/>
+                                  </p:stCondLst>
+                                  <p:childTnLst>
+                                    <p:set>
+                                      <p:cBhvr>
+                                        <p:cTn id="21" dur="1" fill="hold">
+                                          <p:stCondLst>
+                                            <p:cond delay="0"/>
+                                          </p:stCondLst>
+                                        </p:cTn>
+                                        <p:tgtEl>
+                                          <p:spTgt spid="3">
+                                            <p:txEl>
+                                              <p:pRg st="3" end="3"/>
+                                            </p:txEl>
+                                          </p:spTgt>
+                                        </p:tgtEl>
+                                        <p:attrNameLst>
+                                          <p:attrName>style.visibility</p:attrName>
+                                        </p:attrNameLst>
+                                      </p:cBhvr>
+                                      <p:to>
+                                        <p:strVal val="visible"/>
+                                      </p:to>
+                                    </p:set>
+                                    <p:animEffect transition="in" filter="dissolve">
+                                      <p:cBhvr>
+                                        <p:cTn id="22" dur="500"/>
+                                        <p:tgtEl>
+                                          <p:spTgt spid="3">
+                                            <p:txEl>
+                                              <p:pRg st="3" end="3"/>
+                                            </p:txEl>
+                                          </p:spTgt>
+                                        </p:tgtEl>
+                                      </p:cBhvr>
+                                    </p:animEffect>
+                                  </p:childTnLst>
+                                </p:cTn>
+                              </p:par>
+                            </p:childTnLst>
+                          </p:cTn>
+                        </p:par>
+                      </p:childTnLst>
+                    </p:cTn>
+                  </p:par>
+                  <p:par>
+                    <p:cTn id="23" fill="hold">
+                      <p:stCondLst>
+                        <p:cond delay="indefinite"/>
+                      </p:stCondLst>
+                      <p:childTnLst>
+                        <p:par>
+                          <p:cTn id="24" fill="hold">
+                            <p:stCondLst>
+                              <p:cond delay="0"/>
+                            </p:stCondLst>
+                            <p:childTnLst>
+                              <p:par>
+                                <p:cTn id="25" presetID="9" presetClass="entr" presetSubtype="0" fill="hold" grpId="0" nodeType="clickEffect">
+                                  <p:stCondLst>
+                                    <p:cond delay="0"/>
+                                  </p:stCondLst>
+                                  <p:childTnLst>
+                                    <p:set>
+                                      <p:cBhvr>
+                                        <p:cTn id="26" dur="1" fill="hold">
+                                          <p:stCondLst>
+                                            <p:cond delay="0"/>
+                                          </p:stCondLst>
+                                        </p:cTn>
+                                        <p:tgtEl>
+                                          <p:spTgt spid="3">
+                                            <p:txEl>
+                                              <p:pRg st="4" end="4"/>
+                                            </p:txEl>
+                                          </p:spTgt>
+                                        </p:tgtEl>
+                                        <p:attrNameLst>
+                                          <p:attrName>style.visibility</p:attrName>
+                                        </p:attrNameLst>
+                                      </p:cBhvr>
+                                      <p:to>
+                                        <p:strVal val="visible"/>
+                                      </p:to>
+                                    </p:set>
+                                    <p:animEffect transition="in" filter="dissolve">
+                                      <p:cBhvr>
+                                        <p:cTn id="27" dur="500"/>
+                                        <p:tgtEl>
+                                          <p:spTgt spid="3">
+                                            <p:txEl>
+                                              <p:pRg st="4" end="4"/>
+                                            </p:txEl>
+                                          </p:spTgt>
+                                        </p:tgtEl>
+                                      </p:cBhvr>
+                                    </p:animEffect>
+                                  </p:childTnLst>
+                                </p:cTn>
+                              </p:par>
+                            </p:childTnLst>
+                          </p:cTn>
+                        </p:par>
+                        <p:par>
+                          <p:cTn id="28" fill="hold">
+                            <p:stCondLst>
+                              <p:cond delay="500"/>
+                            </p:stCondLst>
+                            <p:childTnLst>
+                              <p:par>
+                                <p:cTn id="29" presetID="9" presetClass="entr" presetSubtype="0" fill="hold" nodeType="afterEffect">
+                                  <p:stCondLst>
+                                    <p:cond delay="0"/>
+                                  </p:stCondLst>
+                                  <p:childTnLst>
+                                    <p:set>
+                                      <p:cBhvr>
+                                        <p:cTn id="30" dur="1" fill="hold">
+                                          <p:stCondLst>
+                                            <p:cond delay="0"/>
+                                          </p:stCondLst>
+                                        </p:cTn>
+                                        <p:tgtEl>
+                                          <p:spTgt spid="9"/>
+                                        </p:tgtEl>
+                                        <p:attrNameLst>
+                                          <p:attrName>style.visibility</p:attrName>
+                                        </p:attrNameLst>
+                                      </p:cBhvr>
+                                      <p:to>
+                                        <p:strVal val="visible"/>
+                                      </p:to>
+                                    </p:set>
+                                    <p:animEffect transition="in" filter="dissolve">
+                                      <p:cBhvr>
+                                        <p:cTn id="31" dur="500"/>
+                                        <p:tgtEl>
+                                          <p:spTgt spid="9"/>
+                                        </p:tgtEl>
+                                      </p:cBhvr>
+                                    </p:animEffect>
+                                  </p:childTnLst>
+                                </p:cTn>
+                              </p:par>
+                            </p:childTnLst>
+                          </p:cTn>
+                        </p:par>
+                      </p:childTnLst>
+                    </p:cTn>
+                  </p:par>
+                </p:childTnLst>
+              </p:cTn>
+              <p:prevCondLst>
+                <p:cond evt="onPrev" delay="0">
+                  <p:tgtEl>
+                    <p:sldTgt/>
+                  </p:tgtEl>
+                </p:cond>
+              </p:prevCondLst>
+              <p:nextCondLst>
+                <p:cond evt="onNext" delay="0">
+                  <p:tgtEl>
+                    <p:sldTgt/>
+                  </p:tgtEl>
+                </p:cond>
+              </p:nextCondLst>
+            </p:seq>
+          </p:childTnLst>
+        </p:cTn>
+      </p:par>
+    </p:tnLst>
+    <p:bldLst>
+      <p:bldP spid="3" grpId="0" uiExpand="1" build="p"/>
+    </p:bldLst>
+  </p:timing>
 </p:sld>
 </file>
 
@@ -18752,10 +19319,265 @@
       </p:grpSpPr>
       <p:sp>
         <p:nvSpPr>
+          <p:cNvPr id="29" name="Rectangle 28">
+            <a:extLst>
+              <a:ext uri="{FF2B5EF4-FFF2-40B4-BE49-F238E27FC236}">
+                <a16:creationId xmlns:a16="http://schemas.microsoft.com/office/drawing/2014/main" id="{60FFFF46-7AD3-4A46-AEC2-3FE7DC979D54}"/>
+              </a:ext>
+            </a:extLst>
+          </p:cNvPr>
+          <p:cNvSpPr/>
+          <p:nvPr/>
+        </p:nvSpPr>
+        <p:spPr>
+          <a:xfrm>
+            <a:off x="6423212" y="3805947"/>
+            <a:ext cx="448382" cy="404925"/>
+          </a:xfrm>
+          <a:prstGeom prst="rect">
+            <a:avLst/>
+          </a:prstGeom>
+          <a:solidFill>
+            <a:schemeClr val="tx1">
+              <a:alpha val="40000"/>
+            </a:schemeClr>
+          </a:solidFill>
+          <a:ln>
+            <a:noFill/>
+          </a:ln>
+        </p:spPr>
+        <p:style>
+          <a:lnRef idx="2">
+            <a:schemeClr val="accent1">
+              <a:shade val="50000"/>
+            </a:schemeClr>
+          </a:lnRef>
+          <a:fillRef idx="1">
+            <a:schemeClr val="accent1"/>
+          </a:fillRef>
+          <a:effectRef idx="0">
+            <a:schemeClr val="accent1"/>
+          </a:effectRef>
+          <a:fontRef idx="minor">
+            <a:schemeClr val="lt1"/>
+          </a:fontRef>
+        </p:style>
+        <p:txBody>
+          <a:bodyPr rtlCol="0" anchor="ctr"/>
+          <a:lstStyle/>
+          <a:p>
+            <a:pPr algn="ctr"/>
+            <a:endParaRPr lang="en-US" dirty="0"/>
+          </a:p>
+        </p:txBody>
+      </p:sp>
+      <p:sp>
+        <p:nvSpPr>
+          <p:cNvPr id="31" name="Rectangle 30">
+            <a:extLst>
+              <a:ext uri="{FF2B5EF4-FFF2-40B4-BE49-F238E27FC236}">
+                <a16:creationId xmlns:a16="http://schemas.microsoft.com/office/drawing/2014/main" id="{574FD4B8-F80B-EB41-8D44-CA1D2D016322}"/>
+              </a:ext>
+            </a:extLst>
+          </p:cNvPr>
+          <p:cNvSpPr/>
+          <p:nvPr/>
+        </p:nvSpPr>
+        <p:spPr>
+          <a:xfrm>
+            <a:off x="6978747" y="3805946"/>
+            <a:ext cx="905537" cy="404925"/>
+          </a:xfrm>
+          <a:prstGeom prst="rect">
+            <a:avLst/>
+          </a:prstGeom>
+          <a:solidFill>
+            <a:schemeClr val="tx1">
+              <a:alpha val="40000"/>
+            </a:schemeClr>
+          </a:solidFill>
+          <a:ln>
+            <a:noFill/>
+          </a:ln>
+        </p:spPr>
+        <p:style>
+          <a:lnRef idx="2">
+            <a:schemeClr val="accent1">
+              <a:shade val="50000"/>
+            </a:schemeClr>
+          </a:lnRef>
+          <a:fillRef idx="1">
+            <a:schemeClr val="accent1"/>
+          </a:fillRef>
+          <a:effectRef idx="0">
+            <a:schemeClr val="accent1"/>
+          </a:effectRef>
+          <a:fontRef idx="minor">
+            <a:schemeClr val="lt1"/>
+          </a:fontRef>
+        </p:style>
+        <p:txBody>
+          <a:bodyPr rtlCol="0" anchor="ctr"/>
+          <a:lstStyle/>
+          <a:p>
+            <a:pPr algn="ctr"/>
+            <a:endParaRPr lang="en-US" dirty="0"/>
+          </a:p>
+        </p:txBody>
+      </p:sp>
+      <p:sp>
+        <p:nvSpPr>
+          <p:cNvPr id="27" name="Rectangle 26">
+            <a:extLst>
+              <a:ext uri="{FF2B5EF4-FFF2-40B4-BE49-F238E27FC236}">
+                <a16:creationId xmlns:a16="http://schemas.microsoft.com/office/drawing/2014/main" id="{0C1CD51F-6FDE-CD4B-A5A7-163F1FBC63E2}"/>
+              </a:ext>
+            </a:extLst>
+          </p:cNvPr>
+          <p:cNvSpPr/>
+          <p:nvPr/>
+        </p:nvSpPr>
+        <p:spPr>
+          <a:xfrm>
+            <a:off x="5271255" y="3805947"/>
+            <a:ext cx="1071273" cy="404925"/>
+          </a:xfrm>
+          <a:prstGeom prst="rect">
+            <a:avLst/>
+          </a:prstGeom>
+          <a:solidFill>
+            <a:schemeClr val="tx1">
+              <a:alpha val="40000"/>
+            </a:schemeClr>
+          </a:solidFill>
+          <a:ln>
+            <a:noFill/>
+          </a:ln>
+        </p:spPr>
+        <p:style>
+          <a:lnRef idx="2">
+            <a:schemeClr val="accent1">
+              <a:shade val="50000"/>
+            </a:schemeClr>
+          </a:lnRef>
+          <a:fillRef idx="1">
+            <a:schemeClr val="accent1"/>
+          </a:fillRef>
+          <a:effectRef idx="0">
+            <a:schemeClr val="accent1"/>
+          </a:effectRef>
+          <a:fontRef idx="minor">
+            <a:schemeClr val="lt1"/>
+          </a:fontRef>
+        </p:style>
+        <p:txBody>
+          <a:bodyPr rtlCol="0" anchor="ctr"/>
+          <a:lstStyle/>
+          <a:p>
+            <a:pPr algn="ctr"/>
+            <a:endParaRPr lang="en-US" dirty="0"/>
+          </a:p>
+        </p:txBody>
+      </p:sp>
+      <p:sp>
+        <p:nvSpPr>
+          <p:cNvPr id="24" name="Rectangle 23">
+            <a:extLst>
+              <a:ext uri="{FF2B5EF4-FFF2-40B4-BE49-F238E27FC236}">
+                <a16:creationId xmlns:a16="http://schemas.microsoft.com/office/drawing/2014/main" id="{F3D1A54B-43D3-4E41-8C9C-99657A4645B1}"/>
+              </a:ext>
+            </a:extLst>
+          </p:cNvPr>
+          <p:cNvSpPr/>
+          <p:nvPr/>
+        </p:nvSpPr>
+        <p:spPr>
+          <a:xfrm>
+            <a:off x="4326862" y="3805947"/>
+            <a:ext cx="905538" cy="404925"/>
+          </a:xfrm>
+          <a:prstGeom prst="rect">
+            <a:avLst/>
+          </a:prstGeom>
+          <a:solidFill>
+            <a:schemeClr val="tx1">
+              <a:alpha val="40000"/>
+            </a:schemeClr>
+          </a:solidFill>
+          <a:ln>
+            <a:noFill/>
+          </a:ln>
+        </p:spPr>
+        <p:style>
+          <a:lnRef idx="2">
+            <a:schemeClr val="accent1">
+              <a:shade val="50000"/>
+            </a:schemeClr>
+          </a:lnRef>
+          <a:fillRef idx="1">
+            <a:schemeClr val="accent1"/>
+          </a:fillRef>
+          <a:effectRef idx="0">
+            <a:schemeClr val="accent1"/>
+          </a:effectRef>
+          <a:fontRef idx="minor">
+            <a:schemeClr val="lt1"/>
+          </a:fontRef>
+        </p:style>
+        <p:txBody>
+          <a:bodyPr rtlCol="0" anchor="ctr"/>
+          <a:lstStyle/>
+          <a:p>
+            <a:pPr algn="ctr"/>
+            <a:endParaRPr lang="en-US" dirty="0"/>
+          </a:p>
+        </p:txBody>
+      </p:sp>
+      <p:sp>
+        <p:nvSpPr>
+          <p:cNvPr id="33" name="TextBox 32">
+            <a:extLst>
+              <a:ext uri="{FF2B5EF4-FFF2-40B4-BE49-F238E27FC236}">
+                <a16:creationId xmlns:a16="http://schemas.microsoft.com/office/drawing/2014/main" id="{F9E519AB-DC29-1341-AE62-A713063C7897}"/>
+              </a:ext>
+            </a:extLst>
+          </p:cNvPr>
+          <p:cNvSpPr txBox="1"/>
+          <p:nvPr/>
+        </p:nvSpPr>
+        <p:spPr>
+          <a:xfrm>
+            <a:off x="4233828" y="3737323"/>
+            <a:ext cx="3762248" cy="523220"/>
+          </a:xfrm>
+          <a:prstGeom prst="rect">
+            <a:avLst/>
+          </a:prstGeom>
+          <a:noFill/>
+        </p:spPr>
+        <p:txBody>
+          <a:bodyPr wrap="none" rtlCol="0">
+            <a:spAutoFit/>
+          </a:bodyPr>
+          <a:lstStyle/>
+          <a:p>
+            <a:r>
+              <a:rPr lang="en-US" sz="2800" dirty="0">
+                <a:solidFill>
+                  <a:srgbClr val="FFFF00"/>
+                </a:solidFill>
+              </a:rPr>
+              <a:t>FROM python:3.8-alpine</a:t>
+            </a:r>
+          </a:p>
+        </p:txBody>
+      </p:sp>
+      <p:sp>
+        <p:nvSpPr>
           <p:cNvPr id="2" name="Title 1">
             <a:extLst>
               <a:ext uri="{FF2B5EF4-FFF2-40B4-BE49-F238E27FC236}">
-                <a16:creationId xmlns:a16="http://schemas.microsoft.com/office/drawing/2014/main" id="{42BD247B-4264-A040-8FCB-C20FD3374FF4}"/>
+                <a16:creationId xmlns:a16="http://schemas.microsoft.com/office/drawing/2014/main" id="{50D24551-8433-1648-A045-8FBF82633296}"/>
               </a:ext>
             </a:extLst>
           </p:cNvPr>
@@ -18773,7 +19595,19 @@
           <a:p>
             <a:r>
               <a:rPr lang="en-US" dirty="0"/>
-              <a:t>Downloading &amp; Storing Images</a:t>
+              <a:t>The </a:t>
+            </a:r>
+            <a:r>
+              <a:rPr lang="en-US" dirty="0">
+                <a:solidFill>
+                  <a:srgbClr val="FFFF00"/>
+                </a:solidFill>
+              </a:rPr>
+              <a:t>FROM</a:t>
+            </a:r>
+            <a:r>
+              <a:rPr lang="en-US" dirty="0"/>
+              <a:t> Instruction</a:t>
             </a:r>
           </a:p>
         </p:txBody>
@@ -18783,7 +19617,7 @@
           <p:cNvPr id="3" name="Content Placeholder 2">
             <a:extLst>
               <a:ext uri="{FF2B5EF4-FFF2-40B4-BE49-F238E27FC236}">
-                <a16:creationId xmlns:a16="http://schemas.microsoft.com/office/drawing/2014/main" id="{B0305AB4-6FFD-1443-85B0-D0B7EAF3A8B3}"/>
+                <a16:creationId xmlns:a16="http://schemas.microsoft.com/office/drawing/2014/main" id="{2E80DB0F-50E2-A74A-8E43-27BCD108C388}"/>
               </a:ext>
             </a:extLst>
           </p:cNvPr>
@@ -18794,12 +19628,49 @@
             <p:ph idx="1"/>
           </p:nvPr>
         </p:nvSpPr>
-        <p:spPr/>
+        <p:spPr>
+          <a:xfrm>
+            <a:off x="838200" y="1825625"/>
+            <a:ext cx="10515600" cy="1817567"/>
+          </a:xfrm>
+        </p:spPr>
         <p:txBody>
-          <a:bodyPr/>
+          <a:bodyPr>
+            <a:normAutofit/>
+          </a:bodyPr>
           <a:lstStyle/>
           <a:p>
+            <a:r>
+              <a:rPr lang="en-US" dirty="0"/>
+              <a:t>Always the first instruction, specifies base OS image</a:t>
+            </a:r>
+          </a:p>
+          <a:p>
+            <a:r>
+              <a:rPr lang="en-US" dirty="0"/>
+              <a:t>Base image index available on </a:t>
+            </a:r>
+            <a:r>
+              <a:rPr lang="en-US" dirty="0">
+                <a:hlinkClick r:id="rId3"/>
+              </a:rPr>
+              <a:t>https://hub.docker.com</a:t>
+            </a:r>
             <a:endParaRPr lang="en-US" dirty="0"/>
+          </a:p>
+          <a:p>
+            <a:r>
+              <a:rPr lang="en-US" dirty="0"/>
+              <a:t>Formatted using </a:t>
+            </a:r>
+            <a:r>
+              <a:rPr lang="en-US" dirty="0">
+                <a:solidFill>
+                  <a:srgbClr val="FFFF00"/>
+                </a:solidFill>
+              </a:rPr>
+              <a:t>tags</a:t>
+            </a:r>
           </a:p>
         </p:txBody>
       </p:sp>
@@ -18808,7 +19679,7 @@
           <p:cNvPr id="4" name="Date Placeholder 3">
             <a:extLst>
               <a:ext uri="{FF2B5EF4-FFF2-40B4-BE49-F238E27FC236}">
-                <a16:creationId xmlns:a16="http://schemas.microsoft.com/office/drawing/2014/main" id="{BCB84961-9207-314D-9F17-CB7953DAEC61}"/>
+                <a16:creationId xmlns:a16="http://schemas.microsoft.com/office/drawing/2014/main" id="{39846D18-0182-8944-9632-5EC9FBE06918}"/>
               </a:ext>
             </a:extLst>
           </p:cNvPr>
@@ -18837,7 +19708,7 @@
           <p:cNvPr id="5" name="Slide Number Placeholder 4">
             <a:extLst>
               <a:ext uri="{FF2B5EF4-FFF2-40B4-BE49-F238E27FC236}">
-                <a16:creationId xmlns:a16="http://schemas.microsoft.com/office/drawing/2014/main" id="{8DCD8B99-39C3-F945-B4FE-C794E71188E0}"/>
+                <a16:creationId xmlns:a16="http://schemas.microsoft.com/office/drawing/2014/main" id="{9D302B0E-8A9B-A64D-BBA5-16F36A28D4D2}"/>
               </a:ext>
             </a:extLst>
           </p:cNvPr>
@@ -18862,10 +19733,337 @@
           </a:p>
         </p:txBody>
       </p:sp>
+      <p:cxnSp>
+        <p:nvCxnSpPr>
+          <p:cNvPr id="6" name="Straight Arrow Connector 5">
+            <a:extLst>
+              <a:ext uri="{FF2B5EF4-FFF2-40B4-BE49-F238E27FC236}">
+                <a16:creationId xmlns:a16="http://schemas.microsoft.com/office/drawing/2014/main" id="{CD318F79-FBCE-4B45-9F85-EE174DE30CB4}"/>
+              </a:ext>
+            </a:extLst>
+          </p:cNvPr>
+          <p:cNvCxnSpPr>
+            <a:cxnSpLocks/>
+            <a:stCxn id="7" idx="0"/>
+            <a:endCxn id="24" idx="2"/>
+          </p:cNvCxnSpPr>
+          <p:nvPr/>
+        </p:nvCxnSpPr>
+        <p:spPr>
+          <a:xfrm flipV="1">
+            <a:off x="3999748" y="4210872"/>
+            <a:ext cx="779883" cy="1355720"/>
+          </a:xfrm>
+          <a:prstGeom prst="straightConnector1">
+            <a:avLst/>
+          </a:prstGeom>
+          <a:ln w="57150">
+            <a:solidFill>
+              <a:srgbClr val="FF0000"/>
+            </a:solidFill>
+            <a:tailEnd type="triangle"/>
+          </a:ln>
+        </p:spPr>
+        <p:style>
+          <a:lnRef idx="1">
+            <a:schemeClr val="accent1"/>
+          </a:lnRef>
+          <a:fillRef idx="0">
+            <a:schemeClr val="accent1"/>
+          </a:fillRef>
+          <a:effectRef idx="0">
+            <a:schemeClr val="accent1"/>
+          </a:effectRef>
+          <a:fontRef idx="minor">
+            <a:schemeClr val="tx1"/>
+          </a:fontRef>
+        </p:style>
+      </p:cxnSp>
+      <p:sp>
+        <p:nvSpPr>
+          <p:cNvPr id="7" name="TextBox 6">
+            <a:extLst>
+              <a:ext uri="{FF2B5EF4-FFF2-40B4-BE49-F238E27FC236}">
+                <a16:creationId xmlns:a16="http://schemas.microsoft.com/office/drawing/2014/main" id="{47332818-0993-8C42-9F19-42811EC0CB63}"/>
+              </a:ext>
+            </a:extLst>
+          </p:cNvPr>
+          <p:cNvSpPr txBox="1"/>
+          <p:nvPr/>
+        </p:nvSpPr>
+        <p:spPr>
+          <a:xfrm>
+            <a:off x="3083471" y="5566592"/>
+            <a:ext cx="1832553" cy="369332"/>
+          </a:xfrm>
+          <a:prstGeom prst="rect">
+            <a:avLst/>
+          </a:prstGeom>
+          <a:noFill/>
+        </p:spPr>
+        <p:txBody>
+          <a:bodyPr wrap="none" rtlCol="0">
+            <a:spAutoFit/>
+          </a:bodyPr>
+          <a:lstStyle/>
+          <a:p>
+            <a:pPr algn="ctr"/>
+            <a:r>
+              <a:rPr lang="en-US" dirty="0"/>
+              <a:t>FROM Instruction</a:t>
+            </a:r>
+          </a:p>
+        </p:txBody>
+      </p:sp>
+      <p:cxnSp>
+        <p:nvCxnSpPr>
+          <p:cNvPr id="10" name="Straight Arrow Connector 9">
+            <a:extLst>
+              <a:ext uri="{FF2B5EF4-FFF2-40B4-BE49-F238E27FC236}">
+                <a16:creationId xmlns:a16="http://schemas.microsoft.com/office/drawing/2014/main" id="{9A5CC4A1-62A1-3E42-BB76-8CDF01BF4146}"/>
+              </a:ext>
+            </a:extLst>
+          </p:cNvPr>
+          <p:cNvCxnSpPr>
+            <a:cxnSpLocks/>
+            <a:stCxn id="11" idx="0"/>
+            <a:endCxn id="27" idx="2"/>
+          </p:cNvCxnSpPr>
+          <p:nvPr/>
+        </p:nvCxnSpPr>
+        <p:spPr>
+          <a:xfrm flipV="1">
+            <a:off x="5146958" y="4210872"/>
+            <a:ext cx="659934" cy="1887377"/>
+          </a:xfrm>
+          <a:prstGeom prst="straightConnector1">
+            <a:avLst/>
+          </a:prstGeom>
+          <a:ln w="57150">
+            <a:solidFill>
+              <a:srgbClr val="FF0000"/>
+            </a:solidFill>
+            <a:tailEnd type="triangle"/>
+          </a:ln>
+        </p:spPr>
+        <p:style>
+          <a:lnRef idx="1">
+            <a:schemeClr val="accent1"/>
+          </a:lnRef>
+          <a:fillRef idx="0">
+            <a:schemeClr val="accent1"/>
+          </a:fillRef>
+          <a:effectRef idx="0">
+            <a:schemeClr val="accent1"/>
+          </a:effectRef>
+          <a:fontRef idx="minor">
+            <a:schemeClr val="tx1"/>
+          </a:fontRef>
+        </p:style>
+      </p:cxnSp>
+      <p:sp>
+        <p:nvSpPr>
+          <p:cNvPr id="11" name="TextBox 10">
+            <a:extLst>
+              <a:ext uri="{FF2B5EF4-FFF2-40B4-BE49-F238E27FC236}">
+                <a16:creationId xmlns:a16="http://schemas.microsoft.com/office/drawing/2014/main" id="{77230286-4844-454C-890D-702585715E23}"/>
+              </a:ext>
+            </a:extLst>
+          </p:cNvPr>
+          <p:cNvSpPr txBox="1"/>
+          <p:nvPr/>
+        </p:nvSpPr>
+        <p:spPr>
+          <a:xfrm>
+            <a:off x="4068810" y="6098249"/>
+            <a:ext cx="2156296" cy="369332"/>
+          </a:xfrm>
+          <a:prstGeom prst="rect">
+            <a:avLst/>
+          </a:prstGeom>
+          <a:noFill/>
+        </p:spPr>
+        <p:txBody>
+          <a:bodyPr wrap="none" rtlCol="0">
+            <a:spAutoFit/>
+          </a:bodyPr>
+          <a:lstStyle/>
+          <a:p>
+            <a:pPr algn="ctr"/>
+            <a:r>
+              <a:rPr lang="en-US" dirty="0"/>
+              <a:t>Python official image</a:t>
+            </a:r>
+          </a:p>
+        </p:txBody>
+      </p:sp>
+      <p:cxnSp>
+        <p:nvCxnSpPr>
+          <p:cNvPr id="14" name="Straight Arrow Connector 13">
+            <a:extLst>
+              <a:ext uri="{FF2B5EF4-FFF2-40B4-BE49-F238E27FC236}">
+                <a16:creationId xmlns:a16="http://schemas.microsoft.com/office/drawing/2014/main" id="{76C5248C-E52B-4841-A86B-22EB44A50143}"/>
+              </a:ext>
+            </a:extLst>
+          </p:cNvPr>
+          <p:cNvCxnSpPr>
+            <a:cxnSpLocks/>
+            <a:stCxn id="15" idx="0"/>
+            <a:endCxn id="29" idx="2"/>
+          </p:cNvCxnSpPr>
+          <p:nvPr/>
+        </p:nvCxnSpPr>
+        <p:spPr>
+          <a:xfrm flipH="1" flipV="1">
+            <a:off x="6647403" y="4210872"/>
+            <a:ext cx="542615" cy="1887377"/>
+          </a:xfrm>
+          <a:prstGeom prst="straightConnector1">
+            <a:avLst/>
+          </a:prstGeom>
+          <a:ln w="57150">
+            <a:solidFill>
+              <a:srgbClr val="FF0000"/>
+            </a:solidFill>
+            <a:tailEnd type="triangle"/>
+          </a:ln>
+        </p:spPr>
+        <p:style>
+          <a:lnRef idx="1">
+            <a:schemeClr val="accent1"/>
+          </a:lnRef>
+          <a:fillRef idx="0">
+            <a:schemeClr val="accent1"/>
+          </a:fillRef>
+          <a:effectRef idx="0">
+            <a:schemeClr val="accent1"/>
+          </a:effectRef>
+          <a:fontRef idx="minor">
+            <a:schemeClr val="tx1"/>
+          </a:fontRef>
+        </p:style>
+      </p:cxnSp>
+      <p:sp>
+        <p:nvSpPr>
+          <p:cNvPr id="15" name="TextBox 14">
+            <a:extLst>
+              <a:ext uri="{FF2B5EF4-FFF2-40B4-BE49-F238E27FC236}">
+                <a16:creationId xmlns:a16="http://schemas.microsoft.com/office/drawing/2014/main" id="{D3D1712F-B75C-244B-9E7A-5A0332F4B6D6}"/>
+              </a:ext>
+            </a:extLst>
+          </p:cNvPr>
+          <p:cNvSpPr txBox="1"/>
+          <p:nvPr/>
+        </p:nvSpPr>
+        <p:spPr>
+          <a:xfrm>
+            <a:off x="6225106" y="6098249"/>
+            <a:ext cx="1929824" cy="369332"/>
+          </a:xfrm>
+          <a:prstGeom prst="rect">
+            <a:avLst/>
+          </a:prstGeom>
+          <a:noFill/>
+        </p:spPr>
+        <p:txBody>
+          <a:bodyPr wrap="none" rtlCol="0">
+            <a:spAutoFit/>
+          </a:bodyPr>
+          <a:lstStyle/>
+          <a:p>
+            <a:pPr algn="ctr"/>
+            <a:r>
+              <a:rPr lang="en-US" dirty="0"/>
+              <a:t>Python version 3.8</a:t>
+            </a:r>
+          </a:p>
+        </p:txBody>
+      </p:sp>
+      <p:cxnSp>
+        <p:nvCxnSpPr>
+          <p:cNvPr id="16" name="Straight Arrow Connector 15">
+            <a:extLst>
+              <a:ext uri="{FF2B5EF4-FFF2-40B4-BE49-F238E27FC236}">
+                <a16:creationId xmlns:a16="http://schemas.microsoft.com/office/drawing/2014/main" id="{318C670B-6B5E-C743-A962-4699694AA24E}"/>
+              </a:ext>
+            </a:extLst>
+          </p:cNvPr>
+          <p:cNvCxnSpPr>
+            <a:cxnSpLocks/>
+            <a:endCxn id="31" idx="2"/>
+          </p:cNvCxnSpPr>
+          <p:nvPr/>
+        </p:nvCxnSpPr>
+        <p:spPr>
+          <a:xfrm flipH="1" flipV="1">
+            <a:off x="7431516" y="4210871"/>
+            <a:ext cx="826102" cy="1467960"/>
+          </a:xfrm>
+          <a:prstGeom prst="straightConnector1">
+            <a:avLst/>
+          </a:prstGeom>
+          <a:ln w="57150">
+            <a:solidFill>
+              <a:srgbClr val="FF0000"/>
+            </a:solidFill>
+            <a:tailEnd type="triangle"/>
+          </a:ln>
+        </p:spPr>
+        <p:style>
+          <a:lnRef idx="1">
+            <a:schemeClr val="accent1"/>
+          </a:lnRef>
+          <a:fillRef idx="0">
+            <a:schemeClr val="accent1"/>
+          </a:fillRef>
+          <a:effectRef idx="0">
+            <a:schemeClr val="accent1"/>
+          </a:effectRef>
+          <a:fontRef idx="minor">
+            <a:schemeClr val="tx1"/>
+          </a:fontRef>
+        </p:style>
+      </p:cxnSp>
+      <p:sp>
+        <p:nvSpPr>
+          <p:cNvPr id="17" name="TextBox 16">
+            <a:extLst>
+              <a:ext uri="{FF2B5EF4-FFF2-40B4-BE49-F238E27FC236}">
+                <a16:creationId xmlns:a16="http://schemas.microsoft.com/office/drawing/2014/main" id="{1842074F-A45E-EC4D-8CEB-31328DA4DDF4}"/>
+              </a:ext>
+            </a:extLst>
+          </p:cNvPr>
+          <p:cNvSpPr txBox="1"/>
+          <p:nvPr/>
+        </p:nvSpPr>
+        <p:spPr>
+          <a:xfrm>
+            <a:off x="7581180" y="5566592"/>
+            <a:ext cx="1640193" cy="369332"/>
+          </a:xfrm>
+          <a:prstGeom prst="rect">
+            <a:avLst/>
+          </a:prstGeom>
+          <a:noFill/>
+        </p:spPr>
+        <p:txBody>
+          <a:bodyPr wrap="none" rtlCol="0">
+            <a:spAutoFit/>
+          </a:bodyPr>
+          <a:lstStyle/>
+          <a:p>
+            <a:pPr algn="ctr"/>
+            <a:r>
+              <a:rPr lang="en-US" dirty="0"/>
+              <a:t>Alpine Linux OS</a:t>
+            </a:r>
+          </a:p>
+        </p:txBody>
+      </p:sp>
     </p:spTree>
     <p:extLst>
       <p:ext uri="{BB962C8B-B14F-4D97-AF65-F5344CB8AC3E}">
-        <p14:creationId xmlns:p14="http://schemas.microsoft.com/office/powerpoint/2010/main" val="3043587272"/>
+        <p14:creationId xmlns:p14="http://schemas.microsoft.com/office/powerpoint/2010/main" val="2181295849"/>
       </p:ext>
     </p:extLst>
   </p:cSld>
@@ -18884,6 +20082,819 @@
       </p:transition>
     </mc:Fallback>
   </mc:AlternateContent>
+  <p:timing>
+    <p:tnLst>
+      <p:par>
+        <p:cTn id="1" dur="indefinite" restart="never" nodeType="tmRoot">
+          <p:childTnLst>
+            <p:seq concurrent="1" nextAc="seek">
+              <p:cTn id="2" dur="indefinite" nodeType="mainSeq">
+                <p:childTnLst>
+                  <p:par>
+                    <p:cTn id="3" fill="hold">
+                      <p:stCondLst>
+                        <p:cond delay="indefinite"/>
+                      </p:stCondLst>
+                      <p:childTnLst>
+                        <p:par>
+                          <p:cTn id="4" fill="hold">
+                            <p:stCondLst>
+                              <p:cond delay="0"/>
+                            </p:stCondLst>
+                            <p:childTnLst>
+                              <p:par>
+                                <p:cTn id="5" presetID="9" presetClass="entr" presetSubtype="0" fill="hold" grpId="0" nodeType="clickEffect">
+                                  <p:stCondLst>
+                                    <p:cond delay="0"/>
+                                  </p:stCondLst>
+                                  <p:childTnLst>
+                                    <p:set>
+                                      <p:cBhvr>
+                                        <p:cTn id="6" dur="1" fill="hold">
+                                          <p:stCondLst>
+                                            <p:cond delay="0"/>
+                                          </p:stCondLst>
+                                        </p:cTn>
+                                        <p:tgtEl>
+                                          <p:spTgt spid="3">
+                                            <p:txEl>
+                                              <p:pRg st="0" end="0"/>
+                                            </p:txEl>
+                                          </p:spTgt>
+                                        </p:tgtEl>
+                                        <p:attrNameLst>
+                                          <p:attrName>style.visibility</p:attrName>
+                                        </p:attrNameLst>
+                                      </p:cBhvr>
+                                      <p:to>
+                                        <p:strVal val="visible"/>
+                                      </p:to>
+                                    </p:set>
+                                    <p:animEffect transition="in" filter="dissolve">
+                                      <p:cBhvr>
+                                        <p:cTn id="7" dur="500"/>
+                                        <p:tgtEl>
+                                          <p:spTgt spid="3">
+                                            <p:txEl>
+                                              <p:pRg st="0" end="0"/>
+                                            </p:txEl>
+                                          </p:spTgt>
+                                        </p:tgtEl>
+                                      </p:cBhvr>
+                                    </p:animEffect>
+                                  </p:childTnLst>
+                                </p:cTn>
+                              </p:par>
+                            </p:childTnLst>
+                          </p:cTn>
+                        </p:par>
+                      </p:childTnLst>
+                    </p:cTn>
+                  </p:par>
+                  <p:par>
+                    <p:cTn id="8" fill="hold">
+                      <p:stCondLst>
+                        <p:cond delay="indefinite"/>
+                      </p:stCondLst>
+                      <p:childTnLst>
+                        <p:par>
+                          <p:cTn id="9" fill="hold">
+                            <p:stCondLst>
+                              <p:cond delay="0"/>
+                            </p:stCondLst>
+                            <p:childTnLst>
+                              <p:par>
+                                <p:cTn id="10" presetID="9" presetClass="entr" presetSubtype="0" fill="hold" grpId="0" nodeType="clickEffect">
+                                  <p:stCondLst>
+                                    <p:cond delay="0"/>
+                                  </p:stCondLst>
+                                  <p:childTnLst>
+                                    <p:set>
+                                      <p:cBhvr>
+                                        <p:cTn id="11" dur="1" fill="hold">
+                                          <p:stCondLst>
+                                            <p:cond delay="0"/>
+                                          </p:stCondLst>
+                                        </p:cTn>
+                                        <p:tgtEl>
+                                          <p:spTgt spid="3">
+                                            <p:txEl>
+                                              <p:pRg st="1" end="1"/>
+                                            </p:txEl>
+                                          </p:spTgt>
+                                        </p:tgtEl>
+                                        <p:attrNameLst>
+                                          <p:attrName>style.visibility</p:attrName>
+                                        </p:attrNameLst>
+                                      </p:cBhvr>
+                                      <p:to>
+                                        <p:strVal val="visible"/>
+                                      </p:to>
+                                    </p:set>
+                                    <p:animEffect transition="in" filter="dissolve">
+                                      <p:cBhvr>
+                                        <p:cTn id="12" dur="500"/>
+                                        <p:tgtEl>
+                                          <p:spTgt spid="3">
+                                            <p:txEl>
+                                              <p:pRg st="1" end="1"/>
+                                            </p:txEl>
+                                          </p:spTgt>
+                                        </p:tgtEl>
+                                      </p:cBhvr>
+                                    </p:animEffect>
+                                  </p:childTnLst>
+                                </p:cTn>
+                              </p:par>
+                            </p:childTnLst>
+                          </p:cTn>
+                        </p:par>
+                      </p:childTnLst>
+                    </p:cTn>
+                  </p:par>
+                  <p:par>
+                    <p:cTn id="13" fill="hold">
+                      <p:stCondLst>
+                        <p:cond delay="indefinite"/>
+                      </p:stCondLst>
+                      <p:childTnLst>
+                        <p:par>
+                          <p:cTn id="14" fill="hold">
+                            <p:stCondLst>
+                              <p:cond delay="0"/>
+                            </p:stCondLst>
+                            <p:childTnLst>
+                              <p:par>
+                                <p:cTn id="15" presetID="9" presetClass="entr" presetSubtype="0" fill="hold" grpId="0" nodeType="clickEffect">
+                                  <p:stCondLst>
+                                    <p:cond delay="0"/>
+                                  </p:stCondLst>
+                                  <p:childTnLst>
+                                    <p:set>
+                                      <p:cBhvr>
+                                        <p:cTn id="16" dur="1" fill="hold">
+                                          <p:stCondLst>
+                                            <p:cond delay="0"/>
+                                          </p:stCondLst>
+                                        </p:cTn>
+                                        <p:tgtEl>
+                                          <p:spTgt spid="3">
+                                            <p:txEl>
+                                              <p:pRg st="2" end="2"/>
+                                            </p:txEl>
+                                          </p:spTgt>
+                                        </p:tgtEl>
+                                        <p:attrNameLst>
+                                          <p:attrName>style.visibility</p:attrName>
+                                        </p:attrNameLst>
+                                      </p:cBhvr>
+                                      <p:to>
+                                        <p:strVal val="visible"/>
+                                      </p:to>
+                                    </p:set>
+                                    <p:animEffect transition="in" filter="dissolve">
+                                      <p:cBhvr>
+                                        <p:cTn id="17" dur="500"/>
+                                        <p:tgtEl>
+                                          <p:spTgt spid="3">
+                                            <p:txEl>
+                                              <p:pRg st="2" end="2"/>
+                                            </p:txEl>
+                                          </p:spTgt>
+                                        </p:tgtEl>
+                                      </p:cBhvr>
+                                    </p:animEffect>
+                                  </p:childTnLst>
+                                </p:cTn>
+                              </p:par>
+                            </p:childTnLst>
+                          </p:cTn>
+                        </p:par>
+                      </p:childTnLst>
+                    </p:cTn>
+                  </p:par>
+                  <p:par>
+                    <p:cTn id="18" fill="hold">
+                      <p:stCondLst>
+                        <p:cond delay="indefinite"/>
+                      </p:stCondLst>
+                      <p:childTnLst>
+                        <p:par>
+                          <p:cTn id="19" fill="hold">
+                            <p:stCondLst>
+                              <p:cond delay="0"/>
+                            </p:stCondLst>
+                            <p:childTnLst>
+                              <p:par>
+                                <p:cTn id="20" presetID="9" presetClass="entr" presetSubtype="0" fill="hold" nodeType="clickEffect">
+                                  <p:stCondLst>
+                                    <p:cond delay="0"/>
+                                  </p:stCondLst>
+                                  <p:childTnLst>
+                                    <p:set>
+                                      <p:cBhvr>
+                                        <p:cTn id="21" dur="1" fill="hold">
+                                          <p:stCondLst>
+                                            <p:cond delay="0"/>
+                                          </p:stCondLst>
+                                        </p:cTn>
+                                        <p:tgtEl>
+                                          <p:spTgt spid="33">
+                                            <p:txEl>
+                                              <p:pRg st="0" end="0"/>
+                                            </p:txEl>
+                                          </p:spTgt>
+                                        </p:tgtEl>
+                                        <p:attrNameLst>
+                                          <p:attrName>style.visibility</p:attrName>
+                                        </p:attrNameLst>
+                                      </p:cBhvr>
+                                      <p:to>
+                                        <p:strVal val="visible"/>
+                                      </p:to>
+                                    </p:set>
+                                    <p:animEffect transition="in" filter="dissolve">
+                                      <p:cBhvr>
+                                        <p:cTn id="22" dur="500"/>
+                                        <p:tgtEl>
+                                          <p:spTgt spid="33">
+                                            <p:txEl>
+                                              <p:pRg st="0" end="0"/>
+                                            </p:txEl>
+                                          </p:spTgt>
+                                        </p:tgtEl>
+                                      </p:cBhvr>
+                                    </p:animEffect>
+                                  </p:childTnLst>
+                                </p:cTn>
+                              </p:par>
+                            </p:childTnLst>
+                          </p:cTn>
+                        </p:par>
+                      </p:childTnLst>
+                    </p:cTn>
+                  </p:par>
+                  <p:par>
+                    <p:cTn id="23" fill="hold">
+                      <p:stCondLst>
+                        <p:cond delay="indefinite"/>
+                      </p:stCondLst>
+                      <p:childTnLst>
+                        <p:par>
+                          <p:cTn id="24" fill="hold">
+                            <p:stCondLst>
+                              <p:cond delay="0"/>
+                            </p:stCondLst>
+                            <p:childTnLst>
+                              <p:par>
+                                <p:cTn id="25" presetID="16" presetClass="entr" presetSubtype="37" fill="hold" grpId="0" nodeType="clickEffect">
+                                  <p:stCondLst>
+                                    <p:cond delay="0"/>
+                                  </p:stCondLst>
+                                  <p:childTnLst>
+                                    <p:set>
+                                      <p:cBhvr>
+                                        <p:cTn id="26" dur="1" fill="hold">
+                                          <p:stCondLst>
+                                            <p:cond delay="0"/>
+                                          </p:stCondLst>
+                                        </p:cTn>
+                                        <p:tgtEl>
+                                          <p:spTgt spid="24"/>
+                                        </p:tgtEl>
+                                        <p:attrNameLst>
+                                          <p:attrName>style.visibility</p:attrName>
+                                        </p:attrNameLst>
+                                      </p:cBhvr>
+                                      <p:to>
+                                        <p:strVal val="visible"/>
+                                      </p:to>
+                                    </p:set>
+                                    <p:animEffect transition="in" filter="barn(outVertical)">
+                                      <p:cBhvr>
+                                        <p:cTn id="27" dur="500"/>
+                                        <p:tgtEl>
+                                          <p:spTgt spid="24"/>
+                                        </p:tgtEl>
+                                      </p:cBhvr>
+                                    </p:animEffect>
+                                  </p:childTnLst>
+                                </p:cTn>
+                              </p:par>
+                            </p:childTnLst>
+                          </p:cTn>
+                        </p:par>
+                        <p:par>
+                          <p:cTn id="28" fill="hold">
+                            <p:stCondLst>
+                              <p:cond delay="500"/>
+                            </p:stCondLst>
+                            <p:childTnLst>
+                              <p:par>
+                                <p:cTn id="29" presetID="9" presetClass="entr" presetSubtype="0" fill="hold" nodeType="afterEffect">
+                                  <p:stCondLst>
+                                    <p:cond delay="0"/>
+                                  </p:stCondLst>
+                                  <p:childTnLst>
+                                    <p:set>
+                                      <p:cBhvr>
+                                        <p:cTn id="30" dur="1" fill="hold">
+                                          <p:stCondLst>
+                                            <p:cond delay="0"/>
+                                          </p:stCondLst>
+                                        </p:cTn>
+                                        <p:tgtEl>
+                                          <p:spTgt spid="6"/>
+                                        </p:tgtEl>
+                                        <p:attrNameLst>
+                                          <p:attrName>style.visibility</p:attrName>
+                                        </p:attrNameLst>
+                                      </p:cBhvr>
+                                      <p:to>
+                                        <p:strVal val="visible"/>
+                                      </p:to>
+                                    </p:set>
+                                    <p:animEffect transition="in" filter="dissolve">
+                                      <p:cBhvr>
+                                        <p:cTn id="31" dur="500"/>
+                                        <p:tgtEl>
+                                          <p:spTgt spid="6"/>
+                                        </p:tgtEl>
+                                      </p:cBhvr>
+                                    </p:animEffect>
+                                  </p:childTnLst>
+                                </p:cTn>
+                              </p:par>
+                              <p:par>
+                                <p:cTn id="32" presetID="9" presetClass="entr" presetSubtype="0" fill="hold" grpId="0" nodeType="withEffect">
+                                  <p:stCondLst>
+                                    <p:cond delay="0"/>
+                                  </p:stCondLst>
+                                  <p:childTnLst>
+                                    <p:set>
+                                      <p:cBhvr>
+                                        <p:cTn id="33" dur="1" fill="hold">
+                                          <p:stCondLst>
+                                            <p:cond delay="0"/>
+                                          </p:stCondLst>
+                                        </p:cTn>
+                                        <p:tgtEl>
+                                          <p:spTgt spid="7"/>
+                                        </p:tgtEl>
+                                        <p:attrNameLst>
+                                          <p:attrName>style.visibility</p:attrName>
+                                        </p:attrNameLst>
+                                      </p:cBhvr>
+                                      <p:to>
+                                        <p:strVal val="visible"/>
+                                      </p:to>
+                                    </p:set>
+                                    <p:animEffect transition="in" filter="dissolve">
+                                      <p:cBhvr>
+                                        <p:cTn id="34" dur="500"/>
+                                        <p:tgtEl>
+                                          <p:spTgt spid="7"/>
+                                        </p:tgtEl>
+                                      </p:cBhvr>
+                                    </p:animEffect>
+                                  </p:childTnLst>
+                                </p:cTn>
+                              </p:par>
+                            </p:childTnLst>
+                          </p:cTn>
+                        </p:par>
+                      </p:childTnLst>
+                    </p:cTn>
+                  </p:par>
+                  <p:par>
+                    <p:cTn id="35" fill="hold">
+                      <p:stCondLst>
+                        <p:cond delay="indefinite"/>
+                      </p:stCondLst>
+                      <p:childTnLst>
+                        <p:par>
+                          <p:cTn id="36" fill="hold">
+                            <p:stCondLst>
+                              <p:cond delay="0"/>
+                            </p:stCondLst>
+                            <p:childTnLst>
+                              <p:par>
+                                <p:cTn id="37" presetID="16" presetClass="entr" presetSubtype="37" fill="hold" grpId="0" nodeType="clickEffect">
+                                  <p:stCondLst>
+                                    <p:cond delay="0"/>
+                                  </p:stCondLst>
+                                  <p:childTnLst>
+                                    <p:set>
+                                      <p:cBhvr>
+                                        <p:cTn id="38" dur="1" fill="hold">
+                                          <p:stCondLst>
+                                            <p:cond delay="0"/>
+                                          </p:stCondLst>
+                                        </p:cTn>
+                                        <p:tgtEl>
+                                          <p:spTgt spid="27"/>
+                                        </p:tgtEl>
+                                        <p:attrNameLst>
+                                          <p:attrName>style.visibility</p:attrName>
+                                        </p:attrNameLst>
+                                      </p:cBhvr>
+                                      <p:to>
+                                        <p:strVal val="visible"/>
+                                      </p:to>
+                                    </p:set>
+                                    <p:animEffect transition="in" filter="barn(outVertical)">
+                                      <p:cBhvr>
+                                        <p:cTn id="39" dur="500"/>
+                                        <p:tgtEl>
+                                          <p:spTgt spid="27"/>
+                                        </p:tgtEl>
+                                      </p:cBhvr>
+                                    </p:animEffect>
+                                  </p:childTnLst>
+                                </p:cTn>
+                              </p:par>
+                            </p:childTnLst>
+                          </p:cTn>
+                        </p:par>
+                        <p:par>
+                          <p:cTn id="40" fill="hold">
+                            <p:stCondLst>
+                              <p:cond delay="500"/>
+                            </p:stCondLst>
+                            <p:childTnLst>
+                              <p:par>
+                                <p:cTn id="41" presetID="9" presetClass="entr" presetSubtype="0" fill="hold" nodeType="afterEffect">
+                                  <p:stCondLst>
+                                    <p:cond delay="0"/>
+                                  </p:stCondLst>
+                                  <p:childTnLst>
+                                    <p:set>
+                                      <p:cBhvr>
+                                        <p:cTn id="42" dur="1" fill="hold">
+                                          <p:stCondLst>
+                                            <p:cond delay="0"/>
+                                          </p:stCondLst>
+                                        </p:cTn>
+                                        <p:tgtEl>
+                                          <p:spTgt spid="10"/>
+                                        </p:tgtEl>
+                                        <p:attrNameLst>
+                                          <p:attrName>style.visibility</p:attrName>
+                                        </p:attrNameLst>
+                                      </p:cBhvr>
+                                      <p:to>
+                                        <p:strVal val="visible"/>
+                                      </p:to>
+                                    </p:set>
+                                    <p:animEffect transition="in" filter="dissolve">
+                                      <p:cBhvr>
+                                        <p:cTn id="43" dur="500"/>
+                                        <p:tgtEl>
+                                          <p:spTgt spid="10"/>
+                                        </p:tgtEl>
+                                      </p:cBhvr>
+                                    </p:animEffect>
+                                  </p:childTnLst>
+                                </p:cTn>
+                              </p:par>
+                              <p:par>
+                                <p:cTn id="44" presetID="9" presetClass="entr" presetSubtype="0" fill="hold" grpId="0" nodeType="withEffect">
+                                  <p:stCondLst>
+                                    <p:cond delay="0"/>
+                                  </p:stCondLst>
+                                  <p:childTnLst>
+                                    <p:set>
+                                      <p:cBhvr>
+                                        <p:cTn id="45" dur="1" fill="hold">
+                                          <p:stCondLst>
+                                            <p:cond delay="0"/>
+                                          </p:stCondLst>
+                                        </p:cTn>
+                                        <p:tgtEl>
+                                          <p:spTgt spid="11"/>
+                                        </p:tgtEl>
+                                        <p:attrNameLst>
+                                          <p:attrName>style.visibility</p:attrName>
+                                        </p:attrNameLst>
+                                      </p:cBhvr>
+                                      <p:to>
+                                        <p:strVal val="visible"/>
+                                      </p:to>
+                                    </p:set>
+                                    <p:animEffect transition="in" filter="dissolve">
+                                      <p:cBhvr>
+                                        <p:cTn id="46" dur="500"/>
+                                        <p:tgtEl>
+                                          <p:spTgt spid="11"/>
+                                        </p:tgtEl>
+                                      </p:cBhvr>
+                                    </p:animEffect>
+                                  </p:childTnLst>
+                                </p:cTn>
+                              </p:par>
+                            </p:childTnLst>
+                          </p:cTn>
+                        </p:par>
+                      </p:childTnLst>
+                    </p:cTn>
+                  </p:par>
+                  <p:par>
+                    <p:cTn id="47" fill="hold">
+                      <p:stCondLst>
+                        <p:cond delay="indefinite"/>
+                      </p:stCondLst>
+                      <p:childTnLst>
+                        <p:par>
+                          <p:cTn id="48" fill="hold">
+                            <p:stCondLst>
+                              <p:cond delay="0"/>
+                            </p:stCondLst>
+                            <p:childTnLst>
+                              <p:par>
+                                <p:cTn id="49" presetID="16" presetClass="entr" presetSubtype="37" fill="hold" grpId="0" nodeType="clickEffect">
+                                  <p:stCondLst>
+                                    <p:cond delay="0"/>
+                                  </p:stCondLst>
+                                  <p:childTnLst>
+                                    <p:set>
+                                      <p:cBhvr>
+                                        <p:cTn id="50" dur="1" fill="hold">
+                                          <p:stCondLst>
+                                            <p:cond delay="0"/>
+                                          </p:stCondLst>
+                                        </p:cTn>
+                                        <p:tgtEl>
+                                          <p:spTgt spid="29"/>
+                                        </p:tgtEl>
+                                        <p:attrNameLst>
+                                          <p:attrName>style.visibility</p:attrName>
+                                        </p:attrNameLst>
+                                      </p:cBhvr>
+                                      <p:to>
+                                        <p:strVal val="visible"/>
+                                      </p:to>
+                                    </p:set>
+                                    <p:animEffect transition="in" filter="barn(outVertical)">
+                                      <p:cBhvr>
+                                        <p:cTn id="51" dur="500"/>
+                                        <p:tgtEl>
+                                          <p:spTgt spid="29"/>
+                                        </p:tgtEl>
+                                      </p:cBhvr>
+                                    </p:animEffect>
+                                  </p:childTnLst>
+                                </p:cTn>
+                              </p:par>
+                            </p:childTnLst>
+                          </p:cTn>
+                        </p:par>
+                        <p:par>
+                          <p:cTn id="52" fill="hold">
+                            <p:stCondLst>
+                              <p:cond delay="500"/>
+                            </p:stCondLst>
+                            <p:childTnLst>
+                              <p:par>
+                                <p:cTn id="53" presetID="9" presetClass="entr" presetSubtype="0" fill="hold" nodeType="afterEffect">
+                                  <p:stCondLst>
+                                    <p:cond delay="0"/>
+                                  </p:stCondLst>
+                                  <p:childTnLst>
+                                    <p:set>
+                                      <p:cBhvr>
+                                        <p:cTn id="54" dur="1" fill="hold">
+                                          <p:stCondLst>
+                                            <p:cond delay="0"/>
+                                          </p:stCondLst>
+                                        </p:cTn>
+                                        <p:tgtEl>
+                                          <p:spTgt spid="14"/>
+                                        </p:tgtEl>
+                                        <p:attrNameLst>
+                                          <p:attrName>style.visibility</p:attrName>
+                                        </p:attrNameLst>
+                                      </p:cBhvr>
+                                      <p:to>
+                                        <p:strVal val="visible"/>
+                                      </p:to>
+                                    </p:set>
+                                    <p:animEffect transition="in" filter="dissolve">
+                                      <p:cBhvr>
+                                        <p:cTn id="55" dur="500"/>
+                                        <p:tgtEl>
+                                          <p:spTgt spid="14"/>
+                                        </p:tgtEl>
+                                      </p:cBhvr>
+                                    </p:animEffect>
+                                  </p:childTnLst>
+                                </p:cTn>
+                              </p:par>
+                              <p:par>
+                                <p:cTn id="56" presetID="9" presetClass="entr" presetSubtype="0" fill="hold" grpId="0" nodeType="withEffect">
+                                  <p:stCondLst>
+                                    <p:cond delay="0"/>
+                                  </p:stCondLst>
+                                  <p:childTnLst>
+                                    <p:set>
+                                      <p:cBhvr>
+                                        <p:cTn id="57" dur="1" fill="hold">
+                                          <p:stCondLst>
+                                            <p:cond delay="0"/>
+                                          </p:stCondLst>
+                                        </p:cTn>
+                                        <p:tgtEl>
+                                          <p:spTgt spid="15"/>
+                                        </p:tgtEl>
+                                        <p:attrNameLst>
+                                          <p:attrName>style.visibility</p:attrName>
+                                        </p:attrNameLst>
+                                      </p:cBhvr>
+                                      <p:to>
+                                        <p:strVal val="visible"/>
+                                      </p:to>
+                                    </p:set>
+                                    <p:animEffect transition="in" filter="dissolve">
+                                      <p:cBhvr>
+                                        <p:cTn id="58" dur="500"/>
+                                        <p:tgtEl>
+                                          <p:spTgt spid="15"/>
+                                        </p:tgtEl>
+                                      </p:cBhvr>
+                                    </p:animEffect>
+                                  </p:childTnLst>
+                                </p:cTn>
+                              </p:par>
+                            </p:childTnLst>
+                          </p:cTn>
+                        </p:par>
+                      </p:childTnLst>
+                    </p:cTn>
+                  </p:par>
+                  <p:par>
+                    <p:cTn id="59" fill="hold">
+                      <p:stCondLst>
+                        <p:cond delay="indefinite"/>
+                      </p:stCondLst>
+                      <p:childTnLst>
+                        <p:par>
+                          <p:cTn id="60" fill="hold">
+                            <p:stCondLst>
+                              <p:cond delay="0"/>
+                            </p:stCondLst>
+                            <p:childTnLst>
+                              <p:par>
+                                <p:cTn id="61" presetID="16" presetClass="entr" presetSubtype="37" fill="hold" grpId="0" nodeType="clickEffect">
+                                  <p:stCondLst>
+                                    <p:cond delay="0"/>
+                                  </p:stCondLst>
+                                  <p:childTnLst>
+                                    <p:set>
+                                      <p:cBhvr>
+                                        <p:cTn id="62" dur="1" fill="hold">
+                                          <p:stCondLst>
+                                            <p:cond delay="0"/>
+                                          </p:stCondLst>
+                                        </p:cTn>
+                                        <p:tgtEl>
+                                          <p:spTgt spid="31"/>
+                                        </p:tgtEl>
+                                        <p:attrNameLst>
+                                          <p:attrName>style.visibility</p:attrName>
+                                        </p:attrNameLst>
+                                      </p:cBhvr>
+                                      <p:to>
+                                        <p:strVal val="visible"/>
+                                      </p:to>
+                                    </p:set>
+                                    <p:animEffect transition="in" filter="barn(outVertical)">
+                                      <p:cBhvr>
+                                        <p:cTn id="63" dur="500"/>
+                                        <p:tgtEl>
+                                          <p:spTgt spid="31"/>
+                                        </p:tgtEl>
+                                      </p:cBhvr>
+                                    </p:animEffect>
+                                  </p:childTnLst>
+                                </p:cTn>
+                              </p:par>
+                            </p:childTnLst>
+                          </p:cTn>
+                        </p:par>
+                        <p:par>
+                          <p:cTn id="64" fill="hold">
+                            <p:stCondLst>
+                              <p:cond delay="500"/>
+                            </p:stCondLst>
+                            <p:childTnLst>
+                              <p:par>
+                                <p:cTn id="65" presetID="9" presetClass="entr" presetSubtype="0" fill="hold" grpId="0" nodeType="afterEffect">
+                                  <p:stCondLst>
+                                    <p:cond delay="0"/>
+                                  </p:stCondLst>
+                                  <p:childTnLst>
+                                    <p:set>
+                                      <p:cBhvr>
+                                        <p:cTn id="66" dur="1" fill="hold">
+                                          <p:stCondLst>
+                                            <p:cond delay="0"/>
+                                          </p:stCondLst>
+                                        </p:cTn>
+                                        <p:tgtEl>
+                                          <p:spTgt spid="17"/>
+                                        </p:tgtEl>
+                                        <p:attrNameLst>
+                                          <p:attrName>style.visibility</p:attrName>
+                                        </p:attrNameLst>
+                                      </p:cBhvr>
+                                      <p:to>
+                                        <p:strVal val="visible"/>
+                                      </p:to>
+                                    </p:set>
+                                    <p:animEffect transition="in" filter="dissolve">
+                                      <p:cBhvr>
+                                        <p:cTn id="67" dur="500"/>
+                                        <p:tgtEl>
+                                          <p:spTgt spid="17"/>
+                                        </p:tgtEl>
+                                      </p:cBhvr>
+                                    </p:animEffect>
+                                  </p:childTnLst>
+                                </p:cTn>
+                              </p:par>
+                              <p:par>
+                                <p:cTn id="68" presetID="9" presetClass="entr" presetSubtype="0" fill="hold" nodeType="withEffect">
+                                  <p:stCondLst>
+                                    <p:cond delay="0"/>
+                                  </p:stCondLst>
+                                  <p:childTnLst>
+                                    <p:set>
+                                      <p:cBhvr>
+                                        <p:cTn id="69" dur="1" fill="hold">
+                                          <p:stCondLst>
+                                            <p:cond delay="0"/>
+                                          </p:stCondLst>
+                                        </p:cTn>
+                                        <p:tgtEl>
+                                          <p:spTgt spid="16"/>
+                                        </p:tgtEl>
+                                        <p:attrNameLst>
+                                          <p:attrName>style.visibility</p:attrName>
+                                        </p:attrNameLst>
+                                      </p:cBhvr>
+                                      <p:to>
+                                        <p:strVal val="visible"/>
+                                      </p:to>
+                                    </p:set>
+                                    <p:animEffect transition="in" filter="dissolve">
+                                      <p:cBhvr>
+                                        <p:cTn id="70" dur="500"/>
+                                        <p:tgtEl>
+                                          <p:spTgt spid="16"/>
+                                        </p:tgtEl>
+                                      </p:cBhvr>
+                                    </p:animEffect>
+                                  </p:childTnLst>
+                                </p:cTn>
+                              </p:par>
+                            </p:childTnLst>
+                          </p:cTn>
+                        </p:par>
+                      </p:childTnLst>
+                    </p:cTn>
+                  </p:par>
+                </p:childTnLst>
+              </p:cTn>
+              <p:prevCondLst>
+                <p:cond evt="onPrev" delay="0">
+                  <p:tgtEl>
+                    <p:sldTgt/>
+                  </p:tgtEl>
+                </p:cond>
+              </p:prevCondLst>
+              <p:nextCondLst>
+                <p:cond evt="onNext" delay="0">
+                  <p:tgtEl>
+                    <p:sldTgt/>
+                  </p:tgtEl>
+                </p:cond>
+              </p:nextCondLst>
+            </p:seq>
+          </p:childTnLst>
+        </p:cTn>
+      </p:par>
+    </p:tnLst>
+    <p:bldLst>
+      <p:bldP spid="29" grpId="0" animBg="1"/>
+      <p:bldP spid="31" grpId="0" animBg="1"/>
+      <p:bldP spid="27" grpId="0" animBg="1"/>
+      <p:bldP spid="24" grpId="0" animBg="1"/>
+      <p:bldP spid="3" grpId="0" build="p"/>
+      <p:bldP spid="7" grpId="0"/>
+      <p:bldP spid="11" grpId="0"/>
+      <p:bldP spid="15" grpId="0"/>
+      <p:bldP spid="17" grpId="0"/>
+    </p:bldLst>
+  </p:timing>
 </p:sld>
 </file>
 
@@ -18904,125 +20915,10 @@
           <a:chExt cx="0" cy="0"/>
         </a:xfrm>
       </p:grpSpPr>
-      <p:sp>
-        <p:nvSpPr>
-          <p:cNvPr id="2" name="Title 1">
-            <a:extLst>
-              <a:ext uri="{FF2B5EF4-FFF2-40B4-BE49-F238E27FC236}">
-                <a16:creationId xmlns:a16="http://schemas.microsoft.com/office/drawing/2014/main" id="{8433E226-C9CA-6940-939E-6C1F5B356A30}"/>
-              </a:ext>
-            </a:extLst>
-          </p:cNvPr>
-          <p:cNvSpPr>
-            <a:spLocks noGrp="1"/>
-          </p:cNvSpPr>
-          <p:nvPr>
-            <p:ph type="title"/>
-          </p:nvPr>
-        </p:nvSpPr>
-        <p:spPr/>
-        <p:txBody>
-          <a:bodyPr/>
-          <a:lstStyle/>
-          <a:p>
-            <a:r>
-              <a:rPr lang="en-US" dirty="0"/>
-              <a:t>Docker Images</a:t>
-            </a:r>
-          </a:p>
-        </p:txBody>
-      </p:sp>
-      <p:sp>
-        <p:nvSpPr>
-          <p:cNvPr id="3" name="Content Placeholder 2">
-            <a:extLst>
-              <a:ext uri="{FF2B5EF4-FFF2-40B4-BE49-F238E27FC236}">
-                <a16:creationId xmlns:a16="http://schemas.microsoft.com/office/drawing/2014/main" id="{B3D06E7E-C378-CF4A-BAE8-73912C1352E6}"/>
-              </a:ext>
-            </a:extLst>
-          </p:cNvPr>
-          <p:cNvSpPr>
-            <a:spLocks noGrp="1"/>
-          </p:cNvSpPr>
-          <p:nvPr>
-            <p:ph idx="1"/>
-          </p:nvPr>
-        </p:nvSpPr>
-        <p:spPr/>
-        <p:txBody>
-          <a:bodyPr/>
-          <a:lstStyle/>
-          <a:p>
-            <a:r>
-              <a:rPr lang="en-US" dirty="0"/>
-              <a:t>Layers</a:t>
-            </a:r>
-          </a:p>
-        </p:txBody>
-      </p:sp>
-      <p:sp>
-        <p:nvSpPr>
-          <p:cNvPr id="4" name="Date Placeholder 3">
-            <a:extLst>
-              <a:ext uri="{FF2B5EF4-FFF2-40B4-BE49-F238E27FC236}">
-                <a16:creationId xmlns:a16="http://schemas.microsoft.com/office/drawing/2014/main" id="{4F1B3995-BF30-9944-85E9-292F234D5C32}"/>
-              </a:ext>
-            </a:extLst>
-          </p:cNvPr>
-          <p:cNvSpPr>
-            <a:spLocks noGrp="1"/>
-          </p:cNvSpPr>
-          <p:nvPr>
-            <p:ph type="dt" sz="half" idx="10"/>
-          </p:nvPr>
-        </p:nvSpPr>
-        <p:spPr/>
-        <p:txBody>
-          <a:bodyPr/>
-          <a:lstStyle/>
-          <a:p>
-            <a:r>
-              <a:rPr lang="en-US"/>
-              <a:t>World Wide Technology ©</a:t>
-            </a:r>
-            <a:endParaRPr lang="en-US" dirty="0"/>
-          </a:p>
-        </p:txBody>
-      </p:sp>
-      <p:sp>
-        <p:nvSpPr>
-          <p:cNvPr id="5" name="Slide Number Placeholder 4">
-            <a:extLst>
-              <a:ext uri="{FF2B5EF4-FFF2-40B4-BE49-F238E27FC236}">
-                <a16:creationId xmlns:a16="http://schemas.microsoft.com/office/drawing/2014/main" id="{72FDF096-946D-D740-8B15-C2984C73CB55}"/>
-              </a:ext>
-            </a:extLst>
-          </p:cNvPr>
-          <p:cNvSpPr>
-            <a:spLocks noGrp="1"/>
-          </p:cNvSpPr>
-          <p:nvPr>
-            <p:ph type="sldNum" sz="quarter" idx="12"/>
-          </p:nvPr>
-        </p:nvSpPr>
-        <p:spPr/>
-        <p:txBody>
-          <a:bodyPr/>
-          <a:lstStyle/>
-          <a:p>
-            <a:fld id="{A44B02FA-DD2D-1844-AE35-8B2EAB0CF4EF}" type="slidenum">
-              <a:rPr lang="en-US" smtClean="0"/>
-              <a:pPr/>
-              <a:t>22</a:t>
-            </a:fld>
-            <a:endParaRPr lang="en-US" dirty="0"/>
-          </a:p>
-        </p:txBody>
-      </p:sp>
     </p:spTree>
     <p:extLst>
       <p:ext uri="{BB962C8B-B14F-4D97-AF65-F5344CB8AC3E}">
-        <p14:creationId xmlns:p14="http://schemas.microsoft.com/office/powerpoint/2010/main" val="2543508427"/>
+        <p14:creationId xmlns:p14="http://schemas.microsoft.com/office/powerpoint/2010/main" val="1079023681"/>
       </p:ext>
     </p:extLst>
   </p:cSld>
@@ -19066,7 +20962,7 @@
           <p:cNvPr id="2" name="Title 1">
             <a:extLst>
               <a:ext uri="{FF2B5EF4-FFF2-40B4-BE49-F238E27FC236}">
-                <a16:creationId xmlns:a16="http://schemas.microsoft.com/office/drawing/2014/main" id="{50D24551-8433-1648-A045-8FBF82633296}"/>
+                <a16:creationId xmlns:a16="http://schemas.microsoft.com/office/drawing/2014/main" id="{AC0D55DF-385E-9A4F-AB08-FEBC11990B8B}"/>
               </a:ext>
             </a:extLst>
           </p:cNvPr>
@@ -19084,11 +20980,11 @@
           <a:p>
             <a:r>
               <a:rPr lang="en-US" dirty="0"/>
-              <a:t>The </a:t>
+              <a:t>Docker </a:t>
             </a:r>
             <a:r>
-              <a:rPr lang="en-US" dirty="0" err="1"/>
-              <a:t>Dockerfile</a:t>
+              <a:rPr lang="en-US" baseline="0" dirty="0"/>
+              <a:t>Containers</a:t>
             </a:r>
             <a:endParaRPr lang="en-US" dirty="0"/>
           </a:p>
@@ -19099,7 +20995,7 @@
           <p:cNvPr id="3" name="Content Placeholder 2">
             <a:extLst>
               <a:ext uri="{FF2B5EF4-FFF2-40B4-BE49-F238E27FC236}">
-                <a16:creationId xmlns:a16="http://schemas.microsoft.com/office/drawing/2014/main" id="{2E80DB0F-50E2-A74A-8E43-27BCD108C388}"/>
+                <a16:creationId xmlns:a16="http://schemas.microsoft.com/office/drawing/2014/main" id="{4CB23FD9-ADE0-084E-A8CC-44CA0BA25AB3}"/>
               </a:ext>
             </a:extLst>
           </p:cNvPr>
@@ -19115,40 +21011,7 @@
           <a:bodyPr/>
           <a:lstStyle/>
           <a:p>
-            <a:r>
-              <a:rPr lang="en-US" dirty="0"/>
-              <a:t>FROM</a:t>
-            </a:r>
-          </a:p>
-          <a:p>
-            <a:r>
-              <a:rPr lang="en-US" dirty="0"/>
-              <a:t>RUN</a:t>
-            </a:r>
-          </a:p>
-          <a:p>
-            <a:r>
-              <a:rPr lang="en-US" dirty="0"/>
-              <a:t>WORKDIR</a:t>
-            </a:r>
-          </a:p>
-          <a:p>
-            <a:r>
-              <a:rPr lang="en-US" dirty="0"/>
-              <a:t>COPY</a:t>
-            </a:r>
-          </a:p>
-          <a:p>
-            <a:r>
-              <a:rPr lang="en-US" dirty="0"/>
-              <a:t>LABEL</a:t>
-            </a:r>
-          </a:p>
-          <a:p>
-            <a:r>
-              <a:rPr lang="en-US" dirty="0"/>
-              <a:t>CMD</a:t>
-            </a:r>
+            <a:endParaRPr lang="en-US"/>
           </a:p>
         </p:txBody>
       </p:sp>
@@ -19157,7 +21020,7 @@
           <p:cNvPr id="4" name="Date Placeholder 3">
             <a:extLst>
               <a:ext uri="{FF2B5EF4-FFF2-40B4-BE49-F238E27FC236}">
-                <a16:creationId xmlns:a16="http://schemas.microsoft.com/office/drawing/2014/main" id="{39846D18-0182-8944-9632-5EC9FBE06918}"/>
+                <a16:creationId xmlns:a16="http://schemas.microsoft.com/office/drawing/2014/main" id="{6E8781CE-B8A7-7540-B619-28D099093D8B}"/>
               </a:ext>
             </a:extLst>
           </p:cNvPr>
@@ -19186,7 +21049,7 @@
           <p:cNvPr id="5" name="Slide Number Placeholder 4">
             <a:extLst>
               <a:ext uri="{FF2B5EF4-FFF2-40B4-BE49-F238E27FC236}">
-                <a16:creationId xmlns:a16="http://schemas.microsoft.com/office/drawing/2014/main" id="{9D302B0E-8A9B-A64D-BBA5-16F36A28D4D2}"/>
+                <a16:creationId xmlns:a16="http://schemas.microsoft.com/office/drawing/2014/main" id="{222BEAA2-2326-1F4D-9BCE-0FC3EC23B201}"/>
               </a:ext>
             </a:extLst>
           </p:cNvPr>
@@ -19214,7 +21077,7 @@
     </p:spTree>
     <p:extLst>
       <p:ext uri="{BB962C8B-B14F-4D97-AF65-F5344CB8AC3E}">
-        <p14:creationId xmlns:p14="http://schemas.microsoft.com/office/powerpoint/2010/main" val="2181295849"/>
+        <p14:creationId xmlns:p14="http://schemas.microsoft.com/office/powerpoint/2010/main" val="2588513431"/>
       </p:ext>
     </p:extLst>
   </p:cSld>
@@ -19258,7 +21121,7 @@
           <p:cNvPr id="2" name="Title 1">
             <a:extLst>
               <a:ext uri="{FF2B5EF4-FFF2-40B4-BE49-F238E27FC236}">
-                <a16:creationId xmlns:a16="http://schemas.microsoft.com/office/drawing/2014/main" id="{94E0E83A-4B2A-E544-BF79-EC8A6F911A9E}"/>
+                <a16:creationId xmlns:a16="http://schemas.microsoft.com/office/drawing/2014/main" id="{42BD247B-4264-A040-8FCB-C20FD3374FF4}"/>
               </a:ext>
             </a:extLst>
           </p:cNvPr>
@@ -19276,7 +21139,7 @@
           <a:p>
             <a:r>
               <a:rPr lang="en-US" dirty="0"/>
-              <a:t>Build Docker Images</a:t>
+              <a:t>Downloading &amp; Storing Images</a:t>
             </a:r>
           </a:p>
         </p:txBody>
@@ -19286,7 +21149,7 @@
           <p:cNvPr id="3" name="Content Placeholder 2">
             <a:extLst>
               <a:ext uri="{FF2B5EF4-FFF2-40B4-BE49-F238E27FC236}">
-                <a16:creationId xmlns:a16="http://schemas.microsoft.com/office/drawing/2014/main" id="{34D58626-62C7-114E-81E1-0A0A21659024}"/>
+                <a16:creationId xmlns:a16="http://schemas.microsoft.com/office/drawing/2014/main" id="{B0305AB4-6FFD-1443-85B0-D0B7EAF3A8B3}"/>
               </a:ext>
             </a:extLst>
           </p:cNvPr>
@@ -19302,36 +21165,7 @@
           <a:bodyPr/>
           <a:lstStyle/>
           <a:p>
-            <a:r>
-              <a:rPr lang="en-US" dirty="0"/>
-              <a:t>docker image build -t </a:t>
-            </a:r>
-            <a:r>
-              <a:rPr lang="en-US" dirty="0" err="1"/>
-              <a:t>nnn</a:t>
-            </a:r>
-            <a:r>
-              <a:rPr lang="en-US" dirty="0"/>
-              <a:t> .</a:t>
-            </a:r>
-          </a:p>
-          <a:p>
-            <a:r>
-              <a:rPr lang="en-US" dirty="0"/>
-              <a:t>docker image ls</a:t>
-            </a:r>
-          </a:p>
-          <a:p>
-            <a:r>
-              <a:rPr lang="en-US" dirty="0"/>
-              <a:t>docker image push</a:t>
-            </a:r>
-          </a:p>
-          <a:p>
-            <a:r>
-              <a:rPr lang="en-US" dirty="0"/>
-              <a:t>docker image rm</a:t>
-            </a:r>
+            <a:endParaRPr lang="en-US" dirty="0"/>
           </a:p>
         </p:txBody>
       </p:sp>
@@ -19340,7 +21174,7 @@
           <p:cNvPr id="4" name="Date Placeholder 3">
             <a:extLst>
               <a:ext uri="{FF2B5EF4-FFF2-40B4-BE49-F238E27FC236}">
-                <a16:creationId xmlns:a16="http://schemas.microsoft.com/office/drawing/2014/main" id="{CC4ADDAD-DA87-B242-A2FD-55D58FC589CB}"/>
+                <a16:creationId xmlns:a16="http://schemas.microsoft.com/office/drawing/2014/main" id="{BCB84961-9207-314D-9F17-CB7953DAEC61}"/>
               </a:ext>
             </a:extLst>
           </p:cNvPr>
@@ -19369,7 +21203,7 @@
           <p:cNvPr id="5" name="Slide Number Placeholder 4">
             <a:extLst>
               <a:ext uri="{FF2B5EF4-FFF2-40B4-BE49-F238E27FC236}">
-                <a16:creationId xmlns:a16="http://schemas.microsoft.com/office/drawing/2014/main" id="{A1DDA22E-7443-8A4B-9114-623E0D047796}"/>
+                <a16:creationId xmlns:a16="http://schemas.microsoft.com/office/drawing/2014/main" id="{8DCD8B99-39C3-F945-B4FE-C794E71188E0}"/>
               </a:ext>
             </a:extLst>
           </p:cNvPr>
@@ -19397,7 +21231,7 @@
     </p:spTree>
     <p:extLst>
       <p:ext uri="{BB962C8B-B14F-4D97-AF65-F5344CB8AC3E}">
-        <p14:creationId xmlns:p14="http://schemas.microsoft.com/office/powerpoint/2010/main" val="3565611311"/>
+        <p14:creationId xmlns:p14="http://schemas.microsoft.com/office/powerpoint/2010/main" val="3043587272"/>
       </p:ext>
     </p:extLst>
   </p:cSld>
@@ -19441,7 +21275,7 @@
           <p:cNvPr id="2" name="Title 1">
             <a:extLst>
               <a:ext uri="{FF2B5EF4-FFF2-40B4-BE49-F238E27FC236}">
-                <a16:creationId xmlns:a16="http://schemas.microsoft.com/office/drawing/2014/main" id="{0DB06B14-C727-D448-B006-9B16C89B8923}"/>
+                <a16:creationId xmlns:a16="http://schemas.microsoft.com/office/drawing/2014/main" id="{94E0E83A-4B2A-E544-BF79-EC8A6F911A9E}"/>
               </a:ext>
             </a:extLst>
           </p:cNvPr>
@@ -19459,7 +21293,7 @@
           <a:p>
             <a:r>
               <a:rPr lang="en-US" dirty="0"/>
-              <a:t>Create Docker Containers</a:t>
+              <a:t>Build Docker Images</a:t>
             </a:r>
           </a:p>
         </p:txBody>
@@ -19469,7 +21303,7 @@
           <p:cNvPr id="3" name="Content Placeholder 2">
             <a:extLst>
               <a:ext uri="{FF2B5EF4-FFF2-40B4-BE49-F238E27FC236}">
-                <a16:creationId xmlns:a16="http://schemas.microsoft.com/office/drawing/2014/main" id="{D5FFDFF9-EB2F-BD49-B79C-EB08AF5D9C92}"/>
+                <a16:creationId xmlns:a16="http://schemas.microsoft.com/office/drawing/2014/main" id="{34D58626-62C7-114E-81E1-0A0A21659024}"/>
               </a:ext>
             </a:extLst>
           </p:cNvPr>
@@ -19482,170 +21316,38 @@
         </p:nvSpPr>
         <p:spPr/>
         <p:txBody>
-          <a:bodyPr>
-            <a:normAutofit fontScale="92500" lnSpcReduction="20000"/>
-          </a:bodyPr>
+          <a:bodyPr/>
           <a:lstStyle/>
           <a:p>
             <a:r>
               <a:rPr lang="en-US" dirty="0"/>
-              <a:t>docker container ls [-a]</a:t>
+              <a:t>docker image build -t </a:t>
             </a:r>
-          </a:p>
-          <a:p>
+            <a:r>
+              <a:rPr lang="en-US" dirty="0" err="1"/>
+              <a:t>nnn</a:t>
+            </a:r>
             <a:r>
               <a:rPr lang="en-US" dirty="0"/>
-              <a:t>docker container run</a:t>
+              <a:t> .</a:t>
             </a:r>
           </a:p>
           <a:p>
-            <a:pPr lvl="1"/>
             <a:r>
               <a:rPr lang="en-US" dirty="0"/>
-              <a:t>Flags</a:t>
+              <a:t>docker image ls</a:t>
             </a:r>
           </a:p>
           <a:p>
-            <a:pPr lvl="2"/>
-            <a:r>
-              <a:rPr lang="en-US" dirty="0" err="1"/>
-              <a:t>i</a:t>
-            </a:r>
-            <a:endParaRPr lang="en-US" dirty="0"/>
-          </a:p>
-          <a:p>
-            <a:pPr lvl="2"/>
             <a:r>
               <a:rPr lang="en-US" dirty="0"/>
-              <a:t>t</a:t>
+              <a:t>docker image push</a:t>
             </a:r>
           </a:p>
           <a:p>
-            <a:pPr lvl="2"/>
             <a:r>
               <a:rPr lang="en-US" dirty="0"/>
-              <a:t>d</a:t>
-            </a:r>
-          </a:p>
-          <a:p>
-            <a:pPr lvl="2"/>
-            <a:r>
-              <a:rPr lang="en-US" dirty="0"/>
-              <a:t>--name</a:t>
-            </a:r>
-          </a:p>
-          <a:p>
-            <a:pPr lvl="2"/>
-            <a:r>
-              <a:rPr lang="en-US" dirty="0"/>
-              <a:t>--rm</a:t>
-            </a:r>
-          </a:p>
-          <a:p>
-            <a:pPr lvl="2"/>
-            <a:r>
-              <a:rPr lang="en-US" dirty="0"/>
-              <a:t>Ctrl P + Q</a:t>
-            </a:r>
-          </a:p>
-          <a:p>
-            <a:pPr lvl="2"/>
-            <a:r>
-              <a:rPr lang="en-US" dirty="0"/>
-              <a:t>Ctrl D</a:t>
-            </a:r>
-          </a:p>
-          <a:p>
-            <a:pPr lvl="0"/>
-            <a:r>
-              <a:rPr lang="en-US" dirty="0"/>
-              <a:t>docker container start/stop/attach/rm</a:t>
-            </a:r>
-          </a:p>
-          <a:p>
-            <a:pPr marL="685800" marR="0" lvl="1" indent="-228600" algn="l" defTabSz="914400" rtl="0" eaLnBrk="1" fontAlgn="auto" latinLnBrk="0" hangingPunct="1">
-              <a:lnSpc>
-                <a:spcPct val="90000"/>
-              </a:lnSpc>
-              <a:spcBef>
-                <a:spcPts val="500"/>
-              </a:spcBef>
-              <a:spcAft>
-                <a:spcPts val="0"/>
-              </a:spcAft>
-              <a:buClrTx/>
-              <a:buSzTx/>
-              <a:buFont typeface="Arial" panose="020B0604020202020204" pitchFamily="34" charset="0"/>
-              <a:buChar char="•"/>
-              <a:tabLst/>
-              <a:defRPr/>
-            </a:pPr>
-            <a:r>
-              <a:rPr lang="en-US" sz="2400" kern="1200" dirty="0">
-                <a:solidFill>
-                  <a:schemeClr val="tx1"/>
-                </a:solidFill>
-                <a:effectLst/>
-                <a:latin typeface="+mn-lt"/>
-                <a:ea typeface="+mn-ea"/>
-                <a:cs typeface="+mn-cs"/>
-              </a:rPr>
-              <a:t>docker container</a:t>
-            </a:r>
-            <a:r>
-              <a:rPr lang="en-US" sz="2400" kern="1200" baseline="0" dirty="0">
-                <a:solidFill>
-                  <a:schemeClr val="tx1"/>
-                </a:solidFill>
-                <a:effectLst/>
-                <a:latin typeface="+mn-lt"/>
-                <a:ea typeface="+mn-ea"/>
-                <a:cs typeface="+mn-cs"/>
-              </a:rPr>
-              <a:t> stop container1 container2 container3</a:t>
-            </a:r>
-          </a:p>
-          <a:p>
-            <a:pPr marL="685800" marR="0" lvl="1" indent="-228600" algn="l" defTabSz="914400" rtl="0" eaLnBrk="1" fontAlgn="auto" latinLnBrk="0" hangingPunct="1">
-              <a:lnSpc>
-                <a:spcPct val="90000"/>
-              </a:lnSpc>
-              <a:spcBef>
-                <a:spcPts val="500"/>
-              </a:spcBef>
-              <a:spcAft>
-                <a:spcPts val="0"/>
-              </a:spcAft>
-              <a:buClrTx/>
-              <a:buSzTx/>
-              <a:buFont typeface="Arial" panose="020B0604020202020204" pitchFamily="34" charset="0"/>
-              <a:buChar char="•"/>
-              <a:tabLst/>
-              <a:defRPr/>
-            </a:pPr>
-            <a:r>
-              <a:rPr lang="en-US" sz="2400" kern="1200" dirty="0">
-                <a:solidFill>
-                  <a:schemeClr val="tx1"/>
-                </a:solidFill>
-                <a:effectLst/>
-                <a:latin typeface="+mn-lt"/>
-                <a:ea typeface="+mn-ea"/>
-                <a:cs typeface="+mn-cs"/>
-              </a:rPr>
-              <a:t>docker container</a:t>
-            </a:r>
-            <a:r>
-              <a:rPr lang="en-US" sz="2400" kern="1200" baseline="0" dirty="0">
-                <a:solidFill>
-                  <a:schemeClr val="tx1"/>
-                </a:solidFill>
-                <a:effectLst/>
-                <a:latin typeface="+mn-lt"/>
-                <a:ea typeface="+mn-ea"/>
-                <a:cs typeface="+mn-cs"/>
-              </a:rPr>
-              <a:t> stop $(docker container ls -a -q)</a:t>
+              <a:t>docker image rm</a:t>
             </a:r>
           </a:p>
         </p:txBody>
@@ -19655,7 +21357,7 @@
           <p:cNvPr id="4" name="Date Placeholder 3">
             <a:extLst>
               <a:ext uri="{FF2B5EF4-FFF2-40B4-BE49-F238E27FC236}">
-                <a16:creationId xmlns:a16="http://schemas.microsoft.com/office/drawing/2014/main" id="{E7AF9DB9-6A2B-8841-A7D0-6CEA791F9D17}"/>
+                <a16:creationId xmlns:a16="http://schemas.microsoft.com/office/drawing/2014/main" id="{CC4ADDAD-DA87-B242-A2FD-55D58FC589CB}"/>
               </a:ext>
             </a:extLst>
           </p:cNvPr>
@@ -19684,7 +21386,7 @@
           <p:cNvPr id="5" name="Slide Number Placeholder 4">
             <a:extLst>
               <a:ext uri="{FF2B5EF4-FFF2-40B4-BE49-F238E27FC236}">
-                <a16:creationId xmlns:a16="http://schemas.microsoft.com/office/drawing/2014/main" id="{25231814-AD22-424F-8371-36B475FB5D80}"/>
+                <a16:creationId xmlns:a16="http://schemas.microsoft.com/office/drawing/2014/main" id="{A1DDA22E-7443-8A4B-9114-623E0D047796}"/>
               </a:ext>
             </a:extLst>
           </p:cNvPr>
@@ -19712,7 +21414,7 @@
     </p:spTree>
     <p:extLst>
       <p:ext uri="{BB962C8B-B14F-4D97-AF65-F5344CB8AC3E}">
-        <p14:creationId xmlns:p14="http://schemas.microsoft.com/office/powerpoint/2010/main" val="2444915202"/>
+        <p14:creationId xmlns:p14="http://schemas.microsoft.com/office/powerpoint/2010/main" val="3565611311"/>
       </p:ext>
     </p:extLst>
   </p:cSld>
@@ -19756,7 +21458,7 @@
           <p:cNvPr id="2" name="Title 1">
             <a:extLst>
               <a:ext uri="{FF2B5EF4-FFF2-40B4-BE49-F238E27FC236}">
-                <a16:creationId xmlns:a16="http://schemas.microsoft.com/office/drawing/2014/main" id="{D84D405D-FCCC-E449-81AA-F627FC8CD5FE}"/>
+                <a16:creationId xmlns:a16="http://schemas.microsoft.com/office/drawing/2014/main" id="{0DB06B14-C727-D448-B006-9B16C89B8923}"/>
               </a:ext>
             </a:extLst>
           </p:cNvPr>
@@ -19774,13 +21476,8 @@
           <a:p>
             <a:r>
               <a:rPr lang="en-US" dirty="0"/>
-              <a:t>Mount</a:t>
+              <a:t>Create Docker Containers</a:t>
             </a:r>
-            <a:r>
-              <a:rPr lang="en-US" baseline="0" dirty="0"/>
-              <a:t> Local Volumes to Docker Containers</a:t>
-            </a:r>
-            <a:endParaRPr lang="en-US" dirty="0"/>
           </a:p>
         </p:txBody>
       </p:sp>
@@ -19789,7 +21486,7 @@
           <p:cNvPr id="3" name="Content Placeholder 2">
             <a:extLst>
               <a:ext uri="{FF2B5EF4-FFF2-40B4-BE49-F238E27FC236}">
-                <a16:creationId xmlns:a16="http://schemas.microsoft.com/office/drawing/2014/main" id="{2797B28F-2840-2049-A94D-AACB96372593}"/>
+                <a16:creationId xmlns:a16="http://schemas.microsoft.com/office/drawing/2014/main" id="{D5FFDFF9-EB2F-BD49-B79C-EB08AF5D9C92}"/>
               </a:ext>
             </a:extLst>
           </p:cNvPr>
@@ -19802,11 +21499,171 @@
         </p:nvSpPr>
         <p:spPr/>
         <p:txBody>
-          <a:bodyPr/>
+          <a:bodyPr>
+            <a:normAutofit fontScale="92500" lnSpcReduction="20000"/>
+          </a:bodyPr>
           <a:lstStyle/>
           <a:p>
+            <a:r>
+              <a:rPr lang="en-US" dirty="0"/>
+              <a:t>docker container ls [-a]</a:t>
+            </a:r>
+          </a:p>
+          <a:p>
+            <a:r>
+              <a:rPr lang="en-US" dirty="0"/>
+              <a:t>docker container run</a:t>
+            </a:r>
+          </a:p>
+          <a:p>
+            <a:pPr lvl="1"/>
+            <a:r>
+              <a:rPr lang="en-US" dirty="0"/>
+              <a:t>Flags</a:t>
+            </a:r>
+          </a:p>
+          <a:p>
             <a:pPr lvl="2"/>
-            <a:endParaRPr lang="en-US"/>
+            <a:r>
+              <a:rPr lang="en-US" dirty="0" err="1"/>
+              <a:t>i</a:t>
+            </a:r>
+            <a:endParaRPr lang="en-US" dirty="0"/>
+          </a:p>
+          <a:p>
+            <a:pPr lvl="2"/>
+            <a:r>
+              <a:rPr lang="en-US" dirty="0"/>
+              <a:t>t</a:t>
+            </a:r>
+          </a:p>
+          <a:p>
+            <a:pPr lvl="2"/>
+            <a:r>
+              <a:rPr lang="en-US" dirty="0"/>
+              <a:t>d</a:t>
+            </a:r>
+          </a:p>
+          <a:p>
+            <a:pPr lvl="2"/>
+            <a:r>
+              <a:rPr lang="en-US" dirty="0"/>
+              <a:t>--name</a:t>
+            </a:r>
+          </a:p>
+          <a:p>
+            <a:pPr lvl="2"/>
+            <a:r>
+              <a:rPr lang="en-US" dirty="0"/>
+              <a:t>--rm</a:t>
+            </a:r>
+          </a:p>
+          <a:p>
+            <a:pPr lvl="2"/>
+            <a:r>
+              <a:rPr lang="en-US" dirty="0"/>
+              <a:t>Ctrl P + Q</a:t>
+            </a:r>
+          </a:p>
+          <a:p>
+            <a:pPr lvl="2"/>
+            <a:r>
+              <a:rPr lang="en-US" dirty="0"/>
+              <a:t>Ctrl D</a:t>
+            </a:r>
+          </a:p>
+          <a:p>
+            <a:pPr lvl="0"/>
+            <a:r>
+              <a:rPr lang="en-US" dirty="0"/>
+              <a:t>docker container start/stop/attach/rm</a:t>
+            </a:r>
+          </a:p>
+          <a:p>
+            <a:pPr marL="685800" marR="0" lvl="1" indent="-228600" algn="l" defTabSz="914400" rtl="0" eaLnBrk="1" fontAlgn="auto" latinLnBrk="0" hangingPunct="1">
+              <a:lnSpc>
+                <a:spcPct val="90000"/>
+              </a:lnSpc>
+              <a:spcBef>
+                <a:spcPts val="500"/>
+              </a:spcBef>
+              <a:spcAft>
+                <a:spcPts val="0"/>
+              </a:spcAft>
+              <a:buClrTx/>
+              <a:buSzTx/>
+              <a:buFont typeface="Arial" panose="020B0604020202020204" pitchFamily="34" charset="0"/>
+              <a:buChar char="•"/>
+              <a:tabLst/>
+              <a:defRPr/>
+            </a:pPr>
+            <a:r>
+              <a:rPr lang="en-US" sz="2400" kern="1200" dirty="0">
+                <a:solidFill>
+                  <a:schemeClr val="tx1"/>
+                </a:solidFill>
+                <a:effectLst/>
+                <a:latin typeface="+mn-lt"/>
+                <a:ea typeface="+mn-ea"/>
+                <a:cs typeface="+mn-cs"/>
+              </a:rPr>
+              <a:t>docker container</a:t>
+            </a:r>
+            <a:r>
+              <a:rPr lang="en-US" sz="2400" kern="1200" baseline="0" dirty="0">
+                <a:solidFill>
+                  <a:schemeClr val="tx1"/>
+                </a:solidFill>
+                <a:effectLst/>
+                <a:latin typeface="+mn-lt"/>
+                <a:ea typeface="+mn-ea"/>
+                <a:cs typeface="+mn-cs"/>
+              </a:rPr>
+              <a:t> stop container1 container2 container3</a:t>
+            </a:r>
+          </a:p>
+          <a:p>
+            <a:pPr marL="685800" marR="0" lvl="1" indent="-228600" algn="l" defTabSz="914400" rtl="0" eaLnBrk="1" fontAlgn="auto" latinLnBrk="0" hangingPunct="1">
+              <a:lnSpc>
+                <a:spcPct val="90000"/>
+              </a:lnSpc>
+              <a:spcBef>
+                <a:spcPts val="500"/>
+              </a:spcBef>
+              <a:spcAft>
+                <a:spcPts val="0"/>
+              </a:spcAft>
+              <a:buClrTx/>
+              <a:buSzTx/>
+              <a:buFont typeface="Arial" panose="020B0604020202020204" pitchFamily="34" charset="0"/>
+              <a:buChar char="•"/>
+              <a:tabLst/>
+              <a:defRPr/>
+            </a:pPr>
+            <a:r>
+              <a:rPr lang="en-US" sz="2400" kern="1200" dirty="0">
+                <a:solidFill>
+                  <a:schemeClr val="tx1"/>
+                </a:solidFill>
+                <a:effectLst/>
+                <a:latin typeface="+mn-lt"/>
+                <a:ea typeface="+mn-ea"/>
+                <a:cs typeface="+mn-cs"/>
+              </a:rPr>
+              <a:t>docker container</a:t>
+            </a:r>
+            <a:r>
+              <a:rPr lang="en-US" sz="2400" kern="1200" baseline="0" dirty="0">
+                <a:solidFill>
+                  <a:schemeClr val="tx1"/>
+                </a:solidFill>
+                <a:effectLst/>
+                <a:latin typeface="+mn-lt"/>
+                <a:ea typeface="+mn-ea"/>
+                <a:cs typeface="+mn-cs"/>
+              </a:rPr>
+              <a:t> stop $(docker container ls -a -q)</a:t>
+            </a:r>
           </a:p>
         </p:txBody>
       </p:sp>
@@ -19815,7 +21672,7 @@
           <p:cNvPr id="4" name="Date Placeholder 3">
             <a:extLst>
               <a:ext uri="{FF2B5EF4-FFF2-40B4-BE49-F238E27FC236}">
-                <a16:creationId xmlns:a16="http://schemas.microsoft.com/office/drawing/2014/main" id="{5840314C-3351-514D-A9AA-DF0F5D7C2BAD}"/>
+                <a16:creationId xmlns:a16="http://schemas.microsoft.com/office/drawing/2014/main" id="{E7AF9DB9-6A2B-8841-A7D0-6CEA791F9D17}"/>
               </a:ext>
             </a:extLst>
           </p:cNvPr>
@@ -19844,7 +21701,7 @@
           <p:cNvPr id="5" name="Slide Number Placeholder 4">
             <a:extLst>
               <a:ext uri="{FF2B5EF4-FFF2-40B4-BE49-F238E27FC236}">
-                <a16:creationId xmlns:a16="http://schemas.microsoft.com/office/drawing/2014/main" id="{9E247962-C086-7B42-9DBE-A2FF934C2CBD}"/>
+                <a16:creationId xmlns:a16="http://schemas.microsoft.com/office/drawing/2014/main" id="{25231814-AD22-424F-8371-36B475FB5D80}"/>
               </a:ext>
             </a:extLst>
           </p:cNvPr>
@@ -19872,7 +21729,7 @@
     </p:spTree>
     <p:extLst>
       <p:ext uri="{BB962C8B-B14F-4D97-AF65-F5344CB8AC3E}">
-        <p14:creationId xmlns:p14="http://schemas.microsoft.com/office/powerpoint/2010/main" val="109380659"/>
+        <p14:creationId xmlns:p14="http://schemas.microsoft.com/office/powerpoint/2010/main" val="2444915202"/>
       </p:ext>
     </p:extLst>
   </p:cSld>
@@ -19916,7 +21773,7 @@
           <p:cNvPr id="2" name="Title 1">
             <a:extLst>
               <a:ext uri="{FF2B5EF4-FFF2-40B4-BE49-F238E27FC236}">
-                <a16:creationId xmlns:a16="http://schemas.microsoft.com/office/drawing/2014/main" id="{E1CC3210-9CAD-894F-953C-7E96E99B1584}"/>
+                <a16:creationId xmlns:a16="http://schemas.microsoft.com/office/drawing/2014/main" id="{D84D405D-FCCC-E449-81AA-F627FC8CD5FE}"/>
               </a:ext>
             </a:extLst>
           </p:cNvPr>
@@ -19934,11 +21791,11 @@
           <a:p>
             <a:r>
               <a:rPr lang="en-US" dirty="0"/>
-              <a:t>Port Forward to</a:t>
+              <a:t>Mount</a:t>
             </a:r>
             <a:r>
               <a:rPr lang="en-US" baseline="0" dirty="0"/>
-              <a:t> Docker Containers</a:t>
+              <a:t> Local Volumes to Docker Containers</a:t>
             </a:r>
             <a:endParaRPr lang="en-US" dirty="0"/>
           </a:p>
@@ -19949,7 +21806,7 @@
           <p:cNvPr id="3" name="Content Placeholder 2">
             <a:extLst>
               <a:ext uri="{FF2B5EF4-FFF2-40B4-BE49-F238E27FC236}">
-                <a16:creationId xmlns:a16="http://schemas.microsoft.com/office/drawing/2014/main" id="{697E95B3-5E4A-3543-8B62-304786E5D366}"/>
+                <a16:creationId xmlns:a16="http://schemas.microsoft.com/office/drawing/2014/main" id="{2797B28F-2840-2049-A94D-AACB96372593}"/>
               </a:ext>
             </a:extLst>
           </p:cNvPr>
@@ -19965,6 +21822,7 @@
           <a:bodyPr/>
           <a:lstStyle/>
           <a:p>
+            <a:pPr lvl="2"/>
             <a:endParaRPr lang="en-US"/>
           </a:p>
         </p:txBody>
@@ -19974,7 +21832,7 @@
           <p:cNvPr id="4" name="Date Placeholder 3">
             <a:extLst>
               <a:ext uri="{FF2B5EF4-FFF2-40B4-BE49-F238E27FC236}">
-                <a16:creationId xmlns:a16="http://schemas.microsoft.com/office/drawing/2014/main" id="{BC69D427-E0F9-E24A-9F8B-C096BD28325E}"/>
+                <a16:creationId xmlns:a16="http://schemas.microsoft.com/office/drawing/2014/main" id="{5840314C-3351-514D-A9AA-DF0F5D7C2BAD}"/>
               </a:ext>
             </a:extLst>
           </p:cNvPr>
@@ -20003,7 +21861,7 @@
           <p:cNvPr id="5" name="Slide Number Placeholder 4">
             <a:extLst>
               <a:ext uri="{FF2B5EF4-FFF2-40B4-BE49-F238E27FC236}">
-                <a16:creationId xmlns:a16="http://schemas.microsoft.com/office/drawing/2014/main" id="{E4E0B44E-C38D-BE4B-8974-805C60EE8918}"/>
+                <a16:creationId xmlns:a16="http://schemas.microsoft.com/office/drawing/2014/main" id="{9E247962-C086-7B42-9DBE-A2FF934C2CBD}"/>
               </a:ext>
             </a:extLst>
           </p:cNvPr>
@@ -20031,7 +21889,7 @@
     </p:spTree>
     <p:extLst>
       <p:ext uri="{BB962C8B-B14F-4D97-AF65-F5344CB8AC3E}">
-        <p14:creationId xmlns:p14="http://schemas.microsoft.com/office/powerpoint/2010/main" val="508043100"/>
+        <p14:creationId xmlns:p14="http://schemas.microsoft.com/office/powerpoint/2010/main" val="109380659"/>
       </p:ext>
     </p:extLst>
   </p:cSld>
@@ -20075,6 +21933,165 @@
           <p:cNvPr id="2" name="Title 1">
             <a:extLst>
               <a:ext uri="{FF2B5EF4-FFF2-40B4-BE49-F238E27FC236}">
+                <a16:creationId xmlns:a16="http://schemas.microsoft.com/office/drawing/2014/main" id="{E1CC3210-9CAD-894F-953C-7E96E99B1584}"/>
+              </a:ext>
+            </a:extLst>
+          </p:cNvPr>
+          <p:cNvSpPr>
+            <a:spLocks noGrp="1"/>
+          </p:cNvSpPr>
+          <p:nvPr>
+            <p:ph type="title"/>
+          </p:nvPr>
+        </p:nvSpPr>
+        <p:spPr/>
+        <p:txBody>
+          <a:bodyPr/>
+          <a:lstStyle/>
+          <a:p>
+            <a:r>
+              <a:rPr lang="en-US" dirty="0"/>
+              <a:t>Port Forward to</a:t>
+            </a:r>
+            <a:r>
+              <a:rPr lang="en-US" baseline="0" dirty="0"/>
+              <a:t> Docker Containers</a:t>
+            </a:r>
+            <a:endParaRPr lang="en-US" dirty="0"/>
+          </a:p>
+        </p:txBody>
+      </p:sp>
+      <p:sp>
+        <p:nvSpPr>
+          <p:cNvPr id="3" name="Content Placeholder 2">
+            <a:extLst>
+              <a:ext uri="{FF2B5EF4-FFF2-40B4-BE49-F238E27FC236}">
+                <a16:creationId xmlns:a16="http://schemas.microsoft.com/office/drawing/2014/main" id="{697E95B3-5E4A-3543-8B62-304786E5D366}"/>
+              </a:ext>
+            </a:extLst>
+          </p:cNvPr>
+          <p:cNvSpPr>
+            <a:spLocks noGrp="1"/>
+          </p:cNvSpPr>
+          <p:nvPr>
+            <p:ph idx="1"/>
+          </p:nvPr>
+        </p:nvSpPr>
+        <p:spPr/>
+        <p:txBody>
+          <a:bodyPr/>
+          <a:lstStyle/>
+          <a:p>
+            <a:endParaRPr lang="en-US"/>
+          </a:p>
+        </p:txBody>
+      </p:sp>
+      <p:sp>
+        <p:nvSpPr>
+          <p:cNvPr id="4" name="Date Placeholder 3">
+            <a:extLst>
+              <a:ext uri="{FF2B5EF4-FFF2-40B4-BE49-F238E27FC236}">
+                <a16:creationId xmlns:a16="http://schemas.microsoft.com/office/drawing/2014/main" id="{BC69D427-E0F9-E24A-9F8B-C096BD28325E}"/>
+              </a:ext>
+            </a:extLst>
+          </p:cNvPr>
+          <p:cNvSpPr>
+            <a:spLocks noGrp="1"/>
+          </p:cNvSpPr>
+          <p:nvPr>
+            <p:ph type="dt" sz="half" idx="10"/>
+          </p:nvPr>
+        </p:nvSpPr>
+        <p:spPr/>
+        <p:txBody>
+          <a:bodyPr/>
+          <a:lstStyle/>
+          <a:p>
+            <a:r>
+              <a:rPr lang="en-US"/>
+              <a:t>World Wide Technology ©</a:t>
+            </a:r>
+            <a:endParaRPr lang="en-US" dirty="0"/>
+          </a:p>
+        </p:txBody>
+      </p:sp>
+      <p:sp>
+        <p:nvSpPr>
+          <p:cNvPr id="5" name="Slide Number Placeholder 4">
+            <a:extLst>
+              <a:ext uri="{FF2B5EF4-FFF2-40B4-BE49-F238E27FC236}">
+                <a16:creationId xmlns:a16="http://schemas.microsoft.com/office/drawing/2014/main" id="{E4E0B44E-C38D-BE4B-8974-805C60EE8918}"/>
+              </a:ext>
+            </a:extLst>
+          </p:cNvPr>
+          <p:cNvSpPr>
+            <a:spLocks noGrp="1"/>
+          </p:cNvSpPr>
+          <p:nvPr>
+            <p:ph type="sldNum" sz="quarter" idx="12"/>
+          </p:nvPr>
+        </p:nvSpPr>
+        <p:spPr/>
+        <p:txBody>
+          <a:bodyPr/>
+          <a:lstStyle/>
+          <a:p>
+            <a:fld id="{A44B02FA-DD2D-1844-AE35-8B2EAB0CF4EF}" type="slidenum">
+              <a:rPr lang="en-US" smtClean="0"/>
+              <a:pPr/>
+              <a:t>28</a:t>
+            </a:fld>
+            <a:endParaRPr lang="en-US" dirty="0"/>
+          </a:p>
+        </p:txBody>
+      </p:sp>
+    </p:spTree>
+    <p:extLst>
+      <p:ext uri="{BB962C8B-B14F-4D97-AF65-F5344CB8AC3E}">
+        <p14:creationId xmlns:p14="http://schemas.microsoft.com/office/powerpoint/2010/main" val="508043100"/>
+      </p:ext>
+    </p:extLst>
+  </p:cSld>
+  <p:clrMapOvr>
+    <a:masterClrMapping/>
+  </p:clrMapOvr>
+  <mc:AlternateContent xmlns:mc="http://schemas.openxmlformats.org/markup-compatibility/2006" xmlns:p14="http://schemas.microsoft.com/office/powerpoint/2010/main">
+    <mc:Choice Requires="p14">
+      <p:transition spd="med" p14:dur="700">
+        <p:fade/>
+      </p:transition>
+    </mc:Choice>
+    <mc:Fallback xmlns="">
+      <p:transition spd="med">
+        <p:fade/>
+      </p:transition>
+    </mc:Fallback>
+  </mc:AlternateContent>
+</p:sld>
+</file>
+
+<file path=ppt/slides/slide29.xml><?xml version="1.0" encoding="utf-8"?>
+<p:sld xmlns:a="http://schemas.openxmlformats.org/drawingml/2006/main" xmlns:r="http://schemas.openxmlformats.org/officeDocument/2006/relationships" xmlns:p="http://schemas.openxmlformats.org/presentationml/2006/main">
+  <p:cSld>
+    <p:spTree>
+      <p:nvGrpSpPr>
+        <p:cNvPr id="1" name=""/>
+        <p:cNvGrpSpPr/>
+        <p:nvPr/>
+      </p:nvGrpSpPr>
+      <p:grpSpPr>
+        <a:xfrm>
+          <a:off x="0" y="0"/>
+          <a:ext cx="0" cy="0"/>
+          <a:chOff x="0" y="0"/>
+          <a:chExt cx="0" cy="0"/>
+        </a:xfrm>
+      </p:grpSpPr>
+      <p:sp>
+        <p:nvSpPr>
+          <p:cNvPr id="2" name="Title 1">
+            <a:extLst>
+              <a:ext uri="{FF2B5EF4-FFF2-40B4-BE49-F238E27FC236}">
                 <a16:creationId xmlns:a16="http://schemas.microsoft.com/office/drawing/2014/main" id="{61D361B5-F989-1B42-A9E6-11CEA715CBCF}"/>
               </a:ext>
             </a:extLst>
@@ -20306,7 +22323,7 @@
             <a:fld id="{A44B02FA-DD2D-1844-AE35-8B2EAB0CF4EF}" type="slidenum">
               <a:rPr lang="en-US" smtClean="0"/>
               <a:pPr/>
-              <a:t>28</a:t>
+              <a:t>29</a:t>
             </a:fld>
             <a:endParaRPr lang="en-US" dirty="0"/>
           </a:p>
@@ -20337,7 +22354,115 @@
 </p:sld>
 </file>
 
-<file path=ppt/slides/slide29.xml><?xml version="1.0" encoding="utf-8"?>
+<file path=ppt/slides/slide3.xml><?xml version="1.0" encoding="utf-8"?>
+<p:sld xmlns:a="http://schemas.openxmlformats.org/drawingml/2006/main" xmlns:r="http://schemas.openxmlformats.org/officeDocument/2006/relationships" xmlns:p="http://schemas.openxmlformats.org/presentationml/2006/main">
+  <p:cSld>
+    <p:spTree>
+      <p:nvGrpSpPr>
+        <p:cNvPr id="1" name=""/>
+        <p:cNvGrpSpPr/>
+        <p:nvPr/>
+      </p:nvGrpSpPr>
+      <p:grpSpPr>
+        <a:xfrm>
+          <a:off x="0" y="0"/>
+          <a:ext cx="0" cy="0"/>
+          <a:chOff x="0" y="0"/>
+          <a:chExt cx="0" cy="0"/>
+        </a:xfrm>
+      </p:grpSpPr>
+      <p:sp>
+        <p:nvSpPr>
+          <p:cNvPr id="2" name="Title 1">
+            <a:extLst>
+              <a:ext uri="{FF2B5EF4-FFF2-40B4-BE49-F238E27FC236}">
+                <a16:creationId xmlns:a16="http://schemas.microsoft.com/office/drawing/2014/main" id="{9D8D6E4C-FC36-3E4C-9387-96DD20072D9D}"/>
+              </a:ext>
+            </a:extLst>
+          </p:cNvPr>
+          <p:cNvSpPr>
+            <a:spLocks noGrp="1"/>
+          </p:cNvSpPr>
+          <p:nvPr>
+            <p:ph type="ctrTitle"/>
+          </p:nvPr>
+        </p:nvSpPr>
+        <p:spPr>
+          <a:xfrm>
+            <a:off x="1524000" y="914013"/>
+            <a:ext cx="9144000" cy="2387600"/>
+          </a:xfrm>
+        </p:spPr>
+        <p:txBody>
+          <a:bodyPr/>
+          <a:lstStyle/>
+          <a:p>
+            <a:r>
+              <a:rPr lang="en-US" dirty="0"/>
+              <a:t>Part I</a:t>
+            </a:r>
+          </a:p>
+        </p:txBody>
+      </p:sp>
+      <p:sp>
+        <p:nvSpPr>
+          <p:cNvPr id="3" name="Subtitle 2">
+            <a:extLst>
+              <a:ext uri="{FF2B5EF4-FFF2-40B4-BE49-F238E27FC236}">
+                <a16:creationId xmlns:a16="http://schemas.microsoft.com/office/drawing/2014/main" id="{0451A0DE-9D64-5A48-94B5-5B4E42709819}"/>
+              </a:ext>
+            </a:extLst>
+          </p:cNvPr>
+          <p:cNvSpPr>
+            <a:spLocks noGrp="1"/>
+          </p:cNvSpPr>
+          <p:nvPr>
+            <p:ph type="subTitle" idx="1"/>
+          </p:nvPr>
+        </p:nvSpPr>
+        <p:spPr>
+          <a:xfrm>
+            <a:off x="1524000" y="3393688"/>
+            <a:ext cx="9144000" cy="1655762"/>
+          </a:xfrm>
+        </p:spPr>
+        <p:txBody>
+          <a:bodyPr/>
+          <a:lstStyle/>
+          <a:p>
+            <a:r>
+              <a:rPr lang="en-US" dirty="0"/>
+              <a:t>Docker Background</a:t>
+            </a:r>
+          </a:p>
+        </p:txBody>
+      </p:sp>
+    </p:spTree>
+    <p:extLst>
+      <p:ext uri="{BB962C8B-B14F-4D97-AF65-F5344CB8AC3E}">
+        <p14:creationId xmlns:p14="http://schemas.microsoft.com/office/powerpoint/2010/main" val="1216467930"/>
+      </p:ext>
+    </p:extLst>
+  </p:cSld>
+  <p:clrMapOvr>
+    <a:masterClrMapping/>
+  </p:clrMapOvr>
+  <mc:AlternateContent xmlns:mc="http://schemas.openxmlformats.org/markup-compatibility/2006" xmlns:p14="http://schemas.microsoft.com/office/powerpoint/2010/main">
+    <mc:Choice Requires="p14">
+      <p:transition spd="med" p14:dur="700">
+        <p:fade/>
+      </p:transition>
+    </mc:Choice>
+    <mc:Fallback xmlns="">
+      <p:transition spd="med">
+        <p:fade/>
+      </p:transition>
+    </mc:Fallback>
+  </mc:AlternateContent>
+</p:sld>
+</file>
+
+<file path=ppt/slides/slide30.xml><?xml version="1.0" encoding="utf-8"?>
 <p:sld xmlns:a="http://schemas.openxmlformats.org/drawingml/2006/main" xmlns:r="http://schemas.openxmlformats.org/officeDocument/2006/relationships" xmlns:p="http://schemas.openxmlformats.org/presentationml/2006/main">
   <p:cSld>
     <p:spTree>
@@ -20409,115 +22534,7 @@
 </p:sld>
 </file>
 
-<file path=ppt/slides/slide3.xml><?xml version="1.0" encoding="utf-8"?>
-<p:sld xmlns:a="http://schemas.openxmlformats.org/drawingml/2006/main" xmlns:r="http://schemas.openxmlformats.org/officeDocument/2006/relationships" xmlns:p="http://schemas.openxmlformats.org/presentationml/2006/main">
-  <p:cSld>
-    <p:spTree>
-      <p:nvGrpSpPr>
-        <p:cNvPr id="1" name=""/>
-        <p:cNvGrpSpPr/>
-        <p:nvPr/>
-      </p:nvGrpSpPr>
-      <p:grpSpPr>
-        <a:xfrm>
-          <a:off x="0" y="0"/>
-          <a:ext cx="0" cy="0"/>
-          <a:chOff x="0" y="0"/>
-          <a:chExt cx="0" cy="0"/>
-        </a:xfrm>
-      </p:grpSpPr>
-      <p:sp>
-        <p:nvSpPr>
-          <p:cNvPr id="2" name="Title 1">
-            <a:extLst>
-              <a:ext uri="{FF2B5EF4-FFF2-40B4-BE49-F238E27FC236}">
-                <a16:creationId xmlns:a16="http://schemas.microsoft.com/office/drawing/2014/main" id="{9D8D6E4C-FC36-3E4C-9387-96DD20072D9D}"/>
-              </a:ext>
-            </a:extLst>
-          </p:cNvPr>
-          <p:cNvSpPr>
-            <a:spLocks noGrp="1"/>
-          </p:cNvSpPr>
-          <p:nvPr>
-            <p:ph type="ctrTitle"/>
-          </p:nvPr>
-        </p:nvSpPr>
-        <p:spPr>
-          <a:xfrm>
-            <a:off x="1524000" y="914013"/>
-            <a:ext cx="9144000" cy="2387600"/>
-          </a:xfrm>
-        </p:spPr>
-        <p:txBody>
-          <a:bodyPr/>
-          <a:lstStyle/>
-          <a:p>
-            <a:r>
-              <a:rPr lang="en-US" dirty="0"/>
-              <a:t>Part I</a:t>
-            </a:r>
-          </a:p>
-        </p:txBody>
-      </p:sp>
-      <p:sp>
-        <p:nvSpPr>
-          <p:cNvPr id="3" name="Subtitle 2">
-            <a:extLst>
-              <a:ext uri="{FF2B5EF4-FFF2-40B4-BE49-F238E27FC236}">
-                <a16:creationId xmlns:a16="http://schemas.microsoft.com/office/drawing/2014/main" id="{0451A0DE-9D64-5A48-94B5-5B4E42709819}"/>
-              </a:ext>
-            </a:extLst>
-          </p:cNvPr>
-          <p:cNvSpPr>
-            <a:spLocks noGrp="1"/>
-          </p:cNvSpPr>
-          <p:nvPr>
-            <p:ph type="subTitle" idx="1"/>
-          </p:nvPr>
-        </p:nvSpPr>
-        <p:spPr>
-          <a:xfrm>
-            <a:off x="1524000" y="3393688"/>
-            <a:ext cx="9144000" cy="1655762"/>
-          </a:xfrm>
-        </p:spPr>
-        <p:txBody>
-          <a:bodyPr/>
-          <a:lstStyle/>
-          <a:p>
-            <a:r>
-              <a:rPr lang="en-US" dirty="0"/>
-              <a:t>Docker Background</a:t>
-            </a:r>
-          </a:p>
-        </p:txBody>
-      </p:sp>
-    </p:spTree>
-    <p:extLst>
-      <p:ext uri="{BB962C8B-B14F-4D97-AF65-F5344CB8AC3E}">
-        <p14:creationId xmlns:p14="http://schemas.microsoft.com/office/powerpoint/2010/main" val="1216467930"/>
-      </p:ext>
-    </p:extLst>
-  </p:cSld>
-  <p:clrMapOvr>
-    <a:masterClrMapping/>
-  </p:clrMapOvr>
-  <mc:AlternateContent xmlns:mc="http://schemas.openxmlformats.org/markup-compatibility/2006" xmlns:p14="http://schemas.microsoft.com/office/powerpoint/2010/main">
-    <mc:Choice Requires="p14">
-      <p:transition spd="med" p14:dur="700">
-        <p:fade/>
-      </p:transition>
-    </mc:Choice>
-    <mc:Fallback xmlns="">
-      <p:transition spd="med">
-        <p:fade/>
-      </p:transition>
-    </mc:Fallback>
-  </mc:AlternateContent>
-</p:sld>
-</file>
-
-<file path=ppt/slides/slide30.xml><?xml version="1.0" encoding="utf-8"?>
+<file path=ppt/slides/slide31.xml><?xml version="1.0" encoding="utf-8"?>
 <p:sld xmlns:a="http://schemas.openxmlformats.org/drawingml/2006/main" xmlns:r="http://schemas.openxmlformats.org/officeDocument/2006/relationships" xmlns:p="http://schemas.openxmlformats.org/presentationml/2006/main">
   <p:cSld>
     <p:spTree>
@@ -20587,7 +22604,7 @@
             <a:fld id="{A44B02FA-DD2D-1844-AE35-8B2EAB0CF4EF}" type="slidenum">
               <a:rPr lang="en-US" smtClean="0"/>
               <a:pPr/>
-              <a:t>30</a:t>
+              <a:t>31</a:t>
             </a:fld>
             <a:endParaRPr lang="en-US" dirty="0"/>
           </a:p>

</xml_diff>